<commit_message>
Added Basic Map Tests
</commit_message>
<xml_diff>
--- a/Multiple Selection Dialogue App.pptx
+++ b/Multiple Selection Dialogue App.pptx
@@ -13,9 +13,9 @@
     <p:sldId id="263" r:id="rId7"/>
     <p:sldId id="265" r:id="rId8"/>
     <p:sldId id="266" r:id="rId9"/>
-    <p:sldId id="268" r:id="rId10"/>
-    <p:sldId id="269" r:id="rId11"/>
-    <p:sldId id="270" r:id="rId12"/>
+    <p:sldId id="269" r:id="rId10"/>
+    <p:sldId id="286" r:id="rId11"/>
+    <p:sldId id="281" r:id="rId12"/>
     <p:sldId id="271" r:id="rId13"/>
     <p:sldId id="272" r:id="rId14"/>
     <p:sldId id="273" r:id="rId15"/>
@@ -26,6 +26,11 @@
     <p:sldId id="278" r:id="rId20"/>
     <p:sldId id="279" r:id="rId21"/>
     <p:sldId id="280" r:id="rId22"/>
+    <p:sldId id="270" r:id="rId23"/>
+    <p:sldId id="282" r:id="rId24"/>
+    <p:sldId id="283" r:id="rId25"/>
+    <p:sldId id="284" r:id="rId26"/>
+    <p:sldId id="285" r:id="rId27"/>
   </p:sldIdLst>
   <p:sldSz cx="12192000" cy="6858000"/>
   <p:notesSz cx="6858000" cy="9144000"/>
@@ -125,6 +130,48 @@
     </a:lvl9pPr>
   </p:defaultTextStyle>
   <p:extLst>
+    <p:ext uri="{521415D9-36F7-43E2-AB2F-B90AF26B5E84}">
+      <p14:sectionLst xmlns:p14="http://schemas.microsoft.com/office/powerpoint/2010/main">
+        <p14:section name="Default Section" id="{593AC71C-72B4-4AD6-B20E-02EC9BC6E935}">
+          <p14:sldIdLst>
+            <p14:sldId id="256"/>
+            <p14:sldId id="257"/>
+            <p14:sldId id="260"/>
+            <p14:sldId id="261"/>
+            <p14:sldId id="262"/>
+            <p14:sldId id="263"/>
+            <p14:sldId id="265"/>
+            <p14:sldId id="266"/>
+            <p14:sldId id="269"/>
+            <p14:sldId id="286"/>
+          </p14:sldIdLst>
+        </p14:section>
+        <p14:section name="List Test Cases" id="{51E30654-D6C8-4503-9413-8E25CEC5DCE2}">
+          <p14:sldIdLst>
+            <p14:sldId id="281"/>
+            <p14:sldId id="271"/>
+            <p14:sldId id="272"/>
+            <p14:sldId id="273"/>
+            <p14:sldId id="274"/>
+            <p14:sldId id="275"/>
+            <p14:sldId id="276"/>
+            <p14:sldId id="277"/>
+            <p14:sldId id="278"/>
+            <p14:sldId id="279"/>
+            <p14:sldId id="280"/>
+          </p14:sldIdLst>
+        </p14:section>
+        <p14:section name="Map Test Cases" id="{4CD68418-9C4C-422D-872F-109A63B51C2B}">
+          <p14:sldIdLst>
+            <p14:sldId id="270"/>
+            <p14:sldId id="282"/>
+            <p14:sldId id="283"/>
+            <p14:sldId id="284"/>
+            <p14:sldId id="285"/>
+          </p14:sldIdLst>
+        </p14:section>
+      </p14:sectionLst>
+    </p:ext>
     <p:ext uri="{EFAFB233-063F-42B5-8137-9DF3F51BA10A}">
       <p15:sldGuideLst xmlns:p15="http://schemas.microsoft.com/office/powerpoint/2012/main"/>
     </p:ext>
@@ -3985,8 +4032,8 @@
         </p:nvSpPr>
         <p:spPr>
           <a:xfrm>
-            <a:off x="4154690" y="3033813"/>
-            <a:ext cx="2602451" cy="762057"/>
+            <a:off x="3379272" y="3039652"/>
+            <a:ext cx="4706637" cy="762057"/>
           </a:xfrm>
           <a:prstGeom prst="roundRect">
             <a:avLst/>
@@ -4020,8 +4067,12 @@
           <a:p>
             <a:pPr algn="ctr"/>
             <a:r>
+              <a:rPr lang="en-US" sz="2400" b="1" dirty="0" err="1" smtClean="0"/>
+              <a:t>convertToMap</a:t>
+            </a:r>
+            <a:r>
               <a:rPr lang="en-US" sz="2400" b="1" dirty="0" smtClean="0"/>
-              <a:t>initMap()</a:t>
+              <a:t>(List&lt;String flavours)</a:t>
             </a:r>
             <a:endParaRPr lang="en-US" sz="2400" b="1" dirty="0"/>
           </a:p>
@@ -4660,7 +4711,7 @@
     </p:spTree>
     <p:extLst>
       <p:ext uri="{BB962C8B-B14F-4D97-AF65-F5344CB8AC3E}">
-        <p14:creationId xmlns:p14="http://schemas.microsoft.com/office/powerpoint/2010/main" val="2249148404"/>
+        <p14:creationId xmlns:p14="http://schemas.microsoft.com/office/powerpoint/2010/main" val="2674563626"/>
       </p:ext>
     </p:extLst>
   </p:cSld>
@@ -5572,7 +5623,7 @@
     </p:spTree>
     <p:extLst>
       <p:ext uri="{BB962C8B-B14F-4D97-AF65-F5344CB8AC3E}">
-        <p14:creationId xmlns:p14="http://schemas.microsoft.com/office/powerpoint/2010/main" val="3080484217"/>
+        <p14:creationId xmlns:p14="http://schemas.microsoft.com/office/powerpoint/2010/main" val="198072774"/>
       </p:ext>
     </p:extLst>
   </p:cSld>
@@ -11278,6 +11329,2732 @@
     <p:extLst>
       <p:ext uri="{BB962C8B-B14F-4D97-AF65-F5344CB8AC3E}">
         <p14:creationId xmlns:p14="http://schemas.microsoft.com/office/powerpoint/2010/main" val="1061242727"/>
+      </p:ext>
+    </p:extLst>
+  </p:cSld>
+  <p:clrMapOvr>
+    <a:masterClrMapping/>
+  </p:clrMapOvr>
+  <p:timing>
+    <p:tnLst>
+      <p:par>
+        <p:cTn id="1" dur="indefinite" restart="never" nodeType="tmRoot"/>
+      </p:par>
+    </p:tnLst>
+  </p:timing>
+</p:sld>
+</file>
+
+<file path=ppt/slides/slide22.xml><?xml version="1.0" encoding="utf-8"?>
+<p:sld xmlns:a="http://schemas.openxmlformats.org/drawingml/2006/main" xmlns:r="http://schemas.openxmlformats.org/officeDocument/2006/relationships" xmlns:p="http://schemas.openxmlformats.org/presentationml/2006/main">
+  <p:cSld>
+    <p:spTree>
+      <p:nvGrpSpPr>
+        <p:cNvPr id="1" name=""/>
+        <p:cNvGrpSpPr/>
+        <p:nvPr/>
+      </p:nvGrpSpPr>
+      <p:grpSpPr>
+        <a:xfrm>
+          <a:off x="0" y="0"/>
+          <a:ext cx="0" cy="0"/>
+          <a:chOff x="0" y="0"/>
+          <a:chExt cx="0" cy="0"/>
+        </a:xfrm>
+      </p:grpSpPr>
+      <p:sp>
+        <p:nvSpPr>
+          <p:cNvPr id="20" name="Rectangle 19"/>
+          <p:cNvSpPr/>
+          <p:nvPr/>
+        </p:nvSpPr>
+        <p:spPr>
+          <a:xfrm>
+            <a:off x="339831" y="328749"/>
+            <a:ext cx="4237057" cy="369332"/>
+          </a:xfrm>
+          <a:prstGeom prst="rect">
+            <a:avLst/>
+          </a:prstGeom>
+        </p:spPr>
+        <p:txBody>
+          <a:bodyPr wrap="none">
+            <a:spAutoFit/>
+          </a:bodyPr>
+          <a:lstStyle/>
+          <a:p>
+            <a:r>
+              <a:rPr lang="en-US" b="1" dirty="0">
+                <a:solidFill>
+                  <a:srgbClr val="386BC4"/>
+                </a:solidFill>
+                <a:latin typeface="Consolas" panose="020B0609020204030204" pitchFamily="49" charset="0"/>
+              </a:rPr>
+              <a:t>Map&lt;String, bool&gt; </a:t>
+            </a:r>
+            <a:r>
+              <a:rPr lang="en-US" b="1" dirty="0" err="1">
+                <a:solidFill>
+                  <a:srgbClr val="386BC4"/>
+                </a:solidFill>
+                <a:latin typeface="Consolas" panose="020B0609020204030204" pitchFamily="49" charset="0"/>
+              </a:rPr>
+              <a:t>mappedFlavours</a:t>
+            </a:r>
+            <a:endParaRPr lang="en-US" b="1" dirty="0">
+              <a:solidFill>
+                <a:srgbClr val="386BC4"/>
+              </a:solidFill>
+              <a:latin typeface="Consolas" panose="020B0609020204030204" pitchFamily="49" charset="0"/>
+            </a:endParaRPr>
+          </a:p>
+        </p:txBody>
+      </p:sp>
+      <p:sp>
+        <p:nvSpPr>
+          <p:cNvPr id="27" name="Rectangle 26"/>
+          <p:cNvSpPr/>
+          <p:nvPr/>
+        </p:nvSpPr>
+        <p:spPr>
+          <a:xfrm>
+            <a:off x="722878" y="4285916"/>
+            <a:ext cx="6714112" cy="2308324"/>
+          </a:xfrm>
+          <a:prstGeom prst="rect">
+            <a:avLst/>
+          </a:prstGeom>
+        </p:spPr>
+        <p:txBody>
+          <a:bodyPr wrap="square">
+            <a:spAutoFit/>
+          </a:bodyPr>
+          <a:lstStyle/>
+          <a:p>
+            <a:pPr marL="342900" indent="-342900">
+              <a:buFont typeface="+mj-lt"/>
+              <a:buAutoNum type="arabicPeriod"/>
+            </a:pPr>
+            <a:r>
+              <a:rPr lang="en-US" b="1" dirty="0">
+                <a:solidFill>
+                  <a:srgbClr val="C00000"/>
+                </a:solidFill>
+                <a:latin typeface="Consolas" panose="020B0609020204030204" pitchFamily="49" charset="0"/>
+              </a:rPr>
+              <a:t>Map is </a:t>
+            </a:r>
+            <a:r>
+              <a:rPr lang="en-US" b="1" dirty="0" smtClean="0">
+                <a:solidFill>
+                  <a:srgbClr val="C00000"/>
+                </a:solidFill>
+                <a:latin typeface="Consolas" panose="020B0609020204030204" pitchFamily="49" charset="0"/>
+              </a:rPr>
+              <a:t>not null</a:t>
+            </a:r>
+            <a:r>
+              <a:rPr lang="en-US" b="1" dirty="0">
+                <a:solidFill>
+                  <a:srgbClr val="C00000"/>
+                </a:solidFill>
+                <a:latin typeface="Consolas" panose="020B0609020204030204" pitchFamily="49" charset="0"/>
+              </a:rPr>
+              <a:t>.</a:t>
+            </a:r>
+            <a:r>
+              <a:rPr lang="en-US" b="1" dirty="0" smtClean="0">
+                <a:solidFill>
+                  <a:srgbClr val="C00000"/>
+                </a:solidFill>
+                <a:latin typeface="Consolas" panose="020B0609020204030204" pitchFamily="49" charset="0"/>
+              </a:rPr>
+              <a:t/>
+            </a:r>
+            <a:br>
+              <a:rPr lang="en-US" b="1" dirty="0" smtClean="0">
+                <a:solidFill>
+                  <a:srgbClr val="C00000"/>
+                </a:solidFill>
+                <a:latin typeface="Consolas" panose="020B0609020204030204" pitchFamily="49" charset="0"/>
+              </a:rPr>
+            </a:br>
+            <a:endParaRPr lang="en-US" b="1" dirty="0" smtClean="0">
+              <a:solidFill>
+                <a:srgbClr val="C00000"/>
+              </a:solidFill>
+              <a:latin typeface="Consolas" panose="020B0609020204030204" pitchFamily="49" charset="0"/>
+            </a:endParaRPr>
+          </a:p>
+          <a:p>
+            <a:pPr marL="342900" indent="-342900">
+              <a:buFont typeface="+mj-lt"/>
+              <a:buAutoNum type="arabicPeriod"/>
+            </a:pPr>
+            <a:r>
+              <a:rPr lang="en-US" b="1" dirty="0">
+                <a:solidFill>
+                  <a:srgbClr val="C00000"/>
+                </a:solidFill>
+                <a:latin typeface="Consolas" panose="020B0609020204030204" pitchFamily="49" charset="0"/>
+              </a:rPr>
+              <a:t>Map </a:t>
+            </a:r>
+            <a:r>
+              <a:rPr lang="en-US" b="1" dirty="0" smtClean="0">
+                <a:solidFill>
+                  <a:srgbClr val="C00000"/>
+                </a:solidFill>
+                <a:latin typeface="Consolas" panose="020B0609020204030204" pitchFamily="49" charset="0"/>
+              </a:rPr>
+              <a:t>is empty.</a:t>
+            </a:r>
+            <a:r>
+              <a:rPr lang="en-US" b="1" dirty="0" smtClean="0">
+                <a:solidFill>
+                  <a:srgbClr val="C00000"/>
+                </a:solidFill>
+                <a:latin typeface="Consolas" panose="020B0609020204030204" pitchFamily="49" charset="0"/>
+              </a:rPr>
+              <a:t/>
+            </a:r>
+            <a:br>
+              <a:rPr lang="en-US" b="1" dirty="0" smtClean="0">
+                <a:solidFill>
+                  <a:srgbClr val="C00000"/>
+                </a:solidFill>
+                <a:latin typeface="Consolas" panose="020B0609020204030204" pitchFamily="49" charset="0"/>
+              </a:rPr>
+            </a:br>
+            <a:endParaRPr lang="en-US" b="1" dirty="0" smtClean="0">
+              <a:solidFill>
+                <a:srgbClr val="C00000"/>
+              </a:solidFill>
+              <a:latin typeface="Consolas" panose="020B0609020204030204" pitchFamily="49" charset="0"/>
+            </a:endParaRPr>
+          </a:p>
+          <a:p>
+            <a:pPr marL="342900" indent="-342900">
+              <a:buFont typeface="+mj-lt"/>
+              <a:buAutoNum type="arabicPeriod"/>
+            </a:pPr>
+            <a:r>
+              <a:rPr lang="en-US" b="1" dirty="0">
+                <a:solidFill>
+                  <a:srgbClr val="C00000"/>
+                </a:solidFill>
+                <a:latin typeface="Consolas" panose="020B0609020204030204" pitchFamily="49" charset="0"/>
+              </a:rPr>
+              <a:t>Map Key is a string.</a:t>
+            </a:r>
+            <a:r>
+              <a:rPr lang="en-US" b="1" dirty="0" smtClean="0">
+                <a:solidFill>
+                  <a:srgbClr val="C00000"/>
+                </a:solidFill>
+                <a:latin typeface="Consolas" panose="020B0609020204030204" pitchFamily="49" charset="0"/>
+              </a:rPr>
+              <a:t/>
+            </a:r>
+            <a:br>
+              <a:rPr lang="en-US" b="1" dirty="0" smtClean="0">
+                <a:solidFill>
+                  <a:srgbClr val="C00000"/>
+                </a:solidFill>
+                <a:latin typeface="Consolas" panose="020B0609020204030204" pitchFamily="49" charset="0"/>
+              </a:rPr>
+            </a:br>
+            <a:endParaRPr lang="en-US" b="1" dirty="0" smtClean="0">
+              <a:solidFill>
+                <a:srgbClr val="C00000"/>
+              </a:solidFill>
+              <a:latin typeface="Consolas" panose="020B0609020204030204" pitchFamily="49" charset="0"/>
+            </a:endParaRPr>
+          </a:p>
+          <a:p>
+            <a:pPr marL="342900" indent="-342900">
+              <a:buFont typeface="+mj-lt"/>
+              <a:buAutoNum type="arabicPeriod"/>
+            </a:pPr>
+            <a:r>
+              <a:rPr lang="en-US" b="1" dirty="0">
+                <a:solidFill>
+                  <a:srgbClr val="C00000"/>
+                </a:solidFill>
+                <a:latin typeface="Consolas" panose="020B0609020204030204" pitchFamily="49" charset="0"/>
+              </a:rPr>
+              <a:t>Map Value is a bool.</a:t>
+            </a:r>
+            <a:r>
+              <a:rPr lang="en-US" b="1" dirty="0" smtClean="0">
+                <a:solidFill>
+                  <a:srgbClr val="C00000"/>
+                </a:solidFill>
+                <a:latin typeface="Consolas" panose="020B0609020204030204" pitchFamily="49" charset="0"/>
+              </a:rPr>
+              <a:t/>
+            </a:r>
+            <a:br>
+              <a:rPr lang="en-US" b="1" dirty="0" smtClean="0">
+                <a:solidFill>
+                  <a:srgbClr val="C00000"/>
+                </a:solidFill>
+                <a:latin typeface="Consolas" panose="020B0609020204030204" pitchFamily="49" charset="0"/>
+              </a:rPr>
+            </a:br>
+            <a:endParaRPr lang="en-US" b="1" dirty="0" smtClean="0">
+              <a:solidFill>
+                <a:srgbClr val="C00000"/>
+              </a:solidFill>
+              <a:latin typeface="Consolas" panose="020B0609020204030204" pitchFamily="49" charset="0"/>
+            </a:endParaRPr>
+          </a:p>
+        </p:txBody>
+      </p:sp>
+      <p:sp>
+        <p:nvSpPr>
+          <p:cNvPr id="5" name="Rectangle 4"/>
+          <p:cNvSpPr/>
+          <p:nvPr/>
+        </p:nvSpPr>
+        <p:spPr>
+          <a:xfrm>
+            <a:off x="4471848" y="3164509"/>
+            <a:ext cx="3204754" cy="538039"/>
+          </a:xfrm>
+          <a:prstGeom prst="rect">
+            <a:avLst/>
+          </a:prstGeom>
+        </p:spPr>
+        <p:txBody>
+          <a:bodyPr wrap="square">
+            <a:spAutoFit/>
+          </a:bodyPr>
+          <a:lstStyle/>
+          <a:p>
+            <a:pPr algn="ctr"/>
+            <a:r>
+              <a:rPr lang="en-US" sz="2800" b="1" dirty="0" smtClean="0">
+                <a:solidFill>
+                  <a:srgbClr val="C00000"/>
+                </a:solidFill>
+                <a:latin typeface="Consolas" panose="020B0609020204030204" pitchFamily="49" charset="0"/>
+              </a:rPr>
+              <a:t>MAP </a:t>
+            </a:r>
+            <a:r>
+              <a:rPr lang="en-US" sz="2800" b="1" dirty="0" smtClean="0">
+                <a:solidFill>
+                  <a:srgbClr val="C00000"/>
+                </a:solidFill>
+                <a:latin typeface="Consolas" panose="020B0609020204030204" pitchFamily="49" charset="0"/>
+              </a:rPr>
+              <a:t>TEST CASES </a:t>
+            </a:r>
+            <a:endParaRPr lang="en-US" sz="2800" b="1" dirty="0">
+              <a:solidFill>
+                <a:srgbClr val="C00000"/>
+              </a:solidFill>
+              <a:latin typeface="Consolas" panose="020B0609020204030204" pitchFamily="49" charset="0"/>
+            </a:endParaRPr>
+          </a:p>
+        </p:txBody>
+      </p:sp>
+      <p:grpSp>
+        <p:nvGrpSpPr>
+          <p:cNvPr id="13" name="Group 12"/>
+          <p:cNvGrpSpPr/>
+          <p:nvPr/>
+        </p:nvGrpSpPr>
+        <p:grpSpPr>
+          <a:xfrm>
+            <a:off x="2838609" y="1207508"/>
+            <a:ext cx="6235723" cy="1305072"/>
+            <a:chOff x="2525098" y="3134975"/>
+            <a:chExt cx="6235723" cy="1305072"/>
+          </a:xfrm>
+        </p:grpSpPr>
+        <p:sp>
+          <p:nvSpPr>
+            <p:cNvPr id="14" name="Rectangle 13"/>
+            <p:cNvSpPr/>
+            <p:nvPr/>
+          </p:nvSpPr>
+          <p:spPr>
+            <a:xfrm>
+              <a:off x="2525099" y="3134975"/>
+              <a:ext cx="1467780" cy="653143"/>
+            </a:xfrm>
+            <a:prstGeom prst="rect">
+              <a:avLst/>
+            </a:prstGeom>
+          </p:spPr>
+          <p:style>
+            <a:lnRef idx="2">
+              <a:schemeClr val="accent1">
+                <a:shade val="50000"/>
+              </a:schemeClr>
+            </a:lnRef>
+            <a:fillRef idx="1">
+              <a:schemeClr val="accent1"/>
+            </a:fillRef>
+            <a:effectRef idx="0">
+              <a:schemeClr val="accent1"/>
+            </a:effectRef>
+            <a:fontRef idx="minor">
+              <a:schemeClr val="lt1"/>
+            </a:fontRef>
+          </p:style>
+          <p:txBody>
+            <a:bodyPr rtlCol="0" anchor="ctr"/>
+            <a:lstStyle/>
+            <a:p>
+              <a:pPr algn="ctr"/>
+              <a:r>
+                <a:rPr lang="en-US" b="1" dirty="0" smtClean="0">
+                  <a:solidFill>
+                    <a:schemeClr val="bg1"/>
+                  </a:solidFill>
+                  <a:effectLst/>
+                  <a:latin typeface="Consolas" panose="020B0609020204030204" pitchFamily="49" charset="0"/>
+                </a:rPr>
+                <a:t>Chocolate</a:t>
+              </a:r>
+              <a:endParaRPr lang="en-US" b="1" dirty="0">
+                <a:solidFill>
+                  <a:schemeClr val="bg1"/>
+                </a:solidFill>
+              </a:endParaRPr>
+            </a:p>
+          </p:txBody>
+        </p:sp>
+        <p:sp>
+          <p:nvSpPr>
+            <p:cNvPr id="15" name="Rectangle 14"/>
+            <p:cNvSpPr/>
+            <p:nvPr/>
+          </p:nvSpPr>
+          <p:spPr>
+            <a:xfrm>
+              <a:off x="3992878" y="3134975"/>
+              <a:ext cx="1463039" cy="653143"/>
+            </a:xfrm>
+            <a:prstGeom prst="rect">
+              <a:avLst/>
+            </a:prstGeom>
+          </p:spPr>
+          <p:style>
+            <a:lnRef idx="2">
+              <a:schemeClr val="accent1">
+                <a:shade val="50000"/>
+              </a:schemeClr>
+            </a:lnRef>
+            <a:fillRef idx="1">
+              <a:schemeClr val="accent1"/>
+            </a:fillRef>
+            <a:effectRef idx="0">
+              <a:schemeClr val="accent1"/>
+            </a:effectRef>
+            <a:fontRef idx="minor">
+              <a:schemeClr val="lt1"/>
+            </a:fontRef>
+          </p:style>
+          <p:txBody>
+            <a:bodyPr rtlCol="0" anchor="ctr"/>
+            <a:lstStyle/>
+            <a:p>
+              <a:pPr algn="ctr"/>
+              <a:r>
+                <a:rPr lang="en-US" b="1" dirty="0" smtClean="0">
+                  <a:solidFill>
+                    <a:schemeClr val="bg1"/>
+                  </a:solidFill>
+                  <a:effectLst/>
+                  <a:latin typeface="Consolas" panose="020B0609020204030204" pitchFamily="49" charset="0"/>
+                </a:rPr>
+                <a:t>Caramel</a:t>
+              </a:r>
+              <a:endParaRPr lang="en-US" b="1" dirty="0">
+                <a:solidFill>
+                  <a:schemeClr val="bg1"/>
+                </a:solidFill>
+              </a:endParaRPr>
+            </a:p>
+          </p:txBody>
+        </p:sp>
+        <p:sp>
+          <p:nvSpPr>
+            <p:cNvPr id="21" name="Rectangle 20"/>
+            <p:cNvSpPr/>
+            <p:nvPr/>
+          </p:nvSpPr>
+          <p:spPr>
+            <a:xfrm>
+              <a:off x="5455917" y="3134975"/>
+              <a:ext cx="1463039" cy="653143"/>
+            </a:xfrm>
+            <a:prstGeom prst="rect">
+              <a:avLst/>
+            </a:prstGeom>
+          </p:spPr>
+          <p:style>
+            <a:lnRef idx="2">
+              <a:schemeClr val="accent1">
+                <a:shade val="50000"/>
+              </a:schemeClr>
+            </a:lnRef>
+            <a:fillRef idx="1">
+              <a:schemeClr val="accent1"/>
+            </a:fillRef>
+            <a:effectRef idx="0">
+              <a:schemeClr val="accent1"/>
+            </a:effectRef>
+            <a:fontRef idx="minor">
+              <a:schemeClr val="lt1"/>
+            </a:fontRef>
+          </p:style>
+          <p:txBody>
+            <a:bodyPr rtlCol="0" anchor="ctr"/>
+            <a:lstStyle/>
+            <a:p>
+              <a:pPr algn="ctr"/>
+              <a:r>
+                <a:rPr lang="en-US" b="1" dirty="0" smtClean="0">
+                  <a:solidFill>
+                    <a:schemeClr val="bg1"/>
+                  </a:solidFill>
+                  <a:effectLst/>
+                  <a:latin typeface="Consolas" panose="020B0609020204030204" pitchFamily="49" charset="0"/>
+                </a:rPr>
+                <a:t>Vanilla</a:t>
+              </a:r>
+              <a:endParaRPr lang="en-US" b="1" dirty="0">
+                <a:solidFill>
+                  <a:schemeClr val="bg1"/>
+                </a:solidFill>
+              </a:endParaRPr>
+            </a:p>
+          </p:txBody>
+        </p:sp>
+        <p:sp>
+          <p:nvSpPr>
+            <p:cNvPr id="23" name="Rectangle 22"/>
+            <p:cNvSpPr/>
+            <p:nvPr/>
+          </p:nvSpPr>
+          <p:spPr>
+            <a:xfrm>
+              <a:off x="6918956" y="3134975"/>
+              <a:ext cx="1841865" cy="653143"/>
+            </a:xfrm>
+            <a:prstGeom prst="rect">
+              <a:avLst/>
+            </a:prstGeom>
+          </p:spPr>
+          <p:style>
+            <a:lnRef idx="2">
+              <a:schemeClr val="accent1">
+                <a:shade val="50000"/>
+              </a:schemeClr>
+            </a:lnRef>
+            <a:fillRef idx="1">
+              <a:schemeClr val="accent1"/>
+            </a:fillRef>
+            <a:effectRef idx="0">
+              <a:schemeClr val="accent1"/>
+            </a:effectRef>
+            <a:fontRef idx="minor">
+              <a:schemeClr val="lt1"/>
+            </a:fontRef>
+          </p:style>
+          <p:txBody>
+            <a:bodyPr rtlCol="0" anchor="ctr"/>
+            <a:lstStyle/>
+            <a:p>
+              <a:pPr algn="ctr"/>
+              <a:r>
+                <a:rPr lang="en-US" b="1" dirty="0" smtClean="0">
+                  <a:solidFill>
+                    <a:schemeClr val="bg1"/>
+                  </a:solidFill>
+                  <a:effectLst/>
+                  <a:latin typeface="Consolas" panose="020B0609020204030204" pitchFamily="49" charset="0"/>
+                </a:rPr>
+                <a:t>Peanut Butter</a:t>
+              </a:r>
+              <a:endParaRPr lang="en-US" b="1" dirty="0">
+                <a:solidFill>
+                  <a:schemeClr val="bg1"/>
+                </a:solidFill>
+              </a:endParaRPr>
+            </a:p>
+          </p:txBody>
+        </p:sp>
+        <p:sp>
+          <p:nvSpPr>
+            <p:cNvPr id="24" name="Rectangle 23"/>
+            <p:cNvSpPr/>
+            <p:nvPr/>
+          </p:nvSpPr>
+          <p:spPr>
+            <a:xfrm>
+              <a:off x="2525098" y="3786904"/>
+              <a:ext cx="1463039" cy="653143"/>
+            </a:xfrm>
+            <a:prstGeom prst="rect">
+              <a:avLst/>
+            </a:prstGeom>
+          </p:spPr>
+          <p:style>
+            <a:lnRef idx="2">
+              <a:schemeClr val="accent2">
+                <a:shade val="50000"/>
+              </a:schemeClr>
+            </a:lnRef>
+            <a:fillRef idx="1">
+              <a:schemeClr val="accent2"/>
+            </a:fillRef>
+            <a:effectRef idx="0">
+              <a:schemeClr val="accent2"/>
+            </a:effectRef>
+            <a:fontRef idx="minor">
+              <a:schemeClr val="lt1"/>
+            </a:fontRef>
+          </p:style>
+          <p:txBody>
+            <a:bodyPr rtlCol="0" anchor="ctr"/>
+            <a:lstStyle/>
+            <a:p>
+              <a:pPr algn="ctr"/>
+              <a:r>
+                <a:rPr lang="en-US" b="1" dirty="0" smtClean="0">
+                  <a:solidFill>
+                    <a:schemeClr val="bg1"/>
+                  </a:solidFill>
+                  <a:effectLst/>
+                  <a:latin typeface="Consolas" panose="020B0609020204030204" pitchFamily="49" charset="0"/>
+                </a:rPr>
+                <a:t>false</a:t>
+              </a:r>
+              <a:endParaRPr lang="en-US" b="1" dirty="0">
+                <a:solidFill>
+                  <a:schemeClr val="bg1"/>
+                </a:solidFill>
+              </a:endParaRPr>
+            </a:p>
+          </p:txBody>
+        </p:sp>
+        <p:sp>
+          <p:nvSpPr>
+            <p:cNvPr id="26" name="Rectangle 25"/>
+            <p:cNvSpPr/>
+            <p:nvPr/>
+          </p:nvSpPr>
+          <p:spPr>
+            <a:xfrm>
+              <a:off x="3992877" y="3786904"/>
+              <a:ext cx="1463039" cy="653143"/>
+            </a:xfrm>
+            <a:prstGeom prst="rect">
+              <a:avLst/>
+            </a:prstGeom>
+          </p:spPr>
+          <p:style>
+            <a:lnRef idx="2">
+              <a:schemeClr val="accent2">
+                <a:shade val="50000"/>
+              </a:schemeClr>
+            </a:lnRef>
+            <a:fillRef idx="1">
+              <a:schemeClr val="accent2"/>
+            </a:fillRef>
+            <a:effectRef idx="0">
+              <a:schemeClr val="accent2"/>
+            </a:effectRef>
+            <a:fontRef idx="minor">
+              <a:schemeClr val="lt1"/>
+            </a:fontRef>
+          </p:style>
+          <p:txBody>
+            <a:bodyPr rtlCol="0" anchor="ctr"/>
+            <a:lstStyle/>
+            <a:p>
+              <a:pPr algn="ctr"/>
+              <a:r>
+                <a:rPr lang="en-US" b="1" dirty="0" smtClean="0">
+                  <a:solidFill>
+                    <a:schemeClr val="bg1"/>
+                  </a:solidFill>
+                  <a:effectLst/>
+                  <a:latin typeface="Consolas" panose="020B0609020204030204" pitchFamily="49" charset="0"/>
+                </a:rPr>
+                <a:t>false</a:t>
+              </a:r>
+              <a:endParaRPr lang="en-US" b="1" dirty="0">
+                <a:solidFill>
+                  <a:schemeClr val="bg1"/>
+                </a:solidFill>
+              </a:endParaRPr>
+            </a:p>
+          </p:txBody>
+        </p:sp>
+        <p:sp>
+          <p:nvSpPr>
+            <p:cNvPr id="28" name="Rectangle 27"/>
+            <p:cNvSpPr/>
+            <p:nvPr/>
+          </p:nvSpPr>
+          <p:spPr>
+            <a:xfrm>
+              <a:off x="5455917" y="3786904"/>
+              <a:ext cx="1463039" cy="653143"/>
+            </a:xfrm>
+            <a:prstGeom prst="rect">
+              <a:avLst/>
+            </a:prstGeom>
+          </p:spPr>
+          <p:style>
+            <a:lnRef idx="2">
+              <a:schemeClr val="accent2">
+                <a:shade val="50000"/>
+              </a:schemeClr>
+            </a:lnRef>
+            <a:fillRef idx="1">
+              <a:schemeClr val="accent2"/>
+            </a:fillRef>
+            <a:effectRef idx="0">
+              <a:schemeClr val="accent2"/>
+            </a:effectRef>
+            <a:fontRef idx="minor">
+              <a:schemeClr val="lt1"/>
+            </a:fontRef>
+          </p:style>
+          <p:txBody>
+            <a:bodyPr rtlCol="0" anchor="ctr"/>
+            <a:lstStyle/>
+            <a:p>
+              <a:pPr algn="ctr"/>
+              <a:r>
+                <a:rPr lang="en-US" b="1" dirty="0" smtClean="0">
+                  <a:solidFill>
+                    <a:schemeClr val="bg1"/>
+                  </a:solidFill>
+                  <a:effectLst/>
+                  <a:latin typeface="Consolas" panose="020B0609020204030204" pitchFamily="49" charset="0"/>
+                </a:rPr>
+                <a:t>false</a:t>
+              </a:r>
+              <a:endParaRPr lang="en-US" b="1" dirty="0">
+                <a:solidFill>
+                  <a:schemeClr val="bg1"/>
+                </a:solidFill>
+              </a:endParaRPr>
+            </a:p>
+          </p:txBody>
+        </p:sp>
+        <p:sp>
+          <p:nvSpPr>
+            <p:cNvPr id="29" name="Rectangle 28"/>
+            <p:cNvSpPr/>
+            <p:nvPr/>
+          </p:nvSpPr>
+          <p:spPr>
+            <a:xfrm>
+              <a:off x="6918956" y="3786904"/>
+              <a:ext cx="1841865" cy="653143"/>
+            </a:xfrm>
+            <a:prstGeom prst="rect">
+              <a:avLst/>
+            </a:prstGeom>
+          </p:spPr>
+          <p:style>
+            <a:lnRef idx="2">
+              <a:schemeClr val="accent2">
+                <a:shade val="50000"/>
+              </a:schemeClr>
+            </a:lnRef>
+            <a:fillRef idx="1">
+              <a:schemeClr val="accent2"/>
+            </a:fillRef>
+            <a:effectRef idx="0">
+              <a:schemeClr val="accent2"/>
+            </a:effectRef>
+            <a:fontRef idx="minor">
+              <a:schemeClr val="lt1"/>
+            </a:fontRef>
+          </p:style>
+          <p:txBody>
+            <a:bodyPr rtlCol="0" anchor="ctr"/>
+            <a:lstStyle/>
+            <a:p>
+              <a:pPr algn="ctr"/>
+              <a:r>
+                <a:rPr lang="en-US" b="1" dirty="0" smtClean="0">
+                  <a:solidFill>
+                    <a:schemeClr val="bg1"/>
+                  </a:solidFill>
+                  <a:effectLst/>
+                  <a:latin typeface="Consolas" panose="020B0609020204030204" pitchFamily="49" charset="0"/>
+                </a:rPr>
+                <a:t>false</a:t>
+              </a:r>
+              <a:endParaRPr lang="en-US" b="1" dirty="0">
+                <a:solidFill>
+                  <a:schemeClr val="bg1"/>
+                </a:solidFill>
+              </a:endParaRPr>
+            </a:p>
+          </p:txBody>
+        </p:sp>
+      </p:grpSp>
+      <p:sp>
+        <p:nvSpPr>
+          <p:cNvPr id="30" name="Rectangle 29"/>
+          <p:cNvSpPr/>
+          <p:nvPr/>
+        </p:nvSpPr>
+        <p:spPr>
+          <a:xfrm>
+            <a:off x="3174046" y="2530960"/>
+            <a:ext cx="6196250" cy="369332"/>
+          </a:xfrm>
+          <a:prstGeom prst="rect">
+            <a:avLst/>
+          </a:prstGeom>
+        </p:spPr>
+        <p:txBody>
+          <a:bodyPr wrap="square">
+            <a:spAutoFit/>
+          </a:bodyPr>
+          <a:lstStyle/>
+          <a:p>
+            <a:r>
+              <a:rPr lang="en-US" b="1" dirty="0" smtClean="0">
+                <a:effectLst/>
+                <a:latin typeface="Consolas" panose="020B0609020204030204" pitchFamily="49" charset="0"/>
+              </a:rPr>
+              <a:t>  0           1          2            3</a:t>
+            </a:r>
+            <a:endParaRPr lang="en-US" b="1" dirty="0">
+              <a:effectLst/>
+              <a:latin typeface="Consolas" panose="020B0609020204030204" pitchFamily="49" charset="0"/>
+            </a:endParaRPr>
+          </a:p>
+        </p:txBody>
+      </p:sp>
+      <p:sp>
+        <p:nvSpPr>
+          <p:cNvPr id="31" name="Rectangle 30"/>
+          <p:cNvSpPr/>
+          <p:nvPr/>
+        </p:nvSpPr>
+        <p:spPr>
+          <a:xfrm>
+            <a:off x="1938528" y="2499133"/>
+            <a:ext cx="817853" cy="369332"/>
+          </a:xfrm>
+          <a:prstGeom prst="rect">
+            <a:avLst/>
+          </a:prstGeom>
+        </p:spPr>
+        <p:txBody>
+          <a:bodyPr wrap="none">
+            <a:spAutoFit/>
+          </a:bodyPr>
+          <a:lstStyle/>
+          <a:p>
+            <a:r>
+              <a:rPr lang="en-US" b="1" dirty="0" smtClean="0">
+                <a:effectLst/>
+                <a:latin typeface="Consolas" panose="020B0609020204030204" pitchFamily="49" charset="0"/>
+              </a:rPr>
+              <a:t>INDEX</a:t>
+            </a:r>
+            <a:endParaRPr lang="en-US" b="1" dirty="0">
+              <a:effectLst/>
+              <a:latin typeface="Consolas" panose="020B0609020204030204" pitchFamily="49" charset="0"/>
+            </a:endParaRPr>
+          </a:p>
+        </p:txBody>
+      </p:sp>
+    </p:spTree>
+    <p:extLst>
+      <p:ext uri="{BB962C8B-B14F-4D97-AF65-F5344CB8AC3E}">
+        <p14:creationId xmlns:p14="http://schemas.microsoft.com/office/powerpoint/2010/main" val="3080484217"/>
+      </p:ext>
+    </p:extLst>
+  </p:cSld>
+  <p:clrMapOvr>
+    <a:masterClrMapping/>
+  </p:clrMapOvr>
+  <p:timing>
+    <p:tnLst>
+      <p:par>
+        <p:cTn id="1" dur="indefinite" restart="never" nodeType="tmRoot"/>
+      </p:par>
+    </p:tnLst>
+  </p:timing>
+</p:sld>
+</file>
+
+<file path=ppt/slides/slide23.xml><?xml version="1.0" encoding="utf-8"?>
+<p:sld xmlns:a="http://schemas.openxmlformats.org/drawingml/2006/main" xmlns:r="http://schemas.openxmlformats.org/officeDocument/2006/relationships" xmlns:p="http://schemas.openxmlformats.org/presentationml/2006/main">
+  <p:cSld>
+    <p:spTree>
+      <p:nvGrpSpPr>
+        <p:cNvPr id="1" name=""/>
+        <p:cNvGrpSpPr/>
+        <p:nvPr/>
+      </p:nvGrpSpPr>
+      <p:grpSpPr>
+        <a:xfrm>
+          <a:off x="0" y="0"/>
+          <a:ext cx="0" cy="0"/>
+          <a:chOff x="0" y="0"/>
+          <a:chExt cx="0" cy="0"/>
+        </a:xfrm>
+      </p:grpSpPr>
+      <p:sp>
+        <p:nvSpPr>
+          <p:cNvPr id="20" name="Rectangle 19"/>
+          <p:cNvSpPr/>
+          <p:nvPr/>
+        </p:nvSpPr>
+        <p:spPr>
+          <a:xfrm>
+            <a:off x="339831" y="328749"/>
+            <a:ext cx="4237057" cy="369332"/>
+          </a:xfrm>
+          <a:prstGeom prst="rect">
+            <a:avLst/>
+          </a:prstGeom>
+        </p:spPr>
+        <p:txBody>
+          <a:bodyPr wrap="none">
+            <a:spAutoFit/>
+          </a:bodyPr>
+          <a:lstStyle/>
+          <a:p>
+            <a:r>
+              <a:rPr lang="en-US" b="1" dirty="0">
+                <a:solidFill>
+                  <a:srgbClr val="386BC4"/>
+                </a:solidFill>
+                <a:latin typeface="Consolas" panose="020B0609020204030204" pitchFamily="49" charset="0"/>
+              </a:rPr>
+              <a:t>Map&lt;String, bool&gt; </a:t>
+            </a:r>
+            <a:r>
+              <a:rPr lang="en-US" b="1" dirty="0" err="1">
+                <a:solidFill>
+                  <a:srgbClr val="386BC4"/>
+                </a:solidFill>
+                <a:latin typeface="Consolas" panose="020B0609020204030204" pitchFamily="49" charset="0"/>
+              </a:rPr>
+              <a:t>mappedFlavours</a:t>
+            </a:r>
+            <a:endParaRPr lang="en-US" b="1" dirty="0">
+              <a:solidFill>
+                <a:srgbClr val="386BC4"/>
+              </a:solidFill>
+              <a:latin typeface="Consolas" panose="020B0609020204030204" pitchFamily="49" charset="0"/>
+            </a:endParaRPr>
+          </a:p>
+        </p:txBody>
+      </p:sp>
+      <p:sp>
+        <p:nvSpPr>
+          <p:cNvPr id="5" name="Rectangle 4"/>
+          <p:cNvSpPr/>
+          <p:nvPr/>
+        </p:nvSpPr>
+        <p:spPr>
+          <a:xfrm>
+            <a:off x="5111740" y="3164509"/>
+            <a:ext cx="2634534" cy="369332"/>
+          </a:xfrm>
+          <a:prstGeom prst="rect">
+            <a:avLst/>
+          </a:prstGeom>
+        </p:spPr>
+        <p:txBody>
+          <a:bodyPr wrap="square">
+            <a:spAutoFit/>
+          </a:bodyPr>
+          <a:lstStyle/>
+          <a:p>
+            <a:pPr marL="342900" indent="-342900" algn="ctr">
+              <a:buFont typeface="+mj-lt"/>
+              <a:buAutoNum type="arabicPeriod"/>
+            </a:pPr>
+            <a:r>
+              <a:rPr lang="en-US" b="1" dirty="0">
+                <a:solidFill>
+                  <a:srgbClr val="C00000"/>
+                </a:solidFill>
+                <a:latin typeface="Consolas" panose="020B0609020204030204" pitchFamily="49" charset="0"/>
+              </a:rPr>
+              <a:t>Map is </a:t>
+            </a:r>
+            <a:r>
+              <a:rPr lang="en-US" b="1" dirty="0" smtClean="0">
+                <a:solidFill>
+                  <a:srgbClr val="C00000"/>
+                </a:solidFill>
+                <a:latin typeface="Consolas" panose="020B0609020204030204" pitchFamily="49" charset="0"/>
+              </a:rPr>
+              <a:t>not null</a:t>
+            </a:r>
+            <a:r>
+              <a:rPr lang="en-US" b="1" dirty="0">
+                <a:solidFill>
+                  <a:srgbClr val="C00000"/>
+                </a:solidFill>
+                <a:latin typeface="Consolas" panose="020B0609020204030204" pitchFamily="49" charset="0"/>
+              </a:rPr>
+              <a:t>.</a:t>
+            </a:r>
+            <a:endParaRPr lang="en-US" sz="2800" b="1" dirty="0">
+              <a:solidFill>
+                <a:srgbClr val="C00000"/>
+              </a:solidFill>
+              <a:latin typeface="Consolas" panose="020B0609020204030204" pitchFamily="49" charset="0"/>
+            </a:endParaRPr>
+          </a:p>
+        </p:txBody>
+      </p:sp>
+      <p:sp>
+        <p:nvSpPr>
+          <p:cNvPr id="14" name="Rectangle 13"/>
+          <p:cNvSpPr/>
+          <p:nvPr/>
+        </p:nvSpPr>
+        <p:spPr>
+          <a:xfrm>
+            <a:off x="2838610" y="1207508"/>
+            <a:ext cx="7036910" cy="653143"/>
+          </a:xfrm>
+          <a:prstGeom prst="rect">
+            <a:avLst/>
+          </a:prstGeom>
+        </p:spPr>
+        <p:style>
+          <a:lnRef idx="2">
+            <a:schemeClr val="accent1">
+              <a:shade val="50000"/>
+            </a:schemeClr>
+          </a:lnRef>
+          <a:fillRef idx="1">
+            <a:schemeClr val="accent1"/>
+          </a:fillRef>
+          <a:effectRef idx="0">
+            <a:schemeClr val="accent1"/>
+          </a:effectRef>
+          <a:fontRef idx="minor">
+            <a:schemeClr val="lt1"/>
+          </a:fontRef>
+        </p:style>
+        <p:txBody>
+          <a:bodyPr rtlCol="0" anchor="ctr"/>
+          <a:lstStyle/>
+          <a:p>
+            <a:pPr algn="ctr"/>
+            <a:endParaRPr lang="en-US" b="1" dirty="0">
+              <a:solidFill>
+                <a:schemeClr val="bg1"/>
+              </a:solidFill>
+            </a:endParaRPr>
+          </a:p>
+        </p:txBody>
+      </p:sp>
+      <p:sp>
+        <p:nvSpPr>
+          <p:cNvPr id="24" name="Rectangle 23"/>
+          <p:cNvSpPr/>
+          <p:nvPr/>
+        </p:nvSpPr>
+        <p:spPr>
+          <a:xfrm>
+            <a:off x="2838609" y="1859437"/>
+            <a:ext cx="7036911" cy="653143"/>
+          </a:xfrm>
+          <a:prstGeom prst="rect">
+            <a:avLst/>
+          </a:prstGeom>
+        </p:spPr>
+        <p:style>
+          <a:lnRef idx="2">
+            <a:schemeClr val="accent2">
+              <a:shade val="50000"/>
+            </a:schemeClr>
+          </a:lnRef>
+          <a:fillRef idx="1">
+            <a:schemeClr val="accent2"/>
+          </a:fillRef>
+          <a:effectRef idx="0">
+            <a:schemeClr val="accent2"/>
+          </a:effectRef>
+          <a:fontRef idx="minor">
+            <a:schemeClr val="lt1"/>
+          </a:fontRef>
+        </p:style>
+        <p:txBody>
+          <a:bodyPr rtlCol="0" anchor="ctr"/>
+          <a:lstStyle/>
+          <a:p>
+            <a:pPr algn="ctr"/>
+            <a:endParaRPr lang="en-US" b="1" dirty="0">
+              <a:solidFill>
+                <a:schemeClr val="bg1"/>
+              </a:solidFill>
+            </a:endParaRPr>
+          </a:p>
+        </p:txBody>
+      </p:sp>
+      <p:sp>
+        <p:nvSpPr>
+          <p:cNvPr id="16" name="Rectangle 15"/>
+          <p:cNvSpPr/>
+          <p:nvPr/>
+        </p:nvSpPr>
+        <p:spPr>
+          <a:xfrm>
+            <a:off x="2458359" y="3815235"/>
+            <a:ext cx="7909538" cy="369332"/>
+          </a:xfrm>
+          <a:prstGeom prst="rect">
+            <a:avLst/>
+          </a:prstGeom>
+        </p:spPr>
+        <p:txBody>
+          <a:bodyPr wrap="none">
+            <a:spAutoFit/>
+          </a:bodyPr>
+          <a:lstStyle/>
+          <a:p>
+            <a:r>
+              <a:rPr lang="en-US" b="1" dirty="0" smtClean="0">
+                <a:solidFill>
+                  <a:schemeClr val="accent6">
+                    <a:lumMod val="50000"/>
+                  </a:schemeClr>
+                </a:solidFill>
+                <a:latin typeface="Consolas" panose="020B0609020204030204" pitchFamily="49" charset="0"/>
+              </a:rPr>
+              <a:t>test</a:t>
+            </a:r>
+            <a:r>
+              <a:rPr lang="en-US" b="1" dirty="0">
+                <a:solidFill>
+                  <a:schemeClr val="accent6">
+                    <a:lumMod val="50000"/>
+                  </a:schemeClr>
+                </a:solidFill>
+                <a:latin typeface="Consolas" panose="020B0609020204030204" pitchFamily="49" charset="0"/>
+              </a:rPr>
+              <a:t>('Map is null', () =&gt; expect(</a:t>
+            </a:r>
+            <a:r>
+              <a:rPr lang="en-US" b="1" dirty="0" err="1">
+                <a:solidFill>
+                  <a:schemeClr val="accent6">
+                    <a:lumMod val="50000"/>
+                  </a:schemeClr>
+                </a:solidFill>
+                <a:latin typeface="Consolas" panose="020B0609020204030204" pitchFamily="49" charset="0"/>
+              </a:rPr>
+              <a:t>mappedFlavours</a:t>
+            </a:r>
+            <a:r>
+              <a:rPr lang="en-US" b="1" dirty="0">
+                <a:solidFill>
+                  <a:schemeClr val="accent6">
+                    <a:lumMod val="50000"/>
+                  </a:schemeClr>
+                </a:solidFill>
+                <a:latin typeface="Consolas" panose="020B0609020204030204" pitchFamily="49" charset="0"/>
+              </a:rPr>
+              <a:t>, </a:t>
+            </a:r>
+            <a:r>
+              <a:rPr lang="en-US" b="1" dirty="0" err="1" smtClean="0">
+                <a:solidFill>
+                  <a:schemeClr val="accent6">
+                    <a:lumMod val="50000"/>
+                  </a:schemeClr>
+                </a:solidFill>
+                <a:latin typeface="Consolas" panose="020B0609020204030204" pitchFamily="49" charset="0"/>
+              </a:rPr>
+              <a:t>isNotNull</a:t>
+            </a:r>
+            <a:r>
+              <a:rPr lang="en-US" b="1" dirty="0">
+                <a:solidFill>
+                  <a:schemeClr val="accent6">
+                    <a:lumMod val="50000"/>
+                  </a:schemeClr>
+                </a:solidFill>
+                <a:latin typeface="Consolas" panose="020B0609020204030204" pitchFamily="49" charset="0"/>
+              </a:rPr>
+              <a:t>));</a:t>
+            </a:r>
+            <a:endParaRPr lang="en-US" b="1" dirty="0">
+              <a:solidFill>
+                <a:schemeClr val="accent6">
+                  <a:lumMod val="50000"/>
+                </a:schemeClr>
+              </a:solidFill>
+              <a:effectLst/>
+              <a:latin typeface="Consolas" panose="020B0609020204030204" pitchFamily="49" charset="0"/>
+            </a:endParaRPr>
+          </a:p>
+        </p:txBody>
+      </p:sp>
+      <p:sp>
+        <p:nvSpPr>
+          <p:cNvPr id="2" name="Multiply 1"/>
+          <p:cNvSpPr/>
+          <p:nvPr/>
+        </p:nvSpPr>
+        <p:spPr>
+          <a:xfrm>
+            <a:off x="4929585" y="641807"/>
+            <a:ext cx="2634535" cy="2381404"/>
+          </a:xfrm>
+          <a:prstGeom prst="mathMultiply">
+            <a:avLst/>
+          </a:prstGeom>
+          <a:solidFill>
+            <a:srgbClr val="C00000"/>
+          </a:solidFill>
+          <a:ln>
+            <a:noFill/>
+          </a:ln>
+        </p:spPr>
+        <p:style>
+          <a:lnRef idx="2">
+            <a:schemeClr val="accent1">
+              <a:shade val="50000"/>
+            </a:schemeClr>
+          </a:lnRef>
+          <a:fillRef idx="1">
+            <a:schemeClr val="accent1"/>
+          </a:fillRef>
+          <a:effectRef idx="0">
+            <a:schemeClr val="accent1"/>
+          </a:effectRef>
+          <a:fontRef idx="minor">
+            <a:schemeClr val="lt1"/>
+          </a:fontRef>
+        </p:style>
+        <p:txBody>
+          <a:bodyPr rtlCol="0" anchor="ctr"/>
+          <a:lstStyle/>
+          <a:p>
+            <a:pPr algn="ctr"/>
+            <a:endParaRPr lang="en-US"/>
+          </a:p>
+        </p:txBody>
+      </p:sp>
+    </p:spTree>
+    <p:extLst>
+      <p:ext uri="{BB962C8B-B14F-4D97-AF65-F5344CB8AC3E}">
+        <p14:creationId xmlns:p14="http://schemas.microsoft.com/office/powerpoint/2010/main" val="262773555"/>
+      </p:ext>
+    </p:extLst>
+  </p:cSld>
+  <p:clrMapOvr>
+    <a:masterClrMapping/>
+  </p:clrMapOvr>
+  <p:timing>
+    <p:tnLst>
+      <p:par>
+        <p:cTn id="1" dur="indefinite" restart="never" nodeType="tmRoot"/>
+      </p:par>
+    </p:tnLst>
+  </p:timing>
+</p:sld>
+</file>
+
+<file path=ppt/slides/slide24.xml><?xml version="1.0" encoding="utf-8"?>
+<p:sld xmlns:a="http://schemas.openxmlformats.org/drawingml/2006/main" xmlns:r="http://schemas.openxmlformats.org/officeDocument/2006/relationships" xmlns:p="http://schemas.openxmlformats.org/presentationml/2006/main">
+  <p:cSld>
+    <p:spTree>
+      <p:nvGrpSpPr>
+        <p:cNvPr id="1" name=""/>
+        <p:cNvGrpSpPr/>
+        <p:nvPr/>
+      </p:nvGrpSpPr>
+      <p:grpSpPr>
+        <a:xfrm>
+          <a:off x="0" y="0"/>
+          <a:ext cx="0" cy="0"/>
+          <a:chOff x="0" y="0"/>
+          <a:chExt cx="0" cy="0"/>
+        </a:xfrm>
+      </p:grpSpPr>
+      <p:sp>
+        <p:nvSpPr>
+          <p:cNvPr id="20" name="Rectangle 19"/>
+          <p:cNvSpPr/>
+          <p:nvPr/>
+        </p:nvSpPr>
+        <p:spPr>
+          <a:xfrm>
+            <a:off x="339831" y="328749"/>
+            <a:ext cx="4237057" cy="369332"/>
+          </a:xfrm>
+          <a:prstGeom prst="rect">
+            <a:avLst/>
+          </a:prstGeom>
+        </p:spPr>
+        <p:txBody>
+          <a:bodyPr wrap="none">
+            <a:spAutoFit/>
+          </a:bodyPr>
+          <a:lstStyle/>
+          <a:p>
+            <a:r>
+              <a:rPr lang="en-US" b="1" dirty="0">
+                <a:solidFill>
+                  <a:srgbClr val="386BC4"/>
+                </a:solidFill>
+                <a:latin typeface="Consolas" panose="020B0609020204030204" pitchFamily="49" charset="0"/>
+              </a:rPr>
+              <a:t>Map&lt;String, bool&gt; </a:t>
+            </a:r>
+            <a:r>
+              <a:rPr lang="en-US" b="1" dirty="0" err="1">
+                <a:solidFill>
+                  <a:srgbClr val="386BC4"/>
+                </a:solidFill>
+                <a:latin typeface="Consolas" panose="020B0609020204030204" pitchFamily="49" charset="0"/>
+              </a:rPr>
+              <a:t>mappedFlavours</a:t>
+            </a:r>
+            <a:endParaRPr lang="en-US" b="1" dirty="0">
+              <a:solidFill>
+                <a:srgbClr val="386BC4"/>
+              </a:solidFill>
+              <a:latin typeface="Consolas" panose="020B0609020204030204" pitchFamily="49" charset="0"/>
+            </a:endParaRPr>
+          </a:p>
+        </p:txBody>
+      </p:sp>
+      <p:sp>
+        <p:nvSpPr>
+          <p:cNvPr id="5" name="Rectangle 4"/>
+          <p:cNvSpPr/>
+          <p:nvPr/>
+        </p:nvSpPr>
+        <p:spPr>
+          <a:xfrm>
+            <a:off x="4928860" y="3216186"/>
+            <a:ext cx="2490647" cy="369332"/>
+          </a:xfrm>
+          <a:prstGeom prst="rect">
+            <a:avLst/>
+          </a:prstGeom>
+        </p:spPr>
+        <p:txBody>
+          <a:bodyPr wrap="square">
+            <a:spAutoFit/>
+          </a:bodyPr>
+          <a:lstStyle/>
+          <a:p>
+            <a:pPr algn="ctr"/>
+            <a:r>
+              <a:rPr lang="en-US" b="1" dirty="0" smtClean="0">
+                <a:solidFill>
+                  <a:srgbClr val="C00000"/>
+                </a:solidFill>
+                <a:latin typeface="Consolas" panose="020B0609020204030204" pitchFamily="49" charset="0"/>
+              </a:rPr>
+              <a:t>2. Map </a:t>
+            </a:r>
+            <a:r>
+              <a:rPr lang="en-US" b="1" dirty="0">
+                <a:solidFill>
+                  <a:srgbClr val="C00000"/>
+                </a:solidFill>
+                <a:latin typeface="Consolas" panose="020B0609020204030204" pitchFamily="49" charset="0"/>
+              </a:rPr>
+              <a:t>is </a:t>
+            </a:r>
+            <a:r>
+              <a:rPr lang="en-US" b="1" dirty="0" smtClean="0">
+                <a:solidFill>
+                  <a:srgbClr val="C00000"/>
+                </a:solidFill>
+                <a:latin typeface="Consolas" panose="020B0609020204030204" pitchFamily="49" charset="0"/>
+              </a:rPr>
+              <a:t>empty.</a:t>
+            </a:r>
+            <a:endParaRPr lang="en-US" sz="2800" b="1" dirty="0">
+              <a:solidFill>
+                <a:srgbClr val="C00000"/>
+              </a:solidFill>
+              <a:latin typeface="Consolas" panose="020B0609020204030204" pitchFamily="49" charset="0"/>
+            </a:endParaRPr>
+          </a:p>
+        </p:txBody>
+      </p:sp>
+      <p:sp>
+        <p:nvSpPr>
+          <p:cNvPr id="16" name="Rectangle 15"/>
+          <p:cNvSpPr/>
+          <p:nvPr/>
+        </p:nvSpPr>
+        <p:spPr>
+          <a:xfrm>
+            <a:off x="3858622" y="3973193"/>
+            <a:ext cx="4996881" cy="1200329"/>
+          </a:xfrm>
+          <a:prstGeom prst="rect">
+            <a:avLst/>
+          </a:prstGeom>
+        </p:spPr>
+        <p:txBody>
+          <a:bodyPr wrap="none">
+            <a:spAutoFit/>
+          </a:bodyPr>
+          <a:lstStyle/>
+          <a:p>
+            <a:r>
+              <a:rPr lang="en-US" b="1" dirty="0">
+                <a:solidFill>
+                  <a:schemeClr val="accent6">
+                    <a:lumMod val="50000"/>
+                  </a:schemeClr>
+                </a:solidFill>
+                <a:latin typeface="Consolas" panose="020B0609020204030204" pitchFamily="49" charset="0"/>
+              </a:rPr>
+              <a:t>test('Map is empty', () {</a:t>
+            </a:r>
+          </a:p>
+          <a:p>
+            <a:r>
+              <a:rPr lang="en-US" b="1" dirty="0">
+                <a:solidFill>
+                  <a:schemeClr val="accent6">
+                    <a:lumMod val="50000"/>
+                  </a:schemeClr>
+                </a:solidFill>
+                <a:latin typeface="Consolas" panose="020B0609020204030204" pitchFamily="49" charset="0"/>
+              </a:rPr>
+              <a:t>      </a:t>
+            </a:r>
+            <a:r>
+              <a:rPr lang="en-US" b="1" dirty="0" err="1">
+                <a:solidFill>
+                  <a:schemeClr val="accent6">
+                    <a:lumMod val="50000"/>
+                  </a:schemeClr>
+                </a:solidFill>
+                <a:latin typeface="Consolas" panose="020B0609020204030204" pitchFamily="49" charset="0"/>
+              </a:rPr>
+              <a:t>mappedFlavours</a:t>
+            </a:r>
+            <a:r>
+              <a:rPr lang="en-US" b="1" dirty="0">
+                <a:solidFill>
+                  <a:schemeClr val="accent6">
+                    <a:lumMod val="50000"/>
+                  </a:schemeClr>
+                </a:solidFill>
+                <a:latin typeface="Consolas" panose="020B0609020204030204" pitchFamily="49" charset="0"/>
+              </a:rPr>
+              <a:t> = {};</a:t>
+            </a:r>
+          </a:p>
+          <a:p>
+            <a:r>
+              <a:rPr lang="en-US" b="1" dirty="0">
+                <a:solidFill>
+                  <a:schemeClr val="accent6">
+                    <a:lumMod val="50000"/>
+                  </a:schemeClr>
+                </a:solidFill>
+                <a:latin typeface="Consolas" panose="020B0609020204030204" pitchFamily="49" charset="0"/>
+              </a:rPr>
+              <a:t>      expect(</a:t>
+            </a:r>
+            <a:r>
+              <a:rPr lang="en-US" b="1" dirty="0" err="1">
+                <a:solidFill>
+                  <a:schemeClr val="accent6">
+                    <a:lumMod val="50000"/>
+                  </a:schemeClr>
+                </a:solidFill>
+                <a:latin typeface="Consolas" panose="020B0609020204030204" pitchFamily="49" charset="0"/>
+              </a:rPr>
+              <a:t>mappedFlavours</a:t>
+            </a:r>
+            <a:r>
+              <a:rPr lang="en-US" b="1" dirty="0">
+                <a:solidFill>
+                  <a:schemeClr val="accent6">
+                    <a:lumMod val="50000"/>
+                  </a:schemeClr>
+                </a:solidFill>
+                <a:latin typeface="Consolas" panose="020B0609020204030204" pitchFamily="49" charset="0"/>
+              </a:rPr>
+              <a:t>, </a:t>
+            </a:r>
+            <a:r>
+              <a:rPr lang="en-US" b="1" dirty="0" err="1">
+                <a:solidFill>
+                  <a:schemeClr val="accent6">
+                    <a:lumMod val="50000"/>
+                  </a:schemeClr>
+                </a:solidFill>
+                <a:latin typeface="Consolas" panose="020B0609020204030204" pitchFamily="49" charset="0"/>
+              </a:rPr>
+              <a:t>isEmpty</a:t>
+            </a:r>
+            <a:r>
+              <a:rPr lang="en-US" b="1" dirty="0">
+                <a:solidFill>
+                  <a:schemeClr val="accent6">
+                    <a:lumMod val="50000"/>
+                  </a:schemeClr>
+                </a:solidFill>
+                <a:latin typeface="Consolas" panose="020B0609020204030204" pitchFamily="49" charset="0"/>
+              </a:rPr>
+              <a:t>);</a:t>
+            </a:r>
+          </a:p>
+          <a:p>
+            <a:r>
+              <a:rPr lang="en-US" b="1" dirty="0">
+                <a:solidFill>
+                  <a:schemeClr val="accent6">
+                    <a:lumMod val="50000"/>
+                  </a:schemeClr>
+                </a:solidFill>
+                <a:latin typeface="Consolas" panose="020B0609020204030204" pitchFamily="49" charset="0"/>
+              </a:rPr>
+              <a:t>    });</a:t>
+            </a:r>
+            <a:endParaRPr lang="en-US" b="1" dirty="0">
+              <a:solidFill>
+                <a:schemeClr val="accent6">
+                  <a:lumMod val="50000"/>
+                </a:schemeClr>
+              </a:solidFill>
+              <a:effectLst/>
+              <a:latin typeface="Consolas" panose="020B0609020204030204" pitchFamily="49" charset="0"/>
+            </a:endParaRPr>
+          </a:p>
+        </p:txBody>
+      </p:sp>
+      <p:sp>
+        <p:nvSpPr>
+          <p:cNvPr id="8" name="Rectangle 7"/>
+          <p:cNvSpPr/>
+          <p:nvPr/>
+        </p:nvSpPr>
+        <p:spPr>
+          <a:xfrm>
+            <a:off x="2838610" y="1207508"/>
+            <a:ext cx="1467780" cy="653143"/>
+          </a:xfrm>
+          <a:prstGeom prst="rect">
+            <a:avLst/>
+          </a:prstGeom>
+        </p:spPr>
+        <p:style>
+          <a:lnRef idx="2">
+            <a:schemeClr val="accent1">
+              <a:shade val="50000"/>
+            </a:schemeClr>
+          </a:lnRef>
+          <a:fillRef idx="1">
+            <a:schemeClr val="accent1"/>
+          </a:fillRef>
+          <a:effectRef idx="0">
+            <a:schemeClr val="accent1"/>
+          </a:effectRef>
+          <a:fontRef idx="minor">
+            <a:schemeClr val="lt1"/>
+          </a:fontRef>
+        </p:style>
+        <p:txBody>
+          <a:bodyPr rtlCol="0" anchor="ctr"/>
+          <a:lstStyle/>
+          <a:p>
+            <a:pPr algn="ctr"/>
+            <a:endParaRPr lang="en-US" b="1" dirty="0">
+              <a:solidFill>
+                <a:schemeClr val="bg1"/>
+              </a:solidFill>
+            </a:endParaRPr>
+          </a:p>
+        </p:txBody>
+      </p:sp>
+      <p:sp>
+        <p:nvSpPr>
+          <p:cNvPr id="12" name="Rectangle 11"/>
+          <p:cNvSpPr/>
+          <p:nvPr/>
+        </p:nvSpPr>
+        <p:spPr>
+          <a:xfrm>
+            <a:off x="2838609" y="1859437"/>
+            <a:ext cx="1467781" cy="653143"/>
+          </a:xfrm>
+          <a:prstGeom prst="rect">
+            <a:avLst/>
+          </a:prstGeom>
+        </p:spPr>
+        <p:style>
+          <a:lnRef idx="2">
+            <a:schemeClr val="accent2">
+              <a:shade val="50000"/>
+            </a:schemeClr>
+          </a:lnRef>
+          <a:fillRef idx="1">
+            <a:schemeClr val="accent2"/>
+          </a:fillRef>
+          <a:effectRef idx="0">
+            <a:schemeClr val="accent2"/>
+          </a:effectRef>
+          <a:fontRef idx="minor">
+            <a:schemeClr val="lt1"/>
+          </a:fontRef>
+        </p:style>
+        <p:txBody>
+          <a:bodyPr rtlCol="0" anchor="ctr"/>
+          <a:lstStyle/>
+          <a:p>
+            <a:pPr algn="ctr"/>
+            <a:endParaRPr lang="en-US" b="1" dirty="0">
+              <a:solidFill>
+                <a:schemeClr val="bg1"/>
+              </a:solidFill>
+            </a:endParaRPr>
+          </a:p>
+        </p:txBody>
+      </p:sp>
+      <p:sp>
+        <p:nvSpPr>
+          <p:cNvPr id="18" name="Rectangle 17"/>
+          <p:cNvSpPr/>
+          <p:nvPr/>
+        </p:nvSpPr>
+        <p:spPr>
+          <a:xfrm>
+            <a:off x="3174046" y="2530960"/>
+            <a:ext cx="684576" cy="369332"/>
+          </a:xfrm>
+          <a:prstGeom prst="rect">
+            <a:avLst/>
+          </a:prstGeom>
+        </p:spPr>
+        <p:txBody>
+          <a:bodyPr wrap="square">
+            <a:spAutoFit/>
+          </a:bodyPr>
+          <a:lstStyle/>
+          <a:p>
+            <a:r>
+              <a:rPr lang="en-US" b="1" dirty="0" smtClean="0">
+                <a:effectLst/>
+                <a:latin typeface="Consolas" panose="020B0609020204030204" pitchFamily="49" charset="0"/>
+              </a:rPr>
+              <a:t>  </a:t>
+            </a:r>
+            <a:r>
+              <a:rPr lang="en-US" b="1" dirty="0" smtClean="0">
+                <a:effectLst/>
+                <a:latin typeface="Consolas" panose="020B0609020204030204" pitchFamily="49" charset="0"/>
+              </a:rPr>
+              <a:t>0</a:t>
+            </a:r>
+            <a:endParaRPr lang="en-US" b="1" dirty="0">
+              <a:effectLst/>
+              <a:latin typeface="Consolas" panose="020B0609020204030204" pitchFamily="49" charset="0"/>
+            </a:endParaRPr>
+          </a:p>
+        </p:txBody>
+      </p:sp>
+      <p:sp>
+        <p:nvSpPr>
+          <p:cNvPr id="19" name="Rectangle 18"/>
+          <p:cNvSpPr/>
+          <p:nvPr/>
+        </p:nvSpPr>
+        <p:spPr>
+          <a:xfrm>
+            <a:off x="1938528" y="2499133"/>
+            <a:ext cx="817853" cy="369332"/>
+          </a:xfrm>
+          <a:prstGeom prst="rect">
+            <a:avLst/>
+          </a:prstGeom>
+        </p:spPr>
+        <p:txBody>
+          <a:bodyPr wrap="none">
+            <a:spAutoFit/>
+          </a:bodyPr>
+          <a:lstStyle/>
+          <a:p>
+            <a:r>
+              <a:rPr lang="en-US" b="1" dirty="0" smtClean="0">
+                <a:effectLst/>
+                <a:latin typeface="Consolas" panose="020B0609020204030204" pitchFamily="49" charset="0"/>
+              </a:rPr>
+              <a:t>INDEX</a:t>
+            </a:r>
+            <a:endParaRPr lang="en-US" b="1" dirty="0">
+              <a:effectLst/>
+              <a:latin typeface="Consolas" panose="020B0609020204030204" pitchFamily="49" charset="0"/>
+            </a:endParaRPr>
+          </a:p>
+        </p:txBody>
+      </p:sp>
+    </p:spTree>
+    <p:extLst>
+      <p:ext uri="{BB962C8B-B14F-4D97-AF65-F5344CB8AC3E}">
+        <p14:creationId xmlns:p14="http://schemas.microsoft.com/office/powerpoint/2010/main" val="2542121107"/>
+      </p:ext>
+    </p:extLst>
+  </p:cSld>
+  <p:clrMapOvr>
+    <a:masterClrMapping/>
+  </p:clrMapOvr>
+  <p:timing>
+    <p:tnLst>
+      <p:par>
+        <p:cTn id="1" dur="indefinite" restart="never" nodeType="tmRoot"/>
+      </p:par>
+    </p:tnLst>
+  </p:timing>
+</p:sld>
+</file>
+
+<file path=ppt/slides/slide25.xml><?xml version="1.0" encoding="utf-8"?>
+<p:sld xmlns:a="http://schemas.openxmlformats.org/drawingml/2006/main" xmlns:r="http://schemas.openxmlformats.org/officeDocument/2006/relationships" xmlns:p="http://schemas.openxmlformats.org/presentationml/2006/main">
+  <p:cSld>
+    <p:spTree>
+      <p:nvGrpSpPr>
+        <p:cNvPr id="1" name=""/>
+        <p:cNvGrpSpPr/>
+        <p:nvPr/>
+      </p:nvGrpSpPr>
+      <p:grpSpPr>
+        <a:xfrm>
+          <a:off x="0" y="0"/>
+          <a:ext cx="0" cy="0"/>
+          <a:chOff x="0" y="0"/>
+          <a:chExt cx="0" cy="0"/>
+        </a:xfrm>
+      </p:grpSpPr>
+      <p:sp>
+        <p:nvSpPr>
+          <p:cNvPr id="20" name="Rectangle 19"/>
+          <p:cNvSpPr/>
+          <p:nvPr/>
+        </p:nvSpPr>
+        <p:spPr>
+          <a:xfrm>
+            <a:off x="339831" y="328749"/>
+            <a:ext cx="4237057" cy="369332"/>
+          </a:xfrm>
+          <a:prstGeom prst="rect">
+            <a:avLst/>
+          </a:prstGeom>
+        </p:spPr>
+        <p:txBody>
+          <a:bodyPr wrap="none">
+            <a:spAutoFit/>
+          </a:bodyPr>
+          <a:lstStyle/>
+          <a:p>
+            <a:r>
+              <a:rPr lang="en-US" b="1" dirty="0">
+                <a:solidFill>
+                  <a:srgbClr val="386BC4"/>
+                </a:solidFill>
+                <a:latin typeface="Consolas" panose="020B0609020204030204" pitchFamily="49" charset="0"/>
+              </a:rPr>
+              <a:t>Map&lt;String, bool&gt; </a:t>
+            </a:r>
+            <a:r>
+              <a:rPr lang="en-US" b="1" dirty="0" err="1">
+                <a:solidFill>
+                  <a:srgbClr val="386BC4"/>
+                </a:solidFill>
+                <a:latin typeface="Consolas" panose="020B0609020204030204" pitchFamily="49" charset="0"/>
+              </a:rPr>
+              <a:t>mappedFlavours</a:t>
+            </a:r>
+            <a:endParaRPr lang="en-US" b="1" dirty="0">
+              <a:solidFill>
+                <a:srgbClr val="386BC4"/>
+              </a:solidFill>
+              <a:latin typeface="Consolas" panose="020B0609020204030204" pitchFamily="49" charset="0"/>
+            </a:endParaRPr>
+          </a:p>
+        </p:txBody>
+      </p:sp>
+      <p:sp>
+        <p:nvSpPr>
+          <p:cNvPr id="5" name="Rectangle 4"/>
+          <p:cNvSpPr/>
+          <p:nvPr/>
+        </p:nvSpPr>
+        <p:spPr>
+          <a:xfrm>
+            <a:off x="4306390" y="3216186"/>
+            <a:ext cx="3113117" cy="369332"/>
+          </a:xfrm>
+          <a:prstGeom prst="rect">
+            <a:avLst/>
+          </a:prstGeom>
+        </p:spPr>
+        <p:txBody>
+          <a:bodyPr wrap="square">
+            <a:spAutoFit/>
+          </a:bodyPr>
+          <a:lstStyle/>
+          <a:p>
+            <a:pPr algn="ctr"/>
+            <a:r>
+              <a:rPr lang="en-US" b="1" dirty="0" smtClean="0">
+                <a:solidFill>
+                  <a:srgbClr val="C00000"/>
+                </a:solidFill>
+                <a:latin typeface="Consolas" panose="020B0609020204030204" pitchFamily="49" charset="0"/>
+              </a:rPr>
+              <a:t>3. Map </a:t>
+            </a:r>
+            <a:r>
+              <a:rPr lang="en-US" b="1" dirty="0">
+                <a:solidFill>
+                  <a:srgbClr val="C00000"/>
+                </a:solidFill>
+                <a:latin typeface="Consolas" panose="020B0609020204030204" pitchFamily="49" charset="0"/>
+              </a:rPr>
+              <a:t>Key is a </a:t>
+            </a:r>
+            <a:r>
+              <a:rPr lang="en-US" b="1" dirty="0" smtClean="0">
+                <a:solidFill>
+                  <a:srgbClr val="C00000"/>
+                </a:solidFill>
+                <a:latin typeface="Consolas" panose="020B0609020204030204" pitchFamily="49" charset="0"/>
+              </a:rPr>
+              <a:t>string.</a:t>
+            </a:r>
+            <a:endParaRPr lang="en-US" sz="2800" b="1" dirty="0">
+              <a:solidFill>
+                <a:srgbClr val="C00000"/>
+              </a:solidFill>
+              <a:latin typeface="Consolas" panose="020B0609020204030204" pitchFamily="49" charset="0"/>
+            </a:endParaRPr>
+          </a:p>
+        </p:txBody>
+      </p:sp>
+      <p:sp>
+        <p:nvSpPr>
+          <p:cNvPr id="16" name="Rectangle 15"/>
+          <p:cNvSpPr/>
+          <p:nvPr/>
+        </p:nvSpPr>
+        <p:spPr>
+          <a:xfrm>
+            <a:off x="2330038" y="3990466"/>
+            <a:ext cx="9049272" cy="646331"/>
+          </a:xfrm>
+          <a:prstGeom prst="rect">
+            <a:avLst/>
+          </a:prstGeom>
+        </p:spPr>
+        <p:txBody>
+          <a:bodyPr wrap="none">
+            <a:spAutoFit/>
+          </a:bodyPr>
+          <a:lstStyle/>
+          <a:p>
+            <a:r>
+              <a:rPr lang="en-US" b="1" dirty="0">
+                <a:solidFill>
+                  <a:schemeClr val="accent6">
+                    <a:lumMod val="50000"/>
+                  </a:schemeClr>
+                </a:solidFill>
+                <a:latin typeface="Consolas" panose="020B0609020204030204" pitchFamily="49" charset="0"/>
+              </a:rPr>
+              <a:t> test('Map Key is a string',</a:t>
+            </a:r>
+          </a:p>
+          <a:p>
+            <a:r>
+              <a:rPr lang="en-US" b="1" dirty="0">
+                <a:solidFill>
+                  <a:schemeClr val="accent6">
+                    <a:lumMod val="50000"/>
+                  </a:schemeClr>
+                </a:solidFill>
+                <a:latin typeface="Consolas" panose="020B0609020204030204" pitchFamily="49" charset="0"/>
+              </a:rPr>
+              <a:t>        () =&gt; expect(</a:t>
+            </a:r>
+            <a:r>
+              <a:rPr lang="en-US" b="1" dirty="0" err="1">
+                <a:solidFill>
+                  <a:schemeClr val="accent6">
+                    <a:lumMod val="50000"/>
+                  </a:schemeClr>
+                </a:solidFill>
+                <a:latin typeface="Consolas" panose="020B0609020204030204" pitchFamily="49" charset="0"/>
+              </a:rPr>
+              <a:t>mappedFlavours.keys.runtimeType</a:t>
+            </a:r>
+            <a:r>
+              <a:rPr lang="en-US" b="1" dirty="0">
+                <a:solidFill>
+                  <a:schemeClr val="accent6">
+                    <a:lumMod val="50000"/>
+                  </a:schemeClr>
+                </a:solidFill>
+                <a:latin typeface="Consolas" panose="020B0609020204030204" pitchFamily="49" charset="0"/>
+              </a:rPr>
+              <a:t> != </a:t>
+            </a:r>
+            <a:r>
+              <a:rPr lang="en-US" b="1" dirty="0" err="1">
+                <a:solidFill>
+                  <a:schemeClr val="accent6">
+                    <a:lumMod val="50000"/>
+                  </a:schemeClr>
+                </a:solidFill>
+                <a:latin typeface="Consolas" panose="020B0609020204030204" pitchFamily="49" charset="0"/>
+              </a:rPr>
+              <a:t>int</a:t>
+            </a:r>
+            <a:r>
+              <a:rPr lang="en-US" b="1" dirty="0">
+                <a:solidFill>
+                  <a:schemeClr val="accent6">
+                    <a:lumMod val="50000"/>
+                  </a:schemeClr>
+                </a:solidFill>
+                <a:latin typeface="Consolas" panose="020B0609020204030204" pitchFamily="49" charset="0"/>
+              </a:rPr>
+              <a:t>, </a:t>
+            </a:r>
+            <a:r>
+              <a:rPr lang="en-US" b="1" dirty="0" err="1">
+                <a:solidFill>
+                  <a:schemeClr val="accent6">
+                    <a:lumMod val="50000"/>
+                  </a:schemeClr>
+                </a:solidFill>
+                <a:latin typeface="Consolas" panose="020B0609020204030204" pitchFamily="49" charset="0"/>
+              </a:rPr>
+              <a:t>isTrue</a:t>
+            </a:r>
+            <a:r>
+              <a:rPr lang="en-US" b="1" dirty="0">
+                <a:solidFill>
+                  <a:schemeClr val="accent6">
+                    <a:lumMod val="50000"/>
+                  </a:schemeClr>
+                </a:solidFill>
+                <a:latin typeface="Consolas" panose="020B0609020204030204" pitchFamily="49" charset="0"/>
+              </a:rPr>
+              <a:t>));</a:t>
+            </a:r>
+            <a:endParaRPr lang="en-US" b="1" dirty="0">
+              <a:solidFill>
+                <a:schemeClr val="accent6">
+                  <a:lumMod val="50000"/>
+                </a:schemeClr>
+              </a:solidFill>
+              <a:effectLst/>
+              <a:latin typeface="Consolas" panose="020B0609020204030204" pitchFamily="49" charset="0"/>
+            </a:endParaRPr>
+          </a:p>
+        </p:txBody>
+      </p:sp>
+      <p:sp>
+        <p:nvSpPr>
+          <p:cNvPr id="8" name="Rectangle 7"/>
+          <p:cNvSpPr/>
+          <p:nvPr/>
+        </p:nvSpPr>
+        <p:spPr>
+          <a:xfrm>
+            <a:off x="2838610" y="1207508"/>
+            <a:ext cx="1467780" cy="653143"/>
+          </a:xfrm>
+          <a:prstGeom prst="rect">
+            <a:avLst/>
+          </a:prstGeom>
+        </p:spPr>
+        <p:style>
+          <a:lnRef idx="2">
+            <a:schemeClr val="accent1">
+              <a:shade val="50000"/>
+            </a:schemeClr>
+          </a:lnRef>
+          <a:fillRef idx="1">
+            <a:schemeClr val="accent1"/>
+          </a:fillRef>
+          <a:effectRef idx="0">
+            <a:schemeClr val="accent1"/>
+          </a:effectRef>
+          <a:fontRef idx="minor">
+            <a:schemeClr val="lt1"/>
+          </a:fontRef>
+        </p:style>
+        <p:txBody>
+          <a:bodyPr rtlCol="0" anchor="ctr"/>
+          <a:lstStyle/>
+          <a:p>
+            <a:pPr algn="ctr"/>
+            <a:endParaRPr lang="en-US" b="1" dirty="0">
+              <a:solidFill>
+                <a:schemeClr val="bg1"/>
+              </a:solidFill>
+            </a:endParaRPr>
+          </a:p>
+        </p:txBody>
+      </p:sp>
+      <p:sp>
+        <p:nvSpPr>
+          <p:cNvPr id="12" name="Rectangle 11"/>
+          <p:cNvSpPr/>
+          <p:nvPr/>
+        </p:nvSpPr>
+        <p:spPr>
+          <a:xfrm>
+            <a:off x="2838609" y="1859437"/>
+            <a:ext cx="1467781" cy="653143"/>
+          </a:xfrm>
+          <a:prstGeom prst="rect">
+            <a:avLst/>
+          </a:prstGeom>
+        </p:spPr>
+        <p:style>
+          <a:lnRef idx="2">
+            <a:schemeClr val="accent2">
+              <a:shade val="50000"/>
+            </a:schemeClr>
+          </a:lnRef>
+          <a:fillRef idx="1">
+            <a:schemeClr val="accent2"/>
+          </a:fillRef>
+          <a:effectRef idx="0">
+            <a:schemeClr val="accent2"/>
+          </a:effectRef>
+          <a:fontRef idx="minor">
+            <a:schemeClr val="lt1"/>
+          </a:fontRef>
+        </p:style>
+        <p:txBody>
+          <a:bodyPr rtlCol="0" anchor="ctr"/>
+          <a:lstStyle/>
+          <a:p>
+            <a:pPr algn="ctr"/>
+            <a:endParaRPr lang="en-US" b="1" dirty="0">
+              <a:solidFill>
+                <a:schemeClr val="bg1"/>
+              </a:solidFill>
+            </a:endParaRPr>
+          </a:p>
+        </p:txBody>
+      </p:sp>
+      <p:sp>
+        <p:nvSpPr>
+          <p:cNvPr id="18" name="Rectangle 17"/>
+          <p:cNvSpPr/>
+          <p:nvPr/>
+        </p:nvSpPr>
+        <p:spPr>
+          <a:xfrm>
+            <a:off x="3174046" y="2530960"/>
+            <a:ext cx="684576" cy="369332"/>
+          </a:xfrm>
+          <a:prstGeom prst="rect">
+            <a:avLst/>
+          </a:prstGeom>
+        </p:spPr>
+        <p:txBody>
+          <a:bodyPr wrap="square">
+            <a:spAutoFit/>
+          </a:bodyPr>
+          <a:lstStyle/>
+          <a:p>
+            <a:r>
+              <a:rPr lang="en-US" b="1" dirty="0" smtClean="0">
+                <a:effectLst/>
+                <a:latin typeface="Consolas" panose="020B0609020204030204" pitchFamily="49" charset="0"/>
+              </a:rPr>
+              <a:t>  </a:t>
+            </a:r>
+            <a:r>
+              <a:rPr lang="en-US" b="1" dirty="0" smtClean="0">
+                <a:effectLst/>
+                <a:latin typeface="Consolas" panose="020B0609020204030204" pitchFamily="49" charset="0"/>
+              </a:rPr>
+              <a:t>0</a:t>
+            </a:r>
+            <a:endParaRPr lang="en-US" b="1" dirty="0">
+              <a:effectLst/>
+              <a:latin typeface="Consolas" panose="020B0609020204030204" pitchFamily="49" charset="0"/>
+            </a:endParaRPr>
+          </a:p>
+        </p:txBody>
+      </p:sp>
+      <p:sp>
+        <p:nvSpPr>
+          <p:cNvPr id="19" name="Rectangle 18"/>
+          <p:cNvSpPr/>
+          <p:nvPr/>
+        </p:nvSpPr>
+        <p:spPr>
+          <a:xfrm>
+            <a:off x="1938528" y="2499133"/>
+            <a:ext cx="817853" cy="369332"/>
+          </a:xfrm>
+          <a:prstGeom prst="rect">
+            <a:avLst/>
+          </a:prstGeom>
+        </p:spPr>
+        <p:txBody>
+          <a:bodyPr wrap="none">
+            <a:spAutoFit/>
+          </a:bodyPr>
+          <a:lstStyle/>
+          <a:p>
+            <a:r>
+              <a:rPr lang="en-US" b="1" dirty="0" smtClean="0">
+                <a:effectLst/>
+                <a:latin typeface="Consolas" panose="020B0609020204030204" pitchFamily="49" charset="0"/>
+              </a:rPr>
+              <a:t>INDEX</a:t>
+            </a:r>
+            <a:endParaRPr lang="en-US" b="1" dirty="0">
+              <a:effectLst/>
+              <a:latin typeface="Consolas" panose="020B0609020204030204" pitchFamily="49" charset="0"/>
+            </a:endParaRPr>
+          </a:p>
+        </p:txBody>
+      </p:sp>
+      <p:sp>
+        <p:nvSpPr>
+          <p:cNvPr id="9" name="Rectangle 8"/>
+          <p:cNvSpPr/>
+          <p:nvPr/>
+        </p:nvSpPr>
+        <p:spPr>
+          <a:xfrm>
+            <a:off x="4171940" y="1312676"/>
+            <a:ext cx="1536529" cy="369332"/>
+          </a:xfrm>
+          <a:prstGeom prst="rect">
+            <a:avLst/>
+          </a:prstGeom>
+        </p:spPr>
+        <p:txBody>
+          <a:bodyPr wrap="square">
+            <a:spAutoFit/>
+          </a:bodyPr>
+          <a:lstStyle/>
+          <a:p>
+            <a:pPr algn="ctr"/>
+            <a:r>
+              <a:rPr lang="en-US" b="1" dirty="0" smtClean="0">
+                <a:solidFill>
+                  <a:srgbClr val="C00000"/>
+                </a:solidFill>
+                <a:latin typeface="Consolas" panose="020B0609020204030204" pitchFamily="49" charset="0"/>
+              </a:rPr>
+              <a:t> == STRING</a:t>
+            </a:r>
+            <a:endParaRPr lang="en-US" sz="2800" b="1" dirty="0">
+              <a:solidFill>
+                <a:srgbClr val="C00000"/>
+              </a:solidFill>
+              <a:latin typeface="Consolas" panose="020B0609020204030204" pitchFamily="49" charset="0"/>
+            </a:endParaRPr>
+          </a:p>
+        </p:txBody>
+      </p:sp>
+      <p:sp>
+        <p:nvSpPr>
+          <p:cNvPr id="2" name="Right Arrow 1"/>
+          <p:cNvSpPr/>
+          <p:nvPr/>
+        </p:nvSpPr>
+        <p:spPr>
+          <a:xfrm>
+            <a:off x="1633753" y="1175975"/>
+            <a:ext cx="1076383" cy="762157"/>
+          </a:xfrm>
+          <a:prstGeom prst="rightArrow">
+            <a:avLst/>
+          </a:prstGeom>
+          <a:solidFill>
+            <a:srgbClr val="C00000"/>
+          </a:solidFill>
+          <a:ln>
+            <a:noFill/>
+          </a:ln>
+        </p:spPr>
+        <p:style>
+          <a:lnRef idx="2">
+            <a:schemeClr val="accent1">
+              <a:shade val="50000"/>
+            </a:schemeClr>
+          </a:lnRef>
+          <a:fillRef idx="1">
+            <a:schemeClr val="accent1"/>
+          </a:fillRef>
+          <a:effectRef idx="0">
+            <a:schemeClr val="accent1"/>
+          </a:effectRef>
+          <a:fontRef idx="minor">
+            <a:schemeClr val="lt1"/>
+          </a:fontRef>
+        </p:style>
+        <p:txBody>
+          <a:bodyPr rtlCol="0" anchor="ctr"/>
+          <a:lstStyle/>
+          <a:p>
+            <a:pPr algn="ctr"/>
+            <a:r>
+              <a:rPr lang="en-US" b="1" dirty="0" smtClean="0"/>
+              <a:t>KEY</a:t>
+            </a:r>
+            <a:endParaRPr lang="en-US" b="1" dirty="0"/>
+          </a:p>
+        </p:txBody>
+      </p:sp>
+    </p:spTree>
+    <p:extLst>
+      <p:ext uri="{BB962C8B-B14F-4D97-AF65-F5344CB8AC3E}">
+        <p14:creationId xmlns:p14="http://schemas.microsoft.com/office/powerpoint/2010/main" val="2723699801"/>
+      </p:ext>
+    </p:extLst>
+  </p:cSld>
+  <p:clrMapOvr>
+    <a:masterClrMapping/>
+  </p:clrMapOvr>
+  <p:timing>
+    <p:tnLst>
+      <p:par>
+        <p:cTn id="1" dur="indefinite" restart="never" nodeType="tmRoot"/>
+      </p:par>
+    </p:tnLst>
+  </p:timing>
+</p:sld>
+</file>
+
+<file path=ppt/slides/slide26.xml><?xml version="1.0" encoding="utf-8"?>
+<p:sld xmlns:a="http://schemas.openxmlformats.org/drawingml/2006/main" xmlns:r="http://schemas.openxmlformats.org/officeDocument/2006/relationships" xmlns:p="http://schemas.openxmlformats.org/presentationml/2006/main">
+  <p:cSld>
+    <p:spTree>
+      <p:nvGrpSpPr>
+        <p:cNvPr id="1" name=""/>
+        <p:cNvGrpSpPr/>
+        <p:nvPr/>
+      </p:nvGrpSpPr>
+      <p:grpSpPr>
+        <a:xfrm>
+          <a:off x="0" y="0"/>
+          <a:ext cx="0" cy="0"/>
+          <a:chOff x="0" y="0"/>
+          <a:chExt cx="0" cy="0"/>
+        </a:xfrm>
+      </p:grpSpPr>
+      <p:sp>
+        <p:nvSpPr>
+          <p:cNvPr id="20" name="Rectangle 19"/>
+          <p:cNvSpPr/>
+          <p:nvPr/>
+        </p:nvSpPr>
+        <p:spPr>
+          <a:xfrm>
+            <a:off x="339831" y="328749"/>
+            <a:ext cx="4237057" cy="369332"/>
+          </a:xfrm>
+          <a:prstGeom prst="rect">
+            <a:avLst/>
+          </a:prstGeom>
+        </p:spPr>
+        <p:txBody>
+          <a:bodyPr wrap="none">
+            <a:spAutoFit/>
+          </a:bodyPr>
+          <a:lstStyle/>
+          <a:p>
+            <a:r>
+              <a:rPr lang="en-US" b="1" dirty="0">
+                <a:solidFill>
+                  <a:srgbClr val="386BC4"/>
+                </a:solidFill>
+                <a:latin typeface="Consolas" panose="020B0609020204030204" pitchFamily="49" charset="0"/>
+              </a:rPr>
+              <a:t>Map&lt;String, bool&gt; </a:t>
+            </a:r>
+            <a:r>
+              <a:rPr lang="en-US" b="1" dirty="0" err="1">
+                <a:solidFill>
+                  <a:srgbClr val="386BC4"/>
+                </a:solidFill>
+                <a:latin typeface="Consolas" panose="020B0609020204030204" pitchFamily="49" charset="0"/>
+              </a:rPr>
+              <a:t>mappedFlavours</a:t>
+            </a:r>
+            <a:endParaRPr lang="en-US" b="1" dirty="0">
+              <a:solidFill>
+                <a:srgbClr val="386BC4"/>
+              </a:solidFill>
+              <a:latin typeface="Consolas" panose="020B0609020204030204" pitchFamily="49" charset="0"/>
+            </a:endParaRPr>
+          </a:p>
+        </p:txBody>
+      </p:sp>
+      <p:sp>
+        <p:nvSpPr>
+          <p:cNvPr id="5" name="Rectangle 4"/>
+          <p:cNvSpPr/>
+          <p:nvPr/>
+        </p:nvSpPr>
+        <p:spPr>
+          <a:xfrm>
+            <a:off x="4576888" y="3244800"/>
+            <a:ext cx="3356958" cy="369332"/>
+          </a:xfrm>
+          <a:prstGeom prst="rect">
+            <a:avLst/>
+          </a:prstGeom>
+        </p:spPr>
+        <p:txBody>
+          <a:bodyPr wrap="square">
+            <a:spAutoFit/>
+          </a:bodyPr>
+          <a:lstStyle/>
+          <a:p>
+            <a:pPr algn="ctr"/>
+            <a:r>
+              <a:rPr lang="en-US" b="1" dirty="0" smtClean="0">
+                <a:solidFill>
+                  <a:srgbClr val="C00000"/>
+                </a:solidFill>
+                <a:latin typeface="Consolas" panose="020B0609020204030204" pitchFamily="49" charset="0"/>
+              </a:rPr>
+              <a:t>4. </a:t>
+            </a:r>
+            <a:r>
+              <a:rPr lang="en-US" b="1" dirty="0">
+                <a:solidFill>
+                  <a:srgbClr val="C00000"/>
+                </a:solidFill>
+                <a:latin typeface="Consolas" panose="020B0609020204030204" pitchFamily="49" charset="0"/>
+              </a:rPr>
+              <a:t>Map </a:t>
+            </a:r>
+            <a:r>
+              <a:rPr lang="en-US" b="1" dirty="0" smtClean="0">
+                <a:solidFill>
+                  <a:srgbClr val="C00000"/>
+                </a:solidFill>
+                <a:latin typeface="Consolas" panose="020B0609020204030204" pitchFamily="49" charset="0"/>
+              </a:rPr>
+              <a:t>Value is </a:t>
+            </a:r>
+            <a:r>
+              <a:rPr lang="en-US" b="1" dirty="0">
+                <a:solidFill>
+                  <a:srgbClr val="C00000"/>
+                </a:solidFill>
+                <a:latin typeface="Consolas" panose="020B0609020204030204" pitchFamily="49" charset="0"/>
+              </a:rPr>
+              <a:t>a </a:t>
+            </a:r>
+            <a:r>
+              <a:rPr lang="en-US" b="1" dirty="0" smtClean="0">
+                <a:solidFill>
+                  <a:srgbClr val="C00000"/>
+                </a:solidFill>
+                <a:latin typeface="Consolas" panose="020B0609020204030204" pitchFamily="49" charset="0"/>
+              </a:rPr>
+              <a:t>bool.</a:t>
+            </a:r>
+            <a:endParaRPr lang="en-US" b="1" dirty="0">
+              <a:solidFill>
+                <a:srgbClr val="C00000"/>
+              </a:solidFill>
+              <a:latin typeface="Consolas" panose="020B0609020204030204" pitchFamily="49" charset="0"/>
+            </a:endParaRPr>
+          </a:p>
+        </p:txBody>
+      </p:sp>
+      <p:sp>
+        <p:nvSpPr>
+          <p:cNvPr id="16" name="Rectangle 15"/>
+          <p:cNvSpPr/>
+          <p:nvPr/>
+        </p:nvSpPr>
+        <p:spPr>
+          <a:xfrm>
+            <a:off x="1807523" y="3990466"/>
+            <a:ext cx="9809096" cy="646331"/>
+          </a:xfrm>
+          <a:prstGeom prst="rect">
+            <a:avLst/>
+          </a:prstGeom>
+        </p:spPr>
+        <p:txBody>
+          <a:bodyPr wrap="none">
+            <a:spAutoFit/>
+          </a:bodyPr>
+          <a:lstStyle/>
+          <a:p>
+            <a:r>
+              <a:rPr lang="en-US" b="1" dirty="0">
+                <a:solidFill>
+                  <a:schemeClr val="accent6">
+                    <a:lumMod val="50000"/>
+                  </a:schemeClr>
+                </a:solidFill>
+                <a:latin typeface="Consolas" panose="020B0609020204030204" pitchFamily="49" charset="0"/>
+              </a:rPr>
+              <a:t> test('Map Value is a bool',</a:t>
+            </a:r>
+          </a:p>
+          <a:p>
+            <a:r>
+              <a:rPr lang="en-US" b="1" dirty="0">
+                <a:solidFill>
+                  <a:schemeClr val="accent6">
+                    <a:lumMod val="50000"/>
+                  </a:schemeClr>
+                </a:solidFill>
+                <a:latin typeface="Consolas" panose="020B0609020204030204" pitchFamily="49" charset="0"/>
+              </a:rPr>
+              <a:t>        () =&gt; expect(</a:t>
+            </a:r>
+            <a:r>
+              <a:rPr lang="en-US" b="1" dirty="0" err="1">
+                <a:solidFill>
+                  <a:schemeClr val="accent6">
+                    <a:lumMod val="50000"/>
+                  </a:schemeClr>
+                </a:solidFill>
+                <a:latin typeface="Consolas" panose="020B0609020204030204" pitchFamily="49" charset="0"/>
+              </a:rPr>
+              <a:t>mappedFlavours.values.runtimeType</a:t>
+            </a:r>
+            <a:r>
+              <a:rPr lang="en-US" b="1" dirty="0">
+                <a:solidFill>
+                  <a:schemeClr val="accent6">
+                    <a:lumMod val="50000"/>
+                  </a:schemeClr>
+                </a:solidFill>
+                <a:latin typeface="Consolas" panose="020B0609020204030204" pitchFamily="49" charset="0"/>
+              </a:rPr>
+              <a:t> == String, </a:t>
+            </a:r>
+            <a:r>
+              <a:rPr lang="en-US" b="1" dirty="0" err="1">
+                <a:solidFill>
+                  <a:schemeClr val="accent6">
+                    <a:lumMod val="50000"/>
+                  </a:schemeClr>
+                </a:solidFill>
+                <a:latin typeface="Consolas" panose="020B0609020204030204" pitchFamily="49" charset="0"/>
+              </a:rPr>
+              <a:t>isFalse</a:t>
+            </a:r>
+            <a:r>
+              <a:rPr lang="en-US" b="1" dirty="0">
+                <a:solidFill>
+                  <a:schemeClr val="accent6">
+                    <a:lumMod val="50000"/>
+                  </a:schemeClr>
+                </a:solidFill>
+                <a:latin typeface="Consolas" panose="020B0609020204030204" pitchFamily="49" charset="0"/>
+              </a:rPr>
+              <a:t>));</a:t>
+            </a:r>
+            <a:endParaRPr lang="en-US" b="1" dirty="0">
+              <a:solidFill>
+                <a:schemeClr val="accent6">
+                  <a:lumMod val="50000"/>
+                </a:schemeClr>
+              </a:solidFill>
+              <a:effectLst/>
+              <a:latin typeface="Consolas" panose="020B0609020204030204" pitchFamily="49" charset="0"/>
+            </a:endParaRPr>
+          </a:p>
+        </p:txBody>
+      </p:sp>
+      <p:sp>
+        <p:nvSpPr>
+          <p:cNvPr id="8" name="Rectangle 7"/>
+          <p:cNvSpPr/>
+          <p:nvPr/>
+        </p:nvSpPr>
+        <p:spPr>
+          <a:xfrm>
+            <a:off x="2838610" y="1207508"/>
+            <a:ext cx="1467780" cy="653143"/>
+          </a:xfrm>
+          <a:prstGeom prst="rect">
+            <a:avLst/>
+          </a:prstGeom>
+        </p:spPr>
+        <p:style>
+          <a:lnRef idx="2">
+            <a:schemeClr val="accent1">
+              <a:shade val="50000"/>
+            </a:schemeClr>
+          </a:lnRef>
+          <a:fillRef idx="1">
+            <a:schemeClr val="accent1"/>
+          </a:fillRef>
+          <a:effectRef idx="0">
+            <a:schemeClr val="accent1"/>
+          </a:effectRef>
+          <a:fontRef idx="minor">
+            <a:schemeClr val="lt1"/>
+          </a:fontRef>
+        </p:style>
+        <p:txBody>
+          <a:bodyPr rtlCol="0" anchor="ctr"/>
+          <a:lstStyle/>
+          <a:p>
+            <a:pPr algn="ctr"/>
+            <a:endParaRPr lang="en-US" b="1" dirty="0">
+              <a:solidFill>
+                <a:schemeClr val="bg1"/>
+              </a:solidFill>
+            </a:endParaRPr>
+          </a:p>
+        </p:txBody>
+      </p:sp>
+      <p:sp>
+        <p:nvSpPr>
+          <p:cNvPr id="12" name="Rectangle 11"/>
+          <p:cNvSpPr/>
+          <p:nvPr/>
+        </p:nvSpPr>
+        <p:spPr>
+          <a:xfrm>
+            <a:off x="2838609" y="1859437"/>
+            <a:ext cx="1467781" cy="653143"/>
+          </a:xfrm>
+          <a:prstGeom prst="rect">
+            <a:avLst/>
+          </a:prstGeom>
+        </p:spPr>
+        <p:style>
+          <a:lnRef idx="2">
+            <a:schemeClr val="accent2">
+              <a:shade val="50000"/>
+            </a:schemeClr>
+          </a:lnRef>
+          <a:fillRef idx="1">
+            <a:schemeClr val="accent2"/>
+          </a:fillRef>
+          <a:effectRef idx="0">
+            <a:schemeClr val="accent2"/>
+          </a:effectRef>
+          <a:fontRef idx="minor">
+            <a:schemeClr val="lt1"/>
+          </a:fontRef>
+        </p:style>
+        <p:txBody>
+          <a:bodyPr rtlCol="0" anchor="ctr"/>
+          <a:lstStyle/>
+          <a:p>
+            <a:pPr algn="ctr"/>
+            <a:endParaRPr lang="en-US" b="1" dirty="0">
+              <a:solidFill>
+                <a:schemeClr val="bg1"/>
+              </a:solidFill>
+            </a:endParaRPr>
+          </a:p>
+        </p:txBody>
+      </p:sp>
+      <p:sp>
+        <p:nvSpPr>
+          <p:cNvPr id="18" name="Rectangle 17"/>
+          <p:cNvSpPr/>
+          <p:nvPr/>
+        </p:nvSpPr>
+        <p:spPr>
+          <a:xfrm>
+            <a:off x="3174046" y="2530960"/>
+            <a:ext cx="684576" cy="369332"/>
+          </a:xfrm>
+          <a:prstGeom prst="rect">
+            <a:avLst/>
+          </a:prstGeom>
+        </p:spPr>
+        <p:txBody>
+          <a:bodyPr wrap="square">
+            <a:spAutoFit/>
+          </a:bodyPr>
+          <a:lstStyle/>
+          <a:p>
+            <a:r>
+              <a:rPr lang="en-US" b="1" dirty="0" smtClean="0">
+                <a:effectLst/>
+                <a:latin typeface="Consolas" panose="020B0609020204030204" pitchFamily="49" charset="0"/>
+              </a:rPr>
+              <a:t>  </a:t>
+            </a:r>
+            <a:r>
+              <a:rPr lang="en-US" b="1" dirty="0" smtClean="0">
+                <a:effectLst/>
+                <a:latin typeface="Consolas" panose="020B0609020204030204" pitchFamily="49" charset="0"/>
+              </a:rPr>
+              <a:t>0</a:t>
+            </a:r>
+            <a:endParaRPr lang="en-US" b="1" dirty="0">
+              <a:effectLst/>
+              <a:latin typeface="Consolas" panose="020B0609020204030204" pitchFamily="49" charset="0"/>
+            </a:endParaRPr>
+          </a:p>
+        </p:txBody>
+      </p:sp>
+      <p:sp>
+        <p:nvSpPr>
+          <p:cNvPr id="19" name="Rectangle 18"/>
+          <p:cNvSpPr/>
+          <p:nvPr/>
+        </p:nvSpPr>
+        <p:spPr>
+          <a:xfrm>
+            <a:off x="1938528" y="2499133"/>
+            <a:ext cx="817853" cy="369332"/>
+          </a:xfrm>
+          <a:prstGeom prst="rect">
+            <a:avLst/>
+          </a:prstGeom>
+        </p:spPr>
+        <p:txBody>
+          <a:bodyPr wrap="none">
+            <a:spAutoFit/>
+          </a:bodyPr>
+          <a:lstStyle/>
+          <a:p>
+            <a:r>
+              <a:rPr lang="en-US" b="1" dirty="0" smtClean="0">
+                <a:effectLst/>
+                <a:latin typeface="Consolas" panose="020B0609020204030204" pitchFamily="49" charset="0"/>
+              </a:rPr>
+              <a:t>INDEX</a:t>
+            </a:r>
+            <a:endParaRPr lang="en-US" b="1" dirty="0">
+              <a:effectLst/>
+              <a:latin typeface="Consolas" panose="020B0609020204030204" pitchFamily="49" charset="0"/>
+            </a:endParaRPr>
+          </a:p>
+        </p:txBody>
+      </p:sp>
+      <p:sp>
+        <p:nvSpPr>
+          <p:cNvPr id="9" name="Right Arrow 8"/>
+          <p:cNvSpPr/>
+          <p:nvPr/>
+        </p:nvSpPr>
+        <p:spPr>
+          <a:xfrm rot="10800000" flipV="1">
+            <a:off x="4398734" y="1859437"/>
+            <a:ext cx="1076383" cy="636846"/>
+          </a:xfrm>
+          <a:prstGeom prst="rightArrow">
+            <a:avLst/>
+          </a:prstGeom>
+          <a:solidFill>
+            <a:srgbClr val="C00000"/>
+          </a:solidFill>
+          <a:ln>
+            <a:noFill/>
+          </a:ln>
+        </p:spPr>
+        <p:style>
+          <a:lnRef idx="2">
+            <a:schemeClr val="accent1">
+              <a:shade val="50000"/>
+            </a:schemeClr>
+          </a:lnRef>
+          <a:fillRef idx="1">
+            <a:schemeClr val="accent1"/>
+          </a:fillRef>
+          <a:effectRef idx="0">
+            <a:schemeClr val="accent1"/>
+          </a:effectRef>
+          <a:fontRef idx="minor">
+            <a:schemeClr val="lt1"/>
+          </a:fontRef>
+        </p:style>
+        <p:txBody>
+          <a:bodyPr rtlCol="0" anchor="ctr"/>
+          <a:lstStyle/>
+          <a:p>
+            <a:pPr algn="ctr"/>
+            <a:r>
+              <a:rPr lang="en-US" b="1" dirty="0" smtClean="0"/>
+              <a:t>VALUE</a:t>
+            </a:r>
+            <a:endParaRPr lang="en-US" b="1" dirty="0"/>
+          </a:p>
+        </p:txBody>
+      </p:sp>
+      <p:sp>
+        <p:nvSpPr>
+          <p:cNvPr id="10" name="Rectangle 9"/>
+          <p:cNvSpPr/>
+          <p:nvPr/>
+        </p:nvSpPr>
+        <p:spPr>
+          <a:xfrm>
+            <a:off x="1812946" y="2019470"/>
+            <a:ext cx="960347" cy="369332"/>
+          </a:xfrm>
+          <a:prstGeom prst="rect">
+            <a:avLst/>
+          </a:prstGeom>
+        </p:spPr>
+        <p:txBody>
+          <a:bodyPr wrap="square">
+            <a:spAutoFit/>
+          </a:bodyPr>
+          <a:lstStyle/>
+          <a:p>
+            <a:pPr algn="r"/>
+            <a:r>
+              <a:rPr lang="en-US" b="1" dirty="0" smtClean="0">
+                <a:solidFill>
+                  <a:srgbClr val="C00000"/>
+                </a:solidFill>
+                <a:latin typeface="Consolas" panose="020B0609020204030204" pitchFamily="49" charset="0"/>
+              </a:rPr>
+              <a:t>INT ==</a:t>
+            </a:r>
+            <a:endParaRPr lang="en-US" sz="2800" b="1" dirty="0">
+              <a:solidFill>
+                <a:srgbClr val="C00000"/>
+              </a:solidFill>
+              <a:latin typeface="Consolas" panose="020B0609020204030204" pitchFamily="49" charset="0"/>
+            </a:endParaRPr>
+          </a:p>
+        </p:txBody>
+      </p:sp>
+    </p:spTree>
+    <p:extLst>
+      <p:ext uri="{BB962C8B-B14F-4D97-AF65-F5344CB8AC3E}">
+        <p14:creationId xmlns:p14="http://schemas.microsoft.com/office/powerpoint/2010/main" val="2483363130"/>
       </p:ext>
     </p:extLst>
   </p:cSld>
@@ -22235,7 +25012,7 @@
         </p:nvSpPr>
         <p:spPr>
           <a:xfrm>
-            <a:off x="344572" y="3919033"/>
+            <a:off x="326384" y="4453638"/>
             <a:ext cx="4363695" cy="369332"/>
           </a:xfrm>
           <a:prstGeom prst="rect">
@@ -22276,15 +25053,178 @@
           </a:p>
         </p:txBody>
       </p:sp>
+      <p:sp>
+        <p:nvSpPr>
+          <p:cNvPr id="22" name="Rectangle 21"/>
+          <p:cNvSpPr/>
+          <p:nvPr/>
+        </p:nvSpPr>
+        <p:spPr>
+          <a:xfrm>
+            <a:off x="2806747" y="1716035"/>
+            <a:ext cx="6196250" cy="369332"/>
+          </a:xfrm>
+          <a:prstGeom prst="rect">
+            <a:avLst/>
+          </a:prstGeom>
+        </p:spPr>
+        <p:txBody>
+          <a:bodyPr wrap="square">
+            <a:spAutoFit/>
+          </a:bodyPr>
+          <a:lstStyle/>
+          <a:p>
+            <a:r>
+              <a:rPr lang="en-US" b="1" dirty="0" smtClean="0">
+                <a:effectLst/>
+                <a:latin typeface="Consolas" panose="020B0609020204030204" pitchFamily="49" charset="0"/>
+              </a:rPr>
+              <a:t>  0           1          2            3</a:t>
+            </a:r>
+            <a:endParaRPr lang="en-US" b="1" dirty="0">
+              <a:effectLst/>
+              <a:latin typeface="Consolas" panose="020B0609020204030204" pitchFamily="49" charset="0"/>
+            </a:endParaRPr>
+          </a:p>
+        </p:txBody>
+      </p:sp>
+      <p:sp>
+        <p:nvSpPr>
+          <p:cNvPr id="3" name="Rounded Rectangle 2"/>
+          <p:cNvSpPr/>
+          <p:nvPr/>
+        </p:nvSpPr>
+        <p:spPr>
+          <a:xfrm>
+            <a:off x="3379272" y="3039652"/>
+            <a:ext cx="4153287" cy="762057"/>
+          </a:xfrm>
+          <a:prstGeom prst="roundRect">
+            <a:avLst/>
+          </a:prstGeom>
+          <a:solidFill>
+            <a:schemeClr val="tx1"/>
+          </a:solidFill>
+          <a:ln>
+            <a:noFill/>
+          </a:ln>
+        </p:spPr>
+        <p:style>
+          <a:lnRef idx="2">
+            <a:schemeClr val="accent1">
+              <a:shade val="50000"/>
+            </a:schemeClr>
+          </a:lnRef>
+          <a:fillRef idx="1">
+            <a:schemeClr val="accent1"/>
+          </a:fillRef>
+          <a:effectRef idx="0">
+            <a:schemeClr val="accent1"/>
+          </a:effectRef>
+          <a:fontRef idx="minor">
+            <a:schemeClr val="lt1"/>
+          </a:fontRef>
+        </p:style>
+        <p:txBody>
+          <a:bodyPr rtlCol="0" anchor="ctr"/>
+          <a:lstStyle/>
+          <a:p>
+            <a:pPr algn="ctr"/>
+            <a:r>
+              <a:rPr lang="en-US" sz="4000" b="1" dirty="0" smtClean="0"/>
+              <a:t>?</a:t>
+            </a:r>
+            <a:endParaRPr lang="en-US" sz="2400" b="1" dirty="0"/>
+          </a:p>
+        </p:txBody>
+      </p:sp>
+      <p:cxnSp>
+        <p:nvCxnSpPr>
+          <p:cNvPr id="9" name="Straight Arrow Connector 8"/>
+          <p:cNvCxnSpPr/>
+          <p:nvPr/>
+        </p:nvCxnSpPr>
+        <p:spPr>
+          <a:xfrm>
+            <a:off x="5351929" y="2121551"/>
+            <a:ext cx="9247" cy="702332"/>
+          </a:xfrm>
+          <a:prstGeom prst="straightConnector1">
+            <a:avLst/>
+          </a:prstGeom>
+          <a:ln w="76200" cap="flat" cmpd="sng" algn="ctr">
+            <a:solidFill>
+              <a:srgbClr val="D0009A"/>
+            </a:solidFill>
+            <a:prstDash val="solid"/>
+            <a:round/>
+            <a:headEnd type="none" w="med" len="med"/>
+            <a:tailEnd type="arrow" w="med" len="med"/>
+          </a:ln>
+        </p:spPr>
+        <p:style>
+          <a:lnRef idx="0">
+            <a:scrgbClr r="0" g="0" b="0"/>
+          </a:lnRef>
+          <a:fillRef idx="0">
+            <a:scrgbClr r="0" g="0" b="0"/>
+          </a:fillRef>
+          <a:effectRef idx="0">
+            <a:scrgbClr r="0" g="0" b="0"/>
+          </a:effectRef>
+          <a:fontRef idx="minor">
+            <a:schemeClr val="tx1"/>
+          </a:fontRef>
+        </p:style>
+      </p:cxnSp>
+      <p:cxnSp>
+        <p:nvCxnSpPr>
+          <p:cNvPr id="31" name="Straight Arrow Connector 30"/>
+          <p:cNvCxnSpPr/>
+          <p:nvPr/>
+        </p:nvCxnSpPr>
+        <p:spPr>
+          <a:xfrm>
+            <a:off x="5374623" y="4073035"/>
+            <a:ext cx="9247" cy="702332"/>
+          </a:xfrm>
+          <a:prstGeom prst="straightConnector1">
+            <a:avLst/>
+          </a:prstGeom>
+          <a:ln w="76200" cap="flat" cmpd="sng" algn="ctr">
+            <a:solidFill>
+              <a:srgbClr val="FF0000"/>
+            </a:solidFill>
+            <a:prstDash val="solid"/>
+            <a:round/>
+            <a:headEnd type="none" w="med" len="med"/>
+            <a:tailEnd type="arrow" w="med" len="med"/>
+          </a:ln>
+        </p:spPr>
+        <p:style>
+          <a:lnRef idx="0">
+            <a:scrgbClr r="0" g="0" b="0"/>
+          </a:lnRef>
+          <a:fillRef idx="0">
+            <a:scrgbClr r="0" g="0" b="0"/>
+          </a:fillRef>
+          <a:effectRef idx="0">
+            <a:scrgbClr r="0" g="0" b="0"/>
+          </a:effectRef>
+          <a:fontRef idx="minor">
+            <a:schemeClr val="tx1"/>
+          </a:fontRef>
+        </p:style>
+      </p:cxnSp>
       <p:grpSp>
         <p:nvGrpSpPr>
-          <p:cNvPr id="6" name="Group 5"/>
+          <p:cNvPr id="32" name="Group 31"/>
           <p:cNvGrpSpPr/>
           <p:nvPr/>
         </p:nvGrpSpPr>
         <p:grpSpPr>
           <a:xfrm>
-            <a:off x="2529839" y="4609159"/>
+            <a:off x="2525098" y="5026016"/>
             <a:ext cx="6235723" cy="1305072"/>
             <a:chOff x="2525098" y="3134975"/>
             <a:chExt cx="6235723" cy="1305072"/>
@@ -22292,7 +25232,7 @@
         </p:grpSpPr>
         <p:sp>
           <p:nvSpPr>
-            <p:cNvPr id="4" name="Rectangle 3"/>
+            <p:cNvPr id="33" name="Rectangle 32"/>
             <p:cNvSpPr/>
             <p:nvPr/>
           </p:nvSpPr>
@@ -22346,7 +25286,7 @@
         </p:sp>
         <p:sp>
           <p:nvSpPr>
-            <p:cNvPr id="12" name="Rectangle 11"/>
+            <p:cNvPr id="34" name="Rectangle 33"/>
             <p:cNvSpPr/>
             <p:nvPr/>
           </p:nvSpPr>
@@ -22400,7 +25340,7 @@
         </p:sp>
         <p:sp>
           <p:nvSpPr>
-            <p:cNvPr id="13" name="Rectangle 12"/>
+            <p:cNvPr id="35" name="Rectangle 34"/>
             <p:cNvSpPr/>
             <p:nvPr/>
           </p:nvSpPr>
@@ -22454,7 +25394,7 @@
         </p:sp>
         <p:sp>
           <p:nvSpPr>
-            <p:cNvPr id="14" name="Rectangle 13"/>
+            <p:cNvPr id="36" name="Rectangle 35"/>
             <p:cNvSpPr/>
             <p:nvPr/>
           </p:nvSpPr>
@@ -22508,7 +25448,7 @@
         </p:sp>
         <p:sp>
           <p:nvSpPr>
-            <p:cNvPr id="21" name="Rectangle 20"/>
+            <p:cNvPr id="37" name="Rectangle 36"/>
             <p:cNvSpPr/>
             <p:nvPr/>
           </p:nvSpPr>
@@ -22562,7 +25502,7 @@
         </p:sp>
         <p:sp>
           <p:nvSpPr>
-            <p:cNvPr id="25" name="Rectangle 24"/>
+            <p:cNvPr id="38" name="Rectangle 37"/>
             <p:cNvSpPr/>
             <p:nvPr/>
           </p:nvSpPr>
@@ -22616,7 +25556,7 @@
         </p:sp>
         <p:sp>
           <p:nvSpPr>
-            <p:cNvPr id="26" name="Rectangle 25"/>
+            <p:cNvPr id="39" name="Rectangle 38"/>
             <p:cNvSpPr/>
             <p:nvPr/>
           </p:nvSpPr>
@@ -22670,7 +25610,7 @@
         </p:sp>
         <p:sp>
           <p:nvSpPr>
-            <p:cNvPr id="27" name="Rectangle 26"/>
+            <p:cNvPr id="40" name="Rectangle 39"/>
             <p:cNvSpPr/>
             <p:nvPr/>
           </p:nvSpPr>
@@ -22725,13 +25665,13 @@
       </p:grpSp>
       <p:sp>
         <p:nvSpPr>
-          <p:cNvPr id="28" name="Rectangle 27"/>
+          <p:cNvPr id="53" name="Rectangle 52"/>
           <p:cNvSpPr/>
           <p:nvPr/>
         </p:nvSpPr>
         <p:spPr>
           <a:xfrm>
-            <a:off x="2806747" y="1716035"/>
+            <a:off x="2860535" y="6349468"/>
             <a:ext cx="6196250" cy="369332"/>
           </a:xfrm>
           <a:prstGeom prst="rect">
@@ -22760,13 +25700,13 @@
       </p:sp>
       <p:sp>
         <p:nvSpPr>
-          <p:cNvPr id="29" name="Rectangle 28"/>
+          <p:cNvPr id="54" name="Rectangle 53"/>
           <p:cNvSpPr/>
           <p:nvPr/>
         </p:nvSpPr>
         <p:spPr>
           <a:xfrm>
-            <a:off x="1519809" y="1684774"/>
+            <a:off x="1625017" y="6317641"/>
             <a:ext cx="817853" cy="369332"/>
           </a:xfrm>
           <a:prstGeom prst="rect">
@@ -22795,48 +25735,13 @@
       </p:sp>
       <p:sp>
         <p:nvSpPr>
-          <p:cNvPr id="30" name="Rectangle 29"/>
+          <p:cNvPr id="56" name="Rectangle 55"/>
           <p:cNvSpPr/>
           <p:nvPr/>
         </p:nvSpPr>
         <p:spPr>
           <a:xfrm>
-            <a:off x="2806747" y="5968626"/>
-            <a:ext cx="6196250" cy="369332"/>
-          </a:xfrm>
-          <a:prstGeom prst="rect">
-            <a:avLst/>
-          </a:prstGeom>
-        </p:spPr>
-        <p:txBody>
-          <a:bodyPr wrap="square">
-            <a:spAutoFit/>
-          </a:bodyPr>
-          <a:lstStyle/>
-          <a:p>
-            <a:r>
-              <a:rPr lang="en-US" b="1" dirty="0" smtClean="0">
-                <a:effectLst/>
-                <a:latin typeface="Consolas" panose="020B0609020204030204" pitchFamily="49" charset="0"/>
-              </a:rPr>
-              <a:t>  0           1          2            3</a:t>
-            </a:r>
-            <a:endParaRPr lang="en-US" b="1" dirty="0">
-              <a:effectLst/>
-              <a:latin typeface="Consolas" panose="020B0609020204030204" pitchFamily="49" charset="0"/>
-            </a:endParaRPr>
-          </a:p>
-        </p:txBody>
-      </p:sp>
-      <p:sp>
-        <p:nvSpPr>
-          <p:cNvPr id="31" name="Rectangle 30"/>
-          <p:cNvSpPr/>
-          <p:nvPr/>
-        </p:nvSpPr>
-        <p:spPr>
-          <a:xfrm>
-            <a:off x="1611570" y="5936799"/>
+            <a:off x="1519809" y="1684774"/>
             <a:ext cx="817853" cy="369332"/>
           </a:xfrm>
           <a:prstGeom prst="rect">
@@ -22866,7 +25771,7 @@
     </p:spTree>
     <p:extLst>
       <p:ext uri="{BB962C8B-B14F-4D97-AF65-F5344CB8AC3E}">
-        <p14:creationId xmlns:p14="http://schemas.microsoft.com/office/powerpoint/2010/main" val="1256721895"/>
+        <p14:creationId xmlns:p14="http://schemas.microsoft.com/office/powerpoint/2010/main" val="2249148404"/>
       </p:ext>
     </p:extLst>
   </p:cSld>

</xml_diff>

<commit_message>
Corrected a code mistake
</commit_message>
<xml_diff>
--- a/Multiple Selection Dialogue App.pptx
+++ b/Multiple Selection Dialogue App.pptx
@@ -11509,15 +11509,6 @@
               </a:rPr>
               <a:t>is empty.</a:t>
             </a:r>
-            <a:r>
-              <a:rPr lang="en-US" b="1" dirty="0" smtClean="0">
-                <a:solidFill>
-                  <a:srgbClr val="C00000"/>
-                </a:solidFill>
-                <a:latin typeface="Consolas" panose="020B0609020204030204" pitchFamily="49" charset="0"/>
-              </a:rPr>
-              <a:t/>
-            </a:r>
             <a:br>
               <a:rPr lang="en-US" b="1" dirty="0" smtClean="0">
                 <a:solidFill>
@@ -11640,16 +11631,7 @@
                 </a:solidFill>
                 <a:latin typeface="Consolas" panose="020B0609020204030204" pitchFamily="49" charset="0"/>
               </a:rPr>
-              <a:t>MAP </a:t>
-            </a:r>
-            <a:r>
-              <a:rPr lang="en-US" sz="2800" b="1" dirty="0" smtClean="0">
-                <a:solidFill>
-                  <a:srgbClr val="C00000"/>
-                </a:solidFill>
-                <a:latin typeface="Consolas" panose="020B0609020204030204" pitchFamily="49" charset="0"/>
-              </a:rPr>
-              <a:t>TEST CASES </a:t>
+              <a:t>MAP TEST CASES </a:t>
             </a:r>
             <a:endParaRPr lang="en-US" sz="2800" b="1" dirty="0">
               <a:solidFill>
@@ -12708,7 +12690,7 @@
         <p:spPr>
           <a:xfrm>
             <a:off x="3858622" y="3973193"/>
-            <a:ext cx="4996881" cy="1200329"/>
+            <a:ext cx="4996881" cy="923330"/>
           </a:xfrm>
           <a:prstGeom prst="rect">
             <a:avLst/>
@@ -12729,12 +12711,10 @@
                 </a:solidFill>
                 <a:latin typeface="Consolas" panose="020B0609020204030204" pitchFamily="49" charset="0"/>
               </a:rPr>
-              <a:t>test('Map is empty', () {</a:t>
-            </a:r>
-          </a:p>
-          <a:p>
-            <a:r>
-              <a:rPr lang="en-US" b="1" dirty="0">
+              <a:t>test('Map is empty', </a:t>
+            </a:r>
+            <a:r>
+              <a:rPr lang="en-US" b="1">
                 <a:solidFill>
                   <a:schemeClr val="accent6">
                     <a:lumMod val="50000"/>
@@ -12742,10 +12722,10 @@
                 </a:solidFill>
                 <a:latin typeface="Consolas" panose="020B0609020204030204" pitchFamily="49" charset="0"/>
               </a:rPr>
-              <a:t>      </a:t>
-            </a:r>
-            <a:r>
-              <a:rPr lang="en-US" b="1" dirty="0" err="1">
+              <a:t>() </a:t>
+            </a:r>
+            <a:r>
+              <a:rPr lang="en-US" b="1" smtClean="0">
                 <a:solidFill>
                   <a:schemeClr val="accent6">
                     <a:lumMod val="50000"/>
@@ -12753,10 +12733,20 @@
                 </a:solidFill>
                 <a:latin typeface="Consolas" panose="020B0609020204030204" pitchFamily="49" charset="0"/>
               </a:rPr>
-              <a:t>mappedFlavours</a:t>
-            </a:r>
-            <a:r>
-              <a:rPr lang="en-US" b="1" dirty="0">
+              <a:t>{</a:t>
+            </a:r>
+            <a:endParaRPr lang="en-US" b="1" dirty="0" smtClean="0">
+              <a:solidFill>
+                <a:schemeClr val="accent6">
+                  <a:lumMod val="50000"/>
+                </a:schemeClr>
+              </a:solidFill>
+              <a:latin typeface="Consolas" panose="020B0609020204030204" pitchFamily="49" charset="0"/>
+            </a:endParaRPr>
+          </a:p>
+          <a:p>
+            <a:r>
+              <a:rPr lang="en-US" b="1" dirty="0" smtClean="0">
                 <a:solidFill>
                   <a:schemeClr val="accent6">
                     <a:lumMod val="50000"/>
@@ -12764,12 +12754,10 @@
                 </a:solidFill>
                 <a:latin typeface="Consolas" panose="020B0609020204030204" pitchFamily="49" charset="0"/>
               </a:rPr>
-              <a:t> = {};</a:t>
-            </a:r>
-          </a:p>
-          <a:p>
-            <a:r>
-              <a:rPr lang="en-US" b="1" dirty="0">
+              <a:t>      expect(</a:t>
+            </a:r>
+            <a:r>
+              <a:rPr lang="en-US" b="1" dirty="0" err="1" smtClean="0">
                 <a:solidFill>
                   <a:schemeClr val="accent6">
                     <a:lumMod val="50000"/>
@@ -12777,10 +12765,10 @@
                 </a:solidFill>
                 <a:latin typeface="Consolas" panose="020B0609020204030204" pitchFamily="49" charset="0"/>
               </a:rPr>
-              <a:t>      expect(</a:t>
-            </a:r>
-            <a:r>
-              <a:rPr lang="en-US" b="1" dirty="0" err="1">
+              <a:t>mappedFlavours</a:t>
+            </a:r>
+            <a:r>
+              <a:rPr lang="en-US" b="1" dirty="0" smtClean="0">
                 <a:solidFill>
                   <a:schemeClr val="accent6">
                     <a:lumMod val="50000"/>
@@ -12788,10 +12776,10 @@
                 </a:solidFill>
                 <a:latin typeface="Consolas" panose="020B0609020204030204" pitchFamily="49" charset="0"/>
               </a:rPr>
-              <a:t>mappedFlavours</a:t>
-            </a:r>
-            <a:r>
-              <a:rPr lang="en-US" b="1" dirty="0">
+              <a:t>, </a:t>
+            </a:r>
+            <a:r>
+              <a:rPr lang="en-US" b="1" dirty="0" err="1" smtClean="0">
                 <a:solidFill>
                   <a:schemeClr val="accent6">
                     <a:lumMod val="50000"/>
@@ -12799,10 +12787,10 @@
                 </a:solidFill>
                 <a:latin typeface="Consolas" panose="020B0609020204030204" pitchFamily="49" charset="0"/>
               </a:rPr>
-              <a:t>, </a:t>
-            </a:r>
-            <a:r>
-              <a:rPr lang="en-US" b="1" dirty="0" err="1">
+              <a:t>isEmpty</a:t>
+            </a:r>
+            <a:r>
+              <a:rPr lang="en-US" b="1" dirty="0" smtClean="0">
                 <a:solidFill>
                   <a:schemeClr val="accent6">
                     <a:lumMod val="50000"/>
@@ -12810,10 +12798,12 @@
                 </a:solidFill>
                 <a:latin typeface="Consolas" panose="020B0609020204030204" pitchFamily="49" charset="0"/>
               </a:rPr>
-              <a:t>isEmpty</a:t>
-            </a:r>
-            <a:r>
-              <a:rPr lang="en-US" b="1" dirty="0">
+              <a:t>);</a:t>
+            </a:r>
+          </a:p>
+          <a:p>
+            <a:r>
+              <a:rPr lang="en-US" b="1" dirty="0" smtClean="0">
                 <a:solidFill>
                   <a:schemeClr val="accent6">
                     <a:lumMod val="50000"/>
@@ -12821,10 +12811,8 @@
                 </a:solidFill>
                 <a:latin typeface="Consolas" panose="020B0609020204030204" pitchFamily="49" charset="0"/>
               </a:rPr>
-              <a:t>);</a:t>
-            </a:r>
-          </a:p>
-          <a:p>
+              <a:t>    </a:t>
+            </a:r>
             <a:r>
               <a:rPr lang="en-US" b="1" dirty="0">
                 <a:solidFill>
@@ -12834,7 +12822,7 @@
                 </a:solidFill>
                 <a:latin typeface="Consolas" panose="020B0609020204030204" pitchFamily="49" charset="0"/>
               </a:rPr>
-              <a:t>    });</a:t>
+              <a:t>});</a:t>
             </a:r>
             <a:endParaRPr lang="en-US" b="1" dirty="0">
               <a:solidFill>
@@ -12962,14 +12950,7 @@
                 <a:effectLst/>
                 <a:latin typeface="Consolas" panose="020B0609020204030204" pitchFamily="49" charset="0"/>
               </a:rPr>
-              <a:t>  </a:t>
-            </a:r>
-            <a:r>
-              <a:rPr lang="en-US" b="1" dirty="0" smtClean="0">
-                <a:effectLst/>
-                <a:latin typeface="Consolas" panose="020B0609020204030204" pitchFamily="49" charset="0"/>
-              </a:rPr>
-              <a:t>0</a:t>
+              <a:t>  0</a:t>
             </a:r>
             <a:endParaRPr lang="en-US" b="1" dirty="0">
               <a:effectLst/>
@@ -13393,14 +13374,7 @@
                 <a:effectLst/>
                 <a:latin typeface="Consolas" panose="020B0609020204030204" pitchFamily="49" charset="0"/>
               </a:rPr>
-              <a:t>  </a:t>
-            </a:r>
-            <a:r>
-              <a:rPr lang="en-US" b="1" dirty="0" smtClean="0">
-                <a:effectLst/>
-                <a:latin typeface="Consolas" panose="020B0609020204030204" pitchFamily="49" charset="0"/>
-              </a:rPr>
-              <a:t>0</a:t>
+              <a:t>  0</a:t>
             </a:r>
             <a:endParaRPr lang="en-US" b="1" dirty="0">
               <a:effectLst/>
@@ -13910,14 +13884,7 @@
                 <a:effectLst/>
                 <a:latin typeface="Consolas" panose="020B0609020204030204" pitchFamily="49" charset="0"/>
               </a:rPr>
-              <a:t>  </a:t>
-            </a:r>
-            <a:r>
-              <a:rPr lang="en-US" b="1" dirty="0" smtClean="0">
-                <a:effectLst/>
-                <a:latin typeface="Consolas" panose="020B0609020204030204" pitchFamily="49" charset="0"/>
-              </a:rPr>
-              <a:t>0</a:t>
+              <a:t>  0</a:t>
             </a:r>
             <a:endParaRPr lang="en-US" b="1" dirty="0">
               <a:effectLst/>

</xml_diff>

<commit_message>
Updated List & Map Test Cases
</commit_message>
<xml_diff>
--- a/Multiple Selection Dialogue App.pptx
+++ b/Multiple Selection Dialogue App.pptx
@@ -16,15 +16,15 @@
     <p:sldId id="269" r:id="rId10"/>
     <p:sldId id="286" r:id="rId11"/>
     <p:sldId id="281" r:id="rId12"/>
-    <p:sldId id="271" r:id="rId13"/>
-    <p:sldId id="272" r:id="rId14"/>
-    <p:sldId id="273" r:id="rId15"/>
-    <p:sldId id="274" r:id="rId16"/>
-    <p:sldId id="275" r:id="rId17"/>
-    <p:sldId id="276" r:id="rId18"/>
-    <p:sldId id="277" r:id="rId19"/>
-    <p:sldId id="278" r:id="rId20"/>
-    <p:sldId id="279" r:id="rId21"/>
+    <p:sldId id="279" r:id="rId13"/>
+    <p:sldId id="278" r:id="rId14"/>
+    <p:sldId id="271" r:id="rId15"/>
+    <p:sldId id="272" r:id="rId16"/>
+    <p:sldId id="273" r:id="rId17"/>
+    <p:sldId id="274" r:id="rId18"/>
+    <p:sldId id="275" r:id="rId19"/>
+    <p:sldId id="276" r:id="rId20"/>
+    <p:sldId id="277" r:id="rId21"/>
     <p:sldId id="280" r:id="rId22"/>
     <p:sldId id="270" r:id="rId23"/>
     <p:sldId id="282" r:id="rId24"/>
@@ -149,6 +149,8 @@
         <p14:section name="List Test Cases" id="{51E30654-D6C8-4503-9413-8E25CEC5DCE2}">
           <p14:sldIdLst>
             <p14:sldId id="281"/>
+            <p14:sldId id="279"/>
+            <p14:sldId id="278"/>
             <p14:sldId id="271"/>
             <p14:sldId id="272"/>
             <p14:sldId id="273"/>
@@ -156,8 +158,6 @@
             <p14:sldId id="275"/>
             <p14:sldId id="276"/>
             <p14:sldId id="277"/>
-            <p14:sldId id="278"/>
-            <p14:sldId id="279"/>
             <p14:sldId id="280"/>
           </p14:sldIdLst>
         </p14:section>
@@ -4164,10 +4164,10 @@
         </p:nvGrpSpPr>
         <p:grpSpPr>
           <a:xfrm>
-            <a:off x="2525098" y="5026016"/>
-            <a:ext cx="6235723" cy="1305072"/>
-            <a:chOff x="2525098" y="3134975"/>
-            <a:chExt cx="6235723" cy="1305072"/>
+            <a:off x="2529838" y="5026016"/>
+            <a:ext cx="6230983" cy="1305072"/>
+            <a:chOff x="2529838" y="3134975"/>
+            <a:chExt cx="6230983" cy="1305072"/>
           </a:xfrm>
         </p:grpSpPr>
         <p:sp>
@@ -4394,8 +4394,8 @@
           </p:nvSpPr>
           <p:spPr>
             <a:xfrm>
-              <a:off x="2525098" y="3786904"/>
-              <a:ext cx="1463039" cy="653143"/>
+              <a:off x="2529838" y="3786904"/>
+              <a:ext cx="1458299" cy="653143"/>
             </a:xfrm>
             <a:prstGeom prst="rect">
               <a:avLst/>
@@ -5094,8 +5094,8 @@
         </p:nvSpPr>
         <p:spPr>
           <a:xfrm>
-            <a:off x="7354388" y="4031404"/>
-            <a:ext cx="5138057" cy="2585323"/>
+            <a:off x="5427617" y="4012824"/>
+            <a:ext cx="7110547" cy="2585323"/>
           </a:xfrm>
           <a:prstGeom prst="rect">
             <a:avLst/>
@@ -5132,7 +5132,16 @@
                 </a:solidFill>
                 <a:latin typeface="Consolas" panose="020B0609020204030204" pitchFamily="49" charset="0"/>
               </a:rPr>
-              <a:t> List</a:t>
+              <a:t> </a:t>
+            </a:r>
+            <a:r>
+              <a:rPr lang="en-US" b="1" dirty="0" smtClean="0">
+                <a:solidFill>
+                  <a:srgbClr val="C00000"/>
+                </a:solidFill>
+                <a:latin typeface="Consolas" panose="020B0609020204030204" pitchFamily="49" charset="0"/>
+              </a:rPr>
+              <a:t>Last </a:t>
             </a:r>
             <a:r>
               <a:rPr lang="en-US" b="1" dirty="0">
@@ -5141,7 +5150,7 @@
                 </a:solidFill>
                 <a:latin typeface="Consolas" panose="020B0609020204030204" pitchFamily="49" charset="0"/>
               </a:rPr>
-              <a:t> has total fifteen </a:t>
+              <a:t>flavour of list is Peanut Butter. </a:t>
             </a:r>
             <a:r>
               <a:rPr lang="en-US" b="1" dirty="0" smtClean="0">
@@ -5150,7 +5159,7 @@
                 </a:solidFill>
                 <a:latin typeface="Consolas" panose="020B0609020204030204" pitchFamily="49" charset="0"/>
               </a:rPr>
-              <a:t>vowels.</a:t>
+              <a:t/>
             </a:r>
             <a:br>
               <a:rPr lang="en-US" b="1" dirty="0" smtClean="0">
@@ -5169,13 +5178,31 @@
           </a:p>
           <a:p>
             <a:r>
+              <a:rPr lang="en-US" b="1" dirty="0" smtClean="0">
+                <a:solidFill>
+                  <a:srgbClr val="C00000"/>
+                </a:solidFill>
+                <a:latin typeface="Consolas" panose="020B0609020204030204" pitchFamily="49" charset="0"/>
+              </a:rPr>
+              <a:t>7.  </a:t>
+            </a:r>
+            <a:r>
+              <a:rPr lang="en-US" b="1" dirty="0" smtClean="0">
+                <a:solidFill>
+                  <a:srgbClr val="C00000"/>
+                </a:solidFill>
+                <a:latin typeface="Consolas" panose="020B0609020204030204" pitchFamily="49" charset="0"/>
+              </a:rPr>
+              <a:t>List </a:t>
+            </a:r>
+            <a:r>
               <a:rPr lang="en-US" b="1" dirty="0">
                 <a:solidFill>
                   <a:srgbClr val="C00000"/>
                 </a:solidFill>
                 <a:latin typeface="Consolas" panose="020B0609020204030204" pitchFamily="49" charset="0"/>
               </a:rPr>
-              <a:t>7</a:t>
+              <a:t>has two flavours starting with the letter C</a:t>
             </a:r>
             <a:r>
               <a:rPr lang="en-US" b="1" dirty="0" smtClean="0">
@@ -5184,25 +5211,16 @@
                 </a:solidFill>
                 <a:latin typeface="Consolas" panose="020B0609020204030204" pitchFamily="49" charset="0"/>
               </a:rPr>
-              <a:t>.  </a:t>
-            </a:r>
-            <a:r>
-              <a:rPr lang="en-US" b="1" dirty="0">
+              <a:t>.</a:t>
+            </a:r>
+            <a:r>
+              <a:rPr lang="en-US" b="1" dirty="0" smtClean="0">
                 <a:solidFill>
                   <a:srgbClr val="C00000"/>
                 </a:solidFill>
                 <a:latin typeface="Consolas" panose="020B0609020204030204" pitchFamily="49" charset="0"/>
               </a:rPr>
-              <a:t>List has total twenty </a:t>
-            </a:r>
-            <a:r>
-              <a:rPr lang="en-US" b="1" dirty="0" smtClean="0">
-                <a:solidFill>
-                  <a:srgbClr val="C00000"/>
-                </a:solidFill>
-                <a:latin typeface="Consolas" panose="020B0609020204030204" pitchFamily="49" charset="0"/>
-              </a:rPr>
-              <a:t>consonants.</a:t>
+              <a:t/>
             </a:r>
             <a:br>
               <a:rPr lang="en-US" b="1" dirty="0" smtClean="0">
@@ -5236,7 +5254,7 @@
                 </a:solidFill>
                 <a:latin typeface="Consolas" panose="020B0609020204030204" pitchFamily="49" charset="0"/>
               </a:rPr>
-              <a:t>8.  </a:t>
+              <a:t>8</a:t>
             </a:r>
             <a:r>
               <a:rPr lang="en-US" b="1" dirty="0">
@@ -5245,7 +5263,7 @@
                 </a:solidFill>
                 <a:latin typeface="Consolas" panose="020B0609020204030204" pitchFamily="49" charset="0"/>
               </a:rPr>
-              <a:t>List is </a:t>
+              <a:t>. </a:t>
             </a:r>
             <a:r>
               <a:rPr lang="en-US" b="1" dirty="0" smtClean="0">
@@ -5254,7 +5272,34 @@
                 </a:solidFill>
                 <a:latin typeface="Consolas" panose="020B0609020204030204" pitchFamily="49" charset="0"/>
               </a:rPr>
-              <a:t>empty.</a:t>
+              <a:t> List</a:t>
+            </a:r>
+            <a:r>
+              <a:rPr lang="en-US" b="1" dirty="0">
+                <a:solidFill>
+                  <a:srgbClr val="C00000"/>
+                </a:solidFill>
+                <a:latin typeface="Consolas" panose="020B0609020204030204" pitchFamily="49" charset="0"/>
+              </a:rPr>
+              <a:t> has total fifteen </a:t>
+            </a:r>
+            <a:r>
+              <a:rPr lang="en-US" b="1" dirty="0" smtClean="0">
+                <a:solidFill>
+                  <a:srgbClr val="C00000"/>
+                </a:solidFill>
+                <a:latin typeface="Consolas" panose="020B0609020204030204" pitchFamily="49" charset="0"/>
+              </a:rPr>
+              <a:t>vowels</a:t>
+            </a:r>
+            <a:r>
+              <a:rPr lang="en-US" b="1" dirty="0" smtClean="0">
+                <a:solidFill>
+                  <a:srgbClr val="C00000"/>
+                </a:solidFill>
+                <a:latin typeface="Consolas" panose="020B0609020204030204" pitchFamily="49" charset="0"/>
+              </a:rPr>
+              <a:t>.</a:t>
             </a:r>
             <a:br>
               <a:rPr lang="en-US" b="1" dirty="0" smtClean="0">
@@ -5282,13 +5327,22 @@
               </a:rPr>
             </a:br>
             <a:r>
+              <a:rPr lang="en-US" b="1" dirty="0">
+                <a:solidFill>
+                  <a:srgbClr val="C00000"/>
+                </a:solidFill>
+                <a:latin typeface="Consolas" panose="020B0609020204030204" pitchFamily="49" charset="0"/>
+              </a:rPr>
+              <a:t>9. </a:t>
+            </a:r>
+            <a:r>
               <a:rPr lang="en-US" b="1" dirty="0" smtClean="0">
                 <a:solidFill>
                   <a:srgbClr val="C00000"/>
                 </a:solidFill>
                 <a:latin typeface="Consolas" panose="020B0609020204030204" pitchFamily="49" charset="0"/>
               </a:rPr>
-              <a:t>9</a:t>
+              <a:t> List </a:t>
             </a:r>
             <a:r>
               <a:rPr lang="en-US" b="1" dirty="0">
@@ -5297,7 +5351,7 @@
                 </a:solidFill>
                 <a:latin typeface="Consolas" panose="020B0609020204030204" pitchFamily="49" charset="0"/>
               </a:rPr>
-              <a:t>. </a:t>
+              <a:t>has total twenty consonants.</a:t>
             </a:r>
             <a:r>
               <a:rPr lang="en-US" b="1" dirty="0" smtClean="0">
@@ -5306,25 +5360,7 @@
                 </a:solidFill>
                 <a:latin typeface="Consolas" panose="020B0609020204030204" pitchFamily="49" charset="0"/>
               </a:rPr>
-              <a:t> List </a:t>
-            </a:r>
-            <a:r>
-              <a:rPr lang="en-US" b="1" dirty="0">
-                <a:solidFill>
-                  <a:srgbClr val="C00000"/>
-                </a:solidFill>
-                <a:latin typeface="Consolas" panose="020B0609020204030204" pitchFamily="49" charset="0"/>
-              </a:rPr>
-              <a:t>is </a:t>
-            </a:r>
-            <a:r>
-              <a:rPr lang="en-US" b="1" dirty="0" smtClean="0">
-                <a:solidFill>
-                  <a:srgbClr val="C00000"/>
-                </a:solidFill>
-                <a:latin typeface="Consolas" panose="020B0609020204030204" pitchFamily="49" charset="0"/>
-              </a:rPr>
-              <a:t>null.</a:t>
+              <a:t/>
             </a:r>
             <a:br>
               <a:rPr lang="en-US" b="1" dirty="0" smtClean="0">
@@ -5358,25 +5394,7 @@
                 </a:solidFill>
                 <a:latin typeface="Consolas" panose="020B0609020204030204" pitchFamily="49" charset="0"/>
               </a:rPr>
-              <a:t>10. Lists </a:t>
-            </a:r>
-            <a:r>
-              <a:rPr lang="en-US" b="1" dirty="0">
-                <a:solidFill>
-                  <a:srgbClr val="C00000"/>
-                </a:solidFill>
-                <a:latin typeface="Consolas" panose="020B0609020204030204" pitchFamily="49" charset="0"/>
-              </a:rPr>
-              <a:t>are not </a:t>
-            </a:r>
-            <a:r>
-              <a:rPr lang="en-US" b="1" dirty="0" smtClean="0">
-                <a:solidFill>
-                  <a:srgbClr val="C00000"/>
-                </a:solidFill>
-                <a:latin typeface="Consolas" panose="020B0609020204030204" pitchFamily="49" charset="0"/>
-              </a:rPr>
-              <a:t>same.</a:t>
+              <a:t>10. Lists are not same.</a:t>
             </a:r>
             <a:endParaRPr lang="en-US" b="1" dirty="0">
               <a:solidFill>
@@ -5396,7 +5414,7 @@
         <p:spPr>
           <a:xfrm>
             <a:off x="21968" y="4044467"/>
-            <a:ext cx="6714112" cy="2862322"/>
+            <a:ext cx="6714112" cy="2585323"/>
           </a:xfrm>
           <a:prstGeom prst="rect">
             <a:avLst/>
@@ -5419,7 +5437,7 @@
                 </a:solidFill>
                 <a:latin typeface="Consolas" panose="020B0609020204030204" pitchFamily="49" charset="0"/>
               </a:rPr>
-              <a:t>L</a:t>
+              <a:t>List is </a:t>
             </a:r>
             <a:r>
               <a:rPr lang="en-US" b="1" dirty="0" smtClean="0">
@@ -5428,7 +5446,25 @@
                 </a:solidFill>
                 <a:latin typeface="Consolas" panose="020B0609020204030204" pitchFamily="49" charset="0"/>
               </a:rPr>
-              <a:t>ist is not empty.</a:t>
+              <a:t>null</a:t>
+            </a:r>
+            <a:r>
+              <a:rPr lang="en-US" b="1" dirty="0" smtClean="0">
+                <a:solidFill>
+                  <a:srgbClr val="C00000"/>
+                </a:solidFill>
+                <a:latin typeface="Consolas" panose="020B0609020204030204" pitchFamily="49" charset="0"/>
+              </a:rPr>
+              <a:t>.</a:t>
+            </a:r>
+            <a:r>
+              <a:rPr lang="en-US" b="1" dirty="0" smtClean="0">
+                <a:solidFill>
+                  <a:srgbClr val="C00000"/>
+                </a:solidFill>
+                <a:latin typeface="Consolas" panose="020B0609020204030204" pitchFamily="49" charset="0"/>
+              </a:rPr>
+              <a:t/>
             </a:r>
             <a:br>
               <a:rPr lang="en-US" b="1" dirty="0" smtClean="0">
@@ -5451,13 +5487,31 @@
               <a:buAutoNum type="arabicPeriod"/>
             </a:pPr>
             <a:r>
+              <a:rPr lang="en-US" b="1" dirty="0">
+                <a:solidFill>
+                  <a:srgbClr val="C00000"/>
+                </a:solidFill>
+                <a:latin typeface="Consolas" panose="020B0609020204030204" pitchFamily="49" charset="0"/>
+              </a:rPr>
+              <a:t>List is </a:t>
+            </a:r>
+            <a:r>
               <a:rPr lang="en-US" b="1" dirty="0" smtClean="0">
                 <a:solidFill>
                   <a:srgbClr val="C00000"/>
                 </a:solidFill>
                 <a:latin typeface="Consolas" panose="020B0609020204030204" pitchFamily="49" charset="0"/>
               </a:rPr>
-              <a:t>List has total four flavours.</a:t>
+              <a:t>empty. </a:t>
+            </a:r>
+            <a:r>
+              <a:rPr lang="en-US" b="1" dirty="0" smtClean="0">
+                <a:solidFill>
+                  <a:srgbClr val="C00000"/>
+                </a:solidFill>
+                <a:latin typeface="Consolas" panose="020B0609020204030204" pitchFamily="49" charset="0"/>
+              </a:rPr>
+              <a:t/>
             </a:r>
             <a:br>
               <a:rPr lang="en-US" b="1" dirty="0" smtClean="0">
@@ -5480,13 +5534,31 @@
               <a:buAutoNum type="arabicPeriod"/>
             </a:pPr>
             <a:r>
+              <a:rPr lang="en-US" b="1" dirty="0">
+                <a:solidFill>
+                  <a:srgbClr val="C00000"/>
+                </a:solidFill>
+                <a:latin typeface="Consolas" panose="020B0609020204030204" pitchFamily="49" charset="0"/>
+              </a:rPr>
+              <a:t>List is </a:t>
+            </a:r>
+            <a:r>
               <a:rPr lang="en-US" b="1" dirty="0" smtClean="0">
                 <a:solidFill>
                   <a:srgbClr val="C00000"/>
                 </a:solidFill>
                 <a:latin typeface="Consolas" panose="020B0609020204030204" pitchFamily="49" charset="0"/>
               </a:rPr>
-              <a:t>First flavour of list is Chocolate.</a:t>
+              <a:t>not empty.</a:t>
+            </a:r>
+            <a:r>
+              <a:rPr lang="en-US" b="1" dirty="0" smtClean="0">
+                <a:solidFill>
+                  <a:srgbClr val="C00000"/>
+                </a:solidFill>
+                <a:latin typeface="Consolas" panose="020B0609020204030204" pitchFamily="49" charset="0"/>
+              </a:rPr>
+              <a:t/>
             </a:r>
             <a:br>
               <a:rPr lang="en-US" b="1" dirty="0" smtClean="0">
@@ -5515,7 +5587,7 @@
                 </a:solidFill>
                 <a:latin typeface="Consolas" panose="020B0609020204030204" pitchFamily="49" charset="0"/>
               </a:rPr>
-              <a:t>Last flavour of list is Peanut </a:t>
+              <a:t>List has total four flavours. </a:t>
             </a:r>
             <a:r>
               <a:rPr lang="en-US" b="1" dirty="0" smtClean="0">
@@ -5524,7 +5596,7 @@
                 </a:solidFill>
                 <a:latin typeface="Consolas" panose="020B0609020204030204" pitchFamily="49" charset="0"/>
               </a:rPr>
-              <a:t>Butter.</a:t>
+              <a:t/>
             </a:r>
             <a:br>
               <a:rPr lang="en-US" b="1" dirty="0" smtClean="0">
@@ -5553,7 +5625,7 @@
                 </a:solidFill>
                 <a:latin typeface="Consolas" panose="020B0609020204030204" pitchFamily="49" charset="0"/>
               </a:rPr>
-              <a:t>List has two flavours starting with </a:t>
+              <a:t>First flavour of list is Chocolate</a:t>
             </a:r>
             <a:r>
               <a:rPr lang="en-US" b="1" dirty="0" smtClean="0">
@@ -5562,14 +5634,8 @@
                 </a:solidFill>
                 <a:latin typeface="Consolas" panose="020B0609020204030204" pitchFamily="49" charset="0"/>
               </a:rPr>
-              <a:t>the letter C.</a:t>
-            </a:r>
-          </a:p>
-          <a:p>
-            <a:pPr marL="342900" indent="-342900">
-              <a:buFont typeface="+mj-lt"/>
-              <a:buAutoNum type="arabicPeriod"/>
-            </a:pPr>
+              <a:t>.</a:t>
+            </a:r>
             <a:endParaRPr lang="en-US" b="1" dirty="0">
               <a:solidFill>
                 <a:srgbClr val="C00000"/>
@@ -5641,6 +5707,604 @@
 </file>
 
 <file path=ppt/slides/slide12.xml><?xml version="1.0" encoding="utf-8"?>
+<p:sld xmlns:a="http://schemas.openxmlformats.org/drawingml/2006/main" xmlns:r="http://schemas.openxmlformats.org/officeDocument/2006/relationships" xmlns:p="http://schemas.openxmlformats.org/presentationml/2006/main">
+  <p:cSld>
+    <p:spTree>
+      <p:nvGrpSpPr>
+        <p:cNvPr id="1" name=""/>
+        <p:cNvGrpSpPr/>
+        <p:nvPr/>
+      </p:nvGrpSpPr>
+      <p:grpSpPr>
+        <a:xfrm>
+          <a:off x="0" y="0"/>
+          <a:ext cx="0" cy="0"/>
+          <a:chOff x="0" y="0"/>
+          <a:chExt cx="0" cy="0"/>
+        </a:xfrm>
+      </p:grpSpPr>
+      <p:sp>
+        <p:nvSpPr>
+          <p:cNvPr id="19" name="Rectangle 18"/>
+          <p:cNvSpPr/>
+          <p:nvPr/>
+        </p:nvSpPr>
+        <p:spPr>
+          <a:xfrm>
+            <a:off x="2372007" y="1242203"/>
+            <a:ext cx="6991346" cy="653143"/>
+          </a:xfrm>
+          <a:prstGeom prst="rect">
+            <a:avLst/>
+          </a:prstGeom>
+        </p:spPr>
+        <p:style>
+          <a:lnRef idx="2">
+            <a:schemeClr val="accent1">
+              <a:shade val="50000"/>
+            </a:schemeClr>
+          </a:lnRef>
+          <a:fillRef idx="1">
+            <a:schemeClr val="accent1"/>
+          </a:fillRef>
+          <a:effectRef idx="0">
+            <a:schemeClr val="accent1"/>
+          </a:effectRef>
+          <a:fontRef idx="minor">
+            <a:schemeClr val="lt1"/>
+          </a:fontRef>
+        </p:style>
+        <p:txBody>
+          <a:bodyPr rtlCol="0" anchor="ctr"/>
+          <a:lstStyle/>
+          <a:p>
+            <a:pPr algn="ctr"/>
+            <a:endParaRPr lang="en-US" b="1" dirty="0">
+              <a:solidFill>
+                <a:schemeClr val="bg1"/>
+              </a:solidFill>
+            </a:endParaRPr>
+          </a:p>
+        </p:txBody>
+      </p:sp>
+      <p:sp>
+        <p:nvSpPr>
+          <p:cNvPr id="20" name="Rectangle 19"/>
+          <p:cNvSpPr/>
+          <p:nvPr/>
+        </p:nvSpPr>
+        <p:spPr>
+          <a:xfrm>
+            <a:off x="339831" y="328749"/>
+            <a:ext cx="2844048" cy="369332"/>
+          </a:xfrm>
+          <a:prstGeom prst="rect">
+            <a:avLst/>
+          </a:prstGeom>
+        </p:spPr>
+        <p:txBody>
+          <a:bodyPr wrap="none">
+            <a:spAutoFit/>
+          </a:bodyPr>
+          <a:lstStyle/>
+          <a:p>
+            <a:r>
+              <a:rPr lang="en-US" b="1" dirty="0">
+                <a:solidFill>
+                  <a:srgbClr val="386BC4"/>
+                </a:solidFill>
+                <a:latin typeface="Consolas" panose="020B0609020204030204" pitchFamily="49" charset="0"/>
+              </a:rPr>
+              <a:t>List&lt;String&gt; flavours</a:t>
+            </a:r>
+            <a:endParaRPr lang="en-US" b="1" dirty="0">
+              <a:solidFill>
+                <a:srgbClr val="386BC4"/>
+              </a:solidFill>
+              <a:effectLst/>
+              <a:latin typeface="Consolas" panose="020B0609020204030204" pitchFamily="49" charset="0"/>
+            </a:endParaRPr>
+          </a:p>
+        </p:txBody>
+      </p:sp>
+      <p:sp>
+        <p:nvSpPr>
+          <p:cNvPr id="27" name="Rectangle 26"/>
+          <p:cNvSpPr/>
+          <p:nvPr/>
+        </p:nvSpPr>
+        <p:spPr>
+          <a:xfrm>
+            <a:off x="4592041" y="2449089"/>
+            <a:ext cx="2328647" cy="369332"/>
+          </a:xfrm>
+          <a:prstGeom prst="rect">
+            <a:avLst/>
+          </a:prstGeom>
+        </p:spPr>
+        <p:txBody>
+          <a:bodyPr wrap="square">
+            <a:spAutoFit/>
+          </a:bodyPr>
+          <a:lstStyle/>
+          <a:p>
+            <a:r>
+              <a:rPr lang="en-US" b="1" dirty="0" smtClean="0">
+                <a:solidFill>
+                  <a:srgbClr val="C00000"/>
+                </a:solidFill>
+                <a:latin typeface="Consolas" panose="020B0609020204030204" pitchFamily="49" charset="0"/>
+              </a:rPr>
+              <a:t>1. </a:t>
+            </a:r>
+            <a:r>
+              <a:rPr lang="en-US" b="1" dirty="0" smtClean="0">
+                <a:solidFill>
+                  <a:srgbClr val="C00000"/>
+                </a:solidFill>
+                <a:latin typeface="Consolas" panose="020B0609020204030204" pitchFamily="49" charset="0"/>
+              </a:rPr>
+              <a:t>List </a:t>
+            </a:r>
+            <a:r>
+              <a:rPr lang="en-US" b="1" dirty="0">
+                <a:solidFill>
+                  <a:srgbClr val="C00000"/>
+                </a:solidFill>
+                <a:latin typeface="Consolas" panose="020B0609020204030204" pitchFamily="49" charset="0"/>
+              </a:rPr>
+              <a:t>is </a:t>
+            </a:r>
+            <a:r>
+              <a:rPr lang="en-US" b="1" dirty="0" smtClean="0">
+                <a:solidFill>
+                  <a:srgbClr val="C00000"/>
+                </a:solidFill>
+                <a:latin typeface="Consolas" panose="020B0609020204030204" pitchFamily="49" charset="0"/>
+              </a:rPr>
+              <a:t>null.</a:t>
+            </a:r>
+          </a:p>
+        </p:txBody>
+      </p:sp>
+      <p:sp>
+        <p:nvSpPr>
+          <p:cNvPr id="12" name="Rectangle 11"/>
+          <p:cNvSpPr/>
+          <p:nvPr/>
+        </p:nvSpPr>
+        <p:spPr>
+          <a:xfrm>
+            <a:off x="2372007" y="3372164"/>
+            <a:ext cx="6991346" cy="369332"/>
+          </a:xfrm>
+          <a:prstGeom prst="rect">
+            <a:avLst/>
+          </a:prstGeom>
+        </p:spPr>
+        <p:txBody>
+          <a:bodyPr wrap="square">
+            <a:spAutoFit/>
+          </a:bodyPr>
+          <a:lstStyle/>
+          <a:p>
+            <a:r>
+              <a:rPr lang="en-US" b="1" dirty="0">
+                <a:solidFill>
+                  <a:schemeClr val="accent6">
+                    <a:lumMod val="50000"/>
+                  </a:schemeClr>
+                </a:solidFill>
+                <a:latin typeface="Consolas" panose="020B0609020204030204" pitchFamily="49" charset="0"/>
+              </a:rPr>
+              <a:t> test('List is null', () =&gt; expect(flavours, </a:t>
+            </a:r>
+            <a:r>
+              <a:rPr lang="en-US" b="1" dirty="0" err="1">
+                <a:solidFill>
+                  <a:schemeClr val="accent6">
+                    <a:lumMod val="50000"/>
+                  </a:schemeClr>
+                </a:solidFill>
+                <a:latin typeface="Consolas" panose="020B0609020204030204" pitchFamily="49" charset="0"/>
+              </a:rPr>
+              <a:t>isNull</a:t>
+            </a:r>
+            <a:r>
+              <a:rPr lang="en-US" b="1" dirty="0">
+                <a:solidFill>
+                  <a:schemeClr val="accent6">
+                    <a:lumMod val="50000"/>
+                  </a:schemeClr>
+                </a:solidFill>
+                <a:latin typeface="Consolas" panose="020B0609020204030204" pitchFamily="49" charset="0"/>
+              </a:rPr>
+              <a:t>));</a:t>
+            </a:r>
+            <a:endParaRPr lang="en-US" b="1" dirty="0">
+              <a:solidFill>
+                <a:schemeClr val="accent6">
+                  <a:lumMod val="50000"/>
+                </a:schemeClr>
+              </a:solidFill>
+              <a:latin typeface="Consolas" panose="020B0609020204030204" pitchFamily="49" charset="0"/>
+            </a:endParaRPr>
+          </a:p>
+        </p:txBody>
+      </p:sp>
+    </p:spTree>
+    <p:extLst>
+      <p:ext uri="{BB962C8B-B14F-4D97-AF65-F5344CB8AC3E}">
+        <p14:creationId xmlns:p14="http://schemas.microsoft.com/office/powerpoint/2010/main" val="2770298008"/>
+      </p:ext>
+    </p:extLst>
+  </p:cSld>
+  <p:clrMapOvr>
+    <a:masterClrMapping/>
+  </p:clrMapOvr>
+  <p:timing>
+    <p:tnLst>
+      <p:par>
+        <p:cTn id="1" dur="indefinite" restart="never" nodeType="tmRoot"/>
+      </p:par>
+    </p:tnLst>
+  </p:timing>
+</p:sld>
+</file>
+
+<file path=ppt/slides/slide13.xml><?xml version="1.0" encoding="utf-8"?>
+<p:sld xmlns:a="http://schemas.openxmlformats.org/drawingml/2006/main" xmlns:r="http://schemas.openxmlformats.org/officeDocument/2006/relationships" xmlns:p="http://schemas.openxmlformats.org/presentationml/2006/main">
+  <p:cSld>
+    <p:spTree>
+      <p:nvGrpSpPr>
+        <p:cNvPr id="1" name=""/>
+        <p:cNvGrpSpPr/>
+        <p:nvPr/>
+      </p:nvGrpSpPr>
+      <p:grpSpPr>
+        <a:xfrm>
+          <a:off x="0" y="0"/>
+          <a:ext cx="0" cy="0"/>
+          <a:chOff x="0" y="0"/>
+          <a:chExt cx="0" cy="0"/>
+        </a:xfrm>
+      </p:grpSpPr>
+      <p:sp>
+        <p:nvSpPr>
+          <p:cNvPr id="16" name="Rectangle 15"/>
+          <p:cNvSpPr/>
+          <p:nvPr/>
+        </p:nvSpPr>
+        <p:spPr>
+          <a:xfrm>
+            <a:off x="4789716" y="1332081"/>
+            <a:ext cx="1463039" cy="653143"/>
+          </a:xfrm>
+          <a:prstGeom prst="rect">
+            <a:avLst/>
+          </a:prstGeom>
+        </p:spPr>
+        <p:style>
+          <a:lnRef idx="2">
+            <a:schemeClr val="accent1">
+              <a:shade val="50000"/>
+            </a:schemeClr>
+          </a:lnRef>
+          <a:fillRef idx="1">
+            <a:schemeClr val="accent1"/>
+          </a:fillRef>
+          <a:effectRef idx="0">
+            <a:schemeClr val="accent1"/>
+          </a:effectRef>
+          <a:fontRef idx="minor">
+            <a:schemeClr val="lt1"/>
+          </a:fontRef>
+        </p:style>
+        <p:txBody>
+          <a:bodyPr rtlCol="0" anchor="ctr"/>
+          <a:lstStyle/>
+          <a:p>
+            <a:pPr algn="ctr"/>
+            <a:endParaRPr lang="en-US" b="1" dirty="0">
+              <a:solidFill>
+                <a:schemeClr val="bg1"/>
+              </a:solidFill>
+            </a:endParaRPr>
+          </a:p>
+        </p:txBody>
+      </p:sp>
+      <p:sp>
+        <p:nvSpPr>
+          <p:cNvPr id="20" name="Rectangle 19"/>
+          <p:cNvSpPr/>
+          <p:nvPr/>
+        </p:nvSpPr>
+        <p:spPr>
+          <a:xfrm>
+            <a:off x="339831" y="328749"/>
+            <a:ext cx="2844048" cy="369332"/>
+          </a:xfrm>
+          <a:prstGeom prst="rect">
+            <a:avLst/>
+          </a:prstGeom>
+        </p:spPr>
+        <p:txBody>
+          <a:bodyPr wrap="none">
+            <a:spAutoFit/>
+          </a:bodyPr>
+          <a:lstStyle/>
+          <a:p>
+            <a:r>
+              <a:rPr lang="en-US" b="1" dirty="0">
+                <a:solidFill>
+                  <a:srgbClr val="386BC4"/>
+                </a:solidFill>
+                <a:latin typeface="Consolas" panose="020B0609020204030204" pitchFamily="49" charset="0"/>
+              </a:rPr>
+              <a:t>List&lt;String&gt; flavours</a:t>
+            </a:r>
+            <a:endParaRPr lang="en-US" b="1" dirty="0">
+              <a:solidFill>
+                <a:srgbClr val="386BC4"/>
+              </a:solidFill>
+              <a:effectLst/>
+              <a:latin typeface="Consolas" panose="020B0609020204030204" pitchFamily="49" charset="0"/>
+            </a:endParaRPr>
+          </a:p>
+        </p:txBody>
+      </p:sp>
+      <p:sp>
+        <p:nvSpPr>
+          <p:cNvPr id="22" name="Rectangle 21"/>
+          <p:cNvSpPr/>
+          <p:nvPr/>
+        </p:nvSpPr>
+        <p:spPr>
+          <a:xfrm>
+            <a:off x="5066624" y="2016485"/>
+            <a:ext cx="1033731" cy="369332"/>
+          </a:xfrm>
+          <a:prstGeom prst="rect">
+            <a:avLst/>
+          </a:prstGeom>
+        </p:spPr>
+        <p:txBody>
+          <a:bodyPr wrap="square">
+            <a:spAutoFit/>
+          </a:bodyPr>
+          <a:lstStyle/>
+          <a:p>
+            <a:r>
+              <a:rPr lang="en-US" b="1" dirty="0" smtClean="0">
+                <a:effectLst/>
+                <a:latin typeface="Consolas" panose="020B0609020204030204" pitchFamily="49" charset="0"/>
+              </a:rPr>
+              <a:t>  0      </a:t>
+            </a:r>
+            <a:endParaRPr lang="en-US" b="1" dirty="0">
+              <a:effectLst/>
+              <a:latin typeface="Consolas" panose="020B0609020204030204" pitchFamily="49" charset="0"/>
+            </a:endParaRPr>
+          </a:p>
+        </p:txBody>
+      </p:sp>
+      <p:sp>
+        <p:nvSpPr>
+          <p:cNvPr id="56" name="Rectangle 55"/>
+          <p:cNvSpPr/>
+          <p:nvPr/>
+        </p:nvSpPr>
+        <p:spPr>
+          <a:xfrm>
+            <a:off x="3779686" y="1985224"/>
+            <a:ext cx="817853" cy="369332"/>
+          </a:xfrm>
+          <a:prstGeom prst="rect">
+            <a:avLst/>
+          </a:prstGeom>
+        </p:spPr>
+        <p:txBody>
+          <a:bodyPr wrap="none">
+            <a:spAutoFit/>
+          </a:bodyPr>
+          <a:lstStyle/>
+          <a:p>
+            <a:r>
+              <a:rPr lang="en-US" b="1" dirty="0" smtClean="0">
+                <a:effectLst/>
+                <a:latin typeface="Consolas" panose="020B0609020204030204" pitchFamily="49" charset="0"/>
+              </a:rPr>
+              <a:t>INDEX</a:t>
+            </a:r>
+            <a:endParaRPr lang="en-US" b="1" dirty="0">
+              <a:effectLst/>
+              <a:latin typeface="Consolas" panose="020B0609020204030204" pitchFamily="49" charset="0"/>
+            </a:endParaRPr>
+          </a:p>
+        </p:txBody>
+      </p:sp>
+      <p:sp>
+        <p:nvSpPr>
+          <p:cNvPr id="27" name="Rectangle 26"/>
+          <p:cNvSpPr/>
+          <p:nvPr/>
+        </p:nvSpPr>
+        <p:spPr>
+          <a:xfrm>
+            <a:off x="4617519" y="2591999"/>
+            <a:ext cx="2328647" cy="369332"/>
+          </a:xfrm>
+          <a:prstGeom prst="rect">
+            <a:avLst/>
+          </a:prstGeom>
+        </p:spPr>
+        <p:txBody>
+          <a:bodyPr wrap="square">
+            <a:spAutoFit/>
+          </a:bodyPr>
+          <a:lstStyle/>
+          <a:p>
+            <a:r>
+              <a:rPr lang="en-US" b="1" dirty="0" smtClean="0">
+                <a:solidFill>
+                  <a:srgbClr val="C00000"/>
+                </a:solidFill>
+                <a:latin typeface="Consolas" panose="020B0609020204030204" pitchFamily="49" charset="0"/>
+              </a:rPr>
+              <a:t>2. </a:t>
+            </a:r>
+            <a:r>
+              <a:rPr lang="en-US" b="1" dirty="0" smtClean="0">
+                <a:solidFill>
+                  <a:srgbClr val="C00000"/>
+                </a:solidFill>
+                <a:latin typeface="Consolas" panose="020B0609020204030204" pitchFamily="49" charset="0"/>
+              </a:rPr>
+              <a:t>List </a:t>
+            </a:r>
+            <a:r>
+              <a:rPr lang="en-US" b="1" dirty="0">
+                <a:solidFill>
+                  <a:srgbClr val="C00000"/>
+                </a:solidFill>
+                <a:latin typeface="Consolas" panose="020B0609020204030204" pitchFamily="49" charset="0"/>
+              </a:rPr>
+              <a:t>is empty.</a:t>
+            </a:r>
+            <a:endParaRPr lang="en-US" b="1" dirty="0" smtClean="0">
+              <a:solidFill>
+                <a:srgbClr val="C00000"/>
+              </a:solidFill>
+              <a:latin typeface="Consolas" panose="020B0609020204030204" pitchFamily="49" charset="0"/>
+            </a:endParaRPr>
+          </a:p>
+        </p:txBody>
+      </p:sp>
+      <p:sp>
+        <p:nvSpPr>
+          <p:cNvPr id="12" name="Rectangle 11"/>
+          <p:cNvSpPr/>
+          <p:nvPr/>
+        </p:nvSpPr>
+        <p:spPr>
+          <a:xfrm>
+            <a:off x="3909709" y="3515854"/>
+            <a:ext cx="4591222" cy="1200329"/>
+          </a:xfrm>
+          <a:prstGeom prst="rect">
+            <a:avLst/>
+          </a:prstGeom>
+        </p:spPr>
+        <p:txBody>
+          <a:bodyPr wrap="square">
+            <a:spAutoFit/>
+          </a:bodyPr>
+          <a:lstStyle/>
+          <a:p>
+            <a:r>
+              <a:rPr lang="en-US" b="1" dirty="0">
+                <a:solidFill>
+                  <a:schemeClr val="accent6">
+                    <a:lumMod val="50000"/>
+                  </a:schemeClr>
+                </a:solidFill>
+                <a:latin typeface="Consolas" panose="020B0609020204030204" pitchFamily="49" charset="0"/>
+              </a:rPr>
+              <a:t>test('List is empty', () {</a:t>
+            </a:r>
+          </a:p>
+          <a:p>
+            <a:r>
+              <a:rPr lang="en-US" b="1" dirty="0">
+                <a:solidFill>
+                  <a:schemeClr val="accent6">
+                    <a:lumMod val="50000"/>
+                  </a:schemeClr>
+                </a:solidFill>
+                <a:latin typeface="Consolas" panose="020B0609020204030204" pitchFamily="49" charset="0"/>
+              </a:rPr>
+              <a:t>      flavours = [];</a:t>
+            </a:r>
+          </a:p>
+          <a:p>
+            <a:r>
+              <a:rPr lang="en-US" b="1" dirty="0">
+                <a:solidFill>
+                  <a:schemeClr val="accent6">
+                    <a:lumMod val="50000"/>
+                  </a:schemeClr>
+                </a:solidFill>
+                <a:latin typeface="Consolas" panose="020B0609020204030204" pitchFamily="49" charset="0"/>
+              </a:rPr>
+              <a:t>      expect(flavours, </a:t>
+            </a:r>
+            <a:r>
+              <a:rPr lang="en-US" b="1" dirty="0" err="1">
+                <a:solidFill>
+                  <a:schemeClr val="accent6">
+                    <a:lumMod val="50000"/>
+                  </a:schemeClr>
+                </a:solidFill>
+                <a:latin typeface="Consolas" panose="020B0609020204030204" pitchFamily="49" charset="0"/>
+              </a:rPr>
+              <a:t>isEmpty</a:t>
+            </a:r>
+            <a:r>
+              <a:rPr lang="en-US" b="1" dirty="0">
+                <a:solidFill>
+                  <a:schemeClr val="accent6">
+                    <a:lumMod val="50000"/>
+                  </a:schemeClr>
+                </a:solidFill>
+                <a:latin typeface="Consolas" panose="020B0609020204030204" pitchFamily="49" charset="0"/>
+              </a:rPr>
+              <a:t>);</a:t>
+            </a:r>
+          </a:p>
+          <a:p>
+            <a:r>
+              <a:rPr lang="en-US" b="1" dirty="0">
+                <a:solidFill>
+                  <a:schemeClr val="accent6">
+                    <a:lumMod val="50000"/>
+                  </a:schemeClr>
+                </a:solidFill>
+                <a:latin typeface="Consolas" panose="020B0609020204030204" pitchFamily="49" charset="0"/>
+              </a:rPr>
+              <a:t>    });</a:t>
+            </a:r>
+            <a:endParaRPr lang="en-US" b="1" dirty="0">
+              <a:solidFill>
+                <a:schemeClr val="accent6">
+                  <a:lumMod val="50000"/>
+                </a:schemeClr>
+              </a:solidFill>
+              <a:latin typeface="Consolas" panose="020B0609020204030204" pitchFamily="49" charset="0"/>
+            </a:endParaRPr>
+          </a:p>
+        </p:txBody>
+      </p:sp>
+    </p:spTree>
+    <p:extLst>
+      <p:ext uri="{BB962C8B-B14F-4D97-AF65-F5344CB8AC3E}">
+        <p14:creationId xmlns:p14="http://schemas.microsoft.com/office/powerpoint/2010/main" val="1338391478"/>
+      </p:ext>
+    </p:extLst>
+  </p:cSld>
+  <p:clrMapOvr>
+    <a:masterClrMapping/>
+  </p:clrMapOvr>
+  <p:timing>
+    <p:tnLst>
+      <p:par>
+        <p:cTn id="1" dur="indefinite" restart="never" nodeType="tmRoot"/>
+      </p:par>
+    </p:tnLst>
+  </p:timing>
+</p:sld>
+</file>
+
+<file path=ppt/slides/slide14.xml><?xml version="1.0" encoding="utf-8"?>
 <p:sld xmlns:a="http://schemas.openxmlformats.org/drawingml/2006/main" xmlns:r="http://schemas.openxmlformats.org/officeDocument/2006/relationships" xmlns:p="http://schemas.openxmlformats.org/presentationml/2006/main">
   <p:cSld>
     <p:spTree>
@@ -6019,18 +6683,14 @@
           </a:bodyPr>
           <a:lstStyle/>
           <a:p>
-            <a:pPr marL="342900" indent="-342900">
-              <a:buFont typeface="+mj-lt"/>
-              <a:buAutoNum type="arabicPeriod"/>
-            </a:pPr>
-            <a:r>
-              <a:rPr lang="en-US" b="1" dirty="0">
+            <a:r>
+              <a:rPr lang="en-US" b="1" dirty="0" smtClean="0">
                 <a:solidFill>
                   <a:srgbClr val="C00000"/>
                 </a:solidFill>
                 <a:latin typeface="Consolas" panose="020B0609020204030204" pitchFamily="49" charset="0"/>
               </a:rPr>
-              <a:t>L</a:t>
+              <a:t>3. List </a:t>
             </a:r>
             <a:r>
               <a:rPr lang="en-US" b="1" dirty="0" smtClean="0">
@@ -6039,7 +6699,7 @@
                 </a:solidFill>
                 <a:latin typeface="Consolas" panose="020B0609020204030204" pitchFamily="49" charset="0"/>
               </a:rPr>
-              <a:t>ist is not empty.</a:t>
+              <a:t>is not empty.</a:t>
             </a:r>
           </a:p>
         </p:txBody>
@@ -6052,8 +6712,8 @@
         </p:nvSpPr>
         <p:spPr>
           <a:xfrm>
-            <a:off x="2123914" y="3884415"/>
-            <a:ext cx="8162812" cy="369332"/>
+            <a:off x="2227418" y="3910540"/>
+            <a:ext cx="9049272" cy="1200329"/>
           </a:xfrm>
           <a:prstGeom prst="rect">
             <a:avLst/>
@@ -6074,10 +6734,12 @@
                 </a:solidFill>
                 <a:latin typeface="Consolas" panose="020B0609020204030204" pitchFamily="49" charset="0"/>
               </a:rPr>
-              <a:t>test('List is not empty ', () =&gt; expect(flavours, </a:t>
-            </a:r>
-            <a:r>
-              <a:rPr lang="en-US" b="1" dirty="0" err="1">
+              <a:t>test('List is not empty', () {</a:t>
+            </a:r>
+          </a:p>
+          <a:p>
+            <a:r>
+              <a:rPr lang="en-US" b="1" dirty="0">
                 <a:solidFill>
                   <a:schemeClr val="accent6">
                     <a:lumMod val="50000"/>
@@ -6085,8 +6747,10 @@
                 </a:solidFill>
                 <a:latin typeface="Consolas" panose="020B0609020204030204" pitchFamily="49" charset="0"/>
               </a:rPr>
-              <a:t>isNotEmpty</a:t>
-            </a:r>
+              <a:t>      flavours = ['Chocolate', 'Caramel', 'Vanilla', 'Peanut Butter'];</a:t>
+            </a:r>
+          </a:p>
+          <a:p>
             <a:r>
               <a:rPr lang="en-US" b="1" dirty="0">
                 <a:solidFill>
@@ -6096,7 +6760,42 @@
                 </a:solidFill>
                 <a:latin typeface="Consolas" panose="020B0609020204030204" pitchFamily="49" charset="0"/>
               </a:rPr>
-              <a:t>));</a:t>
+              <a:t>      expect(flavours, </a:t>
+            </a:r>
+            <a:r>
+              <a:rPr lang="en-US" b="1" dirty="0" err="1">
+                <a:solidFill>
+                  <a:schemeClr val="accent6">
+                    <a:lumMod val="50000"/>
+                  </a:schemeClr>
+                </a:solidFill>
+                <a:latin typeface="Consolas" panose="020B0609020204030204" pitchFamily="49" charset="0"/>
+              </a:rPr>
+              <a:t>isNotEmpty</a:t>
+            </a:r>
+            <a:r>
+              <a:rPr lang="en-US" b="1" dirty="0">
+                <a:solidFill>
+                  <a:schemeClr val="accent6">
+                    <a:lumMod val="50000"/>
+                  </a:schemeClr>
+                </a:solidFill>
+                <a:latin typeface="Consolas" panose="020B0609020204030204" pitchFamily="49" charset="0"/>
+              </a:rPr>
+              <a:t>);</a:t>
+            </a:r>
+          </a:p>
+          <a:p>
+            <a:r>
+              <a:rPr lang="en-US" b="1" dirty="0">
+                <a:solidFill>
+                  <a:schemeClr val="accent6">
+                    <a:lumMod val="50000"/>
+                  </a:schemeClr>
+                </a:solidFill>
+                <a:latin typeface="Consolas" panose="020B0609020204030204" pitchFamily="49" charset="0"/>
+              </a:rPr>
+              <a:t>    });</a:t>
             </a:r>
             <a:endParaRPr lang="en-US" b="1" dirty="0">
               <a:solidFill>
@@ -6130,7 +6829,7 @@
 </p:sld>
 </file>
 
-<file path=ppt/slides/slide13.xml><?xml version="1.0" encoding="utf-8"?>
+<file path=ppt/slides/slide15.xml><?xml version="1.0" encoding="utf-8"?>
 <p:sld xmlns:a="http://schemas.openxmlformats.org/drawingml/2006/main" xmlns:r="http://schemas.openxmlformats.org/officeDocument/2006/relationships" xmlns:p="http://schemas.openxmlformats.org/presentationml/2006/main">
   <p:cSld>
     <p:spTree>
@@ -6516,7 +7215,7 @@
                 </a:solidFill>
                 <a:latin typeface="Consolas" panose="020B0609020204030204" pitchFamily="49" charset="0"/>
               </a:rPr>
-              <a:t>2</a:t>
+              <a:t>4. </a:t>
             </a:r>
             <a:r>
               <a:rPr lang="en-US" b="1" dirty="0">
@@ -6525,7 +7224,7 @@
                 </a:solidFill>
                 <a:latin typeface="Consolas" panose="020B0609020204030204" pitchFamily="49" charset="0"/>
               </a:rPr>
-              <a:t>. List has total four flavours.</a:t>
+              <a:t>List has total four flavours.</a:t>
             </a:r>
             <a:endParaRPr lang="en-US" b="1" dirty="0" smtClean="0">
               <a:solidFill>
@@ -6544,8 +7243,8 @@
         </p:nvSpPr>
         <p:spPr>
           <a:xfrm>
-            <a:off x="2441499" y="4772689"/>
-            <a:ext cx="7527641" cy="646331"/>
+            <a:off x="3241024" y="4720438"/>
+            <a:ext cx="6062421" cy="1200329"/>
           </a:xfrm>
           <a:prstGeom prst="rect">
             <a:avLst/>
@@ -6566,7 +7265,7 @@
                 </a:solidFill>
                 <a:latin typeface="Consolas" panose="020B0609020204030204" pitchFamily="49" charset="0"/>
               </a:rPr>
-              <a:t> test('List has total four flavours',</a:t>
+              <a:t>test('List has total four flavours', () {</a:t>
             </a:r>
           </a:p>
           <a:p>
@@ -6579,7 +7278,7 @@
                 </a:solidFill>
                 <a:latin typeface="Consolas" panose="020B0609020204030204" pitchFamily="49" charset="0"/>
               </a:rPr>
-              <a:t>        () =&gt; expect(</a:t>
+              <a:t>      expect(</a:t>
             </a:r>
             <a:r>
               <a:rPr lang="en-US" b="1" dirty="0" err="1">
@@ -6623,7 +7322,77 @@
                 </a:solidFill>
                 <a:latin typeface="Consolas" panose="020B0609020204030204" pitchFamily="49" charset="0"/>
               </a:rPr>
-              <a:t>(0)));</a:t>
+              <a:t>(0));</a:t>
+            </a:r>
+          </a:p>
+          <a:p>
+            <a:r>
+              <a:rPr lang="en-US" b="1" dirty="0">
+                <a:solidFill>
+                  <a:schemeClr val="accent6">
+                    <a:lumMod val="50000"/>
+                  </a:schemeClr>
+                </a:solidFill>
+                <a:latin typeface="Consolas" panose="020B0609020204030204" pitchFamily="49" charset="0"/>
+              </a:rPr>
+              <a:t>      expect(</a:t>
+            </a:r>
+            <a:r>
+              <a:rPr lang="en-US" b="1" dirty="0" err="1">
+                <a:solidFill>
+                  <a:schemeClr val="accent6">
+                    <a:lumMod val="50000"/>
+                  </a:schemeClr>
+                </a:solidFill>
+                <a:latin typeface="Consolas" panose="020B0609020204030204" pitchFamily="49" charset="0"/>
+              </a:rPr>
+              <a:t>flavours.length</a:t>
+            </a:r>
+            <a:r>
+              <a:rPr lang="en-US" b="1" dirty="0">
+                <a:solidFill>
+                  <a:schemeClr val="accent6">
+                    <a:lumMod val="50000"/>
+                  </a:schemeClr>
+                </a:solidFill>
+                <a:latin typeface="Consolas" panose="020B0609020204030204" pitchFamily="49" charset="0"/>
+              </a:rPr>
+              <a:t>, </a:t>
+            </a:r>
+            <a:r>
+              <a:rPr lang="en-US" b="1" dirty="0" err="1">
+                <a:solidFill>
+                  <a:schemeClr val="accent6">
+                    <a:lumMod val="50000"/>
+                  </a:schemeClr>
+                </a:solidFill>
+                <a:latin typeface="Consolas" panose="020B0609020204030204" pitchFamily="49" charset="0"/>
+              </a:rPr>
+              <a:t>lessThan</a:t>
+            </a:r>
+            <a:r>
+              <a:rPr lang="en-US" b="1" dirty="0">
+                <a:solidFill>
+                  <a:schemeClr val="accent6">
+                    <a:lumMod val="50000"/>
+                  </a:schemeClr>
+                </a:solidFill>
+                <a:latin typeface="Consolas" panose="020B0609020204030204" pitchFamily="49" charset="0"/>
+              </a:rPr>
+              <a:t>(5));</a:t>
+            </a:r>
+          </a:p>
+          <a:p>
+            <a:r>
+              <a:rPr lang="en-US" b="1" dirty="0">
+                <a:solidFill>
+                  <a:schemeClr val="accent6">
+                    <a:lumMod val="50000"/>
+                  </a:schemeClr>
+                </a:solidFill>
+                <a:latin typeface="Consolas" panose="020B0609020204030204" pitchFamily="49" charset="0"/>
+              </a:rPr>
+              <a:t>    });</a:t>
             </a:r>
             <a:endParaRPr lang="en-US" b="1" dirty="0">
               <a:solidFill>
@@ -6831,7 +7600,7 @@
 </p:sld>
 </file>
 
-<file path=ppt/slides/slide14.xml><?xml version="1.0" encoding="utf-8"?>
+<file path=ppt/slides/slide16.xml><?xml version="1.0" encoding="utf-8"?>
 <p:sld xmlns:a="http://schemas.openxmlformats.org/drawingml/2006/main" xmlns:r="http://schemas.openxmlformats.org/officeDocument/2006/relationships" xmlns:p="http://schemas.openxmlformats.org/presentationml/2006/main">
   <p:cSld>
     <p:spTree>
@@ -7217,7 +7986,7 @@
                 </a:solidFill>
                 <a:latin typeface="Consolas" panose="020B0609020204030204" pitchFamily="49" charset="0"/>
               </a:rPr>
-              <a:t>3</a:t>
+              <a:t>5. </a:t>
             </a:r>
             <a:r>
               <a:rPr lang="en-US" b="1" dirty="0">
@@ -7226,7 +7995,7 @@
                 </a:solidFill>
                 <a:latin typeface="Consolas" panose="020B0609020204030204" pitchFamily="49" charset="0"/>
               </a:rPr>
-              <a:t>. First flavour of list is Chocolate.</a:t>
+              <a:t>First flavour of list is Chocolate.</a:t>
             </a:r>
             <a:endParaRPr lang="en-US" b="1" dirty="0" smtClean="0">
               <a:solidFill>
@@ -7383,7 +8152,7 @@
 </p:sld>
 </file>
 
-<file path=ppt/slides/slide15.xml><?xml version="1.0" encoding="utf-8"?>
+<file path=ppt/slides/slide17.xml><?xml version="1.0" encoding="utf-8"?>
 <p:sld xmlns:a="http://schemas.openxmlformats.org/drawingml/2006/main" xmlns:r="http://schemas.openxmlformats.org/officeDocument/2006/relationships" xmlns:p="http://schemas.openxmlformats.org/presentationml/2006/main">
   <p:cSld>
     <p:spTree>
@@ -7769,7 +8538,16 @@
                 </a:solidFill>
                 <a:latin typeface="Consolas" panose="020B0609020204030204" pitchFamily="49" charset="0"/>
               </a:rPr>
-              <a:t>4. Last </a:t>
+              <a:t>6. </a:t>
+            </a:r>
+            <a:r>
+              <a:rPr lang="en-US" b="1" dirty="0" smtClean="0">
+                <a:solidFill>
+                  <a:srgbClr val="C00000"/>
+                </a:solidFill>
+                <a:latin typeface="Consolas" panose="020B0609020204030204" pitchFamily="49" charset="0"/>
+              </a:rPr>
+              <a:t>Last </a:t>
             </a:r>
             <a:r>
               <a:rPr lang="en-US" b="1" dirty="0">
@@ -7960,7 +8738,7 @@
 </p:sld>
 </file>
 
-<file path=ppt/slides/slide16.xml><?xml version="1.0" encoding="utf-8"?>
+<file path=ppt/slides/slide18.xml><?xml version="1.0" encoding="utf-8"?>
 <p:sld xmlns:a="http://schemas.openxmlformats.org/drawingml/2006/main" xmlns:r="http://schemas.openxmlformats.org/officeDocument/2006/relationships" xmlns:p="http://schemas.openxmlformats.org/presentationml/2006/main">
   <p:cSld>
     <p:spTree>
@@ -8352,7 +9130,7 @@
                 </a:solidFill>
                 <a:latin typeface="Consolas" panose="020B0609020204030204" pitchFamily="49" charset="0"/>
               </a:rPr>
-              <a:t>5. </a:t>
+              <a:t>7. </a:t>
             </a:r>
             <a:r>
               <a:rPr lang="en-US" b="1" dirty="0">
@@ -8588,7 +9366,7 @@
 </p:sld>
 </file>
 
-<file path=ppt/slides/slide17.xml><?xml version="1.0" encoding="utf-8"?>
+<file path=ppt/slides/slide19.xml><?xml version="1.0" encoding="utf-8"?>
 <p:sld xmlns:a="http://schemas.openxmlformats.org/drawingml/2006/main" xmlns:r="http://schemas.openxmlformats.org/officeDocument/2006/relationships" xmlns:p="http://schemas.openxmlformats.org/presentationml/2006/main">
   <p:cSld>
     <p:spTree>
@@ -8984,13 +9762,22 @@
           <a:lstStyle/>
           <a:p>
             <a:r>
+              <a:rPr lang="en-US" b="1" dirty="0">
+                <a:solidFill>
+                  <a:srgbClr val="C00000"/>
+                </a:solidFill>
+                <a:latin typeface="Consolas" panose="020B0609020204030204" pitchFamily="49" charset="0"/>
+              </a:rPr>
+              <a:t>8</a:t>
+            </a:r>
+            <a:r>
               <a:rPr lang="en-US" b="1" dirty="0" smtClean="0">
                 <a:solidFill>
                   <a:srgbClr val="C00000"/>
                 </a:solidFill>
                 <a:latin typeface="Consolas" panose="020B0609020204030204" pitchFamily="49" charset="0"/>
               </a:rPr>
-              <a:t>6</a:t>
+              <a:t>. </a:t>
             </a:r>
             <a:r>
               <a:rPr lang="en-US" b="1" dirty="0">
@@ -8999,7 +9786,7 @@
                 </a:solidFill>
                 <a:latin typeface="Consolas" panose="020B0609020204030204" pitchFamily="49" charset="0"/>
               </a:rPr>
-              <a:t>. List has total fifteen </a:t>
+              <a:t>List has total fifteen </a:t>
             </a:r>
             <a:r>
               <a:rPr lang="en-US" b="1" dirty="0" smtClean="0">
@@ -9151,7 +9938,68 @@
 </p:sld>
 </file>
 
-<file path=ppt/slides/slide18.xml><?xml version="1.0" encoding="utf-8"?>
+<file path=ppt/slides/slide2.xml><?xml version="1.0" encoding="utf-8"?>
+<p:sld xmlns:a="http://schemas.openxmlformats.org/drawingml/2006/main" xmlns:r="http://schemas.openxmlformats.org/officeDocument/2006/relationships" xmlns:p="http://schemas.openxmlformats.org/presentationml/2006/main">
+  <p:cSld>
+    <p:spTree>
+      <p:nvGrpSpPr>
+        <p:cNvPr id="1" name=""/>
+        <p:cNvGrpSpPr/>
+        <p:nvPr/>
+      </p:nvGrpSpPr>
+      <p:grpSpPr>
+        <a:xfrm>
+          <a:off x="0" y="0"/>
+          <a:ext cx="0" cy="0"/>
+          <a:chOff x="0" y="0"/>
+          <a:chExt cx="0" cy="0"/>
+        </a:xfrm>
+      </p:grpSpPr>
+      <p:pic>
+        <p:nvPicPr>
+          <p:cNvPr id="5" name="Picture 4"/>
+          <p:cNvPicPr>
+            <a:picLocks noChangeAspect="1"/>
+          </p:cNvPicPr>
+          <p:nvPr/>
+        </p:nvPicPr>
+        <p:blipFill>
+          <a:blip r:embed="rId2"/>
+          <a:stretch>
+            <a:fillRect/>
+          </a:stretch>
+        </p:blipFill>
+        <p:spPr>
+          <a:xfrm>
+            <a:off x="1511410" y="627645"/>
+            <a:ext cx="9169179" cy="5602710"/>
+          </a:xfrm>
+          <a:prstGeom prst="rect">
+            <a:avLst/>
+          </a:prstGeom>
+        </p:spPr>
+      </p:pic>
+    </p:spTree>
+    <p:extLst>
+      <p:ext uri="{BB962C8B-B14F-4D97-AF65-F5344CB8AC3E}">
+        <p14:creationId xmlns:p14="http://schemas.microsoft.com/office/powerpoint/2010/main" val="1129717313"/>
+      </p:ext>
+    </p:extLst>
+  </p:cSld>
+  <p:clrMapOvr>
+    <a:masterClrMapping/>
+  </p:clrMapOvr>
+  <p:timing>
+    <p:tnLst>
+      <p:par>
+        <p:cTn id="1" dur="indefinite" restart="never" nodeType="tmRoot"/>
+      </p:par>
+    </p:tnLst>
+  </p:timing>
+</p:sld>
+</file>
+
+<file path=ppt/slides/slide20.xml><?xml version="1.0" encoding="utf-8"?>
 <p:sld xmlns:a="http://schemas.openxmlformats.org/drawingml/2006/main" xmlns:r="http://schemas.openxmlformats.org/officeDocument/2006/relationships" xmlns:p="http://schemas.openxmlformats.org/presentationml/2006/main">
   <p:cSld>
     <p:spTree>
@@ -9535,7 +10383,7 @@
                 </a:solidFill>
                 <a:latin typeface="Consolas" panose="020B0609020204030204" pitchFamily="49" charset="0"/>
               </a:rPr>
-              <a:t>7</a:t>
+              <a:t>9</a:t>
             </a:r>
             <a:r>
               <a:rPr lang="en-US" b="1" dirty="0" smtClean="0">
@@ -9544,7 +10392,16 @@
                 </a:solidFill>
                 <a:latin typeface="Consolas" panose="020B0609020204030204" pitchFamily="49" charset="0"/>
               </a:rPr>
-              <a:t>. List </a:t>
+              <a:t>. </a:t>
+            </a:r>
+            <a:r>
+              <a:rPr lang="en-US" b="1" dirty="0" smtClean="0">
+                <a:solidFill>
+                  <a:srgbClr val="C00000"/>
+                </a:solidFill>
+                <a:latin typeface="Consolas" panose="020B0609020204030204" pitchFamily="49" charset="0"/>
+              </a:rPr>
+              <a:t>List </a:t>
             </a:r>
             <a:r>
               <a:rPr lang="en-US" b="1" dirty="0">
@@ -9835,679 +10692,6 @@
     <p:extLst>
       <p:ext uri="{BB962C8B-B14F-4D97-AF65-F5344CB8AC3E}">
         <p14:creationId xmlns:p14="http://schemas.microsoft.com/office/powerpoint/2010/main" val="2455418616"/>
-      </p:ext>
-    </p:extLst>
-  </p:cSld>
-  <p:clrMapOvr>
-    <a:masterClrMapping/>
-  </p:clrMapOvr>
-  <p:timing>
-    <p:tnLst>
-      <p:par>
-        <p:cTn id="1" dur="indefinite" restart="never" nodeType="tmRoot"/>
-      </p:par>
-    </p:tnLst>
-  </p:timing>
-</p:sld>
-</file>
-
-<file path=ppt/slides/slide19.xml><?xml version="1.0" encoding="utf-8"?>
-<p:sld xmlns:a="http://schemas.openxmlformats.org/drawingml/2006/main" xmlns:r="http://schemas.openxmlformats.org/officeDocument/2006/relationships" xmlns:p="http://schemas.openxmlformats.org/presentationml/2006/main">
-  <p:cSld>
-    <p:spTree>
-      <p:nvGrpSpPr>
-        <p:cNvPr id="1" name=""/>
-        <p:cNvGrpSpPr/>
-        <p:nvPr/>
-      </p:nvGrpSpPr>
-      <p:grpSpPr>
-        <a:xfrm>
-          <a:off x="0" y="0"/>
-          <a:ext cx="0" cy="0"/>
-          <a:chOff x="0" y="0"/>
-          <a:chExt cx="0" cy="0"/>
-        </a:xfrm>
-      </p:grpSpPr>
-      <p:sp>
-        <p:nvSpPr>
-          <p:cNvPr id="16" name="Rectangle 15"/>
-          <p:cNvSpPr/>
-          <p:nvPr/>
-        </p:nvSpPr>
-        <p:spPr>
-          <a:xfrm>
-            <a:off x="4789716" y="1332081"/>
-            <a:ext cx="1463039" cy="653143"/>
-          </a:xfrm>
-          <a:prstGeom prst="rect">
-            <a:avLst/>
-          </a:prstGeom>
-        </p:spPr>
-        <p:style>
-          <a:lnRef idx="2">
-            <a:schemeClr val="accent1">
-              <a:shade val="50000"/>
-            </a:schemeClr>
-          </a:lnRef>
-          <a:fillRef idx="1">
-            <a:schemeClr val="accent1"/>
-          </a:fillRef>
-          <a:effectRef idx="0">
-            <a:schemeClr val="accent1"/>
-          </a:effectRef>
-          <a:fontRef idx="minor">
-            <a:schemeClr val="lt1"/>
-          </a:fontRef>
-        </p:style>
-        <p:txBody>
-          <a:bodyPr rtlCol="0" anchor="ctr"/>
-          <a:lstStyle/>
-          <a:p>
-            <a:pPr algn="ctr"/>
-            <a:endParaRPr lang="en-US" b="1" dirty="0">
-              <a:solidFill>
-                <a:schemeClr val="bg1"/>
-              </a:solidFill>
-            </a:endParaRPr>
-          </a:p>
-        </p:txBody>
-      </p:sp>
-      <p:sp>
-        <p:nvSpPr>
-          <p:cNvPr id="20" name="Rectangle 19"/>
-          <p:cNvSpPr/>
-          <p:nvPr/>
-        </p:nvSpPr>
-        <p:spPr>
-          <a:xfrm>
-            <a:off x="339831" y="328749"/>
-            <a:ext cx="2844048" cy="369332"/>
-          </a:xfrm>
-          <a:prstGeom prst="rect">
-            <a:avLst/>
-          </a:prstGeom>
-        </p:spPr>
-        <p:txBody>
-          <a:bodyPr wrap="none">
-            <a:spAutoFit/>
-          </a:bodyPr>
-          <a:lstStyle/>
-          <a:p>
-            <a:r>
-              <a:rPr lang="en-US" b="1" dirty="0">
-                <a:solidFill>
-                  <a:srgbClr val="386BC4"/>
-                </a:solidFill>
-                <a:latin typeface="Consolas" panose="020B0609020204030204" pitchFamily="49" charset="0"/>
-              </a:rPr>
-              <a:t>List&lt;String&gt; flavours</a:t>
-            </a:r>
-            <a:endParaRPr lang="en-US" b="1" dirty="0">
-              <a:solidFill>
-                <a:srgbClr val="386BC4"/>
-              </a:solidFill>
-              <a:effectLst/>
-              <a:latin typeface="Consolas" panose="020B0609020204030204" pitchFamily="49" charset="0"/>
-            </a:endParaRPr>
-          </a:p>
-        </p:txBody>
-      </p:sp>
-      <p:sp>
-        <p:nvSpPr>
-          <p:cNvPr id="22" name="Rectangle 21"/>
-          <p:cNvSpPr/>
-          <p:nvPr/>
-        </p:nvSpPr>
-        <p:spPr>
-          <a:xfrm>
-            <a:off x="5066624" y="2016485"/>
-            <a:ext cx="1033731" cy="369332"/>
-          </a:xfrm>
-          <a:prstGeom prst="rect">
-            <a:avLst/>
-          </a:prstGeom>
-        </p:spPr>
-        <p:txBody>
-          <a:bodyPr wrap="square">
-            <a:spAutoFit/>
-          </a:bodyPr>
-          <a:lstStyle/>
-          <a:p>
-            <a:r>
-              <a:rPr lang="en-US" b="1" dirty="0" smtClean="0">
-                <a:effectLst/>
-                <a:latin typeface="Consolas" panose="020B0609020204030204" pitchFamily="49" charset="0"/>
-              </a:rPr>
-              <a:t>  0      </a:t>
-            </a:r>
-            <a:endParaRPr lang="en-US" b="1" dirty="0">
-              <a:effectLst/>
-              <a:latin typeface="Consolas" panose="020B0609020204030204" pitchFamily="49" charset="0"/>
-            </a:endParaRPr>
-          </a:p>
-        </p:txBody>
-      </p:sp>
-      <p:sp>
-        <p:nvSpPr>
-          <p:cNvPr id="56" name="Rectangle 55"/>
-          <p:cNvSpPr/>
-          <p:nvPr/>
-        </p:nvSpPr>
-        <p:spPr>
-          <a:xfrm>
-            <a:off x="3779686" y="1985224"/>
-            <a:ext cx="817853" cy="369332"/>
-          </a:xfrm>
-          <a:prstGeom prst="rect">
-            <a:avLst/>
-          </a:prstGeom>
-        </p:spPr>
-        <p:txBody>
-          <a:bodyPr wrap="none">
-            <a:spAutoFit/>
-          </a:bodyPr>
-          <a:lstStyle/>
-          <a:p>
-            <a:r>
-              <a:rPr lang="en-US" b="1" dirty="0" smtClean="0">
-                <a:effectLst/>
-                <a:latin typeface="Consolas" panose="020B0609020204030204" pitchFamily="49" charset="0"/>
-              </a:rPr>
-              <a:t>INDEX</a:t>
-            </a:r>
-            <a:endParaRPr lang="en-US" b="1" dirty="0">
-              <a:effectLst/>
-              <a:latin typeface="Consolas" panose="020B0609020204030204" pitchFamily="49" charset="0"/>
-            </a:endParaRPr>
-          </a:p>
-        </p:txBody>
-      </p:sp>
-      <p:sp>
-        <p:nvSpPr>
-          <p:cNvPr id="27" name="Rectangle 26"/>
-          <p:cNvSpPr/>
-          <p:nvPr/>
-        </p:nvSpPr>
-        <p:spPr>
-          <a:xfrm>
-            <a:off x="4617519" y="2591999"/>
-            <a:ext cx="2328647" cy="369332"/>
-          </a:xfrm>
-          <a:prstGeom prst="rect">
-            <a:avLst/>
-          </a:prstGeom>
-        </p:spPr>
-        <p:txBody>
-          <a:bodyPr wrap="square">
-            <a:spAutoFit/>
-          </a:bodyPr>
-          <a:lstStyle/>
-          <a:p>
-            <a:r>
-              <a:rPr lang="en-US" b="1" dirty="0">
-                <a:solidFill>
-                  <a:srgbClr val="C00000"/>
-                </a:solidFill>
-                <a:latin typeface="Consolas" panose="020B0609020204030204" pitchFamily="49" charset="0"/>
-              </a:rPr>
-              <a:t>8</a:t>
-            </a:r>
-            <a:r>
-              <a:rPr lang="en-US" b="1" dirty="0" smtClean="0">
-                <a:solidFill>
-                  <a:srgbClr val="C00000"/>
-                </a:solidFill>
-                <a:latin typeface="Consolas" panose="020B0609020204030204" pitchFamily="49" charset="0"/>
-              </a:rPr>
-              <a:t>. List </a:t>
-            </a:r>
-            <a:r>
-              <a:rPr lang="en-US" b="1" dirty="0">
-                <a:solidFill>
-                  <a:srgbClr val="C00000"/>
-                </a:solidFill>
-                <a:latin typeface="Consolas" panose="020B0609020204030204" pitchFamily="49" charset="0"/>
-              </a:rPr>
-              <a:t>is empty.</a:t>
-            </a:r>
-            <a:endParaRPr lang="en-US" b="1" dirty="0" smtClean="0">
-              <a:solidFill>
-                <a:srgbClr val="C00000"/>
-              </a:solidFill>
-              <a:latin typeface="Consolas" panose="020B0609020204030204" pitchFamily="49" charset="0"/>
-            </a:endParaRPr>
-          </a:p>
-        </p:txBody>
-      </p:sp>
-      <p:sp>
-        <p:nvSpPr>
-          <p:cNvPr id="12" name="Rectangle 11"/>
-          <p:cNvSpPr/>
-          <p:nvPr/>
-        </p:nvSpPr>
-        <p:spPr>
-          <a:xfrm>
-            <a:off x="3909709" y="3515854"/>
-            <a:ext cx="4591222" cy="1200329"/>
-          </a:xfrm>
-          <a:prstGeom prst="rect">
-            <a:avLst/>
-          </a:prstGeom>
-        </p:spPr>
-        <p:txBody>
-          <a:bodyPr wrap="square">
-            <a:spAutoFit/>
-          </a:bodyPr>
-          <a:lstStyle/>
-          <a:p>
-            <a:r>
-              <a:rPr lang="en-US" b="1" dirty="0">
-                <a:solidFill>
-                  <a:schemeClr val="accent6">
-                    <a:lumMod val="50000"/>
-                  </a:schemeClr>
-                </a:solidFill>
-                <a:latin typeface="Consolas" panose="020B0609020204030204" pitchFamily="49" charset="0"/>
-              </a:rPr>
-              <a:t>test('List is empty', () {</a:t>
-            </a:r>
-          </a:p>
-          <a:p>
-            <a:r>
-              <a:rPr lang="en-US" b="1" dirty="0">
-                <a:solidFill>
-                  <a:schemeClr val="accent6">
-                    <a:lumMod val="50000"/>
-                  </a:schemeClr>
-                </a:solidFill>
-                <a:latin typeface="Consolas" panose="020B0609020204030204" pitchFamily="49" charset="0"/>
-              </a:rPr>
-              <a:t>      flavours = [];</a:t>
-            </a:r>
-          </a:p>
-          <a:p>
-            <a:r>
-              <a:rPr lang="en-US" b="1" dirty="0">
-                <a:solidFill>
-                  <a:schemeClr val="accent6">
-                    <a:lumMod val="50000"/>
-                  </a:schemeClr>
-                </a:solidFill>
-                <a:latin typeface="Consolas" panose="020B0609020204030204" pitchFamily="49" charset="0"/>
-              </a:rPr>
-              <a:t>      expect(flavours, </a:t>
-            </a:r>
-            <a:r>
-              <a:rPr lang="en-US" b="1" dirty="0" err="1">
-                <a:solidFill>
-                  <a:schemeClr val="accent6">
-                    <a:lumMod val="50000"/>
-                  </a:schemeClr>
-                </a:solidFill>
-                <a:latin typeface="Consolas" panose="020B0609020204030204" pitchFamily="49" charset="0"/>
-              </a:rPr>
-              <a:t>isEmpty</a:t>
-            </a:r>
-            <a:r>
-              <a:rPr lang="en-US" b="1" dirty="0">
-                <a:solidFill>
-                  <a:schemeClr val="accent6">
-                    <a:lumMod val="50000"/>
-                  </a:schemeClr>
-                </a:solidFill>
-                <a:latin typeface="Consolas" panose="020B0609020204030204" pitchFamily="49" charset="0"/>
-              </a:rPr>
-              <a:t>);</a:t>
-            </a:r>
-          </a:p>
-          <a:p>
-            <a:r>
-              <a:rPr lang="en-US" b="1" dirty="0">
-                <a:solidFill>
-                  <a:schemeClr val="accent6">
-                    <a:lumMod val="50000"/>
-                  </a:schemeClr>
-                </a:solidFill>
-                <a:latin typeface="Consolas" panose="020B0609020204030204" pitchFamily="49" charset="0"/>
-              </a:rPr>
-              <a:t>    });</a:t>
-            </a:r>
-          </a:p>
-        </p:txBody>
-      </p:sp>
-    </p:spTree>
-    <p:extLst>
-      <p:ext uri="{BB962C8B-B14F-4D97-AF65-F5344CB8AC3E}">
-        <p14:creationId xmlns:p14="http://schemas.microsoft.com/office/powerpoint/2010/main" val="1338391478"/>
-      </p:ext>
-    </p:extLst>
-  </p:cSld>
-  <p:clrMapOvr>
-    <a:masterClrMapping/>
-  </p:clrMapOvr>
-  <p:timing>
-    <p:tnLst>
-      <p:par>
-        <p:cTn id="1" dur="indefinite" restart="never" nodeType="tmRoot"/>
-      </p:par>
-    </p:tnLst>
-  </p:timing>
-</p:sld>
-</file>
-
-<file path=ppt/slides/slide2.xml><?xml version="1.0" encoding="utf-8"?>
-<p:sld xmlns:a="http://schemas.openxmlformats.org/drawingml/2006/main" xmlns:r="http://schemas.openxmlformats.org/officeDocument/2006/relationships" xmlns:p="http://schemas.openxmlformats.org/presentationml/2006/main">
-  <p:cSld>
-    <p:spTree>
-      <p:nvGrpSpPr>
-        <p:cNvPr id="1" name=""/>
-        <p:cNvGrpSpPr/>
-        <p:nvPr/>
-      </p:nvGrpSpPr>
-      <p:grpSpPr>
-        <a:xfrm>
-          <a:off x="0" y="0"/>
-          <a:ext cx="0" cy="0"/>
-          <a:chOff x="0" y="0"/>
-          <a:chExt cx="0" cy="0"/>
-        </a:xfrm>
-      </p:grpSpPr>
-      <p:pic>
-        <p:nvPicPr>
-          <p:cNvPr id="5" name="Picture 4"/>
-          <p:cNvPicPr>
-            <a:picLocks noChangeAspect="1"/>
-          </p:cNvPicPr>
-          <p:nvPr/>
-        </p:nvPicPr>
-        <p:blipFill>
-          <a:blip r:embed="rId2"/>
-          <a:stretch>
-            <a:fillRect/>
-          </a:stretch>
-        </p:blipFill>
-        <p:spPr>
-          <a:xfrm>
-            <a:off x="1511410" y="627645"/>
-            <a:ext cx="9169179" cy="5602710"/>
-          </a:xfrm>
-          <a:prstGeom prst="rect">
-            <a:avLst/>
-          </a:prstGeom>
-        </p:spPr>
-      </p:pic>
-    </p:spTree>
-    <p:extLst>
-      <p:ext uri="{BB962C8B-B14F-4D97-AF65-F5344CB8AC3E}">
-        <p14:creationId xmlns:p14="http://schemas.microsoft.com/office/powerpoint/2010/main" val="1129717313"/>
-      </p:ext>
-    </p:extLst>
-  </p:cSld>
-  <p:clrMapOvr>
-    <a:masterClrMapping/>
-  </p:clrMapOvr>
-  <p:timing>
-    <p:tnLst>
-      <p:par>
-        <p:cTn id="1" dur="indefinite" restart="never" nodeType="tmRoot"/>
-      </p:par>
-    </p:tnLst>
-  </p:timing>
-</p:sld>
-</file>
-
-<file path=ppt/slides/slide20.xml><?xml version="1.0" encoding="utf-8"?>
-<p:sld xmlns:a="http://schemas.openxmlformats.org/drawingml/2006/main" xmlns:r="http://schemas.openxmlformats.org/officeDocument/2006/relationships" xmlns:p="http://schemas.openxmlformats.org/presentationml/2006/main">
-  <p:cSld>
-    <p:spTree>
-      <p:nvGrpSpPr>
-        <p:cNvPr id="1" name=""/>
-        <p:cNvGrpSpPr/>
-        <p:nvPr/>
-      </p:nvGrpSpPr>
-      <p:grpSpPr>
-        <a:xfrm>
-          <a:off x="0" y="0"/>
-          <a:ext cx="0" cy="0"/>
-          <a:chOff x="0" y="0"/>
-          <a:chExt cx="0" cy="0"/>
-        </a:xfrm>
-      </p:grpSpPr>
-      <p:sp>
-        <p:nvSpPr>
-          <p:cNvPr id="19" name="Rectangle 18"/>
-          <p:cNvSpPr/>
-          <p:nvPr/>
-        </p:nvSpPr>
-        <p:spPr>
-          <a:xfrm>
-            <a:off x="2372007" y="1242203"/>
-            <a:ext cx="6991346" cy="653143"/>
-          </a:xfrm>
-          <a:prstGeom prst="rect">
-            <a:avLst/>
-          </a:prstGeom>
-        </p:spPr>
-        <p:style>
-          <a:lnRef idx="2">
-            <a:schemeClr val="accent1">
-              <a:shade val="50000"/>
-            </a:schemeClr>
-          </a:lnRef>
-          <a:fillRef idx="1">
-            <a:schemeClr val="accent1"/>
-          </a:fillRef>
-          <a:effectRef idx="0">
-            <a:schemeClr val="accent1"/>
-          </a:effectRef>
-          <a:fontRef idx="minor">
-            <a:schemeClr val="lt1"/>
-          </a:fontRef>
-        </p:style>
-        <p:txBody>
-          <a:bodyPr rtlCol="0" anchor="ctr"/>
-          <a:lstStyle/>
-          <a:p>
-            <a:pPr algn="ctr"/>
-            <a:endParaRPr lang="en-US" b="1" dirty="0">
-              <a:solidFill>
-                <a:schemeClr val="bg1"/>
-              </a:solidFill>
-            </a:endParaRPr>
-          </a:p>
-        </p:txBody>
-      </p:sp>
-      <p:sp>
-        <p:nvSpPr>
-          <p:cNvPr id="20" name="Rectangle 19"/>
-          <p:cNvSpPr/>
-          <p:nvPr/>
-        </p:nvSpPr>
-        <p:spPr>
-          <a:xfrm>
-            <a:off x="339831" y="328749"/>
-            <a:ext cx="2844048" cy="369332"/>
-          </a:xfrm>
-          <a:prstGeom prst="rect">
-            <a:avLst/>
-          </a:prstGeom>
-        </p:spPr>
-        <p:txBody>
-          <a:bodyPr wrap="none">
-            <a:spAutoFit/>
-          </a:bodyPr>
-          <a:lstStyle/>
-          <a:p>
-            <a:r>
-              <a:rPr lang="en-US" b="1" dirty="0">
-                <a:solidFill>
-                  <a:srgbClr val="386BC4"/>
-                </a:solidFill>
-                <a:latin typeface="Consolas" panose="020B0609020204030204" pitchFamily="49" charset="0"/>
-              </a:rPr>
-              <a:t>List&lt;String&gt; flavours</a:t>
-            </a:r>
-            <a:endParaRPr lang="en-US" b="1" dirty="0">
-              <a:solidFill>
-                <a:srgbClr val="386BC4"/>
-              </a:solidFill>
-              <a:effectLst/>
-              <a:latin typeface="Consolas" panose="020B0609020204030204" pitchFamily="49" charset="0"/>
-            </a:endParaRPr>
-          </a:p>
-        </p:txBody>
-      </p:sp>
-      <p:sp>
-        <p:nvSpPr>
-          <p:cNvPr id="27" name="Rectangle 26"/>
-          <p:cNvSpPr/>
-          <p:nvPr/>
-        </p:nvSpPr>
-        <p:spPr>
-          <a:xfrm>
-            <a:off x="4592041" y="2449089"/>
-            <a:ext cx="2328647" cy="369332"/>
-          </a:xfrm>
-          <a:prstGeom prst="rect">
-            <a:avLst/>
-          </a:prstGeom>
-        </p:spPr>
-        <p:txBody>
-          <a:bodyPr wrap="square">
-            <a:spAutoFit/>
-          </a:bodyPr>
-          <a:lstStyle/>
-          <a:p>
-            <a:r>
-              <a:rPr lang="en-US" b="1" dirty="0" smtClean="0">
-                <a:solidFill>
-                  <a:srgbClr val="C00000"/>
-                </a:solidFill>
-                <a:latin typeface="Consolas" panose="020B0609020204030204" pitchFamily="49" charset="0"/>
-              </a:rPr>
-              <a:t>9. List </a:t>
-            </a:r>
-            <a:r>
-              <a:rPr lang="en-US" b="1" dirty="0">
-                <a:solidFill>
-                  <a:srgbClr val="C00000"/>
-                </a:solidFill>
-                <a:latin typeface="Consolas" panose="020B0609020204030204" pitchFamily="49" charset="0"/>
-              </a:rPr>
-              <a:t>is </a:t>
-            </a:r>
-            <a:r>
-              <a:rPr lang="en-US" b="1" dirty="0" smtClean="0">
-                <a:solidFill>
-                  <a:srgbClr val="C00000"/>
-                </a:solidFill>
-                <a:latin typeface="Consolas" panose="020B0609020204030204" pitchFamily="49" charset="0"/>
-              </a:rPr>
-              <a:t>null.</a:t>
-            </a:r>
-          </a:p>
-        </p:txBody>
-      </p:sp>
-      <p:sp>
-        <p:nvSpPr>
-          <p:cNvPr id="12" name="Rectangle 11"/>
-          <p:cNvSpPr/>
-          <p:nvPr/>
-        </p:nvSpPr>
-        <p:spPr>
-          <a:xfrm>
-            <a:off x="3612415" y="3372164"/>
-            <a:ext cx="5750938" cy="1200329"/>
-          </a:xfrm>
-          <a:prstGeom prst="rect">
-            <a:avLst/>
-          </a:prstGeom>
-        </p:spPr>
-        <p:txBody>
-          <a:bodyPr wrap="square">
-            <a:spAutoFit/>
-          </a:bodyPr>
-          <a:lstStyle/>
-          <a:p>
-            <a:r>
-              <a:rPr lang="en-US" b="1" dirty="0">
-                <a:solidFill>
-                  <a:schemeClr val="accent6">
-                    <a:lumMod val="50000"/>
-                  </a:schemeClr>
-                </a:solidFill>
-                <a:latin typeface="Consolas" panose="020B0609020204030204" pitchFamily="49" charset="0"/>
-              </a:rPr>
-              <a:t> test('List is null', () {</a:t>
-            </a:r>
-          </a:p>
-          <a:p>
-            <a:r>
-              <a:rPr lang="en-US" b="1" dirty="0">
-                <a:solidFill>
-                  <a:schemeClr val="accent6">
-                    <a:lumMod val="50000"/>
-                  </a:schemeClr>
-                </a:solidFill>
-                <a:latin typeface="Consolas" panose="020B0609020204030204" pitchFamily="49" charset="0"/>
-              </a:rPr>
-              <a:t>      flavours = null;</a:t>
-            </a:r>
-          </a:p>
-          <a:p>
-            <a:r>
-              <a:rPr lang="en-US" b="1" dirty="0">
-                <a:solidFill>
-                  <a:schemeClr val="accent6">
-                    <a:lumMod val="50000"/>
-                  </a:schemeClr>
-                </a:solidFill>
-                <a:latin typeface="Consolas" panose="020B0609020204030204" pitchFamily="49" charset="0"/>
-              </a:rPr>
-              <a:t>      expect(flavours, </a:t>
-            </a:r>
-            <a:r>
-              <a:rPr lang="en-US" b="1" dirty="0" err="1">
-                <a:solidFill>
-                  <a:schemeClr val="accent6">
-                    <a:lumMod val="50000"/>
-                  </a:schemeClr>
-                </a:solidFill>
-                <a:latin typeface="Consolas" panose="020B0609020204030204" pitchFamily="49" charset="0"/>
-              </a:rPr>
-              <a:t>isNull</a:t>
-            </a:r>
-            <a:r>
-              <a:rPr lang="en-US" b="1" dirty="0">
-                <a:solidFill>
-                  <a:schemeClr val="accent6">
-                    <a:lumMod val="50000"/>
-                  </a:schemeClr>
-                </a:solidFill>
-                <a:latin typeface="Consolas" panose="020B0609020204030204" pitchFamily="49" charset="0"/>
-              </a:rPr>
-              <a:t>);</a:t>
-            </a:r>
-          </a:p>
-          <a:p>
-            <a:r>
-              <a:rPr lang="en-US" b="1" dirty="0">
-                <a:solidFill>
-                  <a:schemeClr val="accent6">
-                    <a:lumMod val="50000"/>
-                  </a:schemeClr>
-                </a:solidFill>
-                <a:latin typeface="Consolas" panose="020B0609020204030204" pitchFamily="49" charset="0"/>
-              </a:rPr>
-              <a:t>    });</a:t>
-            </a:r>
-          </a:p>
-        </p:txBody>
-      </p:sp>
-    </p:spTree>
-    <p:extLst>
-      <p:ext uri="{BB962C8B-B14F-4D97-AF65-F5344CB8AC3E}">
-        <p14:creationId xmlns:p14="http://schemas.microsoft.com/office/powerpoint/2010/main" val="2770298008"/>
       </p:ext>
     </p:extLst>
   </p:cSld>
@@ -10549,7 +10733,7 @@
         </p:nvSpPr>
         <p:spPr>
           <a:xfrm>
-            <a:off x="5347526" y="2072487"/>
+            <a:off x="5533478" y="2077938"/>
             <a:ext cx="805542" cy="923330"/>
           </a:xfrm>
           <a:prstGeom prst="rect">
@@ -25191,10 +25375,10 @@
         </p:nvGrpSpPr>
         <p:grpSpPr>
           <a:xfrm>
-            <a:off x="2525098" y="5026016"/>
-            <a:ext cx="6235723" cy="1305072"/>
-            <a:chOff x="2525098" y="3134975"/>
-            <a:chExt cx="6235723" cy="1305072"/>
+            <a:off x="2529839" y="5026016"/>
+            <a:ext cx="6230982" cy="1305072"/>
+            <a:chOff x="2529839" y="3134975"/>
+            <a:chExt cx="6230982" cy="1305072"/>
           </a:xfrm>
         </p:grpSpPr>
         <p:sp>
@@ -25421,8 +25605,8 @@
           </p:nvSpPr>
           <p:spPr>
             <a:xfrm>
-              <a:off x="2525098" y="3786904"/>
-              <a:ext cx="1463039" cy="653143"/>
+              <a:off x="2529839" y="3786904"/>
+              <a:ext cx="1458298" cy="653143"/>
             </a:xfrm>
             <a:prstGeom prst="rect">
               <a:avLst/>

</xml_diff>

<commit_message>
Added Function Test Cases
</commit_message>
<xml_diff>
--- a/Multiple Selection Dialogue App.pptx
+++ b/Multiple Selection Dialogue App.pptx
@@ -31,6 +31,10 @@
     <p:sldId id="283" r:id="rId25"/>
     <p:sldId id="284" r:id="rId26"/>
     <p:sldId id="285" r:id="rId27"/>
+    <p:sldId id="287" r:id="rId28"/>
+    <p:sldId id="288" r:id="rId29"/>
+    <p:sldId id="289" r:id="rId30"/>
+    <p:sldId id="290" r:id="rId31"/>
   </p:sldIdLst>
   <p:sldSz cx="12192000" cy="6858000"/>
   <p:notesSz cx="6858000" cy="9144000"/>
@@ -168,6 +172,14 @@
             <p14:sldId id="283"/>
             <p14:sldId id="284"/>
             <p14:sldId id="285"/>
+          </p14:sldIdLst>
+        </p14:section>
+        <p14:section name="Function Test Cases" id="{6D43A68B-0A8A-4968-ACA1-16324964CE04}">
+          <p14:sldIdLst>
+            <p14:sldId id="287"/>
+            <p14:sldId id="288"/>
+            <p14:sldId id="289"/>
+            <p14:sldId id="290"/>
           </p14:sldIdLst>
         </p14:section>
       </p14:sectionLst>
@@ -5132,16 +5144,7 @@
                 </a:solidFill>
                 <a:latin typeface="Consolas" panose="020B0609020204030204" pitchFamily="49" charset="0"/>
               </a:rPr>
-              <a:t> </a:t>
-            </a:r>
-            <a:r>
-              <a:rPr lang="en-US" b="1" dirty="0" smtClean="0">
-                <a:solidFill>
-                  <a:srgbClr val="C00000"/>
-                </a:solidFill>
-                <a:latin typeface="Consolas" panose="020B0609020204030204" pitchFamily="49" charset="0"/>
-              </a:rPr>
-              <a:t>Last </a:t>
+              <a:t> Last </a:t>
             </a:r>
             <a:r>
               <a:rPr lang="en-US" b="1" dirty="0">
@@ -5184,7 +5187,16 @@
                 </a:solidFill>
                 <a:latin typeface="Consolas" panose="020B0609020204030204" pitchFamily="49" charset="0"/>
               </a:rPr>
-              <a:t>7.  </a:t>
+              <a:t>7.  List </a:t>
+            </a:r>
+            <a:r>
+              <a:rPr lang="en-US" b="1" dirty="0">
+                <a:solidFill>
+                  <a:srgbClr val="C00000"/>
+                </a:solidFill>
+                <a:latin typeface="Consolas" panose="020B0609020204030204" pitchFamily="49" charset="0"/>
+              </a:rPr>
+              <a:t>has two flavours starting with the letter C</a:t>
             </a:r>
             <a:r>
               <a:rPr lang="en-US" b="1" dirty="0" smtClean="0">
@@ -5193,34 +5205,7 @@
                 </a:solidFill>
                 <a:latin typeface="Consolas" panose="020B0609020204030204" pitchFamily="49" charset="0"/>
               </a:rPr>
-              <a:t>List </a:t>
-            </a:r>
-            <a:r>
-              <a:rPr lang="en-US" b="1" dirty="0">
-                <a:solidFill>
-                  <a:srgbClr val="C00000"/>
-                </a:solidFill>
-                <a:latin typeface="Consolas" panose="020B0609020204030204" pitchFamily="49" charset="0"/>
-              </a:rPr>
-              <a:t>has two flavours starting with the letter C</a:t>
-            </a:r>
-            <a:r>
-              <a:rPr lang="en-US" b="1" dirty="0" smtClean="0">
-                <a:solidFill>
-                  <a:srgbClr val="C00000"/>
-                </a:solidFill>
-                <a:latin typeface="Consolas" panose="020B0609020204030204" pitchFamily="49" charset="0"/>
-              </a:rPr>
               <a:t>.</a:t>
-            </a:r>
-            <a:r>
-              <a:rPr lang="en-US" b="1" dirty="0" smtClean="0">
-                <a:solidFill>
-                  <a:srgbClr val="C00000"/>
-                </a:solidFill>
-                <a:latin typeface="Consolas" panose="020B0609020204030204" pitchFamily="49" charset="0"/>
-              </a:rPr>
-              <a:t/>
             </a:r>
             <a:br>
               <a:rPr lang="en-US" b="1" dirty="0" smtClean="0">
@@ -5290,16 +5275,7 @@
                 </a:solidFill>
                 <a:latin typeface="Consolas" panose="020B0609020204030204" pitchFamily="49" charset="0"/>
               </a:rPr>
-              <a:t>vowels</a:t>
-            </a:r>
-            <a:r>
-              <a:rPr lang="en-US" b="1" dirty="0" smtClean="0">
-                <a:solidFill>
-                  <a:srgbClr val="C00000"/>
-                </a:solidFill>
-                <a:latin typeface="Consolas" panose="020B0609020204030204" pitchFamily="49" charset="0"/>
-              </a:rPr>
-              <a:t>.</a:t>
+              <a:t>vowels.</a:t>
             </a:r>
             <a:br>
               <a:rPr lang="en-US" b="1" dirty="0" smtClean="0">
@@ -5446,25 +5422,7 @@
                 </a:solidFill>
                 <a:latin typeface="Consolas" panose="020B0609020204030204" pitchFamily="49" charset="0"/>
               </a:rPr>
-              <a:t>null</a:t>
-            </a:r>
-            <a:r>
-              <a:rPr lang="en-US" b="1" dirty="0" smtClean="0">
-                <a:solidFill>
-                  <a:srgbClr val="C00000"/>
-                </a:solidFill>
-                <a:latin typeface="Consolas" panose="020B0609020204030204" pitchFamily="49" charset="0"/>
-              </a:rPr>
-              <a:t>.</a:t>
-            </a:r>
-            <a:r>
-              <a:rPr lang="en-US" b="1" dirty="0" smtClean="0">
-                <a:solidFill>
-                  <a:srgbClr val="C00000"/>
-                </a:solidFill>
-                <a:latin typeface="Consolas" panose="020B0609020204030204" pitchFamily="49" charset="0"/>
-              </a:rPr>
-              <a:t/>
+              <a:t>null.</a:t>
             </a:r>
             <a:br>
               <a:rPr lang="en-US" b="1" dirty="0" smtClean="0">
@@ -5504,15 +5462,6 @@
               </a:rPr>
               <a:t>empty. </a:t>
             </a:r>
-            <a:r>
-              <a:rPr lang="en-US" b="1" dirty="0" smtClean="0">
-                <a:solidFill>
-                  <a:srgbClr val="C00000"/>
-                </a:solidFill>
-                <a:latin typeface="Consolas" panose="020B0609020204030204" pitchFamily="49" charset="0"/>
-              </a:rPr>
-              <a:t/>
-            </a:r>
             <a:br>
               <a:rPr lang="en-US" b="1" dirty="0" smtClean="0">
                 <a:solidFill>
@@ -5550,15 +5499,6 @@
                 <a:latin typeface="Consolas" panose="020B0609020204030204" pitchFamily="49" charset="0"/>
               </a:rPr>
               <a:t>not empty.</a:t>
-            </a:r>
-            <a:r>
-              <a:rPr lang="en-US" b="1" dirty="0" smtClean="0">
-                <a:solidFill>
-                  <a:srgbClr val="C00000"/>
-                </a:solidFill>
-                <a:latin typeface="Consolas" panose="020B0609020204030204" pitchFamily="49" charset="0"/>
-              </a:rPr>
-              <a:t/>
             </a:r>
             <a:br>
               <a:rPr lang="en-US" b="1" dirty="0" smtClean="0">
@@ -5835,16 +5775,7 @@
                 </a:solidFill>
                 <a:latin typeface="Consolas" panose="020B0609020204030204" pitchFamily="49" charset="0"/>
               </a:rPr>
-              <a:t>1. </a:t>
-            </a:r>
-            <a:r>
-              <a:rPr lang="en-US" b="1" dirty="0" smtClean="0">
-                <a:solidFill>
-                  <a:srgbClr val="C00000"/>
-                </a:solidFill>
-                <a:latin typeface="Consolas" panose="020B0609020204030204" pitchFamily="49" charset="0"/>
-              </a:rPr>
-              <a:t>List </a:t>
+              <a:t>1. List </a:t>
             </a:r>
             <a:r>
               <a:rPr lang="en-US" b="1" dirty="0">
@@ -5921,14 +5852,6 @@
               </a:rPr>
               <a:t>));</a:t>
             </a:r>
-            <a:endParaRPr lang="en-US" b="1" dirty="0">
-              <a:solidFill>
-                <a:schemeClr val="accent6">
-                  <a:lumMod val="50000"/>
-                </a:schemeClr>
-              </a:solidFill>
-              <a:latin typeface="Consolas" panose="020B0609020204030204" pitchFamily="49" charset="0"/>
-            </a:endParaRPr>
           </a:p>
         </p:txBody>
       </p:sp>
@@ -6151,16 +6074,7 @@
                 </a:solidFill>
                 <a:latin typeface="Consolas" panose="020B0609020204030204" pitchFamily="49" charset="0"/>
               </a:rPr>
-              <a:t>2. </a:t>
-            </a:r>
-            <a:r>
-              <a:rPr lang="en-US" b="1" dirty="0" smtClean="0">
-                <a:solidFill>
-                  <a:srgbClr val="C00000"/>
-                </a:solidFill>
-                <a:latin typeface="Consolas" panose="020B0609020204030204" pitchFamily="49" charset="0"/>
-              </a:rPr>
-              <a:t>List </a:t>
+              <a:t>2. List </a:t>
             </a:r>
             <a:r>
               <a:rPr lang="en-US" b="1" dirty="0">
@@ -6273,14 +6187,6 @@
               </a:rPr>
               <a:t>    });</a:t>
             </a:r>
-            <a:endParaRPr lang="en-US" b="1" dirty="0">
-              <a:solidFill>
-                <a:schemeClr val="accent6">
-                  <a:lumMod val="50000"/>
-                </a:schemeClr>
-              </a:solidFill>
-              <a:latin typeface="Consolas" panose="020B0609020204030204" pitchFamily="49" charset="0"/>
-            </a:endParaRPr>
           </a:p>
         </p:txBody>
       </p:sp>
@@ -6690,16 +6596,7 @@
                 </a:solidFill>
                 <a:latin typeface="Consolas" panose="020B0609020204030204" pitchFamily="49" charset="0"/>
               </a:rPr>
-              <a:t>3. List </a:t>
-            </a:r>
-            <a:r>
-              <a:rPr lang="en-US" b="1" dirty="0" smtClean="0">
-                <a:solidFill>
-                  <a:srgbClr val="C00000"/>
-                </a:solidFill>
-                <a:latin typeface="Consolas" panose="020B0609020204030204" pitchFamily="49" charset="0"/>
-              </a:rPr>
-              <a:t>is not empty.</a:t>
+              <a:t>3. List is not empty.</a:t>
             </a:r>
           </a:p>
         </p:txBody>
@@ -8538,16 +8435,7 @@
                 </a:solidFill>
                 <a:latin typeface="Consolas" panose="020B0609020204030204" pitchFamily="49" charset="0"/>
               </a:rPr>
-              <a:t>6. </a:t>
-            </a:r>
-            <a:r>
-              <a:rPr lang="en-US" b="1" dirty="0" smtClean="0">
-                <a:solidFill>
-                  <a:srgbClr val="C00000"/>
-                </a:solidFill>
-                <a:latin typeface="Consolas" panose="020B0609020204030204" pitchFamily="49" charset="0"/>
-              </a:rPr>
-              <a:t>Last </a:t>
+              <a:t>6. Last </a:t>
             </a:r>
             <a:r>
               <a:rPr lang="en-US" b="1" dirty="0">
@@ -10392,16 +10280,7 @@
                 </a:solidFill>
                 <a:latin typeface="Consolas" panose="020B0609020204030204" pitchFamily="49" charset="0"/>
               </a:rPr>
-              <a:t>. </a:t>
-            </a:r>
-            <a:r>
-              <a:rPr lang="en-US" b="1" dirty="0" smtClean="0">
-                <a:solidFill>
-                  <a:srgbClr val="C00000"/>
-                </a:solidFill>
-                <a:latin typeface="Consolas" panose="020B0609020204030204" pitchFamily="49" charset="0"/>
-              </a:rPr>
-              <a:t>List </a:t>
+              <a:t>. List </a:t>
             </a:r>
             <a:r>
               <a:rPr lang="en-US" b="1" dirty="0">
@@ -14206,6 +14085,1575 @@
     <p:extLst>
       <p:ext uri="{BB962C8B-B14F-4D97-AF65-F5344CB8AC3E}">
         <p14:creationId xmlns:p14="http://schemas.microsoft.com/office/powerpoint/2010/main" val="2483363130"/>
+      </p:ext>
+    </p:extLst>
+  </p:cSld>
+  <p:clrMapOvr>
+    <a:masterClrMapping/>
+  </p:clrMapOvr>
+  <p:timing>
+    <p:tnLst>
+      <p:par>
+        <p:cTn id="1" dur="indefinite" restart="never" nodeType="tmRoot"/>
+      </p:par>
+    </p:tnLst>
+  </p:timing>
+</p:sld>
+</file>
+
+<file path=ppt/slides/slide27.xml><?xml version="1.0" encoding="utf-8"?>
+<p:sld xmlns:a="http://schemas.openxmlformats.org/drawingml/2006/main" xmlns:r="http://schemas.openxmlformats.org/officeDocument/2006/relationships" xmlns:p="http://schemas.openxmlformats.org/presentationml/2006/main">
+  <p:cSld>
+    <p:spTree>
+      <p:nvGrpSpPr>
+        <p:cNvPr id="1" name=""/>
+        <p:cNvGrpSpPr/>
+        <p:nvPr/>
+      </p:nvGrpSpPr>
+      <p:grpSpPr>
+        <a:xfrm>
+          <a:off x="0" y="0"/>
+          <a:ext cx="0" cy="0"/>
+          <a:chOff x="0" y="0"/>
+          <a:chExt cx="0" cy="0"/>
+        </a:xfrm>
+      </p:grpSpPr>
+      <p:sp>
+        <p:nvSpPr>
+          <p:cNvPr id="4" name="Rounded Rectangle 3"/>
+          <p:cNvSpPr/>
+          <p:nvPr/>
+        </p:nvSpPr>
+        <p:spPr>
+          <a:xfrm>
+            <a:off x="3470712" y="1427647"/>
+            <a:ext cx="4706637" cy="762057"/>
+          </a:xfrm>
+          <a:prstGeom prst="roundRect">
+            <a:avLst/>
+          </a:prstGeom>
+          <a:solidFill>
+            <a:srgbClr val="FF0000"/>
+          </a:solidFill>
+          <a:ln>
+            <a:noFill/>
+          </a:ln>
+        </p:spPr>
+        <p:style>
+          <a:lnRef idx="2">
+            <a:schemeClr val="accent1">
+              <a:shade val="50000"/>
+            </a:schemeClr>
+          </a:lnRef>
+          <a:fillRef idx="1">
+            <a:schemeClr val="accent1"/>
+          </a:fillRef>
+          <a:effectRef idx="0">
+            <a:schemeClr val="accent1"/>
+          </a:effectRef>
+          <a:fontRef idx="minor">
+            <a:schemeClr val="lt1"/>
+          </a:fontRef>
+        </p:style>
+        <p:txBody>
+          <a:bodyPr rtlCol="0" anchor="ctr"/>
+          <a:lstStyle/>
+          <a:p>
+            <a:pPr algn="ctr"/>
+            <a:r>
+              <a:rPr lang="en-US" sz="2400" b="1" dirty="0" err="1" smtClean="0"/>
+              <a:t>convertToMap</a:t>
+            </a:r>
+            <a:r>
+              <a:rPr lang="en-US" sz="2400" b="1" dirty="0" smtClean="0"/>
+              <a:t>(List&lt;String flavours)</a:t>
+            </a:r>
+            <a:endParaRPr lang="en-US" sz="2400" b="1" dirty="0"/>
+          </a:p>
+        </p:txBody>
+      </p:sp>
+      <p:sp>
+        <p:nvSpPr>
+          <p:cNvPr id="5" name="Rectangle 4"/>
+          <p:cNvSpPr/>
+          <p:nvPr/>
+        </p:nvSpPr>
+        <p:spPr>
+          <a:xfrm>
+            <a:off x="627115" y="4338168"/>
+            <a:ext cx="6714112" cy="1754326"/>
+          </a:xfrm>
+          <a:prstGeom prst="rect">
+            <a:avLst/>
+          </a:prstGeom>
+        </p:spPr>
+        <p:txBody>
+          <a:bodyPr wrap="square">
+            <a:spAutoFit/>
+          </a:bodyPr>
+          <a:lstStyle/>
+          <a:p>
+            <a:pPr marL="342900" indent="-342900">
+              <a:buFont typeface="+mj-lt"/>
+              <a:buAutoNum type="arabicPeriod"/>
+            </a:pPr>
+            <a:r>
+              <a:rPr lang="en-US" b="1" dirty="0" err="1">
+                <a:solidFill>
+                  <a:srgbClr val="C00000"/>
+                </a:solidFill>
+                <a:latin typeface="Consolas" panose="020B0609020204030204" pitchFamily="49" charset="0"/>
+              </a:rPr>
+              <a:t>convertToMap</a:t>
+            </a:r>
+            <a:r>
+              <a:rPr lang="en-US" b="1" dirty="0">
+                <a:solidFill>
+                  <a:srgbClr val="C00000"/>
+                </a:solidFill>
+                <a:latin typeface="Consolas" panose="020B0609020204030204" pitchFamily="49" charset="0"/>
+              </a:rPr>
+              <a:t> requires a List&lt;String&gt; </a:t>
+            </a:r>
+            <a:r>
+              <a:rPr lang="en-US" b="1" dirty="0" smtClean="0">
+                <a:solidFill>
+                  <a:srgbClr val="C00000"/>
+                </a:solidFill>
+                <a:latin typeface="Consolas" panose="020B0609020204030204" pitchFamily="49" charset="0"/>
+              </a:rPr>
+              <a:t>Parameter.</a:t>
+            </a:r>
+            <a:r>
+              <a:rPr lang="en-US" b="1" dirty="0" smtClean="0">
+                <a:solidFill>
+                  <a:srgbClr val="C00000"/>
+                </a:solidFill>
+                <a:latin typeface="Consolas" panose="020B0609020204030204" pitchFamily="49" charset="0"/>
+              </a:rPr>
+              <a:t/>
+            </a:r>
+            <a:br>
+              <a:rPr lang="en-US" b="1" dirty="0" smtClean="0">
+                <a:solidFill>
+                  <a:srgbClr val="C00000"/>
+                </a:solidFill>
+                <a:latin typeface="Consolas" panose="020B0609020204030204" pitchFamily="49" charset="0"/>
+              </a:rPr>
+            </a:br>
+            <a:endParaRPr lang="en-US" b="1" dirty="0" smtClean="0">
+              <a:solidFill>
+                <a:srgbClr val="C00000"/>
+              </a:solidFill>
+              <a:latin typeface="Consolas" panose="020B0609020204030204" pitchFamily="49" charset="0"/>
+            </a:endParaRPr>
+          </a:p>
+          <a:p>
+            <a:pPr marL="342900" indent="-342900">
+              <a:buFont typeface="+mj-lt"/>
+              <a:buAutoNum type="arabicPeriod"/>
+            </a:pPr>
+            <a:r>
+              <a:rPr lang="en-US" b="1" dirty="0" err="1">
+                <a:solidFill>
+                  <a:srgbClr val="C00000"/>
+                </a:solidFill>
+                <a:latin typeface="Consolas" panose="020B0609020204030204" pitchFamily="49" charset="0"/>
+              </a:rPr>
+              <a:t>convertToMap</a:t>
+            </a:r>
+            <a:r>
+              <a:rPr lang="en-US" b="1" dirty="0">
+                <a:solidFill>
+                  <a:srgbClr val="C00000"/>
+                </a:solidFill>
+                <a:latin typeface="Consolas" panose="020B0609020204030204" pitchFamily="49" charset="0"/>
+              </a:rPr>
+              <a:t> return type is Map&lt;</a:t>
+            </a:r>
+            <a:r>
+              <a:rPr lang="en-US" b="1" dirty="0" err="1">
+                <a:solidFill>
+                  <a:srgbClr val="C00000"/>
+                </a:solidFill>
+                <a:latin typeface="Consolas" panose="020B0609020204030204" pitchFamily="49" charset="0"/>
+              </a:rPr>
+              <a:t>String,bool</a:t>
+            </a:r>
+            <a:r>
+              <a:rPr lang="en-US" b="1" dirty="0" smtClean="0">
+                <a:solidFill>
+                  <a:srgbClr val="C00000"/>
+                </a:solidFill>
+                <a:latin typeface="Consolas" panose="020B0609020204030204" pitchFamily="49" charset="0"/>
+              </a:rPr>
+              <a:t>&gt;.</a:t>
+            </a:r>
+          </a:p>
+          <a:p>
+            <a:pPr marL="342900" indent="-342900">
+              <a:buFont typeface="+mj-lt"/>
+              <a:buAutoNum type="arabicPeriod"/>
+            </a:pPr>
+            <a:endParaRPr lang="en-US" b="1" dirty="0">
+              <a:solidFill>
+                <a:srgbClr val="C00000"/>
+              </a:solidFill>
+              <a:latin typeface="Consolas" panose="020B0609020204030204" pitchFamily="49" charset="0"/>
+            </a:endParaRPr>
+          </a:p>
+          <a:p>
+            <a:pPr marL="342900" indent="-342900">
+              <a:buFont typeface="+mj-lt"/>
+              <a:buAutoNum type="arabicPeriod"/>
+            </a:pPr>
+            <a:r>
+              <a:rPr lang="en-US" b="1" dirty="0" err="1">
+                <a:solidFill>
+                  <a:srgbClr val="C00000"/>
+                </a:solidFill>
+                <a:latin typeface="Consolas" panose="020B0609020204030204" pitchFamily="49" charset="0"/>
+              </a:rPr>
+              <a:t>mappedFlavour</a:t>
+            </a:r>
+            <a:r>
+              <a:rPr lang="en-US" b="1" dirty="0">
+                <a:solidFill>
+                  <a:srgbClr val="C00000"/>
+                </a:solidFill>
+                <a:latin typeface="Consolas" panose="020B0609020204030204" pitchFamily="49" charset="0"/>
+              </a:rPr>
+              <a:t> should not be empty</a:t>
+            </a:r>
+            <a:r>
+              <a:rPr lang="en-US" b="1" dirty="0" smtClean="0">
+                <a:solidFill>
+                  <a:srgbClr val="C00000"/>
+                </a:solidFill>
+                <a:latin typeface="Consolas" panose="020B0609020204030204" pitchFamily="49" charset="0"/>
+              </a:rPr>
+              <a:t>.</a:t>
+            </a:r>
+            <a:r>
+              <a:rPr lang="en-US" b="1" dirty="0" smtClean="0">
+                <a:solidFill>
+                  <a:srgbClr val="C00000"/>
+                </a:solidFill>
+                <a:latin typeface="Consolas" panose="020B0609020204030204" pitchFamily="49" charset="0"/>
+              </a:rPr>
+              <a:t/>
+            </a:r>
+            <a:br>
+              <a:rPr lang="en-US" b="1" dirty="0" smtClean="0">
+                <a:solidFill>
+                  <a:srgbClr val="C00000"/>
+                </a:solidFill>
+                <a:latin typeface="Consolas" panose="020B0609020204030204" pitchFamily="49" charset="0"/>
+              </a:rPr>
+            </a:br>
+            <a:endParaRPr lang="en-US" b="1" dirty="0" smtClean="0">
+              <a:solidFill>
+                <a:srgbClr val="C00000"/>
+              </a:solidFill>
+              <a:latin typeface="Consolas" panose="020B0609020204030204" pitchFamily="49" charset="0"/>
+            </a:endParaRPr>
+          </a:p>
+        </p:txBody>
+      </p:sp>
+      <p:sp>
+        <p:nvSpPr>
+          <p:cNvPr id="6" name="Rectangle 5"/>
+          <p:cNvSpPr/>
+          <p:nvPr/>
+        </p:nvSpPr>
+        <p:spPr>
+          <a:xfrm>
+            <a:off x="3984171" y="2811812"/>
+            <a:ext cx="3958047" cy="523220"/>
+          </a:xfrm>
+          <a:prstGeom prst="rect">
+            <a:avLst/>
+          </a:prstGeom>
+        </p:spPr>
+        <p:txBody>
+          <a:bodyPr wrap="square">
+            <a:spAutoFit/>
+          </a:bodyPr>
+          <a:lstStyle/>
+          <a:p>
+            <a:pPr algn="ctr"/>
+            <a:r>
+              <a:rPr lang="en-US" sz="2800" b="1" dirty="0" smtClean="0">
+                <a:solidFill>
+                  <a:srgbClr val="C00000"/>
+                </a:solidFill>
+                <a:latin typeface="Consolas" panose="020B0609020204030204" pitchFamily="49" charset="0"/>
+              </a:rPr>
+              <a:t>FUNCTION</a:t>
+            </a:r>
+            <a:r>
+              <a:rPr lang="en-US" sz="2800" b="1" dirty="0" smtClean="0">
+                <a:solidFill>
+                  <a:srgbClr val="C00000"/>
+                </a:solidFill>
+                <a:latin typeface="Consolas" panose="020B0609020204030204" pitchFamily="49" charset="0"/>
+              </a:rPr>
+              <a:t> </a:t>
+            </a:r>
+            <a:r>
+              <a:rPr lang="en-US" sz="2800" b="1" dirty="0" smtClean="0">
+                <a:solidFill>
+                  <a:srgbClr val="C00000"/>
+                </a:solidFill>
+                <a:latin typeface="Consolas" panose="020B0609020204030204" pitchFamily="49" charset="0"/>
+              </a:rPr>
+              <a:t>TEST CASES </a:t>
+            </a:r>
+            <a:endParaRPr lang="en-US" sz="2800" b="1" dirty="0">
+              <a:solidFill>
+                <a:srgbClr val="C00000"/>
+              </a:solidFill>
+              <a:latin typeface="Consolas" panose="020B0609020204030204" pitchFamily="49" charset="0"/>
+            </a:endParaRPr>
+          </a:p>
+        </p:txBody>
+      </p:sp>
+    </p:spTree>
+    <p:extLst>
+      <p:ext uri="{BB962C8B-B14F-4D97-AF65-F5344CB8AC3E}">
+        <p14:creationId xmlns:p14="http://schemas.microsoft.com/office/powerpoint/2010/main" val="533073439"/>
+      </p:ext>
+    </p:extLst>
+  </p:cSld>
+  <p:clrMapOvr>
+    <a:masterClrMapping/>
+  </p:clrMapOvr>
+  <p:timing>
+    <p:tnLst>
+      <p:par>
+        <p:cTn id="1" dur="indefinite" restart="never" nodeType="tmRoot"/>
+      </p:par>
+    </p:tnLst>
+  </p:timing>
+</p:sld>
+</file>
+
+<file path=ppt/slides/slide28.xml><?xml version="1.0" encoding="utf-8"?>
+<p:sld xmlns:a="http://schemas.openxmlformats.org/drawingml/2006/main" xmlns:r="http://schemas.openxmlformats.org/officeDocument/2006/relationships" xmlns:p="http://schemas.openxmlformats.org/presentationml/2006/main">
+  <p:cSld>
+    <p:spTree>
+      <p:nvGrpSpPr>
+        <p:cNvPr id="1" name=""/>
+        <p:cNvGrpSpPr/>
+        <p:nvPr/>
+      </p:nvGrpSpPr>
+      <p:grpSpPr>
+        <a:xfrm>
+          <a:off x="0" y="0"/>
+          <a:ext cx="0" cy="0"/>
+          <a:chOff x="0" y="0"/>
+          <a:chExt cx="0" cy="0"/>
+        </a:xfrm>
+      </p:grpSpPr>
+      <p:sp>
+        <p:nvSpPr>
+          <p:cNvPr id="4" name="Rounded Rectangle 3"/>
+          <p:cNvSpPr/>
+          <p:nvPr/>
+        </p:nvSpPr>
+        <p:spPr>
+          <a:xfrm>
+            <a:off x="3760097" y="1152211"/>
+            <a:ext cx="4706637" cy="762057"/>
+          </a:xfrm>
+          <a:prstGeom prst="roundRect">
+            <a:avLst/>
+          </a:prstGeom>
+          <a:solidFill>
+            <a:srgbClr val="FF0000"/>
+          </a:solidFill>
+          <a:ln>
+            <a:noFill/>
+          </a:ln>
+        </p:spPr>
+        <p:style>
+          <a:lnRef idx="2">
+            <a:schemeClr val="accent1">
+              <a:shade val="50000"/>
+            </a:schemeClr>
+          </a:lnRef>
+          <a:fillRef idx="1">
+            <a:schemeClr val="accent1"/>
+          </a:fillRef>
+          <a:effectRef idx="0">
+            <a:schemeClr val="accent1"/>
+          </a:effectRef>
+          <a:fontRef idx="minor">
+            <a:schemeClr val="lt1"/>
+          </a:fontRef>
+        </p:style>
+        <p:txBody>
+          <a:bodyPr rtlCol="0" anchor="ctr"/>
+          <a:lstStyle/>
+          <a:p>
+            <a:pPr algn="ctr"/>
+            <a:r>
+              <a:rPr lang="en-US" sz="2400" b="1" dirty="0" err="1" smtClean="0"/>
+              <a:t>convertToMap</a:t>
+            </a:r>
+            <a:r>
+              <a:rPr lang="en-US" sz="2400" b="1" dirty="0" smtClean="0"/>
+              <a:t>() </a:t>
+            </a:r>
+            <a:endParaRPr lang="en-US" sz="2400" b="1" dirty="0"/>
+          </a:p>
+        </p:txBody>
+      </p:sp>
+      <p:sp>
+        <p:nvSpPr>
+          <p:cNvPr id="5" name="Rectangle 4"/>
+          <p:cNvSpPr/>
+          <p:nvPr/>
+        </p:nvSpPr>
+        <p:spPr>
+          <a:xfrm>
+            <a:off x="2808514" y="3778465"/>
+            <a:ext cx="6609806" cy="369332"/>
+          </a:xfrm>
+          <a:prstGeom prst="rect">
+            <a:avLst/>
+          </a:prstGeom>
+        </p:spPr>
+        <p:txBody>
+          <a:bodyPr wrap="square">
+            <a:spAutoFit/>
+          </a:bodyPr>
+          <a:lstStyle/>
+          <a:p>
+            <a:pPr marL="342900" indent="-342900" algn="ctr">
+              <a:buFont typeface="+mj-lt"/>
+              <a:buAutoNum type="arabicPeriod"/>
+            </a:pPr>
+            <a:r>
+              <a:rPr lang="en-US" b="1" dirty="0" err="1" smtClean="0">
+                <a:solidFill>
+                  <a:srgbClr val="C00000"/>
+                </a:solidFill>
+                <a:latin typeface="Consolas" panose="020B0609020204030204" pitchFamily="49" charset="0"/>
+              </a:rPr>
+              <a:t>convertToMap</a:t>
+            </a:r>
+            <a:r>
+              <a:rPr lang="en-US" b="1" dirty="0" smtClean="0">
+                <a:solidFill>
+                  <a:srgbClr val="C00000"/>
+                </a:solidFill>
+                <a:latin typeface="Consolas" panose="020B0609020204030204" pitchFamily="49" charset="0"/>
+              </a:rPr>
+              <a:t> </a:t>
+            </a:r>
+            <a:r>
+              <a:rPr lang="en-US" b="1" dirty="0">
+                <a:solidFill>
+                  <a:srgbClr val="C00000"/>
+                </a:solidFill>
+                <a:latin typeface="Consolas" panose="020B0609020204030204" pitchFamily="49" charset="0"/>
+              </a:rPr>
+              <a:t>requires a List&lt;String&gt; </a:t>
+            </a:r>
+            <a:r>
+              <a:rPr lang="en-US" b="1" dirty="0" smtClean="0">
+                <a:solidFill>
+                  <a:srgbClr val="C00000"/>
+                </a:solidFill>
+                <a:latin typeface="Consolas" panose="020B0609020204030204" pitchFamily="49" charset="0"/>
+              </a:rPr>
+              <a:t>Parameter.</a:t>
+            </a:r>
+            <a:endParaRPr lang="en-US" sz="2800" b="1" dirty="0">
+              <a:solidFill>
+                <a:srgbClr val="C00000"/>
+              </a:solidFill>
+              <a:latin typeface="Consolas" panose="020B0609020204030204" pitchFamily="49" charset="0"/>
+            </a:endParaRPr>
+          </a:p>
+        </p:txBody>
+      </p:sp>
+      <p:sp>
+        <p:nvSpPr>
+          <p:cNvPr id="6" name="Rectangle 5"/>
+          <p:cNvSpPr/>
+          <p:nvPr/>
+        </p:nvSpPr>
+        <p:spPr>
+          <a:xfrm>
+            <a:off x="2262417" y="4585946"/>
+            <a:ext cx="8542723" cy="646331"/>
+          </a:xfrm>
+          <a:prstGeom prst="rect">
+            <a:avLst/>
+          </a:prstGeom>
+        </p:spPr>
+        <p:txBody>
+          <a:bodyPr wrap="none">
+            <a:spAutoFit/>
+          </a:bodyPr>
+          <a:lstStyle/>
+          <a:p>
+            <a:r>
+              <a:rPr lang="en-US" b="1" dirty="0">
+                <a:solidFill>
+                  <a:schemeClr val="accent6">
+                    <a:lumMod val="50000"/>
+                  </a:schemeClr>
+                </a:solidFill>
+                <a:latin typeface="Consolas" panose="020B0609020204030204" pitchFamily="49" charset="0"/>
+              </a:rPr>
+              <a:t>test('</a:t>
+            </a:r>
+            <a:r>
+              <a:rPr lang="en-US" b="1" dirty="0" err="1">
+                <a:solidFill>
+                  <a:schemeClr val="accent6">
+                    <a:lumMod val="50000"/>
+                  </a:schemeClr>
+                </a:solidFill>
+                <a:latin typeface="Consolas" panose="020B0609020204030204" pitchFamily="49" charset="0"/>
+              </a:rPr>
+              <a:t>convertToMap</a:t>
+            </a:r>
+            <a:r>
+              <a:rPr lang="en-US" b="1" dirty="0">
+                <a:solidFill>
+                  <a:schemeClr val="accent6">
+                    <a:lumMod val="50000"/>
+                  </a:schemeClr>
+                </a:solidFill>
+                <a:latin typeface="Consolas" panose="020B0609020204030204" pitchFamily="49" charset="0"/>
+              </a:rPr>
+              <a:t> requires a List&lt;String&gt; Parameter',</a:t>
+            </a:r>
+          </a:p>
+          <a:p>
+            <a:r>
+              <a:rPr lang="en-US" b="1" dirty="0">
+                <a:solidFill>
+                  <a:schemeClr val="accent6">
+                    <a:lumMod val="50000"/>
+                  </a:schemeClr>
+                </a:solidFill>
+                <a:latin typeface="Consolas" panose="020B0609020204030204" pitchFamily="49" charset="0"/>
+              </a:rPr>
+              <a:t>        () =&gt; expect(</a:t>
+            </a:r>
+            <a:r>
+              <a:rPr lang="en-US" b="1" dirty="0" err="1">
+                <a:solidFill>
+                  <a:schemeClr val="accent6">
+                    <a:lumMod val="50000"/>
+                  </a:schemeClr>
+                </a:solidFill>
+                <a:latin typeface="Consolas" panose="020B0609020204030204" pitchFamily="49" charset="0"/>
+              </a:rPr>
+              <a:t>convertToMap</a:t>
+            </a:r>
+            <a:r>
+              <a:rPr lang="en-US" b="1" dirty="0">
+                <a:solidFill>
+                  <a:schemeClr val="accent6">
+                    <a:lumMod val="50000"/>
+                  </a:schemeClr>
+                </a:solidFill>
+                <a:latin typeface="Consolas" panose="020B0609020204030204" pitchFamily="49" charset="0"/>
+              </a:rPr>
+              <a:t> == () =&gt; {'': false}, </a:t>
+            </a:r>
+            <a:r>
+              <a:rPr lang="en-US" b="1" dirty="0" err="1">
+                <a:solidFill>
+                  <a:schemeClr val="accent6">
+                    <a:lumMod val="50000"/>
+                  </a:schemeClr>
+                </a:solidFill>
+                <a:latin typeface="Consolas" panose="020B0609020204030204" pitchFamily="49" charset="0"/>
+              </a:rPr>
+              <a:t>isFalse</a:t>
+            </a:r>
+            <a:r>
+              <a:rPr lang="en-US" b="1" dirty="0">
+                <a:solidFill>
+                  <a:schemeClr val="accent6">
+                    <a:lumMod val="50000"/>
+                  </a:schemeClr>
+                </a:solidFill>
+                <a:latin typeface="Consolas" panose="020B0609020204030204" pitchFamily="49" charset="0"/>
+              </a:rPr>
+              <a:t>));</a:t>
+            </a:r>
+            <a:endParaRPr lang="en-US" b="1" dirty="0">
+              <a:solidFill>
+                <a:schemeClr val="accent6">
+                  <a:lumMod val="50000"/>
+                </a:schemeClr>
+              </a:solidFill>
+              <a:effectLst/>
+              <a:latin typeface="Consolas" panose="020B0609020204030204" pitchFamily="49" charset="0"/>
+            </a:endParaRPr>
+          </a:p>
+        </p:txBody>
+      </p:sp>
+      <p:sp>
+        <p:nvSpPr>
+          <p:cNvPr id="7" name="Rounded Rectangle 6"/>
+          <p:cNvSpPr/>
+          <p:nvPr/>
+        </p:nvSpPr>
+        <p:spPr>
+          <a:xfrm>
+            <a:off x="3760098" y="2352417"/>
+            <a:ext cx="4706637" cy="762057"/>
+          </a:xfrm>
+          <a:prstGeom prst="roundRect">
+            <a:avLst/>
+          </a:prstGeom>
+          <a:solidFill>
+            <a:srgbClr val="FF0000"/>
+          </a:solidFill>
+          <a:ln>
+            <a:noFill/>
+          </a:ln>
+        </p:spPr>
+        <p:style>
+          <a:lnRef idx="2">
+            <a:schemeClr val="accent1">
+              <a:shade val="50000"/>
+            </a:schemeClr>
+          </a:lnRef>
+          <a:fillRef idx="1">
+            <a:schemeClr val="accent1"/>
+          </a:fillRef>
+          <a:effectRef idx="0">
+            <a:schemeClr val="accent1"/>
+          </a:effectRef>
+          <a:fontRef idx="minor">
+            <a:schemeClr val="lt1"/>
+          </a:fontRef>
+        </p:style>
+        <p:txBody>
+          <a:bodyPr rtlCol="0" anchor="ctr"/>
+          <a:lstStyle/>
+          <a:p>
+            <a:pPr algn="ctr"/>
+            <a:r>
+              <a:rPr lang="en-US" sz="2400" b="1" dirty="0" err="1" smtClean="0"/>
+              <a:t>convertToMap</a:t>
+            </a:r>
+            <a:r>
+              <a:rPr lang="en-US" sz="2400" b="1" dirty="0" smtClean="0"/>
+              <a:t>(List&lt;String flavours</a:t>
+            </a:r>
+            <a:r>
+              <a:rPr lang="en-US" sz="2400" b="1" dirty="0" smtClean="0"/>
+              <a:t>) </a:t>
+            </a:r>
+            <a:endParaRPr lang="en-US" sz="2400" b="1" dirty="0"/>
+          </a:p>
+        </p:txBody>
+      </p:sp>
+      <p:sp>
+        <p:nvSpPr>
+          <p:cNvPr id="10" name="Rectangle 9"/>
+          <p:cNvSpPr/>
+          <p:nvPr/>
+        </p:nvSpPr>
+        <p:spPr>
+          <a:xfrm>
+            <a:off x="9418320" y="2222827"/>
+            <a:ext cx="744583" cy="1015663"/>
+          </a:xfrm>
+          <a:prstGeom prst="rect">
+            <a:avLst/>
+          </a:prstGeom>
+        </p:spPr>
+        <p:txBody>
+          <a:bodyPr wrap="square">
+            <a:spAutoFit/>
+          </a:bodyPr>
+          <a:lstStyle/>
+          <a:p>
+            <a:pPr algn="ctr"/>
+            <a:r>
+              <a:rPr lang="en-US" sz="6000" b="1" dirty="0" smtClean="0">
+                <a:solidFill>
+                  <a:srgbClr val="C00000"/>
+                </a:solidFill>
+                <a:latin typeface="Consolas" panose="020B0609020204030204" pitchFamily="49" charset="0"/>
+                <a:sym typeface="Wingdings 2" panose="05020102010507070707" pitchFamily="18" charset="2"/>
+              </a:rPr>
+              <a:t></a:t>
+            </a:r>
+            <a:endParaRPr lang="en-US" sz="6000" b="1" dirty="0">
+              <a:solidFill>
+                <a:srgbClr val="C00000"/>
+              </a:solidFill>
+              <a:latin typeface="Consolas" panose="020B0609020204030204" pitchFamily="49" charset="0"/>
+            </a:endParaRPr>
+          </a:p>
+        </p:txBody>
+      </p:sp>
+      <p:sp>
+        <p:nvSpPr>
+          <p:cNvPr id="11" name="Rectangle 10"/>
+          <p:cNvSpPr/>
+          <p:nvPr/>
+        </p:nvSpPr>
+        <p:spPr>
+          <a:xfrm>
+            <a:off x="9390382" y="1051005"/>
+            <a:ext cx="744583" cy="1015663"/>
+          </a:xfrm>
+          <a:prstGeom prst="rect">
+            <a:avLst/>
+          </a:prstGeom>
+        </p:spPr>
+        <p:txBody>
+          <a:bodyPr wrap="square">
+            <a:spAutoFit/>
+          </a:bodyPr>
+          <a:lstStyle/>
+          <a:p>
+            <a:pPr algn="ctr"/>
+            <a:r>
+              <a:rPr lang="en-US" sz="6000" b="1" dirty="0">
+                <a:solidFill>
+                  <a:srgbClr val="C00000"/>
+                </a:solidFill>
+                <a:latin typeface="Consolas" panose="020B0609020204030204" pitchFamily="49" charset="0"/>
+              </a:rPr>
+              <a:t>X</a:t>
+            </a:r>
+            <a:endParaRPr lang="en-US" sz="6000" b="1" dirty="0">
+              <a:solidFill>
+                <a:srgbClr val="C00000"/>
+              </a:solidFill>
+              <a:latin typeface="Consolas" panose="020B0609020204030204" pitchFamily="49" charset="0"/>
+            </a:endParaRPr>
+          </a:p>
+        </p:txBody>
+      </p:sp>
+    </p:spTree>
+    <p:extLst>
+      <p:ext uri="{BB962C8B-B14F-4D97-AF65-F5344CB8AC3E}">
+        <p14:creationId xmlns:p14="http://schemas.microsoft.com/office/powerpoint/2010/main" val="2118864626"/>
+      </p:ext>
+    </p:extLst>
+  </p:cSld>
+  <p:clrMapOvr>
+    <a:masterClrMapping/>
+  </p:clrMapOvr>
+  <p:timing>
+    <p:tnLst>
+      <p:par>
+        <p:cTn id="1" dur="indefinite" restart="never" nodeType="tmRoot"/>
+      </p:par>
+    </p:tnLst>
+  </p:timing>
+</p:sld>
+</file>
+
+<file path=ppt/slides/slide29.xml><?xml version="1.0" encoding="utf-8"?>
+<p:sld xmlns:a="http://schemas.openxmlformats.org/drawingml/2006/main" xmlns:r="http://schemas.openxmlformats.org/officeDocument/2006/relationships" xmlns:p="http://schemas.openxmlformats.org/presentationml/2006/main">
+  <p:cSld>
+    <p:spTree>
+      <p:nvGrpSpPr>
+        <p:cNvPr id="1" name=""/>
+        <p:cNvGrpSpPr/>
+        <p:nvPr/>
+      </p:nvGrpSpPr>
+      <p:grpSpPr>
+        <a:xfrm>
+          <a:off x="0" y="0"/>
+          <a:ext cx="0" cy="0"/>
+          <a:chOff x="0" y="0"/>
+          <a:chExt cx="0" cy="0"/>
+        </a:xfrm>
+      </p:grpSpPr>
+      <p:sp>
+        <p:nvSpPr>
+          <p:cNvPr id="5" name="Rectangle 4"/>
+          <p:cNvSpPr/>
+          <p:nvPr/>
+        </p:nvSpPr>
+        <p:spPr>
+          <a:xfrm>
+            <a:off x="2808514" y="3778465"/>
+            <a:ext cx="6609806" cy="369332"/>
+          </a:xfrm>
+          <a:prstGeom prst="rect">
+            <a:avLst/>
+          </a:prstGeom>
+        </p:spPr>
+        <p:txBody>
+          <a:bodyPr wrap="square">
+            <a:spAutoFit/>
+          </a:bodyPr>
+          <a:lstStyle/>
+          <a:p>
+            <a:pPr algn="ctr"/>
+            <a:r>
+              <a:rPr lang="en-US" b="1" dirty="0">
+                <a:solidFill>
+                  <a:srgbClr val="C00000"/>
+                </a:solidFill>
+                <a:latin typeface="Consolas" panose="020B0609020204030204" pitchFamily="49" charset="0"/>
+              </a:rPr>
+              <a:t>2. </a:t>
+            </a:r>
+            <a:r>
+              <a:rPr lang="en-US" b="1" dirty="0" err="1">
+                <a:solidFill>
+                  <a:srgbClr val="C00000"/>
+                </a:solidFill>
+                <a:latin typeface="Consolas" panose="020B0609020204030204" pitchFamily="49" charset="0"/>
+              </a:rPr>
+              <a:t>convertToMap</a:t>
+            </a:r>
+            <a:r>
+              <a:rPr lang="en-US" b="1" dirty="0">
+                <a:solidFill>
+                  <a:srgbClr val="C00000"/>
+                </a:solidFill>
+                <a:latin typeface="Consolas" panose="020B0609020204030204" pitchFamily="49" charset="0"/>
+              </a:rPr>
+              <a:t> return type is Map&lt;</a:t>
+            </a:r>
+            <a:r>
+              <a:rPr lang="en-US" b="1" dirty="0" err="1">
+                <a:solidFill>
+                  <a:srgbClr val="C00000"/>
+                </a:solidFill>
+                <a:latin typeface="Consolas" panose="020B0609020204030204" pitchFamily="49" charset="0"/>
+              </a:rPr>
+              <a:t>String,bool</a:t>
+            </a:r>
+            <a:r>
+              <a:rPr lang="en-US" b="1" dirty="0" smtClean="0">
+                <a:solidFill>
+                  <a:srgbClr val="C00000"/>
+                </a:solidFill>
+                <a:latin typeface="Consolas" panose="020B0609020204030204" pitchFamily="49" charset="0"/>
+              </a:rPr>
+              <a:t>&gt;.</a:t>
+            </a:r>
+            <a:endParaRPr lang="en-US" b="1" dirty="0">
+              <a:solidFill>
+                <a:srgbClr val="C00000"/>
+              </a:solidFill>
+              <a:latin typeface="Consolas" panose="020B0609020204030204" pitchFamily="49" charset="0"/>
+            </a:endParaRPr>
+          </a:p>
+        </p:txBody>
+      </p:sp>
+      <p:sp>
+        <p:nvSpPr>
+          <p:cNvPr id="6" name="Rectangle 5"/>
+          <p:cNvSpPr/>
+          <p:nvPr/>
+        </p:nvSpPr>
+        <p:spPr>
+          <a:xfrm>
+            <a:off x="1334954" y="4634363"/>
+            <a:ext cx="10315644" cy="1477328"/>
+          </a:xfrm>
+          <a:prstGeom prst="rect">
+            <a:avLst/>
+          </a:prstGeom>
+        </p:spPr>
+        <p:txBody>
+          <a:bodyPr wrap="none">
+            <a:spAutoFit/>
+          </a:bodyPr>
+          <a:lstStyle/>
+          <a:p>
+            <a:r>
+              <a:rPr lang="en-US" b="1" dirty="0">
+                <a:solidFill>
+                  <a:schemeClr val="accent6">
+                    <a:lumMod val="50000"/>
+                  </a:schemeClr>
+                </a:solidFill>
+                <a:latin typeface="Consolas" panose="020B0609020204030204" pitchFamily="49" charset="0"/>
+              </a:rPr>
+              <a:t>test('</a:t>
+            </a:r>
+            <a:r>
+              <a:rPr lang="en-US" b="1" dirty="0" err="1">
+                <a:solidFill>
+                  <a:schemeClr val="accent6">
+                    <a:lumMod val="50000"/>
+                  </a:schemeClr>
+                </a:solidFill>
+                <a:latin typeface="Consolas" panose="020B0609020204030204" pitchFamily="49" charset="0"/>
+              </a:rPr>
+              <a:t>convertToMap</a:t>
+            </a:r>
+            <a:r>
+              <a:rPr lang="en-US" b="1" dirty="0">
+                <a:solidFill>
+                  <a:schemeClr val="accent6">
+                    <a:lumMod val="50000"/>
+                  </a:schemeClr>
+                </a:solidFill>
+                <a:latin typeface="Consolas" panose="020B0609020204030204" pitchFamily="49" charset="0"/>
+              </a:rPr>
+              <a:t> return type is Map&lt;</a:t>
+            </a:r>
+            <a:r>
+              <a:rPr lang="en-US" b="1" dirty="0" err="1">
+                <a:solidFill>
+                  <a:schemeClr val="accent6">
+                    <a:lumMod val="50000"/>
+                  </a:schemeClr>
+                </a:solidFill>
+                <a:latin typeface="Consolas" panose="020B0609020204030204" pitchFamily="49" charset="0"/>
+              </a:rPr>
+              <a:t>String,bool</a:t>
+            </a:r>
+            <a:r>
+              <a:rPr lang="en-US" b="1" dirty="0">
+                <a:solidFill>
+                  <a:schemeClr val="accent6">
+                    <a:lumMod val="50000"/>
+                  </a:schemeClr>
+                </a:solidFill>
+                <a:latin typeface="Consolas" panose="020B0609020204030204" pitchFamily="49" charset="0"/>
+              </a:rPr>
+              <a:t>&gt;', () {</a:t>
+            </a:r>
+          </a:p>
+          <a:p>
+            <a:r>
+              <a:rPr lang="en-US" b="1" dirty="0">
+                <a:solidFill>
+                  <a:schemeClr val="accent6">
+                    <a:lumMod val="50000"/>
+                  </a:schemeClr>
+                </a:solidFill>
+                <a:latin typeface="Consolas" panose="020B0609020204030204" pitchFamily="49" charset="0"/>
+              </a:rPr>
+              <a:t>      </a:t>
+            </a:r>
+            <a:r>
+              <a:rPr lang="en-US" b="1" dirty="0" err="1">
+                <a:solidFill>
+                  <a:schemeClr val="accent6">
+                    <a:lumMod val="50000"/>
+                  </a:schemeClr>
+                </a:solidFill>
+                <a:latin typeface="Consolas" panose="020B0609020204030204" pitchFamily="49" charset="0"/>
+              </a:rPr>
+              <a:t>var</a:t>
+            </a:r>
+            <a:r>
+              <a:rPr lang="en-US" b="1" dirty="0">
+                <a:solidFill>
+                  <a:schemeClr val="accent6">
+                    <a:lumMod val="50000"/>
+                  </a:schemeClr>
+                </a:solidFill>
+                <a:latin typeface="Consolas" panose="020B0609020204030204" pitchFamily="49" charset="0"/>
+              </a:rPr>
+              <a:t> </a:t>
+            </a:r>
+            <a:r>
+              <a:rPr lang="en-US" b="1" dirty="0" err="1">
+                <a:solidFill>
+                  <a:schemeClr val="accent6">
+                    <a:lumMod val="50000"/>
+                  </a:schemeClr>
+                </a:solidFill>
+                <a:latin typeface="Consolas" panose="020B0609020204030204" pitchFamily="49" charset="0"/>
+              </a:rPr>
+              <a:t>tempFunction</a:t>
+            </a:r>
+            <a:r>
+              <a:rPr lang="en-US" b="1" dirty="0">
+                <a:solidFill>
+                  <a:schemeClr val="accent6">
+                    <a:lumMod val="50000"/>
+                  </a:schemeClr>
+                </a:solidFill>
+                <a:latin typeface="Consolas" panose="020B0609020204030204" pitchFamily="49" charset="0"/>
+              </a:rPr>
+              <a:t> = (List&lt;String&gt; temp) =&gt; Map&lt;String, bool&gt;();</a:t>
+            </a:r>
+          </a:p>
+          <a:p>
+            <a:r>
+              <a:rPr lang="en-US" b="1" dirty="0">
+                <a:solidFill>
+                  <a:schemeClr val="accent6">
+                    <a:lumMod val="50000"/>
+                  </a:schemeClr>
+                </a:solidFill>
+                <a:latin typeface="Consolas" panose="020B0609020204030204" pitchFamily="49" charset="0"/>
+              </a:rPr>
+              <a:t>      expect(</a:t>
+            </a:r>
+            <a:r>
+              <a:rPr lang="en-US" b="1" dirty="0" err="1">
+                <a:solidFill>
+                  <a:schemeClr val="accent6">
+                    <a:lumMod val="50000"/>
+                  </a:schemeClr>
+                </a:solidFill>
+                <a:latin typeface="Consolas" panose="020B0609020204030204" pitchFamily="49" charset="0"/>
+              </a:rPr>
+              <a:t>convertToMap.runtimeType</a:t>
+            </a:r>
+            <a:r>
+              <a:rPr lang="en-US" b="1" dirty="0">
+                <a:solidFill>
+                  <a:schemeClr val="accent6">
+                    <a:lumMod val="50000"/>
+                  </a:schemeClr>
+                </a:solidFill>
+                <a:latin typeface="Consolas" panose="020B0609020204030204" pitchFamily="49" charset="0"/>
+              </a:rPr>
+              <a:t>, </a:t>
+            </a:r>
+            <a:r>
+              <a:rPr lang="en-US" b="1" dirty="0" err="1">
+                <a:solidFill>
+                  <a:schemeClr val="accent6">
+                    <a:lumMod val="50000"/>
+                  </a:schemeClr>
+                </a:solidFill>
+                <a:latin typeface="Consolas" panose="020B0609020204030204" pitchFamily="49" charset="0"/>
+              </a:rPr>
+              <a:t>isNot</a:t>
+            </a:r>
+            <a:r>
+              <a:rPr lang="en-US" b="1" dirty="0">
+                <a:solidFill>
+                  <a:schemeClr val="accent6">
+                    <a:lumMod val="50000"/>
+                  </a:schemeClr>
+                </a:solidFill>
+                <a:latin typeface="Consolas" panose="020B0609020204030204" pitchFamily="49" charset="0"/>
+              </a:rPr>
+              <a:t>(equals((List&lt;String&gt; temp) =&gt; 0)));</a:t>
+            </a:r>
+          </a:p>
+          <a:p>
+            <a:r>
+              <a:rPr lang="en-US" b="1" dirty="0">
+                <a:solidFill>
+                  <a:schemeClr val="accent6">
+                    <a:lumMod val="50000"/>
+                  </a:schemeClr>
+                </a:solidFill>
+                <a:latin typeface="Consolas" panose="020B0609020204030204" pitchFamily="49" charset="0"/>
+              </a:rPr>
+              <a:t>      expect(</a:t>
+            </a:r>
+            <a:r>
+              <a:rPr lang="en-US" b="1" dirty="0" err="1">
+                <a:solidFill>
+                  <a:schemeClr val="accent6">
+                    <a:lumMod val="50000"/>
+                  </a:schemeClr>
+                </a:solidFill>
+                <a:latin typeface="Consolas" panose="020B0609020204030204" pitchFamily="49" charset="0"/>
+              </a:rPr>
+              <a:t>convertToMap.runtimeType</a:t>
+            </a:r>
+            <a:r>
+              <a:rPr lang="en-US" b="1" dirty="0">
+                <a:solidFill>
+                  <a:schemeClr val="accent6">
+                    <a:lumMod val="50000"/>
+                  </a:schemeClr>
+                </a:solidFill>
+                <a:latin typeface="Consolas" panose="020B0609020204030204" pitchFamily="49" charset="0"/>
+              </a:rPr>
+              <a:t>, equals(</a:t>
+            </a:r>
+            <a:r>
+              <a:rPr lang="en-US" b="1" dirty="0" err="1">
+                <a:solidFill>
+                  <a:schemeClr val="accent6">
+                    <a:lumMod val="50000"/>
+                  </a:schemeClr>
+                </a:solidFill>
+                <a:latin typeface="Consolas" panose="020B0609020204030204" pitchFamily="49" charset="0"/>
+              </a:rPr>
+              <a:t>tempFunction.runtimeType</a:t>
+            </a:r>
+            <a:r>
+              <a:rPr lang="en-US" b="1" dirty="0">
+                <a:solidFill>
+                  <a:schemeClr val="accent6">
+                    <a:lumMod val="50000"/>
+                  </a:schemeClr>
+                </a:solidFill>
+                <a:latin typeface="Consolas" panose="020B0609020204030204" pitchFamily="49" charset="0"/>
+              </a:rPr>
+              <a:t>));</a:t>
+            </a:r>
+          </a:p>
+          <a:p>
+            <a:r>
+              <a:rPr lang="en-US" b="1" dirty="0">
+                <a:solidFill>
+                  <a:schemeClr val="accent6">
+                    <a:lumMod val="50000"/>
+                  </a:schemeClr>
+                </a:solidFill>
+                <a:latin typeface="Consolas" panose="020B0609020204030204" pitchFamily="49" charset="0"/>
+              </a:rPr>
+              <a:t>    });</a:t>
+            </a:r>
+            <a:endParaRPr lang="en-US" b="1" dirty="0">
+              <a:solidFill>
+                <a:schemeClr val="accent6">
+                  <a:lumMod val="50000"/>
+                </a:schemeClr>
+              </a:solidFill>
+              <a:effectLst/>
+              <a:latin typeface="Consolas" panose="020B0609020204030204" pitchFamily="49" charset="0"/>
+            </a:endParaRPr>
+          </a:p>
+        </p:txBody>
+      </p:sp>
+      <p:sp>
+        <p:nvSpPr>
+          <p:cNvPr id="7" name="Rounded Rectangle 6"/>
+          <p:cNvSpPr/>
+          <p:nvPr/>
+        </p:nvSpPr>
+        <p:spPr>
+          <a:xfrm>
+            <a:off x="2375433" y="867284"/>
+            <a:ext cx="4706637" cy="762057"/>
+          </a:xfrm>
+          <a:prstGeom prst="roundRect">
+            <a:avLst/>
+          </a:prstGeom>
+          <a:solidFill>
+            <a:srgbClr val="FF0000"/>
+          </a:solidFill>
+          <a:ln>
+            <a:noFill/>
+          </a:ln>
+        </p:spPr>
+        <p:style>
+          <a:lnRef idx="2">
+            <a:schemeClr val="accent1">
+              <a:shade val="50000"/>
+            </a:schemeClr>
+          </a:lnRef>
+          <a:fillRef idx="1">
+            <a:schemeClr val="accent1"/>
+          </a:fillRef>
+          <a:effectRef idx="0">
+            <a:schemeClr val="accent1"/>
+          </a:effectRef>
+          <a:fontRef idx="minor">
+            <a:schemeClr val="lt1"/>
+          </a:fontRef>
+        </p:style>
+        <p:txBody>
+          <a:bodyPr rtlCol="0" anchor="ctr"/>
+          <a:lstStyle/>
+          <a:p>
+            <a:pPr algn="ctr"/>
+            <a:r>
+              <a:rPr lang="en-US" sz="2400" b="1" dirty="0" err="1" smtClean="0"/>
+              <a:t>convertToMap</a:t>
+            </a:r>
+            <a:r>
+              <a:rPr lang="en-US" sz="2400" b="1" dirty="0" smtClean="0"/>
+              <a:t>(List&lt;String flavours</a:t>
+            </a:r>
+            <a:r>
+              <a:rPr lang="en-US" sz="2400" b="1" dirty="0" smtClean="0"/>
+              <a:t>) </a:t>
+            </a:r>
+            <a:endParaRPr lang="en-US" sz="2400" b="1" dirty="0"/>
+          </a:p>
+        </p:txBody>
+      </p:sp>
+      <p:sp>
+        <p:nvSpPr>
+          <p:cNvPr id="10" name="Rectangle 9"/>
+          <p:cNvSpPr/>
+          <p:nvPr/>
+        </p:nvSpPr>
+        <p:spPr>
+          <a:xfrm>
+            <a:off x="875555" y="2431286"/>
+            <a:ext cx="744583" cy="1015663"/>
+          </a:xfrm>
+          <a:prstGeom prst="rect">
+            <a:avLst/>
+          </a:prstGeom>
+        </p:spPr>
+        <p:txBody>
+          <a:bodyPr wrap="square">
+            <a:spAutoFit/>
+          </a:bodyPr>
+          <a:lstStyle/>
+          <a:p>
+            <a:pPr algn="ctr"/>
+            <a:r>
+              <a:rPr lang="en-US" sz="6000" b="1" dirty="0" smtClean="0">
+                <a:solidFill>
+                  <a:srgbClr val="C00000"/>
+                </a:solidFill>
+                <a:latin typeface="Consolas" panose="020B0609020204030204" pitchFamily="49" charset="0"/>
+                <a:sym typeface="Wingdings 2" panose="05020102010507070707" pitchFamily="18" charset="2"/>
+              </a:rPr>
+              <a:t></a:t>
+            </a:r>
+            <a:endParaRPr lang="en-US" sz="6000" b="1" dirty="0">
+              <a:solidFill>
+                <a:srgbClr val="C00000"/>
+              </a:solidFill>
+              <a:latin typeface="Consolas" panose="020B0609020204030204" pitchFamily="49" charset="0"/>
+            </a:endParaRPr>
+          </a:p>
+        </p:txBody>
+      </p:sp>
+      <p:sp>
+        <p:nvSpPr>
+          <p:cNvPr id="11" name="Rectangle 10"/>
+          <p:cNvSpPr/>
+          <p:nvPr/>
+        </p:nvSpPr>
+        <p:spPr>
+          <a:xfrm>
+            <a:off x="835470" y="705586"/>
+            <a:ext cx="744583" cy="1015663"/>
+          </a:xfrm>
+          <a:prstGeom prst="rect">
+            <a:avLst/>
+          </a:prstGeom>
+        </p:spPr>
+        <p:txBody>
+          <a:bodyPr wrap="square">
+            <a:spAutoFit/>
+          </a:bodyPr>
+          <a:lstStyle/>
+          <a:p>
+            <a:pPr algn="ctr"/>
+            <a:r>
+              <a:rPr lang="en-US" sz="6000" b="1" dirty="0">
+                <a:solidFill>
+                  <a:srgbClr val="C00000"/>
+                </a:solidFill>
+                <a:latin typeface="Consolas" panose="020B0609020204030204" pitchFamily="49" charset="0"/>
+              </a:rPr>
+              <a:t>X</a:t>
+            </a:r>
+            <a:endParaRPr lang="en-US" sz="6000" b="1" dirty="0">
+              <a:solidFill>
+                <a:srgbClr val="C00000"/>
+              </a:solidFill>
+              <a:latin typeface="Consolas" panose="020B0609020204030204" pitchFamily="49" charset="0"/>
+            </a:endParaRPr>
+          </a:p>
+        </p:txBody>
+      </p:sp>
+      <p:cxnSp>
+        <p:nvCxnSpPr>
+          <p:cNvPr id="3" name="Straight Arrow Connector 2"/>
+          <p:cNvCxnSpPr/>
+          <p:nvPr/>
+        </p:nvCxnSpPr>
+        <p:spPr>
+          <a:xfrm>
+            <a:off x="7419701" y="1254032"/>
+            <a:ext cx="2090057" cy="0"/>
+          </a:xfrm>
+          <a:prstGeom prst="straightConnector1">
+            <a:avLst/>
+          </a:prstGeom>
+          <a:ln w="76200">
+            <a:tailEnd type="triangle"/>
+          </a:ln>
+        </p:spPr>
+        <p:style>
+          <a:lnRef idx="1">
+            <a:schemeClr val="accent1"/>
+          </a:lnRef>
+          <a:fillRef idx="0">
+            <a:schemeClr val="accent1"/>
+          </a:fillRef>
+          <a:effectRef idx="0">
+            <a:schemeClr val="accent1"/>
+          </a:effectRef>
+          <a:fontRef idx="minor">
+            <a:schemeClr val="tx1"/>
+          </a:fontRef>
+        </p:style>
+      </p:cxnSp>
+      <p:sp>
+        <p:nvSpPr>
+          <p:cNvPr id="8" name="Rectangle 7"/>
+          <p:cNvSpPr/>
+          <p:nvPr/>
+        </p:nvSpPr>
+        <p:spPr>
+          <a:xfrm>
+            <a:off x="7877450" y="810983"/>
+            <a:ext cx="1071127" cy="369332"/>
+          </a:xfrm>
+          <a:prstGeom prst="rect">
+            <a:avLst/>
+          </a:prstGeom>
+        </p:spPr>
+        <p:txBody>
+          <a:bodyPr wrap="none">
+            <a:spAutoFit/>
+          </a:bodyPr>
+          <a:lstStyle/>
+          <a:p>
+            <a:r>
+              <a:rPr lang="en-US" b="1" dirty="0" smtClean="0">
+                <a:solidFill>
+                  <a:srgbClr val="5B9BD5"/>
+                </a:solidFill>
+                <a:latin typeface="Consolas" panose="020B0609020204030204" pitchFamily="49" charset="0"/>
+              </a:rPr>
+              <a:t>returns</a:t>
+            </a:r>
+            <a:endParaRPr lang="en-US" dirty="0">
+              <a:solidFill>
+                <a:srgbClr val="5B9BD5"/>
+              </a:solidFill>
+            </a:endParaRPr>
+          </a:p>
+        </p:txBody>
+      </p:sp>
+      <p:sp>
+        <p:nvSpPr>
+          <p:cNvPr id="12" name="Rectangle 11"/>
+          <p:cNvSpPr/>
+          <p:nvPr/>
+        </p:nvSpPr>
+        <p:spPr>
+          <a:xfrm>
+            <a:off x="10036405" y="982586"/>
+            <a:ext cx="354584" cy="461665"/>
+          </a:xfrm>
+          <a:prstGeom prst="rect">
+            <a:avLst/>
+          </a:prstGeom>
+        </p:spPr>
+        <p:txBody>
+          <a:bodyPr wrap="none">
+            <a:spAutoFit/>
+          </a:bodyPr>
+          <a:lstStyle/>
+          <a:p>
+            <a:r>
+              <a:rPr lang="en-US" sz="2400" b="1" dirty="0" smtClean="0">
+                <a:solidFill>
+                  <a:srgbClr val="FF0000"/>
+                </a:solidFill>
+                <a:latin typeface="Consolas" panose="020B0609020204030204" pitchFamily="49" charset="0"/>
+              </a:rPr>
+              <a:t>0</a:t>
+            </a:r>
+            <a:endParaRPr lang="en-US" sz="2400" dirty="0">
+              <a:solidFill>
+                <a:srgbClr val="FF0000"/>
+              </a:solidFill>
+            </a:endParaRPr>
+          </a:p>
+        </p:txBody>
+      </p:sp>
+      <p:sp>
+        <p:nvSpPr>
+          <p:cNvPr id="13" name="Rounded Rectangle 12"/>
+          <p:cNvSpPr/>
+          <p:nvPr/>
+        </p:nvSpPr>
+        <p:spPr>
+          <a:xfrm>
+            <a:off x="2397204" y="2521914"/>
+            <a:ext cx="4706637" cy="762057"/>
+          </a:xfrm>
+          <a:prstGeom prst="roundRect">
+            <a:avLst/>
+          </a:prstGeom>
+          <a:solidFill>
+            <a:srgbClr val="FF0000"/>
+          </a:solidFill>
+          <a:ln>
+            <a:noFill/>
+          </a:ln>
+        </p:spPr>
+        <p:style>
+          <a:lnRef idx="2">
+            <a:schemeClr val="accent1">
+              <a:shade val="50000"/>
+            </a:schemeClr>
+          </a:lnRef>
+          <a:fillRef idx="1">
+            <a:schemeClr val="accent1"/>
+          </a:fillRef>
+          <a:effectRef idx="0">
+            <a:schemeClr val="accent1"/>
+          </a:effectRef>
+          <a:fontRef idx="minor">
+            <a:schemeClr val="lt1"/>
+          </a:fontRef>
+        </p:style>
+        <p:txBody>
+          <a:bodyPr rtlCol="0" anchor="ctr"/>
+          <a:lstStyle/>
+          <a:p>
+            <a:pPr algn="ctr"/>
+            <a:r>
+              <a:rPr lang="en-US" sz="2400" b="1" dirty="0" err="1" smtClean="0"/>
+              <a:t>convertToMap</a:t>
+            </a:r>
+            <a:r>
+              <a:rPr lang="en-US" sz="2400" b="1" dirty="0" smtClean="0"/>
+              <a:t>(List&lt;String flavours</a:t>
+            </a:r>
+            <a:r>
+              <a:rPr lang="en-US" sz="2400" b="1" dirty="0" smtClean="0"/>
+              <a:t>) </a:t>
+            </a:r>
+            <a:endParaRPr lang="en-US" sz="2400" b="1" dirty="0"/>
+          </a:p>
+        </p:txBody>
+      </p:sp>
+      <p:cxnSp>
+        <p:nvCxnSpPr>
+          <p:cNvPr id="14" name="Straight Arrow Connector 13"/>
+          <p:cNvCxnSpPr/>
+          <p:nvPr/>
+        </p:nvCxnSpPr>
+        <p:spPr>
+          <a:xfrm>
+            <a:off x="7441472" y="2908662"/>
+            <a:ext cx="2090057" cy="0"/>
+          </a:xfrm>
+          <a:prstGeom prst="straightConnector1">
+            <a:avLst/>
+          </a:prstGeom>
+          <a:ln w="76200">
+            <a:tailEnd type="triangle"/>
+          </a:ln>
+        </p:spPr>
+        <p:style>
+          <a:lnRef idx="1">
+            <a:schemeClr val="accent1"/>
+          </a:lnRef>
+          <a:fillRef idx="0">
+            <a:schemeClr val="accent1"/>
+          </a:fillRef>
+          <a:effectRef idx="0">
+            <a:schemeClr val="accent1"/>
+          </a:effectRef>
+          <a:fontRef idx="minor">
+            <a:schemeClr val="tx1"/>
+          </a:fontRef>
+        </p:style>
+      </p:cxnSp>
+      <p:sp>
+        <p:nvSpPr>
+          <p:cNvPr id="15" name="Rectangle 14"/>
+          <p:cNvSpPr/>
+          <p:nvPr/>
+        </p:nvSpPr>
+        <p:spPr>
+          <a:xfrm>
+            <a:off x="7899221" y="2465613"/>
+            <a:ext cx="1071127" cy="369332"/>
+          </a:xfrm>
+          <a:prstGeom prst="rect">
+            <a:avLst/>
+          </a:prstGeom>
+        </p:spPr>
+        <p:txBody>
+          <a:bodyPr wrap="none">
+            <a:spAutoFit/>
+          </a:bodyPr>
+          <a:lstStyle/>
+          <a:p>
+            <a:r>
+              <a:rPr lang="en-US" b="1" dirty="0" smtClean="0">
+                <a:solidFill>
+                  <a:srgbClr val="5B9BD5"/>
+                </a:solidFill>
+                <a:latin typeface="Consolas" panose="020B0609020204030204" pitchFamily="49" charset="0"/>
+              </a:rPr>
+              <a:t>returns</a:t>
+            </a:r>
+            <a:endParaRPr lang="en-US" dirty="0">
+              <a:solidFill>
+                <a:srgbClr val="5B9BD5"/>
+              </a:solidFill>
+            </a:endParaRPr>
+          </a:p>
+        </p:txBody>
+      </p:sp>
+      <p:sp>
+        <p:nvSpPr>
+          <p:cNvPr id="16" name="Rectangle 15"/>
+          <p:cNvSpPr/>
+          <p:nvPr/>
+        </p:nvSpPr>
+        <p:spPr>
+          <a:xfrm>
+            <a:off x="9765728" y="2624936"/>
+            <a:ext cx="1883849" cy="461665"/>
+          </a:xfrm>
+          <a:prstGeom prst="rect">
+            <a:avLst/>
+          </a:prstGeom>
+        </p:spPr>
+        <p:txBody>
+          <a:bodyPr wrap="none">
+            <a:spAutoFit/>
+          </a:bodyPr>
+          <a:lstStyle/>
+          <a:p>
+            <a:r>
+              <a:rPr lang="en-US" sz="2400" b="1" dirty="0">
+                <a:solidFill>
+                  <a:srgbClr val="FF0000"/>
+                </a:solidFill>
+                <a:latin typeface="Consolas" panose="020B0609020204030204" pitchFamily="49" charset="0"/>
+              </a:rPr>
+              <a:t>{'':</a:t>
+            </a:r>
+            <a:r>
+              <a:rPr lang="en-US" sz="2400" b="1" dirty="0" smtClean="0">
+                <a:solidFill>
+                  <a:srgbClr val="FF0000"/>
+                </a:solidFill>
+                <a:latin typeface="Consolas" panose="020B0609020204030204" pitchFamily="49" charset="0"/>
+              </a:rPr>
+              <a:t>false}</a:t>
+            </a:r>
+            <a:endParaRPr lang="en-US" sz="2400" dirty="0">
+              <a:solidFill>
+                <a:srgbClr val="FF0000"/>
+              </a:solidFill>
+            </a:endParaRPr>
+          </a:p>
+        </p:txBody>
+      </p:sp>
+    </p:spTree>
+    <p:extLst>
+      <p:ext uri="{BB962C8B-B14F-4D97-AF65-F5344CB8AC3E}">
+        <p14:creationId xmlns:p14="http://schemas.microsoft.com/office/powerpoint/2010/main" val="1353029156"/>
       </p:ext>
     </p:extLst>
   </p:cSld>
@@ -15967,6 +17415,1267 @@
     <p:extLst>
       <p:ext uri="{BB962C8B-B14F-4D97-AF65-F5344CB8AC3E}">
         <p14:creationId xmlns:p14="http://schemas.microsoft.com/office/powerpoint/2010/main" val="2980162736"/>
+      </p:ext>
+    </p:extLst>
+  </p:cSld>
+  <p:clrMapOvr>
+    <a:masterClrMapping/>
+  </p:clrMapOvr>
+  <p:timing>
+    <p:tnLst>
+      <p:par>
+        <p:cTn id="1" dur="indefinite" restart="never" nodeType="tmRoot"/>
+      </p:par>
+    </p:tnLst>
+  </p:timing>
+</p:sld>
+</file>
+
+<file path=ppt/slides/slide30.xml><?xml version="1.0" encoding="utf-8"?>
+<p:sld xmlns:a="http://schemas.openxmlformats.org/drawingml/2006/main" xmlns:r="http://schemas.openxmlformats.org/officeDocument/2006/relationships" xmlns:p="http://schemas.openxmlformats.org/presentationml/2006/main">
+  <p:cSld>
+    <p:spTree>
+      <p:nvGrpSpPr>
+        <p:cNvPr id="1" name=""/>
+        <p:cNvGrpSpPr/>
+        <p:nvPr/>
+      </p:nvGrpSpPr>
+      <p:grpSpPr>
+        <a:xfrm>
+          <a:off x="0" y="0"/>
+          <a:ext cx="0" cy="0"/>
+          <a:chOff x="0" y="0"/>
+          <a:chExt cx="0" cy="0"/>
+        </a:xfrm>
+      </p:grpSpPr>
+      <p:sp>
+        <p:nvSpPr>
+          <p:cNvPr id="5" name="Rectangle 4"/>
+          <p:cNvSpPr/>
+          <p:nvPr/>
+        </p:nvSpPr>
+        <p:spPr>
+          <a:xfrm>
+            <a:off x="-2435" y="4615437"/>
+            <a:ext cx="4918588" cy="369332"/>
+          </a:xfrm>
+          <a:prstGeom prst="rect">
+            <a:avLst/>
+          </a:prstGeom>
+        </p:spPr>
+        <p:txBody>
+          <a:bodyPr wrap="square">
+            <a:spAutoFit/>
+          </a:bodyPr>
+          <a:lstStyle/>
+          <a:p>
+            <a:r>
+              <a:rPr lang="en-US" b="1" dirty="0" smtClean="0">
+                <a:solidFill>
+                  <a:srgbClr val="C00000"/>
+                </a:solidFill>
+                <a:latin typeface="Consolas" panose="020B0609020204030204" pitchFamily="49" charset="0"/>
+              </a:rPr>
+              <a:t>3. </a:t>
+            </a:r>
+            <a:r>
+              <a:rPr lang="en-US" b="1" dirty="0" err="1" smtClean="0">
+                <a:solidFill>
+                  <a:srgbClr val="C00000"/>
+                </a:solidFill>
+                <a:latin typeface="Consolas" panose="020B0609020204030204" pitchFamily="49" charset="0"/>
+              </a:rPr>
+              <a:t>mappedFlavour</a:t>
+            </a:r>
+            <a:r>
+              <a:rPr lang="en-US" b="1" dirty="0" smtClean="0">
+                <a:solidFill>
+                  <a:srgbClr val="C00000"/>
+                </a:solidFill>
+                <a:latin typeface="Consolas" panose="020B0609020204030204" pitchFamily="49" charset="0"/>
+              </a:rPr>
+              <a:t> </a:t>
+            </a:r>
+            <a:r>
+              <a:rPr lang="en-US" b="1" dirty="0">
+                <a:solidFill>
+                  <a:srgbClr val="C00000"/>
+                </a:solidFill>
+                <a:latin typeface="Consolas" panose="020B0609020204030204" pitchFamily="49" charset="0"/>
+              </a:rPr>
+              <a:t>should not be </a:t>
+            </a:r>
+            <a:r>
+              <a:rPr lang="en-US" b="1" dirty="0" smtClean="0">
+                <a:solidFill>
+                  <a:srgbClr val="C00000"/>
+                </a:solidFill>
+                <a:latin typeface="Consolas" panose="020B0609020204030204" pitchFamily="49" charset="0"/>
+              </a:rPr>
+              <a:t>empty.</a:t>
+            </a:r>
+            <a:endParaRPr lang="en-US" sz="2800" b="1" dirty="0">
+              <a:solidFill>
+                <a:srgbClr val="C00000"/>
+              </a:solidFill>
+              <a:latin typeface="Consolas" panose="020B0609020204030204" pitchFamily="49" charset="0"/>
+            </a:endParaRPr>
+          </a:p>
+        </p:txBody>
+      </p:sp>
+      <p:sp>
+        <p:nvSpPr>
+          <p:cNvPr id="6" name="Rectangle 5"/>
+          <p:cNvSpPr/>
+          <p:nvPr/>
+        </p:nvSpPr>
+        <p:spPr>
+          <a:xfrm>
+            <a:off x="-59386" y="5044337"/>
+            <a:ext cx="6263253" cy="1754326"/>
+          </a:xfrm>
+          <a:prstGeom prst="rect">
+            <a:avLst/>
+          </a:prstGeom>
+        </p:spPr>
+        <p:txBody>
+          <a:bodyPr wrap="none">
+            <a:spAutoFit/>
+          </a:bodyPr>
+          <a:lstStyle/>
+          <a:p>
+            <a:r>
+              <a:rPr lang="en-US" b="1" dirty="0">
+                <a:solidFill>
+                  <a:schemeClr val="accent6">
+                    <a:lumMod val="50000"/>
+                  </a:schemeClr>
+                </a:solidFill>
+                <a:latin typeface="Consolas" panose="020B0609020204030204" pitchFamily="49" charset="0"/>
+              </a:rPr>
+              <a:t> test('</a:t>
+            </a:r>
+            <a:r>
+              <a:rPr lang="en-US" b="1" dirty="0" err="1">
+                <a:solidFill>
+                  <a:schemeClr val="accent6">
+                    <a:lumMod val="50000"/>
+                  </a:schemeClr>
+                </a:solidFill>
+                <a:latin typeface="Consolas" panose="020B0609020204030204" pitchFamily="49" charset="0"/>
+              </a:rPr>
+              <a:t>mappedFlavour</a:t>
+            </a:r>
+            <a:r>
+              <a:rPr lang="en-US" b="1" dirty="0">
+                <a:solidFill>
+                  <a:schemeClr val="accent6">
+                    <a:lumMod val="50000"/>
+                  </a:schemeClr>
+                </a:solidFill>
+                <a:latin typeface="Consolas" panose="020B0609020204030204" pitchFamily="49" charset="0"/>
+              </a:rPr>
+              <a:t> should not be empty', () {</a:t>
+            </a:r>
+          </a:p>
+          <a:p>
+            <a:r>
+              <a:rPr lang="en-US" b="1" dirty="0">
+                <a:solidFill>
+                  <a:schemeClr val="accent6">
+                    <a:lumMod val="50000"/>
+                  </a:schemeClr>
+                </a:solidFill>
+                <a:latin typeface="Consolas" panose="020B0609020204030204" pitchFamily="49" charset="0"/>
+              </a:rPr>
+              <a:t>      if (</a:t>
+            </a:r>
+            <a:r>
+              <a:rPr lang="en-US" b="1" dirty="0" err="1">
+                <a:solidFill>
+                  <a:schemeClr val="accent6">
+                    <a:lumMod val="50000"/>
+                  </a:schemeClr>
+                </a:solidFill>
+                <a:latin typeface="Consolas" panose="020B0609020204030204" pitchFamily="49" charset="0"/>
+              </a:rPr>
+              <a:t>mappedFlavours.isEmpty</a:t>
+            </a:r>
+            <a:r>
+              <a:rPr lang="en-US" b="1" dirty="0">
+                <a:solidFill>
+                  <a:schemeClr val="accent6">
+                    <a:lumMod val="50000"/>
+                  </a:schemeClr>
+                </a:solidFill>
+                <a:latin typeface="Consolas" panose="020B0609020204030204" pitchFamily="49" charset="0"/>
+              </a:rPr>
+              <a:t>) {</a:t>
+            </a:r>
+          </a:p>
+          <a:p>
+            <a:r>
+              <a:rPr lang="en-US" b="1" dirty="0">
+                <a:solidFill>
+                  <a:schemeClr val="accent6">
+                    <a:lumMod val="50000"/>
+                  </a:schemeClr>
+                </a:solidFill>
+                <a:latin typeface="Consolas" panose="020B0609020204030204" pitchFamily="49" charset="0"/>
+              </a:rPr>
+              <a:t>        </a:t>
+            </a:r>
+            <a:r>
+              <a:rPr lang="en-US" b="1" dirty="0" err="1">
+                <a:solidFill>
+                  <a:schemeClr val="accent6">
+                    <a:lumMod val="50000"/>
+                  </a:schemeClr>
+                </a:solidFill>
+                <a:latin typeface="Consolas" panose="020B0609020204030204" pitchFamily="49" charset="0"/>
+              </a:rPr>
+              <a:t>mappedFlavours</a:t>
+            </a:r>
+            <a:r>
+              <a:rPr lang="en-US" b="1" dirty="0">
+                <a:solidFill>
+                  <a:schemeClr val="accent6">
+                    <a:lumMod val="50000"/>
+                  </a:schemeClr>
+                </a:solidFill>
+                <a:latin typeface="Consolas" panose="020B0609020204030204" pitchFamily="49" charset="0"/>
+              </a:rPr>
+              <a:t> = </a:t>
+            </a:r>
+            <a:r>
+              <a:rPr lang="en-US" b="1" dirty="0" err="1">
+                <a:solidFill>
+                  <a:schemeClr val="accent6">
+                    <a:lumMod val="50000"/>
+                  </a:schemeClr>
+                </a:solidFill>
+                <a:latin typeface="Consolas" panose="020B0609020204030204" pitchFamily="49" charset="0"/>
+              </a:rPr>
+              <a:t>convertToMap</a:t>
+            </a:r>
+            <a:r>
+              <a:rPr lang="en-US" b="1" dirty="0">
+                <a:solidFill>
+                  <a:schemeClr val="accent6">
+                    <a:lumMod val="50000"/>
+                  </a:schemeClr>
+                </a:solidFill>
+                <a:latin typeface="Consolas" panose="020B0609020204030204" pitchFamily="49" charset="0"/>
+              </a:rPr>
+              <a:t>(flavours);</a:t>
+            </a:r>
+          </a:p>
+          <a:p>
+            <a:r>
+              <a:rPr lang="en-US" b="1" dirty="0">
+                <a:solidFill>
+                  <a:schemeClr val="accent6">
+                    <a:lumMod val="50000"/>
+                  </a:schemeClr>
+                </a:solidFill>
+                <a:latin typeface="Consolas" panose="020B0609020204030204" pitchFamily="49" charset="0"/>
+              </a:rPr>
+              <a:t>      }</a:t>
+            </a:r>
+          </a:p>
+          <a:p>
+            <a:r>
+              <a:rPr lang="en-US" b="1" dirty="0">
+                <a:solidFill>
+                  <a:schemeClr val="accent6">
+                    <a:lumMod val="50000"/>
+                  </a:schemeClr>
+                </a:solidFill>
+                <a:latin typeface="Consolas" panose="020B0609020204030204" pitchFamily="49" charset="0"/>
+              </a:rPr>
+              <a:t>      expect(</a:t>
+            </a:r>
+            <a:r>
+              <a:rPr lang="en-US" b="1" dirty="0" err="1">
+                <a:solidFill>
+                  <a:schemeClr val="accent6">
+                    <a:lumMod val="50000"/>
+                  </a:schemeClr>
+                </a:solidFill>
+                <a:latin typeface="Consolas" panose="020B0609020204030204" pitchFamily="49" charset="0"/>
+              </a:rPr>
+              <a:t>mappedFlavours</a:t>
+            </a:r>
+            <a:r>
+              <a:rPr lang="en-US" b="1" dirty="0">
+                <a:solidFill>
+                  <a:schemeClr val="accent6">
+                    <a:lumMod val="50000"/>
+                  </a:schemeClr>
+                </a:solidFill>
+                <a:latin typeface="Consolas" panose="020B0609020204030204" pitchFamily="49" charset="0"/>
+              </a:rPr>
+              <a:t>, </a:t>
+            </a:r>
+            <a:r>
+              <a:rPr lang="en-US" b="1" dirty="0" err="1">
+                <a:solidFill>
+                  <a:schemeClr val="accent6">
+                    <a:lumMod val="50000"/>
+                  </a:schemeClr>
+                </a:solidFill>
+                <a:latin typeface="Consolas" panose="020B0609020204030204" pitchFamily="49" charset="0"/>
+              </a:rPr>
+              <a:t>isNotEmpty</a:t>
+            </a:r>
+            <a:r>
+              <a:rPr lang="en-US" b="1" dirty="0">
+                <a:solidFill>
+                  <a:schemeClr val="accent6">
+                    <a:lumMod val="50000"/>
+                  </a:schemeClr>
+                </a:solidFill>
+                <a:latin typeface="Consolas" panose="020B0609020204030204" pitchFamily="49" charset="0"/>
+              </a:rPr>
+              <a:t>);</a:t>
+            </a:r>
+          </a:p>
+          <a:p>
+            <a:r>
+              <a:rPr lang="en-US" b="1" dirty="0">
+                <a:solidFill>
+                  <a:schemeClr val="accent6">
+                    <a:lumMod val="50000"/>
+                  </a:schemeClr>
+                </a:solidFill>
+                <a:latin typeface="Consolas" panose="020B0609020204030204" pitchFamily="49" charset="0"/>
+              </a:rPr>
+              <a:t>    });</a:t>
+            </a:r>
+            <a:endParaRPr lang="en-US" b="1" dirty="0">
+              <a:solidFill>
+                <a:schemeClr val="accent6">
+                  <a:lumMod val="50000"/>
+                </a:schemeClr>
+              </a:solidFill>
+              <a:effectLst/>
+              <a:latin typeface="Consolas" panose="020B0609020204030204" pitchFamily="49" charset="0"/>
+            </a:endParaRPr>
+          </a:p>
+        </p:txBody>
+      </p:sp>
+      <p:sp>
+        <p:nvSpPr>
+          <p:cNvPr id="7" name="Rounded Rectangle 6"/>
+          <p:cNvSpPr/>
+          <p:nvPr/>
+        </p:nvSpPr>
+        <p:spPr>
+          <a:xfrm>
+            <a:off x="6325062" y="230659"/>
+            <a:ext cx="4706637" cy="762057"/>
+          </a:xfrm>
+          <a:prstGeom prst="roundRect">
+            <a:avLst/>
+          </a:prstGeom>
+          <a:solidFill>
+            <a:srgbClr val="FF0000"/>
+          </a:solidFill>
+          <a:ln>
+            <a:noFill/>
+          </a:ln>
+        </p:spPr>
+        <p:style>
+          <a:lnRef idx="2">
+            <a:schemeClr val="accent1">
+              <a:shade val="50000"/>
+            </a:schemeClr>
+          </a:lnRef>
+          <a:fillRef idx="1">
+            <a:schemeClr val="accent1"/>
+          </a:fillRef>
+          <a:effectRef idx="0">
+            <a:schemeClr val="accent1"/>
+          </a:effectRef>
+          <a:fontRef idx="minor">
+            <a:schemeClr val="lt1"/>
+          </a:fontRef>
+        </p:style>
+        <p:txBody>
+          <a:bodyPr rtlCol="0" anchor="ctr"/>
+          <a:lstStyle/>
+          <a:p>
+            <a:pPr algn="ctr"/>
+            <a:r>
+              <a:rPr lang="en-US" sz="2400" b="1" dirty="0" err="1" smtClean="0"/>
+              <a:t>convertToMap</a:t>
+            </a:r>
+            <a:r>
+              <a:rPr lang="en-US" sz="2400" b="1" dirty="0" smtClean="0"/>
+              <a:t>(List&lt;String flavours</a:t>
+            </a:r>
+            <a:r>
+              <a:rPr lang="en-US" sz="2400" b="1" dirty="0" smtClean="0"/>
+              <a:t>) </a:t>
+            </a:r>
+            <a:endParaRPr lang="en-US" sz="2400" b="1" dirty="0"/>
+          </a:p>
+        </p:txBody>
+      </p:sp>
+      <p:sp>
+        <p:nvSpPr>
+          <p:cNvPr id="8" name="Rectangle 7"/>
+          <p:cNvSpPr/>
+          <p:nvPr/>
+        </p:nvSpPr>
+        <p:spPr>
+          <a:xfrm>
+            <a:off x="7130764" y="4102044"/>
+            <a:ext cx="4237057" cy="369332"/>
+          </a:xfrm>
+          <a:prstGeom prst="rect">
+            <a:avLst/>
+          </a:prstGeom>
+        </p:spPr>
+        <p:txBody>
+          <a:bodyPr wrap="none">
+            <a:spAutoFit/>
+          </a:bodyPr>
+          <a:lstStyle/>
+          <a:p>
+            <a:r>
+              <a:rPr lang="en-US" b="1" dirty="0">
+                <a:solidFill>
+                  <a:srgbClr val="386BC4"/>
+                </a:solidFill>
+                <a:latin typeface="Consolas" panose="020B0609020204030204" pitchFamily="49" charset="0"/>
+              </a:rPr>
+              <a:t>Map&lt;String, bool&gt; </a:t>
+            </a:r>
+            <a:r>
+              <a:rPr lang="en-US" b="1" dirty="0" err="1">
+                <a:solidFill>
+                  <a:srgbClr val="386BC4"/>
+                </a:solidFill>
+                <a:latin typeface="Consolas" panose="020B0609020204030204" pitchFamily="49" charset="0"/>
+              </a:rPr>
+              <a:t>mappedFlavours</a:t>
+            </a:r>
+            <a:endParaRPr lang="en-US" b="1" dirty="0">
+              <a:solidFill>
+                <a:srgbClr val="386BC4"/>
+              </a:solidFill>
+              <a:latin typeface="Consolas" panose="020B0609020204030204" pitchFamily="49" charset="0"/>
+            </a:endParaRPr>
+          </a:p>
+        </p:txBody>
+      </p:sp>
+      <p:grpSp>
+        <p:nvGrpSpPr>
+          <p:cNvPr id="9" name="Group 8"/>
+          <p:cNvGrpSpPr/>
+          <p:nvPr/>
+        </p:nvGrpSpPr>
+        <p:grpSpPr>
+          <a:xfrm>
+            <a:off x="5716909" y="2382899"/>
+            <a:ext cx="6235723" cy="1305072"/>
+            <a:chOff x="2525098" y="3134975"/>
+            <a:chExt cx="6235723" cy="1305072"/>
+          </a:xfrm>
+        </p:grpSpPr>
+        <p:sp>
+          <p:nvSpPr>
+            <p:cNvPr id="12" name="Rectangle 11"/>
+            <p:cNvSpPr/>
+            <p:nvPr/>
+          </p:nvSpPr>
+          <p:spPr>
+            <a:xfrm>
+              <a:off x="2525099" y="3134975"/>
+              <a:ext cx="1467780" cy="653143"/>
+            </a:xfrm>
+            <a:prstGeom prst="rect">
+              <a:avLst/>
+            </a:prstGeom>
+          </p:spPr>
+          <p:style>
+            <a:lnRef idx="2">
+              <a:schemeClr val="accent1">
+                <a:shade val="50000"/>
+              </a:schemeClr>
+            </a:lnRef>
+            <a:fillRef idx="1">
+              <a:schemeClr val="accent1"/>
+            </a:fillRef>
+            <a:effectRef idx="0">
+              <a:schemeClr val="accent1"/>
+            </a:effectRef>
+            <a:fontRef idx="minor">
+              <a:schemeClr val="lt1"/>
+            </a:fontRef>
+          </p:style>
+          <p:txBody>
+            <a:bodyPr rtlCol="0" anchor="ctr"/>
+            <a:lstStyle/>
+            <a:p>
+              <a:pPr algn="ctr"/>
+              <a:r>
+                <a:rPr lang="en-US" b="1" dirty="0" smtClean="0">
+                  <a:solidFill>
+                    <a:schemeClr val="bg1"/>
+                  </a:solidFill>
+                  <a:effectLst/>
+                  <a:latin typeface="Consolas" panose="020B0609020204030204" pitchFamily="49" charset="0"/>
+                </a:rPr>
+                <a:t>Chocolate</a:t>
+              </a:r>
+              <a:endParaRPr lang="en-US" b="1" dirty="0">
+                <a:solidFill>
+                  <a:schemeClr val="bg1"/>
+                </a:solidFill>
+              </a:endParaRPr>
+            </a:p>
+          </p:txBody>
+        </p:sp>
+        <p:sp>
+          <p:nvSpPr>
+            <p:cNvPr id="13" name="Rectangle 12"/>
+            <p:cNvSpPr/>
+            <p:nvPr/>
+          </p:nvSpPr>
+          <p:spPr>
+            <a:xfrm>
+              <a:off x="3992878" y="3134975"/>
+              <a:ext cx="1463039" cy="653143"/>
+            </a:xfrm>
+            <a:prstGeom prst="rect">
+              <a:avLst/>
+            </a:prstGeom>
+          </p:spPr>
+          <p:style>
+            <a:lnRef idx="2">
+              <a:schemeClr val="accent1">
+                <a:shade val="50000"/>
+              </a:schemeClr>
+            </a:lnRef>
+            <a:fillRef idx="1">
+              <a:schemeClr val="accent1"/>
+            </a:fillRef>
+            <a:effectRef idx="0">
+              <a:schemeClr val="accent1"/>
+            </a:effectRef>
+            <a:fontRef idx="minor">
+              <a:schemeClr val="lt1"/>
+            </a:fontRef>
+          </p:style>
+          <p:txBody>
+            <a:bodyPr rtlCol="0" anchor="ctr"/>
+            <a:lstStyle/>
+            <a:p>
+              <a:pPr algn="ctr"/>
+              <a:r>
+                <a:rPr lang="en-US" b="1" dirty="0" smtClean="0">
+                  <a:solidFill>
+                    <a:schemeClr val="bg1"/>
+                  </a:solidFill>
+                  <a:effectLst/>
+                  <a:latin typeface="Consolas" panose="020B0609020204030204" pitchFamily="49" charset="0"/>
+                </a:rPr>
+                <a:t>Caramel</a:t>
+              </a:r>
+              <a:endParaRPr lang="en-US" b="1" dirty="0">
+                <a:solidFill>
+                  <a:schemeClr val="bg1"/>
+                </a:solidFill>
+              </a:endParaRPr>
+            </a:p>
+          </p:txBody>
+        </p:sp>
+        <p:sp>
+          <p:nvSpPr>
+            <p:cNvPr id="14" name="Rectangle 13"/>
+            <p:cNvSpPr/>
+            <p:nvPr/>
+          </p:nvSpPr>
+          <p:spPr>
+            <a:xfrm>
+              <a:off x="5455917" y="3134975"/>
+              <a:ext cx="1463039" cy="653143"/>
+            </a:xfrm>
+            <a:prstGeom prst="rect">
+              <a:avLst/>
+            </a:prstGeom>
+          </p:spPr>
+          <p:style>
+            <a:lnRef idx="2">
+              <a:schemeClr val="accent1">
+                <a:shade val="50000"/>
+              </a:schemeClr>
+            </a:lnRef>
+            <a:fillRef idx="1">
+              <a:schemeClr val="accent1"/>
+            </a:fillRef>
+            <a:effectRef idx="0">
+              <a:schemeClr val="accent1"/>
+            </a:effectRef>
+            <a:fontRef idx="minor">
+              <a:schemeClr val="lt1"/>
+            </a:fontRef>
+          </p:style>
+          <p:txBody>
+            <a:bodyPr rtlCol="0" anchor="ctr"/>
+            <a:lstStyle/>
+            <a:p>
+              <a:pPr algn="ctr"/>
+              <a:r>
+                <a:rPr lang="en-US" b="1" dirty="0" smtClean="0">
+                  <a:solidFill>
+                    <a:schemeClr val="bg1"/>
+                  </a:solidFill>
+                  <a:effectLst/>
+                  <a:latin typeface="Consolas" panose="020B0609020204030204" pitchFamily="49" charset="0"/>
+                </a:rPr>
+                <a:t>Vanilla</a:t>
+              </a:r>
+              <a:endParaRPr lang="en-US" b="1" dirty="0">
+                <a:solidFill>
+                  <a:schemeClr val="bg1"/>
+                </a:solidFill>
+              </a:endParaRPr>
+            </a:p>
+          </p:txBody>
+        </p:sp>
+        <p:sp>
+          <p:nvSpPr>
+            <p:cNvPr id="15" name="Rectangle 14"/>
+            <p:cNvSpPr/>
+            <p:nvPr/>
+          </p:nvSpPr>
+          <p:spPr>
+            <a:xfrm>
+              <a:off x="6918956" y="3134975"/>
+              <a:ext cx="1841865" cy="653143"/>
+            </a:xfrm>
+            <a:prstGeom prst="rect">
+              <a:avLst/>
+            </a:prstGeom>
+          </p:spPr>
+          <p:style>
+            <a:lnRef idx="2">
+              <a:schemeClr val="accent1">
+                <a:shade val="50000"/>
+              </a:schemeClr>
+            </a:lnRef>
+            <a:fillRef idx="1">
+              <a:schemeClr val="accent1"/>
+            </a:fillRef>
+            <a:effectRef idx="0">
+              <a:schemeClr val="accent1"/>
+            </a:effectRef>
+            <a:fontRef idx="minor">
+              <a:schemeClr val="lt1"/>
+            </a:fontRef>
+          </p:style>
+          <p:txBody>
+            <a:bodyPr rtlCol="0" anchor="ctr"/>
+            <a:lstStyle/>
+            <a:p>
+              <a:pPr algn="ctr"/>
+              <a:r>
+                <a:rPr lang="en-US" b="1" dirty="0" smtClean="0">
+                  <a:solidFill>
+                    <a:schemeClr val="bg1"/>
+                  </a:solidFill>
+                  <a:effectLst/>
+                  <a:latin typeface="Consolas" panose="020B0609020204030204" pitchFamily="49" charset="0"/>
+                </a:rPr>
+                <a:t>Peanut Butter</a:t>
+              </a:r>
+              <a:endParaRPr lang="en-US" b="1" dirty="0">
+                <a:solidFill>
+                  <a:schemeClr val="bg1"/>
+                </a:solidFill>
+              </a:endParaRPr>
+            </a:p>
+          </p:txBody>
+        </p:sp>
+        <p:sp>
+          <p:nvSpPr>
+            <p:cNvPr id="16" name="Rectangle 15"/>
+            <p:cNvSpPr/>
+            <p:nvPr/>
+          </p:nvSpPr>
+          <p:spPr>
+            <a:xfrm>
+              <a:off x="2525098" y="3786904"/>
+              <a:ext cx="1463039" cy="653143"/>
+            </a:xfrm>
+            <a:prstGeom prst="rect">
+              <a:avLst/>
+            </a:prstGeom>
+          </p:spPr>
+          <p:style>
+            <a:lnRef idx="2">
+              <a:schemeClr val="accent2">
+                <a:shade val="50000"/>
+              </a:schemeClr>
+            </a:lnRef>
+            <a:fillRef idx="1">
+              <a:schemeClr val="accent2"/>
+            </a:fillRef>
+            <a:effectRef idx="0">
+              <a:schemeClr val="accent2"/>
+            </a:effectRef>
+            <a:fontRef idx="minor">
+              <a:schemeClr val="lt1"/>
+            </a:fontRef>
+          </p:style>
+          <p:txBody>
+            <a:bodyPr rtlCol="0" anchor="ctr"/>
+            <a:lstStyle/>
+            <a:p>
+              <a:pPr algn="ctr"/>
+              <a:r>
+                <a:rPr lang="en-US" b="1" dirty="0" smtClean="0">
+                  <a:solidFill>
+                    <a:schemeClr val="bg1"/>
+                  </a:solidFill>
+                  <a:effectLst/>
+                  <a:latin typeface="Consolas" panose="020B0609020204030204" pitchFamily="49" charset="0"/>
+                </a:rPr>
+                <a:t>false</a:t>
+              </a:r>
+              <a:endParaRPr lang="en-US" b="1" dirty="0">
+                <a:solidFill>
+                  <a:schemeClr val="bg1"/>
+                </a:solidFill>
+              </a:endParaRPr>
+            </a:p>
+          </p:txBody>
+        </p:sp>
+        <p:sp>
+          <p:nvSpPr>
+            <p:cNvPr id="17" name="Rectangle 16"/>
+            <p:cNvSpPr/>
+            <p:nvPr/>
+          </p:nvSpPr>
+          <p:spPr>
+            <a:xfrm>
+              <a:off x="3992877" y="3786904"/>
+              <a:ext cx="1463039" cy="653143"/>
+            </a:xfrm>
+            <a:prstGeom prst="rect">
+              <a:avLst/>
+            </a:prstGeom>
+          </p:spPr>
+          <p:style>
+            <a:lnRef idx="2">
+              <a:schemeClr val="accent2">
+                <a:shade val="50000"/>
+              </a:schemeClr>
+            </a:lnRef>
+            <a:fillRef idx="1">
+              <a:schemeClr val="accent2"/>
+            </a:fillRef>
+            <a:effectRef idx="0">
+              <a:schemeClr val="accent2"/>
+            </a:effectRef>
+            <a:fontRef idx="minor">
+              <a:schemeClr val="lt1"/>
+            </a:fontRef>
+          </p:style>
+          <p:txBody>
+            <a:bodyPr rtlCol="0" anchor="ctr"/>
+            <a:lstStyle/>
+            <a:p>
+              <a:pPr algn="ctr"/>
+              <a:r>
+                <a:rPr lang="en-US" b="1" dirty="0" smtClean="0">
+                  <a:solidFill>
+                    <a:schemeClr val="bg1"/>
+                  </a:solidFill>
+                  <a:effectLst/>
+                  <a:latin typeface="Consolas" panose="020B0609020204030204" pitchFamily="49" charset="0"/>
+                </a:rPr>
+                <a:t>false</a:t>
+              </a:r>
+              <a:endParaRPr lang="en-US" b="1" dirty="0">
+                <a:solidFill>
+                  <a:schemeClr val="bg1"/>
+                </a:solidFill>
+              </a:endParaRPr>
+            </a:p>
+          </p:txBody>
+        </p:sp>
+        <p:sp>
+          <p:nvSpPr>
+            <p:cNvPr id="18" name="Rectangle 17"/>
+            <p:cNvSpPr/>
+            <p:nvPr/>
+          </p:nvSpPr>
+          <p:spPr>
+            <a:xfrm>
+              <a:off x="5455917" y="3786904"/>
+              <a:ext cx="1463039" cy="653143"/>
+            </a:xfrm>
+            <a:prstGeom prst="rect">
+              <a:avLst/>
+            </a:prstGeom>
+          </p:spPr>
+          <p:style>
+            <a:lnRef idx="2">
+              <a:schemeClr val="accent2">
+                <a:shade val="50000"/>
+              </a:schemeClr>
+            </a:lnRef>
+            <a:fillRef idx="1">
+              <a:schemeClr val="accent2"/>
+            </a:fillRef>
+            <a:effectRef idx="0">
+              <a:schemeClr val="accent2"/>
+            </a:effectRef>
+            <a:fontRef idx="minor">
+              <a:schemeClr val="lt1"/>
+            </a:fontRef>
+          </p:style>
+          <p:txBody>
+            <a:bodyPr rtlCol="0" anchor="ctr"/>
+            <a:lstStyle/>
+            <a:p>
+              <a:pPr algn="ctr"/>
+              <a:r>
+                <a:rPr lang="en-US" b="1" dirty="0" smtClean="0">
+                  <a:solidFill>
+                    <a:schemeClr val="bg1"/>
+                  </a:solidFill>
+                  <a:effectLst/>
+                  <a:latin typeface="Consolas" panose="020B0609020204030204" pitchFamily="49" charset="0"/>
+                </a:rPr>
+                <a:t>false</a:t>
+              </a:r>
+              <a:endParaRPr lang="en-US" b="1" dirty="0">
+                <a:solidFill>
+                  <a:schemeClr val="bg1"/>
+                </a:solidFill>
+              </a:endParaRPr>
+            </a:p>
+          </p:txBody>
+        </p:sp>
+        <p:sp>
+          <p:nvSpPr>
+            <p:cNvPr id="19" name="Rectangle 18"/>
+            <p:cNvSpPr/>
+            <p:nvPr/>
+          </p:nvSpPr>
+          <p:spPr>
+            <a:xfrm>
+              <a:off x="6918956" y="3786904"/>
+              <a:ext cx="1841865" cy="653143"/>
+            </a:xfrm>
+            <a:prstGeom prst="rect">
+              <a:avLst/>
+            </a:prstGeom>
+          </p:spPr>
+          <p:style>
+            <a:lnRef idx="2">
+              <a:schemeClr val="accent2">
+                <a:shade val="50000"/>
+              </a:schemeClr>
+            </a:lnRef>
+            <a:fillRef idx="1">
+              <a:schemeClr val="accent2"/>
+            </a:fillRef>
+            <a:effectRef idx="0">
+              <a:schemeClr val="accent2"/>
+            </a:effectRef>
+            <a:fontRef idx="minor">
+              <a:schemeClr val="lt1"/>
+            </a:fontRef>
+          </p:style>
+          <p:txBody>
+            <a:bodyPr rtlCol="0" anchor="ctr"/>
+            <a:lstStyle/>
+            <a:p>
+              <a:pPr algn="ctr"/>
+              <a:r>
+                <a:rPr lang="en-US" b="1" dirty="0" smtClean="0">
+                  <a:solidFill>
+                    <a:schemeClr val="bg1"/>
+                  </a:solidFill>
+                  <a:effectLst/>
+                  <a:latin typeface="Consolas" panose="020B0609020204030204" pitchFamily="49" charset="0"/>
+                </a:rPr>
+                <a:t>false</a:t>
+              </a:r>
+              <a:endParaRPr lang="en-US" b="1" dirty="0">
+                <a:solidFill>
+                  <a:schemeClr val="bg1"/>
+                </a:solidFill>
+              </a:endParaRPr>
+            </a:p>
+          </p:txBody>
+        </p:sp>
+      </p:grpSp>
+      <p:sp>
+        <p:nvSpPr>
+          <p:cNvPr id="20" name="Rectangle 19"/>
+          <p:cNvSpPr/>
+          <p:nvPr/>
+        </p:nvSpPr>
+        <p:spPr>
+          <a:xfrm>
+            <a:off x="6060175" y="3701101"/>
+            <a:ext cx="6196250" cy="369332"/>
+          </a:xfrm>
+          <a:prstGeom prst="rect">
+            <a:avLst/>
+          </a:prstGeom>
+        </p:spPr>
+        <p:txBody>
+          <a:bodyPr wrap="square">
+            <a:spAutoFit/>
+          </a:bodyPr>
+          <a:lstStyle/>
+          <a:p>
+            <a:r>
+              <a:rPr lang="en-US" b="1" dirty="0" smtClean="0">
+                <a:effectLst/>
+                <a:latin typeface="Consolas" panose="020B0609020204030204" pitchFamily="49" charset="0"/>
+              </a:rPr>
+              <a:t>  0           1          2            3</a:t>
+            </a:r>
+            <a:endParaRPr lang="en-US" b="1" dirty="0">
+              <a:effectLst/>
+              <a:latin typeface="Consolas" panose="020B0609020204030204" pitchFamily="49" charset="0"/>
+            </a:endParaRPr>
+          </a:p>
+        </p:txBody>
+      </p:sp>
+      <p:sp>
+        <p:nvSpPr>
+          <p:cNvPr id="21" name="Rectangle 20"/>
+          <p:cNvSpPr/>
+          <p:nvPr/>
+        </p:nvSpPr>
+        <p:spPr>
+          <a:xfrm>
+            <a:off x="5293665" y="3716627"/>
+            <a:ext cx="745717" cy="338554"/>
+          </a:xfrm>
+          <a:prstGeom prst="rect">
+            <a:avLst/>
+          </a:prstGeom>
+        </p:spPr>
+        <p:txBody>
+          <a:bodyPr wrap="none">
+            <a:spAutoFit/>
+          </a:bodyPr>
+          <a:lstStyle/>
+          <a:p>
+            <a:r>
+              <a:rPr lang="en-US" sz="1600" b="1" dirty="0" smtClean="0">
+                <a:effectLst/>
+                <a:latin typeface="Consolas" panose="020B0609020204030204" pitchFamily="49" charset="0"/>
+              </a:rPr>
+              <a:t>INDEX</a:t>
+            </a:r>
+            <a:endParaRPr lang="en-US" b="1" dirty="0">
+              <a:effectLst/>
+              <a:latin typeface="Consolas" panose="020B0609020204030204" pitchFamily="49" charset="0"/>
+            </a:endParaRPr>
+          </a:p>
+        </p:txBody>
+      </p:sp>
+      <p:sp>
+        <p:nvSpPr>
+          <p:cNvPr id="22" name="Rectangle 21"/>
+          <p:cNvSpPr/>
+          <p:nvPr/>
+        </p:nvSpPr>
+        <p:spPr>
+          <a:xfrm>
+            <a:off x="679096" y="2027075"/>
+            <a:ext cx="4237057" cy="369332"/>
+          </a:xfrm>
+          <a:prstGeom prst="rect">
+            <a:avLst/>
+          </a:prstGeom>
+        </p:spPr>
+        <p:txBody>
+          <a:bodyPr wrap="none">
+            <a:spAutoFit/>
+          </a:bodyPr>
+          <a:lstStyle/>
+          <a:p>
+            <a:r>
+              <a:rPr lang="en-US" b="1" dirty="0">
+                <a:solidFill>
+                  <a:srgbClr val="386BC4"/>
+                </a:solidFill>
+                <a:latin typeface="Consolas" panose="020B0609020204030204" pitchFamily="49" charset="0"/>
+              </a:rPr>
+              <a:t>Map&lt;String, bool&gt; </a:t>
+            </a:r>
+            <a:r>
+              <a:rPr lang="en-US" b="1" dirty="0" err="1">
+                <a:solidFill>
+                  <a:srgbClr val="386BC4"/>
+                </a:solidFill>
+                <a:latin typeface="Consolas" panose="020B0609020204030204" pitchFamily="49" charset="0"/>
+              </a:rPr>
+              <a:t>mappedFlavours</a:t>
+            </a:r>
+            <a:endParaRPr lang="en-US" b="1" dirty="0">
+              <a:solidFill>
+                <a:srgbClr val="386BC4"/>
+              </a:solidFill>
+              <a:latin typeface="Consolas" panose="020B0609020204030204" pitchFamily="49" charset="0"/>
+            </a:endParaRPr>
+          </a:p>
+        </p:txBody>
+      </p:sp>
+      <p:sp>
+        <p:nvSpPr>
+          <p:cNvPr id="24" name="Rectangle 23"/>
+          <p:cNvSpPr/>
+          <p:nvPr/>
+        </p:nvSpPr>
+        <p:spPr>
+          <a:xfrm>
+            <a:off x="1794505" y="173754"/>
+            <a:ext cx="1467780" cy="653143"/>
+          </a:xfrm>
+          <a:prstGeom prst="rect">
+            <a:avLst/>
+          </a:prstGeom>
+        </p:spPr>
+        <p:style>
+          <a:lnRef idx="2">
+            <a:schemeClr val="accent1">
+              <a:shade val="50000"/>
+            </a:schemeClr>
+          </a:lnRef>
+          <a:fillRef idx="1">
+            <a:schemeClr val="accent1"/>
+          </a:fillRef>
+          <a:effectRef idx="0">
+            <a:schemeClr val="accent1"/>
+          </a:effectRef>
+          <a:fontRef idx="minor">
+            <a:schemeClr val="lt1"/>
+          </a:fontRef>
+        </p:style>
+        <p:txBody>
+          <a:bodyPr rtlCol="0" anchor="ctr"/>
+          <a:lstStyle/>
+          <a:p>
+            <a:pPr algn="ctr"/>
+            <a:endParaRPr lang="en-US" b="1" dirty="0">
+              <a:solidFill>
+                <a:schemeClr val="bg1"/>
+              </a:solidFill>
+            </a:endParaRPr>
+          </a:p>
+        </p:txBody>
+      </p:sp>
+      <p:sp>
+        <p:nvSpPr>
+          <p:cNvPr id="28" name="Rectangle 27"/>
+          <p:cNvSpPr/>
+          <p:nvPr/>
+        </p:nvSpPr>
+        <p:spPr>
+          <a:xfrm>
+            <a:off x="1794504" y="825683"/>
+            <a:ext cx="1467781" cy="653143"/>
+          </a:xfrm>
+          <a:prstGeom prst="rect">
+            <a:avLst/>
+          </a:prstGeom>
+        </p:spPr>
+        <p:style>
+          <a:lnRef idx="2">
+            <a:schemeClr val="accent2">
+              <a:shade val="50000"/>
+            </a:schemeClr>
+          </a:lnRef>
+          <a:fillRef idx="1">
+            <a:schemeClr val="accent2"/>
+          </a:fillRef>
+          <a:effectRef idx="0">
+            <a:schemeClr val="accent2"/>
+          </a:effectRef>
+          <a:fontRef idx="minor">
+            <a:schemeClr val="lt1"/>
+          </a:fontRef>
+        </p:style>
+        <p:txBody>
+          <a:bodyPr rtlCol="0" anchor="ctr"/>
+          <a:lstStyle/>
+          <a:p>
+            <a:pPr algn="ctr"/>
+            <a:endParaRPr lang="en-US" b="1" dirty="0">
+              <a:solidFill>
+                <a:schemeClr val="bg1"/>
+              </a:solidFill>
+            </a:endParaRPr>
+          </a:p>
+        </p:txBody>
+      </p:sp>
+      <p:sp>
+        <p:nvSpPr>
+          <p:cNvPr id="32" name="Rectangle 31"/>
+          <p:cNvSpPr/>
+          <p:nvPr/>
+        </p:nvSpPr>
+        <p:spPr>
+          <a:xfrm>
+            <a:off x="1107406" y="1528214"/>
+            <a:ext cx="817853" cy="369332"/>
+          </a:xfrm>
+          <a:prstGeom prst="rect">
+            <a:avLst/>
+          </a:prstGeom>
+        </p:spPr>
+        <p:txBody>
+          <a:bodyPr wrap="none">
+            <a:spAutoFit/>
+          </a:bodyPr>
+          <a:lstStyle/>
+          <a:p>
+            <a:r>
+              <a:rPr lang="en-US" b="1" dirty="0" smtClean="0">
+                <a:effectLst/>
+                <a:latin typeface="Consolas" panose="020B0609020204030204" pitchFamily="49" charset="0"/>
+              </a:rPr>
+              <a:t>INDEX</a:t>
+            </a:r>
+            <a:endParaRPr lang="en-US" b="1" dirty="0">
+              <a:effectLst/>
+              <a:latin typeface="Consolas" panose="020B0609020204030204" pitchFamily="49" charset="0"/>
+            </a:endParaRPr>
+          </a:p>
+        </p:txBody>
+      </p:sp>
+      <p:sp>
+        <p:nvSpPr>
+          <p:cNvPr id="33" name="Rectangle 32"/>
+          <p:cNvSpPr/>
+          <p:nvPr/>
+        </p:nvSpPr>
+        <p:spPr>
+          <a:xfrm>
+            <a:off x="2143388" y="1538394"/>
+            <a:ext cx="619305" cy="369332"/>
+          </a:xfrm>
+          <a:prstGeom prst="rect">
+            <a:avLst/>
+          </a:prstGeom>
+        </p:spPr>
+        <p:txBody>
+          <a:bodyPr wrap="square">
+            <a:spAutoFit/>
+          </a:bodyPr>
+          <a:lstStyle/>
+          <a:p>
+            <a:pPr algn="ctr"/>
+            <a:r>
+              <a:rPr lang="en-US" b="1" dirty="0" smtClean="0">
+                <a:effectLst/>
+                <a:latin typeface="Consolas" panose="020B0609020204030204" pitchFamily="49" charset="0"/>
+              </a:rPr>
+              <a:t>0</a:t>
+            </a:r>
+            <a:endParaRPr lang="en-US" b="1" dirty="0">
+              <a:effectLst/>
+              <a:latin typeface="Consolas" panose="020B0609020204030204" pitchFamily="49" charset="0"/>
+            </a:endParaRPr>
+          </a:p>
+        </p:txBody>
+      </p:sp>
+      <p:cxnSp>
+        <p:nvCxnSpPr>
+          <p:cNvPr id="34" name="Straight Arrow Connector 33"/>
+          <p:cNvCxnSpPr/>
+          <p:nvPr/>
+        </p:nvCxnSpPr>
+        <p:spPr>
+          <a:xfrm flipV="1">
+            <a:off x="3529839" y="802229"/>
+            <a:ext cx="2251394" cy="2206"/>
+          </a:xfrm>
+          <a:prstGeom prst="straightConnector1">
+            <a:avLst/>
+          </a:prstGeom>
+          <a:ln w="76200" cap="flat" cmpd="sng" algn="ctr">
+            <a:solidFill>
+              <a:srgbClr val="D0009A"/>
+            </a:solidFill>
+            <a:prstDash val="solid"/>
+            <a:round/>
+            <a:headEnd type="none" w="med" len="med"/>
+            <a:tailEnd type="arrow" w="med" len="med"/>
+          </a:ln>
+        </p:spPr>
+        <p:style>
+          <a:lnRef idx="0">
+            <a:scrgbClr r="0" g="0" b="0"/>
+          </a:lnRef>
+          <a:fillRef idx="0">
+            <a:scrgbClr r="0" g="0" b="0"/>
+          </a:fillRef>
+          <a:effectRef idx="0">
+            <a:scrgbClr r="0" g="0" b="0"/>
+          </a:effectRef>
+          <a:fontRef idx="minor">
+            <a:schemeClr val="tx1"/>
+          </a:fontRef>
+        </p:style>
+      </p:cxnSp>
+      <p:cxnSp>
+        <p:nvCxnSpPr>
+          <p:cNvPr id="35" name="Straight Arrow Connector 34"/>
+          <p:cNvCxnSpPr/>
+          <p:nvPr/>
+        </p:nvCxnSpPr>
+        <p:spPr>
+          <a:xfrm flipH="1">
+            <a:off x="8748573" y="1224999"/>
+            <a:ext cx="18116" cy="850091"/>
+          </a:xfrm>
+          <a:prstGeom prst="straightConnector1">
+            <a:avLst/>
+          </a:prstGeom>
+          <a:ln w="76200" cap="flat" cmpd="sng" algn="ctr">
+            <a:solidFill>
+              <a:srgbClr val="FF0000"/>
+            </a:solidFill>
+            <a:prstDash val="solid"/>
+            <a:round/>
+            <a:headEnd type="none" w="med" len="med"/>
+            <a:tailEnd type="arrow" w="med" len="med"/>
+          </a:ln>
+        </p:spPr>
+        <p:style>
+          <a:lnRef idx="0">
+            <a:scrgbClr r="0" g="0" b="0"/>
+          </a:lnRef>
+          <a:fillRef idx="0">
+            <a:scrgbClr r="0" g="0" b="0"/>
+          </a:fillRef>
+          <a:effectRef idx="0">
+            <a:scrgbClr r="0" g="0" b="0"/>
+          </a:effectRef>
+          <a:fontRef idx="minor">
+            <a:schemeClr val="tx1"/>
+          </a:fontRef>
+        </p:style>
+      </p:cxnSp>
+    </p:spTree>
+    <p:extLst>
+      <p:ext uri="{BB962C8B-B14F-4D97-AF65-F5344CB8AC3E}">
+        <p14:creationId xmlns:p14="http://schemas.microsoft.com/office/powerpoint/2010/main" val="715860076"/>
       </p:ext>
     </p:extLst>
   </p:cSld>

</xml_diff>

<commit_message>
Added Post Conversion Test Cases
</commit_message>
<xml_diff>
--- a/Multiple Selection Dialogue App.pptx
+++ b/Multiple Selection Dialogue App.pptx
@@ -35,6 +35,10 @@
     <p:sldId id="288" r:id="rId29"/>
     <p:sldId id="289" r:id="rId30"/>
     <p:sldId id="290" r:id="rId31"/>
+    <p:sldId id="291" r:id="rId32"/>
+    <p:sldId id="292" r:id="rId33"/>
+    <p:sldId id="293" r:id="rId34"/>
+    <p:sldId id="294" r:id="rId35"/>
   </p:sldIdLst>
   <p:sldSz cx="12192000" cy="6858000"/>
   <p:notesSz cx="6858000" cy="9144000"/>
@@ -182,6 +186,14 @@
             <p14:sldId id="290"/>
           </p14:sldIdLst>
         </p14:section>
+        <p14:section name="Post Conversion Test Cases" id="{0763F103-39C2-4D08-B991-F1EED663EFD6}">
+          <p14:sldIdLst>
+            <p14:sldId id="291"/>
+            <p14:sldId id="292"/>
+            <p14:sldId id="293"/>
+            <p14:sldId id="294"/>
+          </p14:sldIdLst>
+        </p14:section>
       </p14:sectionLst>
     </p:ext>
     <p:ext uri="{EFAFB233-063F-42B5-8137-9DF3F51BA10A}">
@@ -322,7 +334,7 @@
           <a:p>
             <a:fld id="{2426FBA7-C62C-4C26-9216-D61FA2779E86}" type="datetimeFigureOut">
               <a:rPr lang="en-US" smtClean="0"/>
-              <a:t>3/14/2021</a:t>
+              <a:t>3/16/2021</a:t>
             </a:fld>
             <a:endParaRPr lang="en-US"/>
           </a:p>
@@ -492,7 +504,7 @@
           <a:p>
             <a:fld id="{2426FBA7-C62C-4C26-9216-D61FA2779E86}" type="datetimeFigureOut">
               <a:rPr lang="en-US" smtClean="0"/>
-              <a:t>3/14/2021</a:t>
+              <a:t>3/16/2021</a:t>
             </a:fld>
             <a:endParaRPr lang="en-US"/>
           </a:p>
@@ -672,7 +684,7 @@
           <a:p>
             <a:fld id="{2426FBA7-C62C-4C26-9216-D61FA2779E86}" type="datetimeFigureOut">
               <a:rPr lang="en-US" smtClean="0"/>
-              <a:t>3/14/2021</a:t>
+              <a:t>3/16/2021</a:t>
             </a:fld>
             <a:endParaRPr lang="en-US"/>
           </a:p>
@@ -842,7 +854,7 @@
           <a:p>
             <a:fld id="{2426FBA7-C62C-4C26-9216-D61FA2779E86}" type="datetimeFigureOut">
               <a:rPr lang="en-US" smtClean="0"/>
-              <a:t>3/14/2021</a:t>
+              <a:t>3/16/2021</a:t>
             </a:fld>
             <a:endParaRPr lang="en-US"/>
           </a:p>
@@ -1088,7 +1100,7 @@
           <a:p>
             <a:fld id="{2426FBA7-C62C-4C26-9216-D61FA2779E86}" type="datetimeFigureOut">
               <a:rPr lang="en-US" smtClean="0"/>
-              <a:t>3/14/2021</a:t>
+              <a:t>3/16/2021</a:t>
             </a:fld>
             <a:endParaRPr lang="en-US"/>
           </a:p>
@@ -1320,7 +1332,7 @@
           <a:p>
             <a:fld id="{2426FBA7-C62C-4C26-9216-D61FA2779E86}" type="datetimeFigureOut">
               <a:rPr lang="en-US" smtClean="0"/>
-              <a:t>3/14/2021</a:t>
+              <a:t>3/16/2021</a:t>
             </a:fld>
             <a:endParaRPr lang="en-US"/>
           </a:p>
@@ -1687,7 +1699,7 @@
           <a:p>
             <a:fld id="{2426FBA7-C62C-4C26-9216-D61FA2779E86}" type="datetimeFigureOut">
               <a:rPr lang="en-US" smtClean="0"/>
-              <a:t>3/14/2021</a:t>
+              <a:t>3/16/2021</a:t>
             </a:fld>
             <a:endParaRPr lang="en-US"/>
           </a:p>
@@ -1805,7 +1817,7 @@
           <a:p>
             <a:fld id="{2426FBA7-C62C-4C26-9216-D61FA2779E86}" type="datetimeFigureOut">
               <a:rPr lang="en-US" smtClean="0"/>
-              <a:t>3/14/2021</a:t>
+              <a:t>3/16/2021</a:t>
             </a:fld>
             <a:endParaRPr lang="en-US"/>
           </a:p>
@@ -1900,7 +1912,7 @@
           <a:p>
             <a:fld id="{2426FBA7-C62C-4C26-9216-D61FA2779E86}" type="datetimeFigureOut">
               <a:rPr lang="en-US" smtClean="0"/>
-              <a:t>3/14/2021</a:t>
+              <a:t>3/16/2021</a:t>
             </a:fld>
             <a:endParaRPr lang="en-US"/>
           </a:p>
@@ -2177,7 +2189,7 @@
           <a:p>
             <a:fld id="{2426FBA7-C62C-4C26-9216-D61FA2779E86}" type="datetimeFigureOut">
               <a:rPr lang="en-US" smtClean="0"/>
-              <a:t>3/14/2021</a:t>
+              <a:t>3/16/2021</a:t>
             </a:fld>
             <a:endParaRPr lang="en-US"/>
           </a:p>
@@ -2430,7 +2442,7 @@
           <a:p>
             <a:fld id="{2426FBA7-C62C-4C26-9216-D61FA2779E86}" type="datetimeFigureOut">
               <a:rPr lang="en-US" smtClean="0"/>
-              <a:t>3/14/2021</a:t>
+              <a:t>3/16/2021</a:t>
             </a:fld>
             <a:endParaRPr lang="en-US"/>
           </a:p>
@@ -2643,7 +2655,7 @@
           <a:p>
             <a:fld id="{2426FBA7-C62C-4C26-9216-D61FA2779E86}" type="datetimeFigureOut">
               <a:rPr lang="en-US" smtClean="0"/>
-              <a:t>3/14/2021</a:t>
+              <a:t>3/16/2021</a:t>
             </a:fld>
             <a:endParaRPr lang="en-US"/>
           </a:p>
@@ -14224,15 +14236,6 @@
               </a:rPr>
               <a:t>Parameter.</a:t>
             </a:r>
-            <a:r>
-              <a:rPr lang="en-US" b="1" dirty="0" smtClean="0">
-                <a:solidFill>
-                  <a:srgbClr val="C00000"/>
-                </a:solidFill>
-                <a:latin typeface="Consolas" panose="020B0609020204030204" pitchFamily="49" charset="0"/>
-              </a:rPr>
-              <a:t/>
-            </a:r>
             <a:br>
               <a:rPr lang="en-US" b="1" dirty="0" smtClean="0">
                 <a:solidFill>
@@ -14334,15 +14337,6 @@
               </a:rPr>
               <a:t>.</a:t>
             </a:r>
-            <a:r>
-              <a:rPr lang="en-US" b="1" dirty="0" smtClean="0">
-                <a:solidFill>
-                  <a:srgbClr val="C00000"/>
-                </a:solidFill>
-                <a:latin typeface="Consolas" panose="020B0609020204030204" pitchFamily="49" charset="0"/>
-              </a:rPr>
-              <a:t/>
-            </a:r>
             <a:br>
               <a:rPr lang="en-US" b="1" dirty="0" smtClean="0">
                 <a:solidFill>
@@ -14389,25 +14383,7 @@
                 </a:solidFill>
                 <a:latin typeface="Consolas" panose="020B0609020204030204" pitchFamily="49" charset="0"/>
               </a:rPr>
-              <a:t>FUNCTION</a:t>
-            </a:r>
-            <a:r>
-              <a:rPr lang="en-US" sz="2800" b="1" dirty="0" smtClean="0">
-                <a:solidFill>
-                  <a:srgbClr val="C00000"/>
-                </a:solidFill>
-                <a:latin typeface="Consolas" panose="020B0609020204030204" pitchFamily="49" charset="0"/>
-              </a:rPr>
-              <a:t> </a:t>
-            </a:r>
-            <a:r>
-              <a:rPr lang="en-US" sz="2800" b="1" dirty="0" smtClean="0">
-                <a:solidFill>
-                  <a:srgbClr val="C00000"/>
-                </a:solidFill>
-                <a:latin typeface="Consolas" panose="020B0609020204030204" pitchFamily="49" charset="0"/>
-              </a:rPr>
-              <a:t>TEST CASES </a:t>
+              <a:t>FUNCTION TEST CASES </a:t>
             </a:r>
             <a:endParaRPr lang="en-US" sz="2800" b="1" dirty="0">
               <a:solidFill>
@@ -14750,11 +14726,7 @@
             </a:r>
             <a:r>
               <a:rPr lang="en-US" sz="2400" b="1" dirty="0" smtClean="0"/>
-              <a:t>(List&lt;String flavours</a:t>
-            </a:r>
-            <a:r>
-              <a:rPr lang="en-US" sz="2400" b="1" dirty="0" smtClean="0"/>
-              <a:t>) </a:t>
+              <a:t>(List&lt;String flavours) </a:t>
             </a:r>
             <a:endParaRPr lang="en-US" sz="2400" b="1" dirty="0"/>
           </a:p>
@@ -14832,12 +14804,6 @@
               </a:rPr>
               <a:t>X</a:t>
             </a:r>
-            <a:endParaRPr lang="en-US" sz="6000" b="1" dirty="0">
-              <a:solidFill>
-                <a:srgbClr val="C00000"/>
-              </a:solidFill>
-              <a:latin typeface="Consolas" panose="020B0609020204030204" pitchFamily="49" charset="0"/>
-            </a:endParaRPr>
           </a:p>
         </p:txBody>
       </p:sp>
@@ -15274,11 +15240,7 @@
             </a:r>
             <a:r>
               <a:rPr lang="en-US" sz="2400" b="1" dirty="0" smtClean="0"/>
-              <a:t>(List&lt;String flavours</a:t>
-            </a:r>
-            <a:r>
-              <a:rPr lang="en-US" sz="2400" b="1" dirty="0" smtClean="0"/>
-              <a:t>) </a:t>
+              <a:t>(List&lt;String flavours) </a:t>
             </a:r>
             <a:endParaRPr lang="en-US" sz="2400" b="1" dirty="0"/>
           </a:p>
@@ -15356,12 +15318,6 @@
               </a:rPr>
               <a:t>X</a:t>
             </a:r>
-            <a:endParaRPr lang="en-US" sz="6000" b="1" dirty="0">
-              <a:solidFill>
-                <a:srgbClr val="C00000"/>
-              </a:solidFill>
-              <a:latin typeface="Consolas" panose="020B0609020204030204" pitchFamily="49" charset="0"/>
-            </a:endParaRPr>
           </a:p>
         </p:txBody>
       </p:sp>
@@ -15522,11 +15478,7 @@
             </a:r>
             <a:r>
               <a:rPr lang="en-US" sz="2400" b="1" dirty="0" smtClean="0"/>
-              <a:t>(List&lt;String flavours</a:t>
-            </a:r>
-            <a:r>
-              <a:rPr lang="en-US" sz="2400" b="1" dirty="0" smtClean="0"/>
-              <a:t>) </a:t>
+              <a:t>(List&lt;String flavours) </a:t>
             </a:r>
             <a:endParaRPr lang="en-US" sz="2400" b="1" dirty="0"/>
           </a:p>
@@ -17812,11 +17764,7 @@
             </a:r>
             <a:r>
               <a:rPr lang="en-US" sz="2400" b="1" dirty="0" smtClean="0"/>
-              <a:t>(List&lt;String flavours</a:t>
-            </a:r>
-            <a:r>
-              <a:rPr lang="en-US" sz="2400" b="1" dirty="0" smtClean="0"/>
-              <a:t>) </a:t>
+              <a:t>(List&lt;String flavours) </a:t>
             </a:r>
             <a:endParaRPr lang="en-US" sz="2400" b="1" dirty="0"/>
           </a:p>
@@ -18676,6 +18624,4518 @@
     <p:extLst>
       <p:ext uri="{BB962C8B-B14F-4D97-AF65-F5344CB8AC3E}">
         <p14:creationId xmlns:p14="http://schemas.microsoft.com/office/powerpoint/2010/main" val="715860076"/>
+      </p:ext>
+    </p:extLst>
+  </p:cSld>
+  <p:clrMapOvr>
+    <a:masterClrMapping/>
+  </p:clrMapOvr>
+  <p:timing>
+    <p:tnLst>
+      <p:par>
+        <p:cTn id="1" dur="indefinite" restart="never" nodeType="tmRoot"/>
+      </p:par>
+    </p:tnLst>
+  </p:timing>
+</p:sld>
+</file>
+
+<file path=ppt/slides/slide31.xml><?xml version="1.0" encoding="utf-8"?>
+<p:sld xmlns:a="http://schemas.openxmlformats.org/drawingml/2006/main" xmlns:r="http://schemas.openxmlformats.org/officeDocument/2006/relationships" xmlns:p="http://schemas.openxmlformats.org/presentationml/2006/main">
+  <p:cSld>
+    <p:spTree>
+      <p:nvGrpSpPr>
+        <p:cNvPr id="1" name=""/>
+        <p:cNvGrpSpPr/>
+        <p:nvPr/>
+      </p:nvGrpSpPr>
+      <p:grpSpPr>
+        <a:xfrm>
+          <a:off x="0" y="0"/>
+          <a:ext cx="0" cy="0"/>
+          <a:chOff x="0" y="0"/>
+          <a:chExt cx="0" cy="0"/>
+        </a:xfrm>
+      </p:grpSpPr>
+      <p:sp>
+        <p:nvSpPr>
+          <p:cNvPr id="4" name="Rounded Rectangle 3"/>
+          <p:cNvSpPr/>
+          <p:nvPr/>
+        </p:nvSpPr>
+        <p:spPr>
+          <a:xfrm>
+            <a:off x="354352" y="262423"/>
+            <a:ext cx="3975118" cy="762057"/>
+          </a:xfrm>
+          <a:prstGeom prst="roundRect">
+            <a:avLst/>
+          </a:prstGeom>
+          <a:solidFill>
+            <a:srgbClr val="FF0000"/>
+          </a:solidFill>
+          <a:ln>
+            <a:noFill/>
+          </a:ln>
+        </p:spPr>
+        <p:style>
+          <a:lnRef idx="2">
+            <a:schemeClr val="accent1">
+              <a:shade val="50000"/>
+            </a:schemeClr>
+          </a:lnRef>
+          <a:fillRef idx="1">
+            <a:schemeClr val="accent1"/>
+          </a:fillRef>
+          <a:effectRef idx="0">
+            <a:schemeClr val="accent1"/>
+          </a:effectRef>
+          <a:fontRef idx="minor">
+            <a:schemeClr val="lt1"/>
+          </a:fontRef>
+        </p:style>
+        <p:txBody>
+          <a:bodyPr rtlCol="0" anchor="ctr"/>
+          <a:lstStyle/>
+          <a:p>
+            <a:pPr algn="ctr"/>
+            <a:r>
+              <a:rPr lang="en-US" sz="2000" b="1" dirty="0" err="1" smtClean="0"/>
+              <a:t>convertToMap</a:t>
+            </a:r>
+            <a:r>
+              <a:rPr lang="en-US" sz="2000" b="1" dirty="0" smtClean="0"/>
+              <a:t>(List&lt;String flavours)</a:t>
+            </a:r>
+            <a:endParaRPr lang="en-US" sz="2000" b="1" dirty="0"/>
+          </a:p>
+        </p:txBody>
+      </p:sp>
+      <p:sp>
+        <p:nvSpPr>
+          <p:cNvPr id="5" name="Rectangle 4"/>
+          <p:cNvSpPr/>
+          <p:nvPr/>
+        </p:nvSpPr>
+        <p:spPr>
+          <a:xfrm>
+            <a:off x="265689" y="5128910"/>
+            <a:ext cx="6714112" cy="1754326"/>
+          </a:xfrm>
+          <a:prstGeom prst="rect">
+            <a:avLst/>
+          </a:prstGeom>
+        </p:spPr>
+        <p:txBody>
+          <a:bodyPr wrap="square">
+            <a:spAutoFit/>
+          </a:bodyPr>
+          <a:lstStyle/>
+          <a:p>
+            <a:pPr marL="342900" indent="-342900">
+              <a:buFont typeface="+mj-lt"/>
+              <a:buAutoNum type="arabicPeriod"/>
+            </a:pPr>
+            <a:r>
+              <a:rPr lang="en-US" b="1" dirty="0" err="1" smtClean="0">
+                <a:solidFill>
+                  <a:srgbClr val="C00000"/>
+                </a:solidFill>
+                <a:latin typeface="Consolas" panose="020B0609020204030204" pitchFamily="49" charset="0"/>
+              </a:rPr>
+              <a:t>mappedFlavour</a:t>
+            </a:r>
+            <a:r>
+              <a:rPr lang="en-US" b="1" dirty="0" smtClean="0">
+                <a:solidFill>
+                  <a:srgbClr val="C00000"/>
+                </a:solidFill>
+                <a:latin typeface="Consolas" panose="020B0609020204030204" pitchFamily="49" charset="0"/>
+              </a:rPr>
+              <a:t> </a:t>
+            </a:r>
+            <a:r>
+              <a:rPr lang="en-US" b="1" dirty="0">
+                <a:solidFill>
+                  <a:srgbClr val="C00000"/>
+                </a:solidFill>
+                <a:latin typeface="Consolas" panose="020B0609020204030204" pitchFamily="49" charset="0"/>
+              </a:rPr>
+              <a:t>has no key </a:t>
+            </a:r>
+            <a:r>
+              <a:rPr lang="en-US" b="1" dirty="0" smtClean="0">
+                <a:solidFill>
+                  <a:srgbClr val="C00000"/>
+                </a:solidFill>
+                <a:latin typeface="Consolas" panose="020B0609020204030204" pitchFamily="49" charset="0"/>
+              </a:rPr>
+              <a:t>Cherry.</a:t>
+            </a:r>
+            <a:br>
+              <a:rPr lang="en-US" b="1" dirty="0" smtClean="0">
+                <a:solidFill>
+                  <a:srgbClr val="C00000"/>
+                </a:solidFill>
+                <a:latin typeface="Consolas" panose="020B0609020204030204" pitchFamily="49" charset="0"/>
+              </a:rPr>
+            </a:br>
+            <a:endParaRPr lang="en-US" b="1" dirty="0" smtClean="0">
+              <a:solidFill>
+                <a:srgbClr val="C00000"/>
+              </a:solidFill>
+              <a:latin typeface="Consolas" panose="020B0609020204030204" pitchFamily="49" charset="0"/>
+            </a:endParaRPr>
+          </a:p>
+          <a:p>
+            <a:pPr marL="342900" indent="-342900">
+              <a:buFont typeface="+mj-lt"/>
+              <a:buAutoNum type="arabicPeriod"/>
+            </a:pPr>
+            <a:r>
+              <a:rPr lang="en-US" b="1" dirty="0" err="1" smtClean="0">
+                <a:solidFill>
+                  <a:srgbClr val="C00000"/>
+                </a:solidFill>
+                <a:latin typeface="Consolas" panose="020B0609020204030204" pitchFamily="49" charset="0"/>
+              </a:rPr>
+              <a:t>mappedFlavour</a:t>
+            </a:r>
+            <a:r>
+              <a:rPr lang="en-US" b="1" dirty="0" smtClean="0">
+                <a:solidFill>
+                  <a:srgbClr val="C00000"/>
+                </a:solidFill>
+                <a:latin typeface="Consolas" panose="020B0609020204030204" pitchFamily="49" charset="0"/>
+              </a:rPr>
+              <a:t> </a:t>
+            </a:r>
+            <a:r>
+              <a:rPr lang="en-US" b="1" dirty="0">
+                <a:solidFill>
+                  <a:srgbClr val="C00000"/>
+                </a:solidFill>
+                <a:latin typeface="Consolas" panose="020B0609020204030204" pitchFamily="49" charset="0"/>
+              </a:rPr>
+              <a:t>has no value </a:t>
+            </a:r>
+            <a:r>
+              <a:rPr lang="en-US" b="1" dirty="0" smtClean="0">
+                <a:solidFill>
+                  <a:srgbClr val="C00000"/>
+                </a:solidFill>
+                <a:latin typeface="Consolas" panose="020B0609020204030204" pitchFamily="49" charset="0"/>
+              </a:rPr>
+              <a:t>0.</a:t>
+            </a:r>
+            <a:br>
+              <a:rPr lang="en-US" b="1" dirty="0" smtClean="0">
+                <a:solidFill>
+                  <a:srgbClr val="C00000"/>
+                </a:solidFill>
+                <a:latin typeface="Consolas" panose="020B0609020204030204" pitchFamily="49" charset="0"/>
+              </a:rPr>
+            </a:br>
+            <a:endParaRPr lang="en-US" b="1" dirty="0">
+              <a:solidFill>
+                <a:srgbClr val="C00000"/>
+              </a:solidFill>
+              <a:latin typeface="Consolas" panose="020B0609020204030204" pitchFamily="49" charset="0"/>
+            </a:endParaRPr>
+          </a:p>
+          <a:p>
+            <a:pPr marL="342900" indent="-342900">
+              <a:buFont typeface="+mj-lt"/>
+              <a:buAutoNum type="arabicPeriod"/>
+            </a:pPr>
+            <a:r>
+              <a:rPr lang="en-US" b="1" dirty="0" err="1" smtClean="0">
+                <a:solidFill>
+                  <a:srgbClr val="C00000"/>
+                </a:solidFill>
+                <a:latin typeface="Consolas" panose="020B0609020204030204" pitchFamily="49" charset="0"/>
+              </a:rPr>
+              <a:t>mappedFlavour</a:t>
+            </a:r>
+            <a:r>
+              <a:rPr lang="en-US" b="1" dirty="0" smtClean="0">
+                <a:solidFill>
+                  <a:srgbClr val="C00000"/>
+                </a:solidFill>
+                <a:latin typeface="Consolas" panose="020B0609020204030204" pitchFamily="49" charset="0"/>
+              </a:rPr>
+              <a:t> </a:t>
+            </a:r>
+            <a:r>
+              <a:rPr lang="en-US" b="1" dirty="0">
+                <a:solidFill>
+                  <a:srgbClr val="C00000"/>
+                </a:solidFill>
+                <a:latin typeface="Consolas" panose="020B0609020204030204" pitchFamily="49" charset="0"/>
+              </a:rPr>
+              <a:t>has no blank entries.</a:t>
+            </a:r>
+            <a:r>
+              <a:rPr lang="en-US" b="1" dirty="0" smtClean="0">
+                <a:solidFill>
+                  <a:srgbClr val="C00000"/>
+                </a:solidFill>
+                <a:latin typeface="Consolas" panose="020B0609020204030204" pitchFamily="49" charset="0"/>
+              </a:rPr>
+              <a:t/>
+            </a:r>
+            <a:br>
+              <a:rPr lang="en-US" b="1" dirty="0" smtClean="0">
+                <a:solidFill>
+                  <a:srgbClr val="C00000"/>
+                </a:solidFill>
+                <a:latin typeface="Consolas" panose="020B0609020204030204" pitchFamily="49" charset="0"/>
+              </a:rPr>
+            </a:br>
+            <a:endParaRPr lang="en-US" b="1" dirty="0" smtClean="0">
+              <a:solidFill>
+                <a:srgbClr val="C00000"/>
+              </a:solidFill>
+              <a:latin typeface="Consolas" panose="020B0609020204030204" pitchFamily="49" charset="0"/>
+            </a:endParaRPr>
+          </a:p>
+        </p:txBody>
+      </p:sp>
+      <p:sp>
+        <p:nvSpPr>
+          <p:cNvPr id="6" name="Rectangle 5"/>
+          <p:cNvSpPr/>
+          <p:nvPr/>
+        </p:nvSpPr>
+        <p:spPr>
+          <a:xfrm>
+            <a:off x="3861981" y="4229072"/>
+            <a:ext cx="5277396" cy="523220"/>
+          </a:xfrm>
+          <a:prstGeom prst="rect">
+            <a:avLst/>
+          </a:prstGeom>
+        </p:spPr>
+        <p:txBody>
+          <a:bodyPr wrap="square">
+            <a:spAutoFit/>
+          </a:bodyPr>
+          <a:lstStyle/>
+          <a:p>
+            <a:pPr algn="ctr"/>
+            <a:r>
+              <a:rPr lang="en-US" sz="2800" b="1" dirty="0" smtClean="0">
+                <a:solidFill>
+                  <a:srgbClr val="C00000"/>
+                </a:solidFill>
+                <a:latin typeface="Consolas" panose="020B0609020204030204" pitchFamily="49" charset="0"/>
+              </a:rPr>
+              <a:t>POST CONVERSION TEST CASES </a:t>
+            </a:r>
+            <a:endParaRPr lang="en-US" sz="2800" b="1" dirty="0">
+              <a:solidFill>
+                <a:srgbClr val="C00000"/>
+              </a:solidFill>
+              <a:latin typeface="Consolas" panose="020B0609020204030204" pitchFamily="49" charset="0"/>
+            </a:endParaRPr>
+          </a:p>
+        </p:txBody>
+      </p:sp>
+      <p:sp>
+        <p:nvSpPr>
+          <p:cNvPr id="12" name="Rectangle 11"/>
+          <p:cNvSpPr/>
+          <p:nvPr/>
+        </p:nvSpPr>
+        <p:spPr>
+          <a:xfrm>
+            <a:off x="7091575" y="1991296"/>
+            <a:ext cx="4237057" cy="369332"/>
+          </a:xfrm>
+          <a:prstGeom prst="rect">
+            <a:avLst/>
+          </a:prstGeom>
+        </p:spPr>
+        <p:txBody>
+          <a:bodyPr wrap="none">
+            <a:spAutoFit/>
+          </a:bodyPr>
+          <a:lstStyle/>
+          <a:p>
+            <a:r>
+              <a:rPr lang="en-US" b="1" dirty="0">
+                <a:solidFill>
+                  <a:srgbClr val="386BC4"/>
+                </a:solidFill>
+                <a:latin typeface="Consolas" panose="020B0609020204030204" pitchFamily="49" charset="0"/>
+              </a:rPr>
+              <a:t>Map&lt;String, bool&gt; </a:t>
+            </a:r>
+            <a:r>
+              <a:rPr lang="en-US" b="1" dirty="0" err="1">
+                <a:solidFill>
+                  <a:srgbClr val="386BC4"/>
+                </a:solidFill>
+                <a:latin typeface="Consolas" panose="020B0609020204030204" pitchFamily="49" charset="0"/>
+              </a:rPr>
+              <a:t>mappedFlavours</a:t>
+            </a:r>
+            <a:endParaRPr lang="en-US" b="1" dirty="0">
+              <a:solidFill>
+                <a:srgbClr val="386BC4"/>
+              </a:solidFill>
+              <a:latin typeface="Consolas" panose="020B0609020204030204" pitchFamily="49" charset="0"/>
+            </a:endParaRPr>
+          </a:p>
+        </p:txBody>
+      </p:sp>
+      <p:grpSp>
+        <p:nvGrpSpPr>
+          <p:cNvPr id="13" name="Group 12"/>
+          <p:cNvGrpSpPr/>
+          <p:nvPr/>
+        </p:nvGrpSpPr>
+        <p:grpSpPr>
+          <a:xfrm>
+            <a:off x="5769160" y="218961"/>
+            <a:ext cx="6235723" cy="1305072"/>
+            <a:chOff x="2525098" y="3134975"/>
+            <a:chExt cx="6235723" cy="1305072"/>
+          </a:xfrm>
+        </p:grpSpPr>
+        <p:sp>
+          <p:nvSpPr>
+            <p:cNvPr id="14" name="Rectangle 13"/>
+            <p:cNvSpPr/>
+            <p:nvPr/>
+          </p:nvSpPr>
+          <p:spPr>
+            <a:xfrm>
+              <a:off x="2525099" y="3134975"/>
+              <a:ext cx="1467780" cy="653143"/>
+            </a:xfrm>
+            <a:prstGeom prst="rect">
+              <a:avLst/>
+            </a:prstGeom>
+          </p:spPr>
+          <p:style>
+            <a:lnRef idx="2">
+              <a:schemeClr val="accent1">
+                <a:shade val="50000"/>
+              </a:schemeClr>
+            </a:lnRef>
+            <a:fillRef idx="1">
+              <a:schemeClr val="accent1"/>
+            </a:fillRef>
+            <a:effectRef idx="0">
+              <a:schemeClr val="accent1"/>
+            </a:effectRef>
+            <a:fontRef idx="minor">
+              <a:schemeClr val="lt1"/>
+            </a:fontRef>
+          </p:style>
+          <p:txBody>
+            <a:bodyPr rtlCol="0" anchor="ctr"/>
+            <a:lstStyle/>
+            <a:p>
+              <a:pPr algn="ctr"/>
+              <a:r>
+                <a:rPr lang="en-US" b="1" dirty="0" smtClean="0">
+                  <a:solidFill>
+                    <a:schemeClr val="bg1"/>
+                  </a:solidFill>
+                  <a:effectLst/>
+                  <a:latin typeface="Consolas" panose="020B0609020204030204" pitchFamily="49" charset="0"/>
+                </a:rPr>
+                <a:t>Chocolate</a:t>
+              </a:r>
+              <a:endParaRPr lang="en-US" b="1" dirty="0">
+                <a:solidFill>
+                  <a:schemeClr val="bg1"/>
+                </a:solidFill>
+              </a:endParaRPr>
+            </a:p>
+          </p:txBody>
+        </p:sp>
+        <p:sp>
+          <p:nvSpPr>
+            <p:cNvPr id="15" name="Rectangle 14"/>
+            <p:cNvSpPr/>
+            <p:nvPr/>
+          </p:nvSpPr>
+          <p:spPr>
+            <a:xfrm>
+              <a:off x="3992878" y="3134975"/>
+              <a:ext cx="1463039" cy="653143"/>
+            </a:xfrm>
+            <a:prstGeom prst="rect">
+              <a:avLst/>
+            </a:prstGeom>
+          </p:spPr>
+          <p:style>
+            <a:lnRef idx="2">
+              <a:schemeClr val="accent1">
+                <a:shade val="50000"/>
+              </a:schemeClr>
+            </a:lnRef>
+            <a:fillRef idx="1">
+              <a:schemeClr val="accent1"/>
+            </a:fillRef>
+            <a:effectRef idx="0">
+              <a:schemeClr val="accent1"/>
+            </a:effectRef>
+            <a:fontRef idx="minor">
+              <a:schemeClr val="lt1"/>
+            </a:fontRef>
+          </p:style>
+          <p:txBody>
+            <a:bodyPr rtlCol="0" anchor="ctr"/>
+            <a:lstStyle/>
+            <a:p>
+              <a:pPr algn="ctr"/>
+              <a:r>
+                <a:rPr lang="en-US" b="1" dirty="0" smtClean="0">
+                  <a:solidFill>
+                    <a:schemeClr val="bg1"/>
+                  </a:solidFill>
+                  <a:effectLst/>
+                  <a:latin typeface="Consolas" panose="020B0609020204030204" pitchFamily="49" charset="0"/>
+                </a:rPr>
+                <a:t>Caramel</a:t>
+              </a:r>
+              <a:endParaRPr lang="en-US" b="1" dirty="0">
+                <a:solidFill>
+                  <a:schemeClr val="bg1"/>
+                </a:solidFill>
+              </a:endParaRPr>
+            </a:p>
+          </p:txBody>
+        </p:sp>
+        <p:sp>
+          <p:nvSpPr>
+            <p:cNvPr id="16" name="Rectangle 15"/>
+            <p:cNvSpPr/>
+            <p:nvPr/>
+          </p:nvSpPr>
+          <p:spPr>
+            <a:xfrm>
+              <a:off x="5455917" y="3134975"/>
+              <a:ext cx="1463039" cy="653143"/>
+            </a:xfrm>
+            <a:prstGeom prst="rect">
+              <a:avLst/>
+            </a:prstGeom>
+          </p:spPr>
+          <p:style>
+            <a:lnRef idx="2">
+              <a:schemeClr val="accent1">
+                <a:shade val="50000"/>
+              </a:schemeClr>
+            </a:lnRef>
+            <a:fillRef idx="1">
+              <a:schemeClr val="accent1"/>
+            </a:fillRef>
+            <a:effectRef idx="0">
+              <a:schemeClr val="accent1"/>
+            </a:effectRef>
+            <a:fontRef idx="minor">
+              <a:schemeClr val="lt1"/>
+            </a:fontRef>
+          </p:style>
+          <p:txBody>
+            <a:bodyPr rtlCol="0" anchor="ctr"/>
+            <a:lstStyle/>
+            <a:p>
+              <a:pPr algn="ctr"/>
+              <a:r>
+                <a:rPr lang="en-US" b="1" dirty="0" smtClean="0">
+                  <a:solidFill>
+                    <a:schemeClr val="bg1"/>
+                  </a:solidFill>
+                  <a:effectLst/>
+                  <a:latin typeface="Consolas" panose="020B0609020204030204" pitchFamily="49" charset="0"/>
+                </a:rPr>
+                <a:t>Vanilla</a:t>
+              </a:r>
+              <a:endParaRPr lang="en-US" b="1" dirty="0">
+                <a:solidFill>
+                  <a:schemeClr val="bg1"/>
+                </a:solidFill>
+              </a:endParaRPr>
+            </a:p>
+          </p:txBody>
+        </p:sp>
+        <p:sp>
+          <p:nvSpPr>
+            <p:cNvPr id="17" name="Rectangle 16"/>
+            <p:cNvSpPr/>
+            <p:nvPr/>
+          </p:nvSpPr>
+          <p:spPr>
+            <a:xfrm>
+              <a:off x="6918956" y="3134975"/>
+              <a:ext cx="1841865" cy="653143"/>
+            </a:xfrm>
+            <a:prstGeom prst="rect">
+              <a:avLst/>
+            </a:prstGeom>
+          </p:spPr>
+          <p:style>
+            <a:lnRef idx="2">
+              <a:schemeClr val="accent1">
+                <a:shade val="50000"/>
+              </a:schemeClr>
+            </a:lnRef>
+            <a:fillRef idx="1">
+              <a:schemeClr val="accent1"/>
+            </a:fillRef>
+            <a:effectRef idx="0">
+              <a:schemeClr val="accent1"/>
+            </a:effectRef>
+            <a:fontRef idx="minor">
+              <a:schemeClr val="lt1"/>
+            </a:fontRef>
+          </p:style>
+          <p:txBody>
+            <a:bodyPr rtlCol="0" anchor="ctr"/>
+            <a:lstStyle/>
+            <a:p>
+              <a:pPr algn="ctr"/>
+              <a:r>
+                <a:rPr lang="en-US" b="1" dirty="0" smtClean="0">
+                  <a:solidFill>
+                    <a:schemeClr val="bg1"/>
+                  </a:solidFill>
+                  <a:effectLst/>
+                  <a:latin typeface="Consolas" panose="020B0609020204030204" pitchFamily="49" charset="0"/>
+                </a:rPr>
+                <a:t>Peanut Butter</a:t>
+              </a:r>
+              <a:endParaRPr lang="en-US" b="1" dirty="0">
+                <a:solidFill>
+                  <a:schemeClr val="bg1"/>
+                </a:solidFill>
+              </a:endParaRPr>
+            </a:p>
+          </p:txBody>
+        </p:sp>
+        <p:sp>
+          <p:nvSpPr>
+            <p:cNvPr id="18" name="Rectangle 17"/>
+            <p:cNvSpPr/>
+            <p:nvPr/>
+          </p:nvSpPr>
+          <p:spPr>
+            <a:xfrm>
+              <a:off x="2525098" y="3786904"/>
+              <a:ext cx="1463039" cy="653143"/>
+            </a:xfrm>
+            <a:prstGeom prst="rect">
+              <a:avLst/>
+            </a:prstGeom>
+          </p:spPr>
+          <p:style>
+            <a:lnRef idx="2">
+              <a:schemeClr val="accent2">
+                <a:shade val="50000"/>
+              </a:schemeClr>
+            </a:lnRef>
+            <a:fillRef idx="1">
+              <a:schemeClr val="accent2"/>
+            </a:fillRef>
+            <a:effectRef idx="0">
+              <a:schemeClr val="accent2"/>
+            </a:effectRef>
+            <a:fontRef idx="minor">
+              <a:schemeClr val="lt1"/>
+            </a:fontRef>
+          </p:style>
+          <p:txBody>
+            <a:bodyPr rtlCol="0" anchor="ctr"/>
+            <a:lstStyle/>
+            <a:p>
+              <a:pPr algn="ctr"/>
+              <a:r>
+                <a:rPr lang="en-US" b="1" dirty="0" smtClean="0">
+                  <a:solidFill>
+                    <a:schemeClr val="bg1"/>
+                  </a:solidFill>
+                  <a:effectLst/>
+                  <a:latin typeface="Consolas" panose="020B0609020204030204" pitchFamily="49" charset="0"/>
+                </a:rPr>
+                <a:t>false</a:t>
+              </a:r>
+              <a:endParaRPr lang="en-US" b="1" dirty="0">
+                <a:solidFill>
+                  <a:schemeClr val="bg1"/>
+                </a:solidFill>
+              </a:endParaRPr>
+            </a:p>
+          </p:txBody>
+        </p:sp>
+        <p:sp>
+          <p:nvSpPr>
+            <p:cNvPr id="19" name="Rectangle 18"/>
+            <p:cNvSpPr/>
+            <p:nvPr/>
+          </p:nvSpPr>
+          <p:spPr>
+            <a:xfrm>
+              <a:off x="3992877" y="3786904"/>
+              <a:ext cx="1463039" cy="653143"/>
+            </a:xfrm>
+            <a:prstGeom prst="rect">
+              <a:avLst/>
+            </a:prstGeom>
+          </p:spPr>
+          <p:style>
+            <a:lnRef idx="2">
+              <a:schemeClr val="accent2">
+                <a:shade val="50000"/>
+              </a:schemeClr>
+            </a:lnRef>
+            <a:fillRef idx="1">
+              <a:schemeClr val="accent2"/>
+            </a:fillRef>
+            <a:effectRef idx="0">
+              <a:schemeClr val="accent2"/>
+            </a:effectRef>
+            <a:fontRef idx="minor">
+              <a:schemeClr val="lt1"/>
+            </a:fontRef>
+          </p:style>
+          <p:txBody>
+            <a:bodyPr rtlCol="0" anchor="ctr"/>
+            <a:lstStyle/>
+            <a:p>
+              <a:pPr algn="ctr"/>
+              <a:r>
+                <a:rPr lang="en-US" b="1" dirty="0" smtClean="0">
+                  <a:solidFill>
+                    <a:schemeClr val="bg1"/>
+                  </a:solidFill>
+                  <a:effectLst/>
+                  <a:latin typeface="Consolas" panose="020B0609020204030204" pitchFamily="49" charset="0"/>
+                </a:rPr>
+                <a:t>false</a:t>
+              </a:r>
+              <a:endParaRPr lang="en-US" b="1" dirty="0">
+                <a:solidFill>
+                  <a:schemeClr val="bg1"/>
+                </a:solidFill>
+              </a:endParaRPr>
+            </a:p>
+          </p:txBody>
+        </p:sp>
+        <p:sp>
+          <p:nvSpPr>
+            <p:cNvPr id="20" name="Rectangle 19"/>
+            <p:cNvSpPr/>
+            <p:nvPr/>
+          </p:nvSpPr>
+          <p:spPr>
+            <a:xfrm>
+              <a:off x="5455917" y="3786904"/>
+              <a:ext cx="1463039" cy="653143"/>
+            </a:xfrm>
+            <a:prstGeom prst="rect">
+              <a:avLst/>
+            </a:prstGeom>
+          </p:spPr>
+          <p:style>
+            <a:lnRef idx="2">
+              <a:schemeClr val="accent2">
+                <a:shade val="50000"/>
+              </a:schemeClr>
+            </a:lnRef>
+            <a:fillRef idx="1">
+              <a:schemeClr val="accent2"/>
+            </a:fillRef>
+            <a:effectRef idx="0">
+              <a:schemeClr val="accent2"/>
+            </a:effectRef>
+            <a:fontRef idx="minor">
+              <a:schemeClr val="lt1"/>
+            </a:fontRef>
+          </p:style>
+          <p:txBody>
+            <a:bodyPr rtlCol="0" anchor="ctr"/>
+            <a:lstStyle/>
+            <a:p>
+              <a:pPr algn="ctr"/>
+              <a:r>
+                <a:rPr lang="en-US" b="1" dirty="0" smtClean="0">
+                  <a:solidFill>
+                    <a:schemeClr val="bg1"/>
+                  </a:solidFill>
+                  <a:effectLst/>
+                  <a:latin typeface="Consolas" panose="020B0609020204030204" pitchFamily="49" charset="0"/>
+                </a:rPr>
+                <a:t>false</a:t>
+              </a:r>
+              <a:endParaRPr lang="en-US" b="1" dirty="0">
+                <a:solidFill>
+                  <a:schemeClr val="bg1"/>
+                </a:solidFill>
+              </a:endParaRPr>
+            </a:p>
+          </p:txBody>
+        </p:sp>
+        <p:sp>
+          <p:nvSpPr>
+            <p:cNvPr id="21" name="Rectangle 20"/>
+            <p:cNvSpPr/>
+            <p:nvPr/>
+          </p:nvSpPr>
+          <p:spPr>
+            <a:xfrm>
+              <a:off x="6918956" y="3786904"/>
+              <a:ext cx="1841865" cy="653143"/>
+            </a:xfrm>
+            <a:prstGeom prst="rect">
+              <a:avLst/>
+            </a:prstGeom>
+          </p:spPr>
+          <p:style>
+            <a:lnRef idx="2">
+              <a:schemeClr val="accent2">
+                <a:shade val="50000"/>
+              </a:schemeClr>
+            </a:lnRef>
+            <a:fillRef idx="1">
+              <a:schemeClr val="accent2"/>
+            </a:fillRef>
+            <a:effectRef idx="0">
+              <a:schemeClr val="accent2"/>
+            </a:effectRef>
+            <a:fontRef idx="minor">
+              <a:schemeClr val="lt1"/>
+            </a:fontRef>
+          </p:style>
+          <p:txBody>
+            <a:bodyPr rtlCol="0" anchor="ctr"/>
+            <a:lstStyle/>
+            <a:p>
+              <a:pPr algn="ctr"/>
+              <a:r>
+                <a:rPr lang="en-US" b="1" dirty="0" smtClean="0">
+                  <a:solidFill>
+                    <a:schemeClr val="bg1"/>
+                  </a:solidFill>
+                  <a:effectLst/>
+                  <a:latin typeface="Consolas" panose="020B0609020204030204" pitchFamily="49" charset="0"/>
+                </a:rPr>
+                <a:t>false</a:t>
+              </a:r>
+              <a:endParaRPr lang="en-US" b="1" dirty="0">
+                <a:solidFill>
+                  <a:schemeClr val="bg1"/>
+                </a:solidFill>
+              </a:endParaRPr>
+            </a:p>
+          </p:txBody>
+        </p:sp>
+      </p:grpSp>
+      <p:sp>
+        <p:nvSpPr>
+          <p:cNvPr id="22" name="Rectangle 21"/>
+          <p:cNvSpPr/>
+          <p:nvPr/>
+        </p:nvSpPr>
+        <p:spPr>
+          <a:xfrm>
+            <a:off x="6243056" y="1550226"/>
+            <a:ext cx="6196250" cy="369332"/>
+          </a:xfrm>
+          <a:prstGeom prst="rect">
+            <a:avLst/>
+          </a:prstGeom>
+        </p:spPr>
+        <p:txBody>
+          <a:bodyPr wrap="square">
+            <a:spAutoFit/>
+          </a:bodyPr>
+          <a:lstStyle/>
+          <a:p>
+            <a:r>
+              <a:rPr lang="en-US" b="1" dirty="0" smtClean="0">
+                <a:effectLst/>
+                <a:latin typeface="Consolas" panose="020B0609020204030204" pitchFamily="49" charset="0"/>
+              </a:rPr>
+              <a:t>  0           1          2            3</a:t>
+            </a:r>
+            <a:endParaRPr lang="en-US" b="1" dirty="0">
+              <a:effectLst/>
+              <a:latin typeface="Consolas" panose="020B0609020204030204" pitchFamily="49" charset="0"/>
+            </a:endParaRPr>
+          </a:p>
+        </p:txBody>
+      </p:sp>
+      <p:sp>
+        <p:nvSpPr>
+          <p:cNvPr id="23" name="Rectangle 22"/>
+          <p:cNvSpPr/>
+          <p:nvPr/>
+        </p:nvSpPr>
+        <p:spPr>
+          <a:xfrm>
+            <a:off x="5319790" y="1539626"/>
+            <a:ext cx="745717" cy="338554"/>
+          </a:xfrm>
+          <a:prstGeom prst="rect">
+            <a:avLst/>
+          </a:prstGeom>
+        </p:spPr>
+        <p:txBody>
+          <a:bodyPr wrap="none">
+            <a:spAutoFit/>
+          </a:bodyPr>
+          <a:lstStyle/>
+          <a:p>
+            <a:r>
+              <a:rPr lang="en-US" sz="1600" b="1" dirty="0" smtClean="0">
+                <a:effectLst/>
+                <a:latin typeface="Consolas" panose="020B0609020204030204" pitchFamily="49" charset="0"/>
+              </a:rPr>
+              <a:t>INDEX</a:t>
+            </a:r>
+            <a:endParaRPr lang="en-US" b="1" dirty="0">
+              <a:effectLst/>
+              <a:latin typeface="Consolas" panose="020B0609020204030204" pitchFamily="49" charset="0"/>
+            </a:endParaRPr>
+          </a:p>
+        </p:txBody>
+      </p:sp>
+      <p:sp>
+        <p:nvSpPr>
+          <p:cNvPr id="24" name="Rectangle 23"/>
+          <p:cNvSpPr/>
+          <p:nvPr/>
+        </p:nvSpPr>
+        <p:spPr>
+          <a:xfrm>
+            <a:off x="1350368" y="1789839"/>
+            <a:ext cx="1467780" cy="653143"/>
+          </a:xfrm>
+          <a:prstGeom prst="rect">
+            <a:avLst/>
+          </a:prstGeom>
+        </p:spPr>
+        <p:style>
+          <a:lnRef idx="2">
+            <a:schemeClr val="accent1">
+              <a:shade val="50000"/>
+            </a:schemeClr>
+          </a:lnRef>
+          <a:fillRef idx="1">
+            <a:schemeClr val="accent1"/>
+          </a:fillRef>
+          <a:effectRef idx="0">
+            <a:schemeClr val="accent1"/>
+          </a:effectRef>
+          <a:fontRef idx="minor">
+            <a:schemeClr val="lt1"/>
+          </a:fontRef>
+        </p:style>
+        <p:txBody>
+          <a:bodyPr rtlCol="0" anchor="ctr"/>
+          <a:lstStyle/>
+          <a:p>
+            <a:pPr algn="ctr"/>
+            <a:endParaRPr lang="en-US" b="1" dirty="0">
+              <a:solidFill>
+                <a:schemeClr val="bg1"/>
+              </a:solidFill>
+            </a:endParaRPr>
+          </a:p>
+        </p:txBody>
+      </p:sp>
+      <p:sp>
+        <p:nvSpPr>
+          <p:cNvPr id="25" name="Rectangle 24"/>
+          <p:cNvSpPr/>
+          <p:nvPr/>
+        </p:nvSpPr>
+        <p:spPr>
+          <a:xfrm>
+            <a:off x="1350367" y="2441768"/>
+            <a:ext cx="1467781" cy="653143"/>
+          </a:xfrm>
+          <a:prstGeom prst="rect">
+            <a:avLst/>
+          </a:prstGeom>
+        </p:spPr>
+        <p:style>
+          <a:lnRef idx="2">
+            <a:schemeClr val="accent2">
+              <a:shade val="50000"/>
+            </a:schemeClr>
+          </a:lnRef>
+          <a:fillRef idx="1">
+            <a:schemeClr val="accent2"/>
+          </a:fillRef>
+          <a:effectRef idx="0">
+            <a:schemeClr val="accent2"/>
+          </a:effectRef>
+          <a:fontRef idx="minor">
+            <a:schemeClr val="lt1"/>
+          </a:fontRef>
+        </p:style>
+        <p:txBody>
+          <a:bodyPr rtlCol="0" anchor="ctr"/>
+          <a:lstStyle/>
+          <a:p>
+            <a:pPr algn="ctr"/>
+            <a:endParaRPr lang="en-US" b="1" dirty="0">
+              <a:solidFill>
+                <a:schemeClr val="bg1"/>
+              </a:solidFill>
+            </a:endParaRPr>
+          </a:p>
+        </p:txBody>
+      </p:sp>
+      <p:sp>
+        <p:nvSpPr>
+          <p:cNvPr id="26" name="Rectangle 25"/>
+          <p:cNvSpPr/>
+          <p:nvPr/>
+        </p:nvSpPr>
+        <p:spPr>
+          <a:xfrm>
+            <a:off x="663269" y="3157362"/>
+            <a:ext cx="817853" cy="369332"/>
+          </a:xfrm>
+          <a:prstGeom prst="rect">
+            <a:avLst/>
+          </a:prstGeom>
+        </p:spPr>
+        <p:txBody>
+          <a:bodyPr wrap="none">
+            <a:spAutoFit/>
+          </a:bodyPr>
+          <a:lstStyle/>
+          <a:p>
+            <a:r>
+              <a:rPr lang="en-US" b="1" dirty="0" smtClean="0">
+                <a:effectLst/>
+                <a:latin typeface="Consolas" panose="020B0609020204030204" pitchFamily="49" charset="0"/>
+              </a:rPr>
+              <a:t>INDEX</a:t>
+            </a:r>
+            <a:endParaRPr lang="en-US" b="1" dirty="0">
+              <a:effectLst/>
+              <a:latin typeface="Consolas" panose="020B0609020204030204" pitchFamily="49" charset="0"/>
+            </a:endParaRPr>
+          </a:p>
+        </p:txBody>
+      </p:sp>
+      <p:sp>
+        <p:nvSpPr>
+          <p:cNvPr id="27" name="Rectangle 26"/>
+          <p:cNvSpPr/>
+          <p:nvPr/>
+        </p:nvSpPr>
+        <p:spPr>
+          <a:xfrm>
+            <a:off x="1699251" y="3167542"/>
+            <a:ext cx="619305" cy="369332"/>
+          </a:xfrm>
+          <a:prstGeom prst="rect">
+            <a:avLst/>
+          </a:prstGeom>
+        </p:spPr>
+        <p:txBody>
+          <a:bodyPr wrap="square">
+            <a:spAutoFit/>
+          </a:bodyPr>
+          <a:lstStyle/>
+          <a:p>
+            <a:pPr algn="ctr"/>
+            <a:r>
+              <a:rPr lang="en-US" b="1" dirty="0" smtClean="0">
+                <a:effectLst/>
+                <a:latin typeface="Consolas" panose="020B0609020204030204" pitchFamily="49" charset="0"/>
+              </a:rPr>
+              <a:t>0</a:t>
+            </a:r>
+            <a:endParaRPr lang="en-US" b="1" dirty="0">
+              <a:effectLst/>
+              <a:latin typeface="Consolas" panose="020B0609020204030204" pitchFamily="49" charset="0"/>
+            </a:endParaRPr>
+          </a:p>
+        </p:txBody>
+      </p:sp>
+      <p:cxnSp>
+        <p:nvCxnSpPr>
+          <p:cNvPr id="28" name="Straight Arrow Connector 27"/>
+          <p:cNvCxnSpPr/>
+          <p:nvPr/>
+        </p:nvCxnSpPr>
+        <p:spPr>
+          <a:xfrm flipH="1" flipV="1">
+            <a:off x="2021966" y="1088061"/>
+            <a:ext cx="1" cy="607242"/>
+          </a:xfrm>
+          <a:prstGeom prst="straightConnector1">
+            <a:avLst/>
+          </a:prstGeom>
+          <a:ln w="76200" cap="flat" cmpd="sng" algn="ctr">
+            <a:solidFill>
+              <a:srgbClr val="D0009A"/>
+            </a:solidFill>
+            <a:prstDash val="solid"/>
+            <a:round/>
+            <a:headEnd type="none" w="med" len="med"/>
+            <a:tailEnd type="arrow" w="med" len="med"/>
+          </a:ln>
+        </p:spPr>
+        <p:style>
+          <a:lnRef idx="0">
+            <a:scrgbClr r="0" g="0" b="0"/>
+          </a:lnRef>
+          <a:fillRef idx="0">
+            <a:scrgbClr r="0" g="0" b="0"/>
+          </a:fillRef>
+          <a:effectRef idx="0">
+            <a:scrgbClr r="0" g="0" b="0"/>
+          </a:effectRef>
+          <a:fontRef idx="minor">
+            <a:schemeClr val="tx1"/>
+          </a:fontRef>
+        </p:style>
+      </p:cxnSp>
+      <p:cxnSp>
+        <p:nvCxnSpPr>
+          <p:cNvPr id="30" name="Straight Arrow Connector 29"/>
+          <p:cNvCxnSpPr/>
+          <p:nvPr/>
+        </p:nvCxnSpPr>
+        <p:spPr>
+          <a:xfrm>
+            <a:off x="4676502" y="763678"/>
+            <a:ext cx="849087" cy="0"/>
+          </a:xfrm>
+          <a:prstGeom prst="straightConnector1">
+            <a:avLst/>
+          </a:prstGeom>
+          <a:ln w="76200" cap="flat" cmpd="sng" algn="ctr">
+            <a:solidFill>
+              <a:srgbClr val="FF0000"/>
+            </a:solidFill>
+            <a:prstDash val="solid"/>
+            <a:round/>
+            <a:headEnd type="none" w="med" len="med"/>
+            <a:tailEnd type="arrow" w="med" len="med"/>
+          </a:ln>
+        </p:spPr>
+        <p:style>
+          <a:lnRef idx="0">
+            <a:scrgbClr r="0" g="0" b="0"/>
+          </a:lnRef>
+          <a:fillRef idx="0">
+            <a:scrgbClr r="0" g="0" b="0"/>
+          </a:fillRef>
+          <a:effectRef idx="0">
+            <a:scrgbClr r="0" g="0" b="0"/>
+          </a:effectRef>
+          <a:fontRef idx="minor">
+            <a:schemeClr val="tx1"/>
+          </a:fontRef>
+        </p:style>
+      </p:cxnSp>
+      <p:sp>
+        <p:nvSpPr>
+          <p:cNvPr id="35" name="Rectangle 34"/>
+          <p:cNvSpPr/>
+          <p:nvPr/>
+        </p:nvSpPr>
+        <p:spPr>
+          <a:xfrm>
+            <a:off x="363986" y="3563000"/>
+            <a:ext cx="4237057" cy="369332"/>
+          </a:xfrm>
+          <a:prstGeom prst="rect">
+            <a:avLst/>
+          </a:prstGeom>
+        </p:spPr>
+        <p:txBody>
+          <a:bodyPr wrap="none">
+            <a:spAutoFit/>
+          </a:bodyPr>
+          <a:lstStyle/>
+          <a:p>
+            <a:r>
+              <a:rPr lang="en-US" b="1" dirty="0">
+                <a:solidFill>
+                  <a:srgbClr val="386BC4"/>
+                </a:solidFill>
+                <a:latin typeface="Consolas" panose="020B0609020204030204" pitchFamily="49" charset="0"/>
+              </a:rPr>
+              <a:t>Map&lt;String, bool&gt; </a:t>
+            </a:r>
+            <a:r>
+              <a:rPr lang="en-US" b="1" dirty="0" err="1">
+                <a:solidFill>
+                  <a:srgbClr val="386BC4"/>
+                </a:solidFill>
+                <a:latin typeface="Consolas" panose="020B0609020204030204" pitchFamily="49" charset="0"/>
+              </a:rPr>
+              <a:t>mappedFlavours</a:t>
+            </a:r>
+            <a:endParaRPr lang="en-US" b="1" dirty="0">
+              <a:solidFill>
+                <a:srgbClr val="386BC4"/>
+              </a:solidFill>
+              <a:latin typeface="Consolas" panose="020B0609020204030204" pitchFamily="49" charset="0"/>
+            </a:endParaRPr>
+          </a:p>
+        </p:txBody>
+      </p:sp>
+    </p:spTree>
+    <p:extLst>
+      <p:ext uri="{BB962C8B-B14F-4D97-AF65-F5344CB8AC3E}">
+        <p14:creationId xmlns:p14="http://schemas.microsoft.com/office/powerpoint/2010/main" val="1196221222"/>
+      </p:ext>
+    </p:extLst>
+  </p:cSld>
+  <p:clrMapOvr>
+    <a:masterClrMapping/>
+  </p:clrMapOvr>
+  <p:timing>
+    <p:tnLst>
+      <p:par>
+        <p:cTn id="1" dur="indefinite" restart="never" nodeType="tmRoot"/>
+      </p:par>
+    </p:tnLst>
+  </p:timing>
+</p:sld>
+</file>
+
+<file path=ppt/slides/slide32.xml><?xml version="1.0" encoding="utf-8"?>
+<p:sld xmlns:a="http://schemas.openxmlformats.org/drawingml/2006/main" xmlns:r="http://schemas.openxmlformats.org/officeDocument/2006/relationships" xmlns:p="http://schemas.openxmlformats.org/presentationml/2006/main">
+  <p:cSld>
+    <p:spTree>
+      <p:nvGrpSpPr>
+        <p:cNvPr id="1" name=""/>
+        <p:cNvGrpSpPr/>
+        <p:nvPr/>
+      </p:nvGrpSpPr>
+      <p:grpSpPr>
+        <a:xfrm>
+          <a:off x="0" y="0"/>
+          <a:ext cx="0" cy="0"/>
+          <a:chOff x="0" y="0"/>
+          <a:chExt cx="0" cy="0"/>
+        </a:xfrm>
+      </p:grpSpPr>
+      <p:sp>
+        <p:nvSpPr>
+          <p:cNvPr id="5" name="Rectangle 4"/>
+          <p:cNvSpPr/>
+          <p:nvPr/>
+        </p:nvSpPr>
+        <p:spPr>
+          <a:xfrm>
+            <a:off x="4258477" y="3655771"/>
+            <a:ext cx="4645945" cy="369332"/>
+          </a:xfrm>
+          <a:prstGeom prst="rect">
+            <a:avLst/>
+          </a:prstGeom>
+        </p:spPr>
+        <p:txBody>
+          <a:bodyPr wrap="square">
+            <a:spAutoFit/>
+          </a:bodyPr>
+          <a:lstStyle/>
+          <a:p>
+            <a:pPr marL="342900" indent="-342900">
+              <a:buFont typeface="+mj-lt"/>
+              <a:buAutoNum type="arabicPeriod"/>
+            </a:pPr>
+            <a:r>
+              <a:rPr lang="en-US" b="1" dirty="0" err="1" smtClean="0">
+                <a:solidFill>
+                  <a:srgbClr val="C00000"/>
+                </a:solidFill>
+                <a:latin typeface="Consolas" panose="020B0609020204030204" pitchFamily="49" charset="0"/>
+              </a:rPr>
+              <a:t>mappedFlavour</a:t>
+            </a:r>
+            <a:r>
+              <a:rPr lang="en-US" b="1" dirty="0" smtClean="0">
+                <a:solidFill>
+                  <a:srgbClr val="C00000"/>
+                </a:solidFill>
+                <a:latin typeface="Consolas" panose="020B0609020204030204" pitchFamily="49" charset="0"/>
+              </a:rPr>
+              <a:t> </a:t>
+            </a:r>
+            <a:r>
+              <a:rPr lang="en-US" b="1" dirty="0">
+                <a:solidFill>
+                  <a:srgbClr val="C00000"/>
+                </a:solidFill>
+                <a:latin typeface="Consolas" panose="020B0609020204030204" pitchFamily="49" charset="0"/>
+              </a:rPr>
+              <a:t>has no key </a:t>
+            </a:r>
+            <a:r>
+              <a:rPr lang="en-US" b="1" dirty="0" smtClean="0">
+                <a:solidFill>
+                  <a:srgbClr val="C00000"/>
+                </a:solidFill>
+                <a:latin typeface="Consolas" panose="020B0609020204030204" pitchFamily="49" charset="0"/>
+              </a:rPr>
+              <a:t>Cherry.</a:t>
+            </a:r>
+          </a:p>
+        </p:txBody>
+      </p:sp>
+      <p:sp>
+        <p:nvSpPr>
+          <p:cNvPr id="12" name="Rectangle 11"/>
+          <p:cNvSpPr/>
+          <p:nvPr/>
+        </p:nvSpPr>
+        <p:spPr>
+          <a:xfrm>
+            <a:off x="4462922" y="2844661"/>
+            <a:ext cx="4237057" cy="369332"/>
+          </a:xfrm>
+          <a:prstGeom prst="rect">
+            <a:avLst/>
+          </a:prstGeom>
+        </p:spPr>
+        <p:txBody>
+          <a:bodyPr wrap="none">
+            <a:spAutoFit/>
+          </a:bodyPr>
+          <a:lstStyle/>
+          <a:p>
+            <a:r>
+              <a:rPr lang="en-US" b="1" dirty="0">
+                <a:solidFill>
+                  <a:srgbClr val="386BC4"/>
+                </a:solidFill>
+                <a:latin typeface="Consolas" panose="020B0609020204030204" pitchFamily="49" charset="0"/>
+              </a:rPr>
+              <a:t>Map&lt;String, bool&gt; </a:t>
+            </a:r>
+            <a:r>
+              <a:rPr lang="en-US" b="1" dirty="0" err="1">
+                <a:solidFill>
+                  <a:srgbClr val="386BC4"/>
+                </a:solidFill>
+                <a:latin typeface="Consolas" panose="020B0609020204030204" pitchFamily="49" charset="0"/>
+              </a:rPr>
+              <a:t>mappedFlavours</a:t>
+            </a:r>
+            <a:endParaRPr lang="en-US" b="1" dirty="0">
+              <a:solidFill>
+                <a:srgbClr val="386BC4"/>
+              </a:solidFill>
+              <a:latin typeface="Consolas" panose="020B0609020204030204" pitchFamily="49" charset="0"/>
+            </a:endParaRPr>
+          </a:p>
+        </p:txBody>
+      </p:sp>
+      <p:sp>
+        <p:nvSpPr>
+          <p:cNvPr id="22" name="Rectangle 21"/>
+          <p:cNvSpPr/>
+          <p:nvPr/>
+        </p:nvSpPr>
+        <p:spPr>
+          <a:xfrm>
+            <a:off x="2938152" y="2320935"/>
+            <a:ext cx="7603691" cy="369332"/>
+          </a:xfrm>
+          <a:prstGeom prst="rect">
+            <a:avLst/>
+          </a:prstGeom>
+        </p:spPr>
+        <p:txBody>
+          <a:bodyPr wrap="square">
+            <a:spAutoFit/>
+          </a:bodyPr>
+          <a:lstStyle/>
+          <a:p>
+            <a:r>
+              <a:rPr lang="en-US" b="1" dirty="0" smtClean="0">
+                <a:effectLst/>
+                <a:latin typeface="Consolas" panose="020B0609020204030204" pitchFamily="49" charset="0"/>
+              </a:rPr>
+              <a:t>  0           1          2            3              </a:t>
+            </a:r>
+            <a:r>
+              <a:rPr lang="en-US" b="1" dirty="0" smtClean="0">
+                <a:solidFill>
+                  <a:srgbClr val="FF0000"/>
+                </a:solidFill>
+                <a:effectLst/>
+                <a:latin typeface="Consolas" panose="020B0609020204030204" pitchFamily="49" charset="0"/>
+              </a:rPr>
+              <a:t>4</a:t>
+            </a:r>
+            <a:endParaRPr lang="en-US" b="1" dirty="0">
+              <a:solidFill>
+                <a:srgbClr val="FF0000"/>
+              </a:solidFill>
+              <a:effectLst/>
+              <a:latin typeface="Consolas" panose="020B0609020204030204" pitchFamily="49" charset="0"/>
+            </a:endParaRPr>
+          </a:p>
+        </p:txBody>
+      </p:sp>
+      <p:sp>
+        <p:nvSpPr>
+          <p:cNvPr id="23" name="Rectangle 22"/>
+          <p:cNvSpPr/>
+          <p:nvPr/>
+        </p:nvSpPr>
+        <p:spPr>
+          <a:xfrm>
+            <a:off x="1718540" y="2277425"/>
+            <a:ext cx="745717" cy="338554"/>
+          </a:xfrm>
+          <a:prstGeom prst="rect">
+            <a:avLst/>
+          </a:prstGeom>
+        </p:spPr>
+        <p:txBody>
+          <a:bodyPr wrap="none">
+            <a:spAutoFit/>
+          </a:bodyPr>
+          <a:lstStyle/>
+          <a:p>
+            <a:r>
+              <a:rPr lang="en-US" sz="1600" b="1" dirty="0" smtClean="0">
+                <a:effectLst/>
+                <a:latin typeface="Consolas" panose="020B0609020204030204" pitchFamily="49" charset="0"/>
+              </a:rPr>
+              <a:t>INDEX</a:t>
+            </a:r>
+            <a:endParaRPr lang="en-US" b="1" dirty="0">
+              <a:effectLst/>
+              <a:latin typeface="Consolas" panose="020B0609020204030204" pitchFamily="49" charset="0"/>
+            </a:endParaRPr>
+          </a:p>
+        </p:txBody>
+      </p:sp>
+      <p:grpSp>
+        <p:nvGrpSpPr>
+          <p:cNvPr id="2" name="Group 1"/>
+          <p:cNvGrpSpPr/>
+          <p:nvPr/>
+        </p:nvGrpSpPr>
+        <p:grpSpPr>
+          <a:xfrm>
+            <a:off x="2464257" y="987386"/>
+            <a:ext cx="8077588" cy="1315136"/>
+            <a:chOff x="3117400" y="1091889"/>
+            <a:chExt cx="8077588" cy="1315136"/>
+          </a:xfrm>
+        </p:grpSpPr>
+        <p:sp>
+          <p:nvSpPr>
+            <p:cNvPr id="14" name="Rectangle 13"/>
+            <p:cNvSpPr/>
+            <p:nvPr/>
+          </p:nvSpPr>
+          <p:spPr>
+            <a:xfrm>
+              <a:off x="3117401" y="1094172"/>
+              <a:ext cx="1467780" cy="653143"/>
+            </a:xfrm>
+            <a:prstGeom prst="rect">
+              <a:avLst/>
+            </a:prstGeom>
+          </p:spPr>
+          <p:style>
+            <a:lnRef idx="2">
+              <a:schemeClr val="accent1">
+                <a:shade val="50000"/>
+              </a:schemeClr>
+            </a:lnRef>
+            <a:fillRef idx="1">
+              <a:schemeClr val="accent1"/>
+            </a:fillRef>
+            <a:effectRef idx="0">
+              <a:schemeClr val="accent1"/>
+            </a:effectRef>
+            <a:fontRef idx="minor">
+              <a:schemeClr val="lt1"/>
+            </a:fontRef>
+          </p:style>
+          <p:txBody>
+            <a:bodyPr rtlCol="0" anchor="ctr"/>
+            <a:lstStyle/>
+            <a:p>
+              <a:pPr algn="ctr"/>
+              <a:r>
+                <a:rPr lang="en-US" b="1" dirty="0" smtClean="0">
+                  <a:solidFill>
+                    <a:schemeClr val="bg1"/>
+                  </a:solidFill>
+                  <a:effectLst/>
+                  <a:latin typeface="Consolas" panose="020B0609020204030204" pitchFamily="49" charset="0"/>
+                </a:rPr>
+                <a:t>Chocolate</a:t>
+              </a:r>
+              <a:endParaRPr lang="en-US" b="1" dirty="0">
+                <a:solidFill>
+                  <a:schemeClr val="bg1"/>
+                </a:solidFill>
+              </a:endParaRPr>
+            </a:p>
+          </p:txBody>
+        </p:sp>
+        <p:sp>
+          <p:nvSpPr>
+            <p:cNvPr id="15" name="Rectangle 14"/>
+            <p:cNvSpPr/>
+            <p:nvPr/>
+          </p:nvSpPr>
+          <p:spPr>
+            <a:xfrm>
+              <a:off x="4585180" y="1094172"/>
+              <a:ext cx="1463039" cy="653143"/>
+            </a:xfrm>
+            <a:prstGeom prst="rect">
+              <a:avLst/>
+            </a:prstGeom>
+          </p:spPr>
+          <p:style>
+            <a:lnRef idx="2">
+              <a:schemeClr val="accent1">
+                <a:shade val="50000"/>
+              </a:schemeClr>
+            </a:lnRef>
+            <a:fillRef idx="1">
+              <a:schemeClr val="accent1"/>
+            </a:fillRef>
+            <a:effectRef idx="0">
+              <a:schemeClr val="accent1"/>
+            </a:effectRef>
+            <a:fontRef idx="minor">
+              <a:schemeClr val="lt1"/>
+            </a:fontRef>
+          </p:style>
+          <p:txBody>
+            <a:bodyPr rtlCol="0" anchor="ctr"/>
+            <a:lstStyle/>
+            <a:p>
+              <a:pPr algn="ctr"/>
+              <a:r>
+                <a:rPr lang="en-US" b="1" dirty="0" smtClean="0">
+                  <a:solidFill>
+                    <a:schemeClr val="bg1"/>
+                  </a:solidFill>
+                  <a:effectLst/>
+                  <a:latin typeface="Consolas" panose="020B0609020204030204" pitchFamily="49" charset="0"/>
+                </a:rPr>
+                <a:t>Caramel</a:t>
+              </a:r>
+              <a:endParaRPr lang="en-US" b="1" dirty="0">
+                <a:solidFill>
+                  <a:schemeClr val="bg1"/>
+                </a:solidFill>
+              </a:endParaRPr>
+            </a:p>
+          </p:txBody>
+        </p:sp>
+        <p:sp>
+          <p:nvSpPr>
+            <p:cNvPr id="16" name="Rectangle 15"/>
+            <p:cNvSpPr/>
+            <p:nvPr/>
+          </p:nvSpPr>
+          <p:spPr>
+            <a:xfrm>
+              <a:off x="6048219" y="1094172"/>
+              <a:ext cx="1463039" cy="653143"/>
+            </a:xfrm>
+            <a:prstGeom prst="rect">
+              <a:avLst/>
+            </a:prstGeom>
+          </p:spPr>
+          <p:style>
+            <a:lnRef idx="2">
+              <a:schemeClr val="accent1">
+                <a:shade val="50000"/>
+              </a:schemeClr>
+            </a:lnRef>
+            <a:fillRef idx="1">
+              <a:schemeClr val="accent1"/>
+            </a:fillRef>
+            <a:effectRef idx="0">
+              <a:schemeClr val="accent1"/>
+            </a:effectRef>
+            <a:fontRef idx="minor">
+              <a:schemeClr val="lt1"/>
+            </a:fontRef>
+          </p:style>
+          <p:txBody>
+            <a:bodyPr rtlCol="0" anchor="ctr"/>
+            <a:lstStyle/>
+            <a:p>
+              <a:pPr algn="ctr"/>
+              <a:r>
+                <a:rPr lang="en-US" b="1" dirty="0" smtClean="0">
+                  <a:solidFill>
+                    <a:schemeClr val="bg1"/>
+                  </a:solidFill>
+                  <a:effectLst/>
+                  <a:latin typeface="Consolas" panose="020B0609020204030204" pitchFamily="49" charset="0"/>
+                </a:rPr>
+                <a:t>Vanilla</a:t>
+              </a:r>
+              <a:endParaRPr lang="en-US" b="1" dirty="0">
+                <a:solidFill>
+                  <a:schemeClr val="bg1"/>
+                </a:solidFill>
+              </a:endParaRPr>
+            </a:p>
+          </p:txBody>
+        </p:sp>
+        <p:sp>
+          <p:nvSpPr>
+            <p:cNvPr id="17" name="Rectangle 16"/>
+            <p:cNvSpPr/>
+            <p:nvPr/>
+          </p:nvSpPr>
+          <p:spPr>
+            <a:xfrm>
+              <a:off x="7511258" y="1094172"/>
+              <a:ext cx="1841865" cy="653143"/>
+            </a:xfrm>
+            <a:prstGeom prst="rect">
+              <a:avLst/>
+            </a:prstGeom>
+          </p:spPr>
+          <p:style>
+            <a:lnRef idx="2">
+              <a:schemeClr val="accent1">
+                <a:shade val="50000"/>
+              </a:schemeClr>
+            </a:lnRef>
+            <a:fillRef idx="1">
+              <a:schemeClr val="accent1"/>
+            </a:fillRef>
+            <a:effectRef idx="0">
+              <a:schemeClr val="accent1"/>
+            </a:effectRef>
+            <a:fontRef idx="minor">
+              <a:schemeClr val="lt1"/>
+            </a:fontRef>
+          </p:style>
+          <p:txBody>
+            <a:bodyPr rtlCol="0" anchor="ctr"/>
+            <a:lstStyle/>
+            <a:p>
+              <a:pPr algn="ctr"/>
+              <a:r>
+                <a:rPr lang="en-US" b="1" dirty="0" smtClean="0">
+                  <a:solidFill>
+                    <a:schemeClr val="bg1"/>
+                  </a:solidFill>
+                  <a:effectLst/>
+                  <a:latin typeface="Consolas" panose="020B0609020204030204" pitchFamily="49" charset="0"/>
+                </a:rPr>
+                <a:t>Peanut Butter</a:t>
+              </a:r>
+              <a:endParaRPr lang="en-US" b="1" dirty="0">
+                <a:solidFill>
+                  <a:schemeClr val="bg1"/>
+                </a:solidFill>
+              </a:endParaRPr>
+            </a:p>
+          </p:txBody>
+        </p:sp>
+        <p:sp>
+          <p:nvSpPr>
+            <p:cNvPr id="18" name="Rectangle 17"/>
+            <p:cNvSpPr/>
+            <p:nvPr/>
+          </p:nvSpPr>
+          <p:spPr>
+            <a:xfrm>
+              <a:off x="3117400" y="1746101"/>
+              <a:ext cx="1463039" cy="653143"/>
+            </a:xfrm>
+            <a:prstGeom prst="rect">
+              <a:avLst/>
+            </a:prstGeom>
+          </p:spPr>
+          <p:style>
+            <a:lnRef idx="2">
+              <a:schemeClr val="accent2">
+                <a:shade val="50000"/>
+              </a:schemeClr>
+            </a:lnRef>
+            <a:fillRef idx="1">
+              <a:schemeClr val="accent2"/>
+            </a:fillRef>
+            <a:effectRef idx="0">
+              <a:schemeClr val="accent2"/>
+            </a:effectRef>
+            <a:fontRef idx="minor">
+              <a:schemeClr val="lt1"/>
+            </a:fontRef>
+          </p:style>
+          <p:txBody>
+            <a:bodyPr rtlCol="0" anchor="ctr"/>
+            <a:lstStyle/>
+            <a:p>
+              <a:pPr algn="ctr"/>
+              <a:r>
+                <a:rPr lang="en-US" b="1" dirty="0" smtClean="0">
+                  <a:solidFill>
+                    <a:schemeClr val="bg1"/>
+                  </a:solidFill>
+                  <a:effectLst/>
+                  <a:latin typeface="Consolas" panose="020B0609020204030204" pitchFamily="49" charset="0"/>
+                </a:rPr>
+                <a:t>false</a:t>
+              </a:r>
+              <a:endParaRPr lang="en-US" b="1" dirty="0">
+                <a:solidFill>
+                  <a:schemeClr val="bg1"/>
+                </a:solidFill>
+              </a:endParaRPr>
+            </a:p>
+          </p:txBody>
+        </p:sp>
+        <p:sp>
+          <p:nvSpPr>
+            <p:cNvPr id="19" name="Rectangle 18"/>
+            <p:cNvSpPr/>
+            <p:nvPr/>
+          </p:nvSpPr>
+          <p:spPr>
+            <a:xfrm>
+              <a:off x="4585179" y="1746101"/>
+              <a:ext cx="1463039" cy="653143"/>
+            </a:xfrm>
+            <a:prstGeom prst="rect">
+              <a:avLst/>
+            </a:prstGeom>
+          </p:spPr>
+          <p:style>
+            <a:lnRef idx="2">
+              <a:schemeClr val="accent2">
+                <a:shade val="50000"/>
+              </a:schemeClr>
+            </a:lnRef>
+            <a:fillRef idx="1">
+              <a:schemeClr val="accent2"/>
+            </a:fillRef>
+            <a:effectRef idx="0">
+              <a:schemeClr val="accent2"/>
+            </a:effectRef>
+            <a:fontRef idx="minor">
+              <a:schemeClr val="lt1"/>
+            </a:fontRef>
+          </p:style>
+          <p:txBody>
+            <a:bodyPr rtlCol="0" anchor="ctr"/>
+            <a:lstStyle/>
+            <a:p>
+              <a:pPr algn="ctr"/>
+              <a:r>
+                <a:rPr lang="en-US" b="1" dirty="0" smtClean="0">
+                  <a:solidFill>
+                    <a:schemeClr val="bg1"/>
+                  </a:solidFill>
+                  <a:effectLst/>
+                  <a:latin typeface="Consolas" panose="020B0609020204030204" pitchFamily="49" charset="0"/>
+                </a:rPr>
+                <a:t>false</a:t>
+              </a:r>
+              <a:endParaRPr lang="en-US" b="1" dirty="0">
+                <a:solidFill>
+                  <a:schemeClr val="bg1"/>
+                </a:solidFill>
+              </a:endParaRPr>
+            </a:p>
+          </p:txBody>
+        </p:sp>
+        <p:sp>
+          <p:nvSpPr>
+            <p:cNvPr id="20" name="Rectangle 19"/>
+            <p:cNvSpPr/>
+            <p:nvPr/>
+          </p:nvSpPr>
+          <p:spPr>
+            <a:xfrm>
+              <a:off x="6048219" y="1746101"/>
+              <a:ext cx="1463039" cy="653143"/>
+            </a:xfrm>
+            <a:prstGeom prst="rect">
+              <a:avLst/>
+            </a:prstGeom>
+          </p:spPr>
+          <p:style>
+            <a:lnRef idx="2">
+              <a:schemeClr val="accent2">
+                <a:shade val="50000"/>
+              </a:schemeClr>
+            </a:lnRef>
+            <a:fillRef idx="1">
+              <a:schemeClr val="accent2"/>
+            </a:fillRef>
+            <a:effectRef idx="0">
+              <a:schemeClr val="accent2"/>
+            </a:effectRef>
+            <a:fontRef idx="minor">
+              <a:schemeClr val="lt1"/>
+            </a:fontRef>
+          </p:style>
+          <p:txBody>
+            <a:bodyPr rtlCol="0" anchor="ctr"/>
+            <a:lstStyle/>
+            <a:p>
+              <a:pPr algn="ctr"/>
+              <a:r>
+                <a:rPr lang="en-US" b="1" dirty="0" smtClean="0">
+                  <a:solidFill>
+                    <a:schemeClr val="bg1"/>
+                  </a:solidFill>
+                  <a:effectLst/>
+                  <a:latin typeface="Consolas" panose="020B0609020204030204" pitchFamily="49" charset="0"/>
+                </a:rPr>
+                <a:t>false</a:t>
+              </a:r>
+              <a:endParaRPr lang="en-US" b="1" dirty="0">
+                <a:solidFill>
+                  <a:schemeClr val="bg1"/>
+                </a:solidFill>
+              </a:endParaRPr>
+            </a:p>
+          </p:txBody>
+        </p:sp>
+        <p:sp>
+          <p:nvSpPr>
+            <p:cNvPr id="21" name="Rectangle 20"/>
+            <p:cNvSpPr/>
+            <p:nvPr/>
+          </p:nvSpPr>
+          <p:spPr>
+            <a:xfrm>
+              <a:off x="7511258" y="1746101"/>
+              <a:ext cx="1841865" cy="653143"/>
+            </a:xfrm>
+            <a:prstGeom prst="rect">
+              <a:avLst/>
+            </a:prstGeom>
+          </p:spPr>
+          <p:style>
+            <a:lnRef idx="2">
+              <a:schemeClr val="accent2">
+                <a:shade val="50000"/>
+              </a:schemeClr>
+            </a:lnRef>
+            <a:fillRef idx="1">
+              <a:schemeClr val="accent2"/>
+            </a:fillRef>
+            <a:effectRef idx="0">
+              <a:schemeClr val="accent2"/>
+            </a:effectRef>
+            <a:fontRef idx="minor">
+              <a:schemeClr val="lt1"/>
+            </a:fontRef>
+          </p:style>
+          <p:txBody>
+            <a:bodyPr rtlCol="0" anchor="ctr"/>
+            <a:lstStyle/>
+            <a:p>
+              <a:pPr algn="ctr"/>
+              <a:r>
+                <a:rPr lang="en-US" b="1" dirty="0" smtClean="0">
+                  <a:solidFill>
+                    <a:schemeClr val="bg1"/>
+                  </a:solidFill>
+                  <a:effectLst/>
+                  <a:latin typeface="Consolas" panose="020B0609020204030204" pitchFamily="49" charset="0"/>
+                </a:rPr>
+                <a:t>false</a:t>
+              </a:r>
+              <a:endParaRPr lang="en-US" b="1" dirty="0">
+                <a:solidFill>
+                  <a:schemeClr val="bg1"/>
+                </a:solidFill>
+              </a:endParaRPr>
+            </a:p>
+          </p:txBody>
+        </p:sp>
+        <p:sp>
+          <p:nvSpPr>
+            <p:cNvPr id="29" name="Rectangle 28"/>
+            <p:cNvSpPr/>
+            <p:nvPr/>
+          </p:nvSpPr>
+          <p:spPr>
+            <a:xfrm>
+              <a:off x="9353123" y="1091889"/>
+              <a:ext cx="1841865" cy="653143"/>
+            </a:xfrm>
+            <a:prstGeom prst="rect">
+              <a:avLst/>
+            </a:prstGeom>
+            <a:solidFill>
+              <a:srgbClr val="FF0000"/>
+            </a:solidFill>
+          </p:spPr>
+          <p:style>
+            <a:lnRef idx="2">
+              <a:schemeClr val="accent1">
+                <a:shade val="50000"/>
+              </a:schemeClr>
+            </a:lnRef>
+            <a:fillRef idx="1">
+              <a:schemeClr val="accent1"/>
+            </a:fillRef>
+            <a:effectRef idx="0">
+              <a:schemeClr val="accent1"/>
+            </a:effectRef>
+            <a:fontRef idx="minor">
+              <a:schemeClr val="lt1"/>
+            </a:fontRef>
+          </p:style>
+          <p:txBody>
+            <a:bodyPr rtlCol="0" anchor="ctr"/>
+            <a:lstStyle/>
+            <a:p>
+              <a:pPr algn="ctr"/>
+              <a:r>
+                <a:rPr lang="en-US" b="1" dirty="0" smtClean="0">
+                  <a:solidFill>
+                    <a:schemeClr val="bg1"/>
+                  </a:solidFill>
+                  <a:effectLst/>
+                  <a:latin typeface="Consolas" panose="020B0609020204030204" pitchFamily="49" charset="0"/>
+                </a:rPr>
+                <a:t>Cherry</a:t>
+              </a:r>
+              <a:endParaRPr lang="en-US" b="1" dirty="0">
+                <a:solidFill>
+                  <a:schemeClr val="bg1"/>
+                </a:solidFill>
+              </a:endParaRPr>
+            </a:p>
+          </p:txBody>
+        </p:sp>
+        <p:sp>
+          <p:nvSpPr>
+            <p:cNvPr id="31" name="Rectangle 30"/>
+            <p:cNvSpPr/>
+            <p:nvPr/>
+          </p:nvSpPr>
+          <p:spPr>
+            <a:xfrm>
+              <a:off x="9353122" y="1753882"/>
+              <a:ext cx="1841865" cy="653143"/>
+            </a:xfrm>
+            <a:prstGeom prst="rect">
+              <a:avLst/>
+            </a:prstGeom>
+            <a:solidFill>
+              <a:srgbClr val="FF0000"/>
+            </a:solidFill>
+          </p:spPr>
+          <p:style>
+            <a:lnRef idx="2">
+              <a:schemeClr val="accent2">
+                <a:shade val="50000"/>
+              </a:schemeClr>
+            </a:lnRef>
+            <a:fillRef idx="1">
+              <a:schemeClr val="accent2"/>
+            </a:fillRef>
+            <a:effectRef idx="0">
+              <a:schemeClr val="accent2"/>
+            </a:effectRef>
+            <a:fontRef idx="minor">
+              <a:schemeClr val="lt1"/>
+            </a:fontRef>
+          </p:style>
+          <p:txBody>
+            <a:bodyPr rtlCol="0" anchor="ctr"/>
+            <a:lstStyle/>
+            <a:p>
+              <a:pPr algn="ctr"/>
+              <a:r>
+                <a:rPr lang="en-US" b="1" dirty="0" smtClean="0">
+                  <a:solidFill>
+                    <a:schemeClr val="bg1"/>
+                  </a:solidFill>
+                  <a:effectLst/>
+                  <a:latin typeface="Consolas" panose="020B0609020204030204" pitchFamily="49" charset="0"/>
+                </a:rPr>
+                <a:t>false</a:t>
+              </a:r>
+              <a:endParaRPr lang="en-US" b="1" dirty="0">
+                <a:solidFill>
+                  <a:schemeClr val="bg1"/>
+                </a:solidFill>
+              </a:endParaRPr>
+            </a:p>
+          </p:txBody>
+        </p:sp>
+      </p:grpSp>
+      <p:sp>
+        <p:nvSpPr>
+          <p:cNvPr id="34" name="Rectangle 33"/>
+          <p:cNvSpPr/>
+          <p:nvPr/>
+        </p:nvSpPr>
+        <p:spPr>
+          <a:xfrm>
+            <a:off x="2091398" y="4440139"/>
+            <a:ext cx="8922635" cy="646331"/>
+          </a:xfrm>
+          <a:prstGeom prst="rect">
+            <a:avLst/>
+          </a:prstGeom>
+        </p:spPr>
+        <p:txBody>
+          <a:bodyPr wrap="none">
+            <a:spAutoFit/>
+          </a:bodyPr>
+          <a:lstStyle/>
+          <a:p>
+            <a:r>
+              <a:rPr lang="en-US" b="1" dirty="0">
+                <a:solidFill>
+                  <a:schemeClr val="accent6">
+                    <a:lumMod val="50000"/>
+                  </a:schemeClr>
+                </a:solidFill>
+                <a:latin typeface="Consolas" panose="020B0609020204030204" pitchFamily="49" charset="0"/>
+              </a:rPr>
+              <a:t>test('</a:t>
+            </a:r>
+            <a:r>
+              <a:rPr lang="en-US" b="1" dirty="0" err="1">
+                <a:solidFill>
+                  <a:schemeClr val="accent6">
+                    <a:lumMod val="50000"/>
+                  </a:schemeClr>
+                </a:solidFill>
+                <a:latin typeface="Consolas" panose="020B0609020204030204" pitchFamily="49" charset="0"/>
+              </a:rPr>
+              <a:t>mappedFlavour</a:t>
+            </a:r>
+            <a:r>
+              <a:rPr lang="en-US" b="1" dirty="0">
+                <a:solidFill>
+                  <a:schemeClr val="accent6">
+                    <a:lumMod val="50000"/>
+                  </a:schemeClr>
+                </a:solidFill>
+                <a:latin typeface="Consolas" panose="020B0609020204030204" pitchFamily="49" charset="0"/>
+              </a:rPr>
+              <a:t> has no key Cherry',</a:t>
+            </a:r>
+          </a:p>
+          <a:p>
+            <a:r>
+              <a:rPr lang="en-US" b="1" dirty="0">
+                <a:solidFill>
+                  <a:schemeClr val="accent6">
+                    <a:lumMod val="50000"/>
+                  </a:schemeClr>
+                </a:solidFill>
+                <a:latin typeface="Consolas" panose="020B0609020204030204" pitchFamily="49" charset="0"/>
+              </a:rPr>
+              <a:t>        () =&gt; expect(!</a:t>
+            </a:r>
+            <a:r>
+              <a:rPr lang="en-US" b="1" dirty="0" err="1">
+                <a:solidFill>
+                  <a:schemeClr val="accent6">
+                    <a:lumMod val="50000"/>
+                  </a:schemeClr>
+                </a:solidFill>
+                <a:latin typeface="Consolas" panose="020B0609020204030204" pitchFamily="49" charset="0"/>
+              </a:rPr>
+              <a:t>mappedFlavours.containsKey</a:t>
+            </a:r>
+            <a:r>
+              <a:rPr lang="en-US" b="1" dirty="0">
+                <a:solidFill>
+                  <a:schemeClr val="accent6">
+                    <a:lumMod val="50000"/>
+                  </a:schemeClr>
+                </a:solidFill>
+                <a:latin typeface="Consolas" panose="020B0609020204030204" pitchFamily="49" charset="0"/>
+              </a:rPr>
+              <a:t>('Cherry'), </a:t>
+            </a:r>
+            <a:r>
+              <a:rPr lang="en-US" b="1" dirty="0" err="1">
+                <a:solidFill>
+                  <a:schemeClr val="accent6">
+                    <a:lumMod val="50000"/>
+                  </a:schemeClr>
+                </a:solidFill>
+                <a:latin typeface="Consolas" panose="020B0609020204030204" pitchFamily="49" charset="0"/>
+              </a:rPr>
+              <a:t>isTrue</a:t>
+            </a:r>
+            <a:r>
+              <a:rPr lang="en-US" b="1" dirty="0">
+                <a:solidFill>
+                  <a:schemeClr val="accent6">
+                    <a:lumMod val="50000"/>
+                  </a:schemeClr>
+                </a:solidFill>
+                <a:latin typeface="Consolas" panose="020B0609020204030204" pitchFamily="49" charset="0"/>
+              </a:rPr>
+              <a:t>));</a:t>
+            </a:r>
+            <a:endParaRPr lang="en-US" b="1" dirty="0">
+              <a:solidFill>
+                <a:schemeClr val="accent6">
+                  <a:lumMod val="50000"/>
+                </a:schemeClr>
+              </a:solidFill>
+              <a:effectLst/>
+              <a:latin typeface="Consolas" panose="020B0609020204030204" pitchFamily="49" charset="0"/>
+            </a:endParaRPr>
+          </a:p>
+        </p:txBody>
+      </p:sp>
+    </p:spTree>
+    <p:extLst>
+      <p:ext uri="{BB962C8B-B14F-4D97-AF65-F5344CB8AC3E}">
+        <p14:creationId xmlns:p14="http://schemas.microsoft.com/office/powerpoint/2010/main" val="2676159417"/>
+      </p:ext>
+    </p:extLst>
+  </p:cSld>
+  <p:clrMapOvr>
+    <a:masterClrMapping/>
+  </p:clrMapOvr>
+  <p:timing>
+    <p:tnLst>
+      <p:par>
+        <p:cTn id="1" dur="indefinite" restart="never" nodeType="tmRoot"/>
+      </p:par>
+    </p:tnLst>
+  </p:timing>
+</p:sld>
+</file>
+
+<file path=ppt/slides/slide33.xml><?xml version="1.0" encoding="utf-8"?>
+<p:sld xmlns:a="http://schemas.openxmlformats.org/drawingml/2006/main" xmlns:r="http://schemas.openxmlformats.org/officeDocument/2006/relationships" xmlns:p="http://schemas.openxmlformats.org/presentationml/2006/main">
+  <p:cSld>
+    <p:spTree>
+      <p:nvGrpSpPr>
+        <p:cNvPr id="1" name=""/>
+        <p:cNvGrpSpPr/>
+        <p:nvPr/>
+      </p:nvGrpSpPr>
+      <p:grpSpPr>
+        <a:xfrm>
+          <a:off x="0" y="0"/>
+          <a:ext cx="0" cy="0"/>
+          <a:chOff x="0" y="0"/>
+          <a:chExt cx="0" cy="0"/>
+        </a:xfrm>
+      </p:grpSpPr>
+      <p:sp>
+        <p:nvSpPr>
+          <p:cNvPr id="5" name="Rectangle 4"/>
+          <p:cNvSpPr/>
+          <p:nvPr/>
+        </p:nvSpPr>
+        <p:spPr>
+          <a:xfrm>
+            <a:off x="4258478" y="3655771"/>
+            <a:ext cx="4232380" cy="369332"/>
+          </a:xfrm>
+          <a:prstGeom prst="rect">
+            <a:avLst/>
+          </a:prstGeom>
+        </p:spPr>
+        <p:txBody>
+          <a:bodyPr wrap="square">
+            <a:spAutoFit/>
+          </a:bodyPr>
+          <a:lstStyle/>
+          <a:p>
+            <a:r>
+              <a:rPr lang="en-US" b="1" dirty="0" smtClean="0">
+                <a:solidFill>
+                  <a:srgbClr val="C00000"/>
+                </a:solidFill>
+                <a:latin typeface="Consolas" panose="020B0609020204030204" pitchFamily="49" charset="0"/>
+              </a:rPr>
+              <a:t>2. </a:t>
+            </a:r>
+            <a:r>
+              <a:rPr lang="en-US" b="1" dirty="0" err="1" smtClean="0">
+                <a:solidFill>
+                  <a:srgbClr val="C00000"/>
+                </a:solidFill>
+                <a:latin typeface="Consolas" panose="020B0609020204030204" pitchFamily="49" charset="0"/>
+              </a:rPr>
+              <a:t>mappedFlavour</a:t>
+            </a:r>
+            <a:r>
+              <a:rPr lang="en-US" b="1" dirty="0" smtClean="0">
+                <a:solidFill>
+                  <a:srgbClr val="C00000"/>
+                </a:solidFill>
+                <a:latin typeface="Consolas" panose="020B0609020204030204" pitchFamily="49" charset="0"/>
+              </a:rPr>
+              <a:t> </a:t>
+            </a:r>
+            <a:r>
+              <a:rPr lang="en-US" b="1" dirty="0">
+                <a:solidFill>
+                  <a:srgbClr val="C00000"/>
+                </a:solidFill>
+                <a:latin typeface="Consolas" panose="020B0609020204030204" pitchFamily="49" charset="0"/>
+              </a:rPr>
+              <a:t>has no value 0.</a:t>
+            </a:r>
+            <a:endParaRPr lang="en-US" b="1" dirty="0" smtClean="0">
+              <a:solidFill>
+                <a:srgbClr val="C00000"/>
+              </a:solidFill>
+              <a:latin typeface="Consolas" panose="020B0609020204030204" pitchFamily="49" charset="0"/>
+            </a:endParaRPr>
+          </a:p>
+        </p:txBody>
+      </p:sp>
+      <p:sp>
+        <p:nvSpPr>
+          <p:cNvPr id="12" name="Rectangle 11"/>
+          <p:cNvSpPr/>
+          <p:nvPr/>
+        </p:nvSpPr>
+        <p:spPr>
+          <a:xfrm>
+            <a:off x="4462922" y="2844661"/>
+            <a:ext cx="4237057" cy="369332"/>
+          </a:xfrm>
+          <a:prstGeom prst="rect">
+            <a:avLst/>
+          </a:prstGeom>
+        </p:spPr>
+        <p:txBody>
+          <a:bodyPr wrap="none">
+            <a:spAutoFit/>
+          </a:bodyPr>
+          <a:lstStyle/>
+          <a:p>
+            <a:r>
+              <a:rPr lang="en-US" b="1" dirty="0">
+                <a:solidFill>
+                  <a:srgbClr val="386BC4"/>
+                </a:solidFill>
+                <a:latin typeface="Consolas" panose="020B0609020204030204" pitchFamily="49" charset="0"/>
+              </a:rPr>
+              <a:t>Map&lt;String, bool&gt; </a:t>
+            </a:r>
+            <a:r>
+              <a:rPr lang="en-US" b="1" dirty="0" err="1">
+                <a:solidFill>
+                  <a:srgbClr val="386BC4"/>
+                </a:solidFill>
+                <a:latin typeface="Consolas" panose="020B0609020204030204" pitchFamily="49" charset="0"/>
+              </a:rPr>
+              <a:t>mappedFlavours</a:t>
+            </a:r>
+            <a:endParaRPr lang="en-US" b="1" dirty="0">
+              <a:solidFill>
+                <a:srgbClr val="386BC4"/>
+              </a:solidFill>
+              <a:latin typeface="Consolas" panose="020B0609020204030204" pitchFamily="49" charset="0"/>
+            </a:endParaRPr>
+          </a:p>
+        </p:txBody>
+      </p:sp>
+      <p:sp>
+        <p:nvSpPr>
+          <p:cNvPr id="22" name="Rectangle 21"/>
+          <p:cNvSpPr/>
+          <p:nvPr/>
+        </p:nvSpPr>
+        <p:spPr>
+          <a:xfrm>
+            <a:off x="2938152" y="2320935"/>
+            <a:ext cx="7603691" cy="369332"/>
+          </a:xfrm>
+          <a:prstGeom prst="rect">
+            <a:avLst/>
+          </a:prstGeom>
+        </p:spPr>
+        <p:txBody>
+          <a:bodyPr wrap="square">
+            <a:spAutoFit/>
+          </a:bodyPr>
+          <a:lstStyle/>
+          <a:p>
+            <a:r>
+              <a:rPr lang="en-US" b="1" dirty="0" smtClean="0">
+                <a:effectLst/>
+                <a:latin typeface="Consolas" panose="020B0609020204030204" pitchFamily="49" charset="0"/>
+              </a:rPr>
+              <a:t>  0           1          </a:t>
+            </a:r>
+            <a:r>
+              <a:rPr lang="en-US" b="1" dirty="0" smtClean="0">
+                <a:solidFill>
+                  <a:srgbClr val="FF0000"/>
+                </a:solidFill>
+                <a:effectLst/>
+                <a:latin typeface="Consolas" panose="020B0609020204030204" pitchFamily="49" charset="0"/>
+              </a:rPr>
+              <a:t>2</a:t>
+            </a:r>
+            <a:r>
+              <a:rPr lang="en-US" b="1" dirty="0" smtClean="0">
+                <a:effectLst/>
+                <a:latin typeface="Consolas" panose="020B0609020204030204" pitchFamily="49" charset="0"/>
+              </a:rPr>
+              <a:t>            3              4</a:t>
+            </a:r>
+            <a:endParaRPr lang="en-US" b="1" dirty="0">
+              <a:effectLst/>
+              <a:latin typeface="Consolas" panose="020B0609020204030204" pitchFamily="49" charset="0"/>
+            </a:endParaRPr>
+          </a:p>
+        </p:txBody>
+      </p:sp>
+      <p:sp>
+        <p:nvSpPr>
+          <p:cNvPr id="23" name="Rectangle 22"/>
+          <p:cNvSpPr/>
+          <p:nvPr/>
+        </p:nvSpPr>
+        <p:spPr>
+          <a:xfrm>
+            <a:off x="1718540" y="2277425"/>
+            <a:ext cx="745717" cy="338554"/>
+          </a:xfrm>
+          <a:prstGeom prst="rect">
+            <a:avLst/>
+          </a:prstGeom>
+        </p:spPr>
+        <p:txBody>
+          <a:bodyPr wrap="none">
+            <a:spAutoFit/>
+          </a:bodyPr>
+          <a:lstStyle/>
+          <a:p>
+            <a:r>
+              <a:rPr lang="en-US" sz="1600" b="1" dirty="0" smtClean="0">
+                <a:effectLst/>
+                <a:latin typeface="Consolas" panose="020B0609020204030204" pitchFamily="49" charset="0"/>
+              </a:rPr>
+              <a:t>INDEX</a:t>
+            </a:r>
+            <a:endParaRPr lang="en-US" b="1" dirty="0">
+              <a:effectLst/>
+              <a:latin typeface="Consolas" panose="020B0609020204030204" pitchFamily="49" charset="0"/>
+            </a:endParaRPr>
+          </a:p>
+        </p:txBody>
+      </p:sp>
+      <p:sp>
+        <p:nvSpPr>
+          <p:cNvPr id="14" name="Rectangle 13"/>
+          <p:cNvSpPr/>
+          <p:nvPr/>
+        </p:nvSpPr>
+        <p:spPr>
+          <a:xfrm>
+            <a:off x="2464258" y="989669"/>
+            <a:ext cx="1467780" cy="653143"/>
+          </a:xfrm>
+          <a:prstGeom prst="rect">
+            <a:avLst/>
+          </a:prstGeom>
+        </p:spPr>
+        <p:style>
+          <a:lnRef idx="2">
+            <a:schemeClr val="accent1">
+              <a:shade val="50000"/>
+            </a:schemeClr>
+          </a:lnRef>
+          <a:fillRef idx="1">
+            <a:schemeClr val="accent1"/>
+          </a:fillRef>
+          <a:effectRef idx="0">
+            <a:schemeClr val="accent1"/>
+          </a:effectRef>
+          <a:fontRef idx="minor">
+            <a:schemeClr val="lt1"/>
+          </a:fontRef>
+        </p:style>
+        <p:txBody>
+          <a:bodyPr rtlCol="0" anchor="ctr"/>
+          <a:lstStyle/>
+          <a:p>
+            <a:pPr algn="ctr"/>
+            <a:r>
+              <a:rPr lang="en-US" b="1" dirty="0" smtClean="0">
+                <a:solidFill>
+                  <a:schemeClr val="bg1"/>
+                </a:solidFill>
+                <a:effectLst/>
+                <a:latin typeface="Consolas" panose="020B0609020204030204" pitchFamily="49" charset="0"/>
+              </a:rPr>
+              <a:t>Chocolate</a:t>
+            </a:r>
+            <a:endParaRPr lang="en-US" b="1" dirty="0">
+              <a:solidFill>
+                <a:schemeClr val="bg1"/>
+              </a:solidFill>
+            </a:endParaRPr>
+          </a:p>
+        </p:txBody>
+      </p:sp>
+      <p:sp>
+        <p:nvSpPr>
+          <p:cNvPr id="15" name="Rectangle 14"/>
+          <p:cNvSpPr/>
+          <p:nvPr/>
+        </p:nvSpPr>
+        <p:spPr>
+          <a:xfrm>
+            <a:off x="3932037" y="989669"/>
+            <a:ext cx="1463039" cy="653143"/>
+          </a:xfrm>
+          <a:prstGeom prst="rect">
+            <a:avLst/>
+          </a:prstGeom>
+        </p:spPr>
+        <p:style>
+          <a:lnRef idx="2">
+            <a:schemeClr val="accent1">
+              <a:shade val="50000"/>
+            </a:schemeClr>
+          </a:lnRef>
+          <a:fillRef idx="1">
+            <a:schemeClr val="accent1"/>
+          </a:fillRef>
+          <a:effectRef idx="0">
+            <a:schemeClr val="accent1"/>
+          </a:effectRef>
+          <a:fontRef idx="minor">
+            <a:schemeClr val="lt1"/>
+          </a:fontRef>
+        </p:style>
+        <p:txBody>
+          <a:bodyPr rtlCol="0" anchor="ctr"/>
+          <a:lstStyle/>
+          <a:p>
+            <a:pPr algn="ctr"/>
+            <a:r>
+              <a:rPr lang="en-US" b="1" dirty="0" smtClean="0">
+                <a:solidFill>
+                  <a:schemeClr val="bg1"/>
+                </a:solidFill>
+                <a:effectLst/>
+                <a:latin typeface="Consolas" panose="020B0609020204030204" pitchFamily="49" charset="0"/>
+              </a:rPr>
+              <a:t>Caramel</a:t>
+            </a:r>
+            <a:endParaRPr lang="en-US" b="1" dirty="0">
+              <a:solidFill>
+                <a:schemeClr val="bg1"/>
+              </a:solidFill>
+            </a:endParaRPr>
+          </a:p>
+        </p:txBody>
+      </p:sp>
+      <p:sp>
+        <p:nvSpPr>
+          <p:cNvPr id="16" name="Rectangle 15"/>
+          <p:cNvSpPr/>
+          <p:nvPr/>
+        </p:nvSpPr>
+        <p:spPr>
+          <a:xfrm>
+            <a:off x="7250006" y="989669"/>
+            <a:ext cx="1463039" cy="653143"/>
+          </a:xfrm>
+          <a:prstGeom prst="rect">
+            <a:avLst/>
+          </a:prstGeom>
+        </p:spPr>
+        <p:style>
+          <a:lnRef idx="2">
+            <a:schemeClr val="accent1">
+              <a:shade val="50000"/>
+            </a:schemeClr>
+          </a:lnRef>
+          <a:fillRef idx="1">
+            <a:schemeClr val="accent1"/>
+          </a:fillRef>
+          <a:effectRef idx="0">
+            <a:schemeClr val="accent1"/>
+          </a:effectRef>
+          <a:fontRef idx="minor">
+            <a:schemeClr val="lt1"/>
+          </a:fontRef>
+        </p:style>
+        <p:txBody>
+          <a:bodyPr rtlCol="0" anchor="ctr"/>
+          <a:lstStyle/>
+          <a:p>
+            <a:pPr algn="ctr"/>
+            <a:r>
+              <a:rPr lang="en-US" b="1" dirty="0" smtClean="0">
+                <a:solidFill>
+                  <a:schemeClr val="bg1"/>
+                </a:solidFill>
+                <a:effectLst/>
+                <a:latin typeface="Consolas" panose="020B0609020204030204" pitchFamily="49" charset="0"/>
+              </a:rPr>
+              <a:t>Vanilla</a:t>
+            </a:r>
+            <a:endParaRPr lang="en-US" b="1" dirty="0">
+              <a:solidFill>
+                <a:schemeClr val="bg1"/>
+              </a:solidFill>
+            </a:endParaRPr>
+          </a:p>
+        </p:txBody>
+      </p:sp>
+      <p:sp>
+        <p:nvSpPr>
+          <p:cNvPr id="17" name="Rectangle 16"/>
+          <p:cNvSpPr/>
+          <p:nvPr/>
+        </p:nvSpPr>
+        <p:spPr>
+          <a:xfrm>
+            <a:off x="8713045" y="989669"/>
+            <a:ext cx="1841865" cy="653143"/>
+          </a:xfrm>
+          <a:prstGeom prst="rect">
+            <a:avLst/>
+          </a:prstGeom>
+        </p:spPr>
+        <p:style>
+          <a:lnRef idx="2">
+            <a:schemeClr val="accent1">
+              <a:shade val="50000"/>
+            </a:schemeClr>
+          </a:lnRef>
+          <a:fillRef idx="1">
+            <a:schemeClr val="accent1"/>
+          </a:fillRef>
+          <a:effectRef idx="0">
+            <a:schemeClr val="accent1"/>
+          </a:effectRef>
+          <a:fontRef idx="minor">
+            <a:schemeClr val="lt1"/>
+          </a:fontRef>
+        </p:style>
+        <p:txBody>
+          <a:bodyPr rtlCol="0" anchor="ctr"/>
+          <a:lstStyle/>
+          <a:p>
+            <a:pPr algn="ctr"/>
+            <a:r>
+              <a:rPr lang="en-US" b="1" dirty="0" smtClean="0">
+                <a:solidFill>
+                  <a:schemeClr val="bg1"/>
+                </a:solidFill>
+                <a:effectLst/>
+                <a:latin typeface="Consolas" panose="020B0609020204030204" pitchFamily="49" charset="0"/>
+              </a:rPr>
+              <a:t>Peanut Butter</a:t>
+            </a:r>
+            <a:endParaRPr lang="en-US" b="1" dirty="0">
+              <a:solidFill>
+                <a:schemeClr val="bg1"/>
+              </a:solidFill>
+            </a:endParaRPr>
+          </a:p>
+        </p:txBody>
+      </p:sp>
+      <p:sp>
+        <p:nvSpPr>
+          <p:cNvPr id="18" name="Rectangle 17"/>
+          <p:cNvSpPr/>
+          <p:nvPr/>
+        </p:nvSpPr>
+        <p:spPr>
+          <a:xfrm>
+            <a:off x="2464257" y="1641598"/>
+            <a:ext cx="1463039" cy="653143"/>
+          </a:xfrm>
+          <a:prstGeom prst="rect">
+            <a:avLst/>
+          </a:prstGeom>
+        </p:spPr>
+        <p:style>
+          <a:lnRef idx="2">
+            <a:schemeClr val="accent2">
+              <a:shade val="50000"/>
+            </a:schemeClr>
+          </a:lnRef>
+          <a:fillRef idx="1">
+            <a:schemeClr val="accent2"/>
+          </a:fillRef>
+          <a:effectRef idx="0">
+            <a:schemeClr val="accent2"/>
+          </a:effectRef>
+          <a:fontRef idx="minor">
+            <a:schemeClr val="lt1"/>
+          </a:fontRef>
+        </p:style>
+        <p:txBody>
+          <a:bodyPr rtlCol="0" anchor="ctr"/>
+          <a:lstStyle/>
+          <a:p>
+            <a:pPr algn="ctr"/>
+            <a:r>
+              <a:rPr lang="en-US" b="1" dirty="0" smtClean="0">
+                <a:solidFill>
+                  <a:schemeClr val="bg1"/>
+                </a:solidFill>
+                <a:effectLst/>
+                <a:latin typeface="Consolas" panose="020B0609020204030204" pitchFamily="49" charset="0"/>
+              </a:rPr>
+              <a:t>false</a:t>
+            </a:r>
+            <a:endParaRPr lang="en-US" b="1" dirty="0">
+              <a:solidFill>
+                <a:schemeClr val="bg1"/>
+              </a:solidFill>
+            </a:endParaRPr>
+          </a:p>
+        </p:txBody>
+      </p:sp>
+      <p:sp>
+        <p:nvSpPr>
+          <p:cNvPr id="19" name="Rectangle 18"/>
+          <p:cNvSpPr/>
+          <p:nvPr/>
+        </p:nvSpPr>
+        <p:spPr>
+          <a:xfrm>
+            <a:off x="3932036" y="1641598"/>
+            <a:ext cx="1463039" cy="653143"/>
+          </a:xfrm>
+          <a:prstGeom prst="rect">
+            <a:avLst/>
+          </a:prstGeom>
+        </p:spPr>
+        <p:style>
+          <a:lnRef idx="2">
+            <a:schemeClr val="accent2">
+              <a:shade val="50000"/>
+            </a:schemeClr>
+          </a:lnRef>
+          <a:fillRef idx="1">
+            <a:schemeClr val="accent2"/>
+          </a:fillRef>
+          <a:effectRef idx="0">
+            <a:schemeClr val="accent2"/>
+          </a:effectRef>
+          <a:fontRef idx="minor">
+            <a:schemeClr val="lt1"/>
+          </a:fontRef>
+        </p:style>
+        <p:txBody>
+          <a:bodyPr rtlCol="0" anchor="ctr"/>
+          <a:lstStyle/>
+          <a:p>
+            <a:pPr algn="ctr"/>
+            <a:r>
+              <a:rPr lang="en-US" b="1" dirty="0" smtClean="0">
+                <a:solidFill>
+                  <a:schemeClr val="bg1"/>
+                </a:solidFill>
+                <a:effectLst/>
+                <a:latin typeface="Consolas" panose="020B0609020204030204" pitchFamily="49" charset="0"/>
+              </a:rPr>
+              <a:t>false</a:t>
+            </a:r>
+            <a:endParaRPr lang="en-US" b="1" dirty="0">
+              <a:solidFill>
+                <a:schemeClr val="bg1"/>
+              </a:solidFill>
+            </a:endParaRPr>
+          </a:p>
+        </p:txBody>
+      </p:sp>
+      <p:sp>
+        <p:nvSpPr>
+          <p:cNvPr id="20" name="Rectangle 19"/>
+          <p:cNvSpPr/>
+          <p:nvPr/>
+        </p:nvSpPr>
+        <p:spPr>
+          <a:xfrm>
+            <a:off x="7250006" y="1641598"/>
+            <a:ext cx="1463039" cy="653143"/>
+          </a:xfrm>
+          <a:prstGeom prst="rect">
+            <a:avLst/>
+          </a:prstGeom>
+        </p:spPr>
+        <p:style>
+          <a:lnRef idx="2">
+            <a:schemeClr val="accent2">
+              <a:shade val="50000"/>
+            </a:schemeClr>
+          </a:lnRef>
+          <a:fillRef idx="1">
+            <a:schemeClr val="accent2"/>
+          </a:fillRef>
+          <a:effectRef idx="0">
+            <a:schemeClr val="accent2"/>
+          </a:effectRef>
+          <a:fontRef idx="minor">
+            <a:schemeClr val="lt1"/>
+          </a:fontRef>
+        </p:style>
+        <p:txBody>
+          <a:bodyPr rtlCol="0" anchor="ctr"/>
+          <a:lstStyle/>
+          <a:p>
+            <a:pPr algn="ctr"/>
+            <a:r>
+              <a:rPr lang="en-US" b="1" dirty="0" smtClean="0">
+                <a:solidFill>
+                  <a:schemeClr val="bg1"/>
+                </a:solidFill>
+                <a:effectLst/>
+                <a:latin typeface="Consolas" panose="020B0609020204030204" pitchFamily="49" charset="0"/>
+              </a:rPr>
+              <a:t>false</a:t>
+            </a:r>
+            <a:endParaRPr lang="en-US" b="1" dirty="0">
+              <a:solidFill>
+                <a:schemeClr val="bg1"/>
+              </a:solidFill>
+            </a:endParaRPr>
+          </a:p>
+        </p:txBody>
+      </p:sp>
+      <p:sp>
+        <p:nvSpPr>
+          <p:cNvPr id="21" name="Rectangle 20"/>
+          <p:cNvSpPr/>
+          <p:nvPr/>
+        </p:nvSpPr>
+        <p:spPr>
+          <a:xfrm>
+            <a:off x="8713045" y="1641598"/>
+            <a:ext cx="1841865" cy="653143"/>
+          </a:xfrm>
+          <a:prstGeom prst="rect">
+            <a:avLst/>
+          </a:prstGeom>
+        </p:spPr>
+        <p:style>
+          <a:lnRef idx="2">
+            <a:schemeClr val="accent2">
+              <a:shade val="50000"/>
+            </a:schemeClr>
+          </a:lnRef>
+          <a:fillRef idx="1">
+            <a:schemeClr val="accent2"/>
+          </a:fillRef>
+          <a:effectRef idx="0">
+            <a:schemeClr val="accent2"/>
+          </a:effectRef>
+          <a:fontRef idx="minor">
+            <a:schemeClr val="lt1"/>
+          </a:fontRef>
+        </p:style>
+        <p:txBody>
+          <a:bodyPr rtlCol="0" anchor="ctr"/>
+          <a:lstStyle/>
+          <a:p>
+            <a:pPr algn="ctr"/>
+            <a:r>
+              <a:rPr lang="en-US" b="1" dirty="0" smtClean="0">
+                <a:solidFill>
+                  <a:schemeClr val="bg1"/>
+                </a:solidFill>
+                <a:effectLst/>
+                <a:latin typeface="Consolas" panose="020B0609020204030204" pitchFamily="49" charset="0"/>
+              </a:rPr>
+              <a:t>false</a:t>
+            </a:r>
+            <a:endParaRPr lang="en-US" b="1" dirty="0">
+              <a:solidFill>
+                <a:schemeClr val="bg1"/>
+              </a:solidFill>
+            </a:endParaRPr>
+          </a:p>
+        </p:txBody>
+      </p:sp>
+      <p:sp>
+        <p:nvSpPr>
+          <p:cNvPr id="29" name="Rectangle 28"/>
+          <p:cNvSpPr/>
+          <p:nvPr/>
+        </p:nvSpPr>
+        <p:spPr>
+          <a:xfrm>
+            <a:off x="5408133" y="987386"/>
+            <a:ext cx="1841865" cy="653143"/>
+          </a:xfrm>
+          <a:prstGeom prst="rect">
+            <a:avLst/>
+          </a:prstGeom>
+          <a:solidFill>
+            <a:srgbClr val="FF0000"/>
+          </a:solidFill>
+        </p:spPr>
+        <p:style>
+          <a:lnRef idx="2">
+            <a:schemeClr val="accent1">
+              <a:shade val="50000"/>
+            </a:schemeClr>
+          </a:lnRef>
+          <a:fillRef idx="1">
+            <a:schemeClr val="accent1"/>
+          </a:fillRef>
+          <a:effectRef idx="0">
+            <a:schemeClr val="accent1"/>
+          </a:effectRef>
+          <a:fontRef idx="minor">
+            <a:schemeClr val="lt1"/>
+          </a:fontRef>
+        </p:style>
+        <p:txBody>
+          <a:bodyPr rtlCol="0" anchor="ctr"/>
+          <a:lstStyle/>
+          <a:p>
+            <a:pPr algn="ctr"/>
+            <a:r>
+              <a:rPr lang="en-US" b="1" dirty="0" smtClean="0">
+                <a:solidFill>
+                  <a:schemeClr val="bg1"/>
+                </a:solidFill>
+                <a:latin typeface="Consolas" panose="020B0609020204030204" pitchFamily="49" charset="0"/>
+              </a:rPr>
+              <a:t>''</a:t>
+            </a:r>
+            <a:endParaRPr lang="en-US" b="1" dirty="0">
+              <a:solidFill>
+                <a:schemeClr val="bg1"/>
+              </a:solidFill>
+            </a:endParaRPr>
+          </a:p>
+        </p:txBody>
+      </p:sp>
+      <p:sp>
+        <p:nvSpPr>
+          <p:cNvPr id="31" name="Rectangle 30"/>
+          <p:cNvSpPr/>
+          <p:nvPr/>
+        </p:nvSpPr>
+        <p:spPr>
+          <a:xfrm>
+            <a:off x="5408132" y="1649379"/>
+            <a:ext cx="1841865" cy="653143"/>
+          </a:xfrm>
+          <a:prstGeom prst="rect">
+            <a:avLst/>
+          </a:prstGeom>
+          <a:solidFill>
+            <a:srgbClr val="FF0000"/>
+          </a:solidFill>
+        </p:spPr>
+        <p:style>
+          <a:lnRef idx="2">
+            <a:schemeClr val="accent2">
+              <a:shade val="50000"/>
+            </a:schemeClr>
+          </a:lnRef>
+          <a:fillRef idx="1">
+            <a:schemeClr val="accent2"/>
+          </a:fillRef>
+          <a:effectRef idx="0">
+            <a:schemeClr val="accent2"/>
+          </a:effectRef>
+          <a:fontRef idx="minor">
+            <a:schemeClr val="lt1"/>
+          </a:fontRef>
+        </p:style>
+        <p:txBody>
+          <a:bodyPr rtlCol="0" anchor="ctr"/>
+          <a:lstStyle/>
+          <a:p>
+            <a:pPr algn="ctr"/>
+            <a:r>
+              <a:rPr lang="en-US" b="1" dirty="0" smtClean="0">
+                <a:solidFill>
+                  <a:schemeClr val="bg1"/>
+                </a:solidFill>
+                <a:effectLst/>
+                <a:latin typeface="Consolas" panose="020B0609020204030204" pitchFamily="49" charset="0"/>
+              </a:rPr>
+              <a:t>0</a:t>
+            </a:r>
+            <a:endParaRPr lang="en-US" b="1" dirty="0">
+              <a:solidFill>
+                <a:schemeClr val="bg1"/>
+              </a:solidFill>
+            </a:endParaRPr>
+          </a:p>
+        </p:txBody>
+      </p:sp>
+      <p:sp>
+        <p:nvSpPr>
+          <p:cNvPr id="34" name="Rectangle 33"/>
+          <p:cNvSpPr/>
+          <p:nvPr/>
+        </p:nvSpPr>
+        <p:spPr>
+          <a:xfrm>
+            <a:off x="2091398" y="4440139"/>
+            <a:ext cx="8289449" cy="646331"/>
+          </a:xfrm>
+          <a:prstGeom prst="rect">
+            <a:avLst/>
+          </a:prstGeom>
+        </p:spPr>
+        <p:txBody>
+          <a:bodyPr wrap="none">
+            <a:spAutoFit/>
+          </a:bodyPr>
+          <a:lstStyle/>
+          <a:p>
+            <a:r>
+              <a:rPr lang="en-US" b="1" dirty="0">
+                <a:solidFill>
+                  <a:schemeClr val="accent6">
+                    <a:lumMod val="50000"/>
+                  </a:schemeClr>
+                </a:solidFill>
+                <a:latin typeface="Consolas" panose="020B0609020204030204" pitchFamily="49" charset="0"/>
+              </a:rPr>
+              <a:t> test('</a:t>
+            </a:r>
+            <a:r>
+              <a:rPr lang="en-US" b="1" dirty="0" err="1">
+                <a:solidFill>
+                  <a:schemeClr val="accent6">
+                    <a:lumMod val="50000"/>
+                  </a:schemeClr>
+                </a:solidFill>
+                <a:latin typeface="Consolas" panose="020B0609020204030204" pitchFamily="49" charset="0"/>
+              </a:rPr>
+              <a:t>mappedFlavour</a:t>
+            </a:r>
+            <a:r>
+              <a:rPr lang="en-US" b="1" dirty="0">
+                <a:solidFill>
+                  <a:schemeClr val="accent6">
+                    <a:lumMod val="50000"/>
+                  </a:schemeClr>
+                </a:solidFill>
+                <a:latin typeface="Consolas" panose="020B0609020204030204" pitchFamily="49" charset="0"/>
+              </a:rPr>
+              <a:t> has no value 0',</a:t>
+            </a:r>
+          </a:p>
+          <a:p>
+            <a:r>
+              <a:rPr lang="en-US" b="1" dirty="0">
+                <a:solidFill>
+                  <a:schemeClr val="accent6">
+                    <a:lumMod val="50000"/>
+                  </a:schemeClr>
+                </a:solidFill>
+                <a:latin typeface="Consolas" panose="020B0609020204030204" pitchFamily="49" charset="0"/>
+              </a:rPr>
+              <a:t>        () =&gt; expect(!</a:t>
+            </a:r>
+            <a:r>
+              <a:rPr lang="en-US" b="1" dirty="0" err="1">
+                <a:solidFill>
+                  <a:schemeClr val="accent6">
+                    <a:lumMod val="50000"/>
+                  </a:schemeClr>
+                </a:solidFill>
+                <a:latin typeface="Consolas" panose="020B0609020204030204" pitchFamily="49" charset="0"/>
+              </a:rPr>
+              <a:t>mappedFlavours.containsValue</a:t>
+            </a:r>
+            <a:r>
+              <a:rPr lang="en-US" b="1" dirty="0">
+                <a:solidFill>
+                  <a:schemeClr val="accent6">
+                    <a:lumMod val="50000"/>
+                  </a:schemeClr>
+                </a:solidFill>
+                <a:latin typeface="Consolas" panose="020B0609020204030204" pitchFamily="49" charset="0"/>
+              </a:rPr>
+              <a:t>(0), </a:t>
+            </a:r>
+            <a:r>
+              <a:rPr lang="en-US" b="1" dirty="0" err="1">
+                <a:solidFill>
+                  <a:schemeClr val="accent6">
+                    <a:lumMod val="50000"/>
+                  </a:schemeClr>
+                </a:solidFill>
+                <a:latin typeface="Consolas" panose="020B0609020204030204" pitchFamily="49" charset="0"/>
+              </a:rPr>
+              <a:t>isTrue</a:t>
+            </a:r>
+            <a:r>
+              <a:rPr lang="en-US" b="1" dirty="0">
+                <a:solidFill>
+                  <a:schemeClr val="accent6">
+                    <a:lumMod val="50000"/>
+                  </a:schemeClr>
+                </a:solidFill>
+                <a:latin typeface="Consolas" panose="020B0609020204030204" pitchFamily="49" charset="0"/>
+              </a:rPr>
+              <a:t>));</a:t>
+            </a:r>
+            <a:endParaRPr lang="en-US" b="1" dirty="0">
+              <a:solidFill>
+                <a:schemeClr val="accent6">
+                  <a:lumMod val="50000"/>
+                </a:schemeClr>
+              </a:solidFill>
+              <a:effectLst/>
+              <a:latin typeface="Consolas" panose="020B0609020204030204" pitchFamily="49" charset="0"/>
+            </a:endParaRPr>
+          </a:p>
+        </p:txBody>
+      </p:sp>
+    </p:spTree>
+    <p:extLst>
+      <p:ext uri="{BB962C8B-B14F-4D97-AF65-F5344CB8AC3E}">
+        <p14:creationId xmlns:p14="http://schemas.microsoft.com/office/powerpoint/2010/main" val="1367617125"/>
+      </p:ext>
+    </p:extLst>
+  </p:cSld>
+  <p:clrMapOvr>
+    <a:masterClrMapping/>
+  </p:clrMapOvr>
+  <p:timing>
+    <p:tnLst>
+      <p:par>
+        <p:cTn id="1" dur="indefinite" restart="never" nodeType="tmRoot"/>
+      </p:par>
+    </p:tnLst>
+  </p:timing>
+</p:sld>
+</file>
+
+<file path=ppt/slides/slide34.xml><?xml version="1.0" encoding="utf-8"?>
+<p:sld xmlns:a="http://schemas.openxmlformats.org/drawingml/2006/main" xmlns:r="http://schemas.openxmlformats.org/officeDocument/2006/relationships" xmlns:p="http://schemas.openxmlformats.org/presentationml/2006/main">
+  <p:cSld>
+    <p:spTree>
+      <p:nvGrpSpPr>
+        <p:cNvPr id="1" name=""/>
+        <p:cNvGrpSpPr/>
+        <p:nvPr/>
+      </p:nvGrpSpPr>
+      <p:grpSpPr>
+        <a:xfrm>
+          <a:off x="0" y="0"/>
+          <a:ext cx="0" cy="0"/>
+          <a:chOff x="0" y="0"/>
+          <a:chExt cx="0" cy="0"/>
+        </a:xfrm>
+      </p:grpSpPr>
+      <p:sp>
+        <p:nvSpPr>
+          <p:cNvPr id="5" name="Rectangle 4"/>
+          <p:cNvSpPr/>
+          <p:nvPr/>
+        </p:nvSpPr>
+        <p:spPr>
+          <a:xfrm>
+            <a:off x="3649355" y="3556557"/>
+            <a:ext cx="4957711" cy="369332"/>
+          </a:xfrm>
+          <a:prstGeom prst="rect">
+            <a:avLst/>
+          </a:prstGeom>
+        </p:spPr>
+        <p:txBody>
+          <a:bodyPr wrap="square">
+            <a:spAutoFit/>
+          </a:bodyPr>
+          <a:lstStyle/>
+          <a:p>
+            <a:r>
+              <a:rPr lang="en-US" b="1" dirty="0" smtClean="0">
+                <a:solidFill>
+                  <a:srgbClr val="C00000"/>
+                </a:solidFill>
+                <a:latin typeface="Consolas" panose="020B0609020204030204" pitchFamily="49" charset="0"/>
+              </a:rPr>
+              <a:t>3. </a:t>
+            </a:r>
+            <a:r>
+              <a:rPr lang="en-US" b="1" dirty="0" err="1" smtClean="0">
+                <a:solidFill>
+                  <a:srgbClr val="C00000"/>
+                </a:solidFill>
+                <a:latin typeface="Consolas" panose="020B0609020204030204" pitchFamily="49" charset="0"/>
+              </a:rPr>
+              <a:t>mappedFlavour</a:t>
+            </a:r>
+            <a:r>
+              <a:rPr lang="en-US" b="1" dirty="0" smtClean="0">
+                <a:solidFill>
+                  <a:srgbClr val="C00000"/>
+                </a:solidFill>
+                <a:latin typeface="Consolas" panose="020B0609020204030204" pitchFamily="49" charset="0"/>
+              </a:rPr>
+              <a:t> </a:t>
+            </a:r>
+            <a:r>
+              <a:rPr lang="en-US" b="1" dirty="0">
+                <a:solidFill>
+                  <a:srgbClr val="C00000"/>
+                </a:solidFill>
+                <a:latin typeface="Consolas" panose="020B0609020204030204" pitchFamily="49" charset="0"/>
+              </a:rPr>
+              <a:t>has no blank entries.</a:t>
+            </a:r>
+            <a:endParaRPr lang="en-US" b="1" dirty="0" smtClean="0">
+              <a:solidFill>
+                <a:srgbClr val="C00000"/>
+              </a:solidFill>
+              <a:latin typeface="Consolas" panose="020B0609020204030204" pitchFamily="49" charset="0"/>
+            </a:endParaRPr>
+          </a:p>
+        </p:txBody>
+      </p:sp>
+      <p:sp>
+        <p:nvSpPr>
+          <p:cNvPr id="34" name="Rectangle 33"/>
+          <p:cNvSpPr/>
+          <p:nvPr/>
+        </p:nvSpPr>
+        <p:spPr>
+          <a:xfrm>
+            <a:off x="1711354" y="4361762"/>
+            <a:ext cx="10189008" cy="1754326"/>
+          </a:xfrm>
+          <a:prstGeom prst="rect">
+            <a:avLst/>
+          </a:prstGeom>
+        </p:spPr>
+        <p:txBody>
+          <a:bodyPr wrap="none">
+            <a:spAutoFit/>
+          </a:bodyPr>
+          <a:lstStyle/>
+          <a:p>
+            <a:r>
+              <a:rPr lang="en-US" b="1" dirty="0">
+                <a:solidFill>
+                  <a:schemeClr val="accent6">
+                    <a:lumMod val="50000"/>
+                  </a:schemeClr>
+                </a:solidFill>
+                <a:latin typeface="Consolas" panose="020B0609020204030204" pitchFamily="49" charset="0"/>
+              </a:rPr>
+              <a:t>test(</a:t>
+            </a:r>
+          </a:p>
+          <a:p>
+            <a:r>
+              <a:rPr lang="en-US" b="1" dirty="0">
+                <a:solidFill>
+                  <a:schemeClr val="accent6">
+                    <a:lumMod val="50000"/>
+                  </a:schemeClr>
+                </a:solidFill>
+                <a:latin typeface="Consolas" panose="020B0609020204030204" pitchFamily="49" charset="0"/>
+              </a:rPr>
+              <a:t>        '</a:t>
+            </a:r>
+            <a:r>
+              <a:rPr lang="en-US" b="1" dirty="0" err="1">
+                <a:solidFill>
+                  <a:schemeClr val="accent6">
+                    <a:lumMod val="50000"/>
+                  </a:schemeClr>
+                </a:solidFill>
+                <a:latin typeface="Consolas" panose="020B0609020204030204" pitchFamily="49" charset="0"/>
+              </a:rPr>
+              <a:t>mappedFlavour</a:t>
+            </a:r>
+            <a:r>
+              <a:rPr lang="en-US" b="1" dirty="0">
+                <a:solidFill>
+                  <a:schemeClr val="accent6">
+                    <a:lumMod val="50000"/>
+                  </a:schemeClr>
+                </a:solidFill>
+                <a:latin typeface="Consolas" panose="020B0609020204030204" pitchFamily="49" charset="0"/>
+              </a:rPr>
+              <a:t> has no blank entries',</a:t>
+            </a:r>
+          </a:p>
+          <a:p>
+            <a:r>
+              <a:rPr lang="en-US" b="1" dirty="0">
+                <a:solidFill>
+                  <a:schemeClr val="accent6">
+                    <a:lumMod val="50000"/>
+                  </a:schemeClr>
+                </a:solidFill>
+                <a:latin typeface="Consolas" panose="020B0609020204030204" pitchFamily="49" charset="0"/>
+              </a:rPr>
+              <a:t>        () =&gt; expect(</a:t>
+            </a:r>
+          </a:p>
+          <a:p>
+            <a:r>
+              <a:rPr lang="en-US" b="1" dirty="0">
+                <a:solidFill>
+                  <a:schemeClr val="accent6">
+                    <a:lumMod val="50000"/>
+                  </a:schemeClr>
+                </a:solidFill>
+                <a:latin typeface="Consolas" panose="020B0609020204030204" pitchFamily="49" charset="0"/>
+              </a:rPr>
+              <a:t>            </a:t>
+            </a:r>
+            <a:r>
+              <a:rPr lang="en-US" b="1" dirty="0" err="1">
+                <a:solidFill>
+                  <a:schemeClr val="accent6">
+                    <a:lumMod val="50000"/>
+                  </a:schemeClr>
+                </a:solidFill>
+                <a:latin typeface="Consolas" panose="020B0609020204030204" pitchFamily="49" charset="0"/>
+              </a:rPr>
+              <a:t>mappedFlavours.containsKey</a:t>
+            </a:r>
+            <a:r>
+              <a:rPr lang="en-US" b="1" dirty="0">
+                <a:solidFill>
+                  <a:schemeClr val="accent6">
+                    <a:lumMod val="50000"/>
+                  </a:schemeClr>
+                </a:solidFill>
+                <a:latin typeface="Consolas" panose="020B0609020204030204" pitchFamily="49" charset="0"/>
+              </a:rPr>
+              <a:t>('') &amp;&amp; </a:t>
+            </a:r>
+            <a:r>
+              <a:rPr lang="en-US" b="1" dirty="0" err="1">
+                <a:solidFill>
+                  <a:schemeClr val="accent6">
+                    <a:lumMod val="50000"/>
+                  </a:schemeClr>
+                </a:solidFill>
+                <a:latin typeface="Consolas" panose="020B0609020204030204" pitchFamily="49" charset="0"/>
+              </a:rPr>
+              <a:t>mappedFlavours.containsValue</a:t>
+            </a:r>
+            <a:r>
+              <a:rPr lang="en-US" b="1" dirty="0">
+                <a:solidFill>
+                  <a:schemeClr val="accent6">
+                    <a:lumMod val="50000"/>
+                  </a:schemeClr>
+                </a:solidFill>
+                <a:latin typeface="Consolas" panose="020B0609020204030204" pitchFamily="49" charset="0"/>
+              </a:rPr>
+              <a:t>(''),</a:t>
+            </a:r>
+          </a:p>
+          <a:p>
+            <a:r>
+              <a:rPr lang="en-US" b="1" dirty="0">
+                <a:solidFill>
+                  <a:schemeClr val="accent6">
+                    <a:lumMod val="50000"/>
+                  </a:schemeClr>
+                </a:solidFill>
+                <a:latin typeface="Consolas" panose="020B0609020204030204" pitchFamily="49" charset="0"/>
+              </a:rPr>
+              <a:t>            </a:t>
+            </a:r>
+            <a:r>
+              <a:rPr lang="en-US" b="1" dirty="0" err="1">
+                <a:solidFill>
+                  <a:schemeClr val="accent6">
+                    <a:lumMod val="50000"/>
+                  </a:schemeClr>
+                </a:solidFill>
+                <a:latin typeface="Consolas" panose="020B0609020204030204" pitchFamily="49" charset="0"/>
+              </a:rPr>
+              <a:t>isFalse</a:t>
+            </a:r>
+            <a:r>
+              <a:rPr lang="en-US" b="1" dirty="0" smtClean="0">
+                <a:solidFill>
+                  <a:schemeClr val="accent6">
+                    <a:lumMod val="50000"/>
+                  </a:schemeClr>
+                </a:solidFill>
+                <a:latin typeface="Consolas" panose="020B0609020204030204" pitchFamily="49" charset="0"/>
+              </a:rPr>
+              <a:t>)</a:t>
+            </a:r>
+          </a:p>
+          <a:p>
+            <a:r>
+              <a:rPr lang="en-US" b="1" dirty="0">
+                <a:solidFill>
+                  <a:schemeClr val="accent6">
+                    <a:lumMod val="50000"/>
+                  </a:schemeClr>
+                </a:solidFill>
+                <a:latin typeface="Consolas" panose="020B0609020204030204" pitchFamily="49" charset="0"/>
+              </a:rPr>
+              <a:t> </a:t>
+            </a:r>
+            <a:r>
+              <a:rPr lang="en-US" b="1" dirty="0" smtClean="0">
+                <a:solidFill>
+                  <a:schemeClr val="accent6">
+                    <a:lumMod val="50000"/>
+                  </a:schemeClr>
+                </a:solidFill>
+                <a:latin typeface="Consolas" panose="020B0609020204030204" pitchFamily="49" charset="0"/>
+              </a:rPr>
+              <a:t>   );</a:t>
+            </a:r>
+            <a:endParaRPr lang="en-US" b="1" dirty="0">
+              <a:solidFill>
+                <a:schemeClr val="accent6">
+                  <a:lumMod val="50000"/>
+                </a:schemeClr>
+              </a:solidFill>
+              <a:effectLst/>
+              <a:latin typeface="Consolas" panose="020B0609020204030204" pitchFamily="49" charset="0"/>
+            </a:endParaRPr>
+          </a:p>
+        </p:txBody>
+      </p:sp>
+      <p:sp>
+        <p:nvSpPr>
+          <p:cNvPr id="25" name="Rectangle 24"/>
+          <p:cNvSpPr/>
+          <p:nvPr/>
+        </p:nvSpPr>
+        <p:spPr>
+          <a:xfrm>
+            <a:off x="696927" y="249918"/>
+            <a:ext cx="4237057" cy="369332"/>
+          </a:xfrm>
+          <a:prstGeom prst="rect">
+            <a:avLst/>
+          </a:prstGeom>
+        </p:spPr>
+        <p:txBody>
+          <a:bodyPr wrap="none">
+            <a:spAutoFit/>
+          </a:bodyPr>
+          <a:lstStyle/>
+          <a:p>
+            <a:r>
+              <a:rPr lang="en-US" b="1" dirty="0">
+                <a:solidFill>
+                  <a:srgbClr val="386BC4"/>
+                </a:solidFill>
+                <a:latin typeface="Consolas" panose="020B0609020204030204" pitchFamily="49" charset="0"/>
+              </a:rPr>
+              <a:t>Map&lt;String, bool&gt; </a:t>
+            </a:r>
+            <a:r>
+              <a:rPr lang="en-US" b="1" dirty="0" err="1">
+                <a:solidFill>
+                  <a:srgbClr val="386BC4"/>
+                </a:solidFill>
+                <a:latin typeface="Consolas" panose="020B0609020204030204" pitchFamily="49" charset="0"/>
+              </a:rPr>
+              <a:t>mappedFlavours</a:t>
+            </a:r>
+            <a:endParaRPr lang="en-US" b="1" dirty="0">
+              <a:solidFill>
+                <a:srgbClr val="386BC4"/>
+              </a:solidFill>
+              <a:latin typeface="Consolas" panose="020B0609020204030204" pitchFamily="49" charset="0"/>
+            </a:endParaRPr>
+          </a:p>
+        </p:txBody>
+      </p:sp>
+      <p:grpSp>
+        <p:nvGrpSpPr>
+          <p:cNvPr id="26" name="Group 25"/>
+          <p:cNvGrpSpPr/>
+          <p:nvPr/>
+        </p:nvGrpSpPr>
+        <p:grpSpPr>
+          <a:xfrm>
+            <a:off x="493623" y="785116"/>
+            <a:ext cx="4348495" cy="1305072"/>
+            <a:chOff x="2525098" y="3134975"/>
+            <a:chExt cx="6235723" cy="1305072"/>
+          </a:xfrm>
+        </p:grpSpPr>
+        <p:sp>
+          <p:nvSpPr>
+            <p:cNvPr id="27" name="Rectangle 26"/>
+            <p:cNvSpPr/>
+            <p:nvPr/>
+          </p:nvSpPr>
+          <p:spPr>
+            <a:xfrm>
+              <a:off x="2525099" y="3134975"/>
+              <a:ext cx="1467780" cy="653143"/>
+            </a:xfrm>
+            <a:prstGeom prst="rect">
+              <a:avLst/>
+            </a:prstGeom>
+          </p:spPr>
+          <p:style>
+            <a:lnRef idx="2">
+              <a:schemeClr val="accent1">
+                <a:shade val="50000"/>
+              </a:schemeClr>
+            </a:lnRef>
+            <a:fillRef idx="1">
+              <a:schemeClr val="accent1"/>
+            </a:fillRef>
+            <a:effectRef idx="0">
+              <a:schemeClr val="accent1"/>
+            </a:effectRef>
+            <a:fontRef idx="minor">
+              <a:schemeClr val="lt1"/>
+            </a:fontRef>
+          </p:style>
+          <p:txBody>
+            <a:bodyPr rtlCol="0" anchor="ctr"/>
+            <a:lstStyle/>
+            <a:p>
+              <a:pPr algn="ctr"/>
+              <a:r>
+                <a:rPr lang="en-US" b="1" dirty="0" smtClean="0">
+                  <a:solidFill>
+                    <a:schemeClr val="bg1"/>
+                  </a:solidFill>
+                  <a:latin typeface="Consolas" panose="020B0609020204030204" pitchFamily="49" charset="0"/>
+                </a:rPr>
+                <a:t>''</a:t>
+              </a:r>
+              <a:endParaRPr lang="en-US" b="1" dirty="0">
+                <a:solidFill>
+                  <a:schemeClr val="bg1"/>
+                </a:solidFill>
+              </a:endParaRPr>
+            </a:p>
+          </p:txBody>
+        </p:sp>
+        <p:sp>
+          <p:nvSpPr>
+            <p:cNvPr id="28" name="Rectangle 27"/>
+            <p:cNvSpPr/>
+            <p:nvPr/>
+          </p:nvSpPr>
+          <p:spPr>
+            <a:xfrm>
+              <a:off x="3992878" y="3134975"/>
+              <a:ext cx="1463039" cy="653143"/>
+            </a:xfrm>
+            <a:prstGeom prst="rect">
+              <a:avLst/>
+            </a:prstGeom>
+          </p:spPr>
+          <p:style>
+            <a:lnRef idx="2">
+              <a:schemeClr val="accent1">
+                <a:shade val="50000"/>
+              </a:schemeClr>
+            </a:lnRef>
+            <a:fillRef idx="1">
+              <a:schemeClr val="accent1"/>
+            </a:fillRef>
+            <a:effectRef idx="0">
+              <a:schemeClr val="accent1"/>
+            </a:effectRef>
+            <a:fontRef idx="minor">
+              <a:schemeClr val="lt1"/>
+            </a:fontRef>
+          </p:style>
+          <p:txBody>
+            <a:bodyPr rtlCol="0" anchor="ctr"/>
+            <a:lstStyle/>
+            <a:p>
+              <a:pPr algn="ctr"/>
+              <a:r>
+                <a:rPr lang="en-US" b="1" dirty="0">
+                  <a:solidFill>
+                    <a:schemeClr val="bg1"/>
+                  </a:solidFill>
+                  <a:latin typeface="Consolas" panose="020B0609020204030204" pitchFamily="49" charset="0"/>
+                </a:rPr>
+                <a:t>''</a:t>
+              </a:r>
+              <a:endParaRPr lang="en-US" b="1" dirty="0">
+                <a:solidFill>
+                  <a:schemeClr val="bg1"/>
+                </a:solidFill>
+              </a:endParaRPr>
+            </a:p>
+          </p:txBody>
+        </p:sp>
+        <p:sp>
+          <p:nvSpPr>
+            <p:cNvPr id="30" name="Rectangle 29"/>
+            <p:cNvSpPr/>
+            <p:nvPr/>
+          </p:nvSpPr>
+          <p:spPr>
+            <a:xfrm>
+              <a:off x="5455917" y="3134975"/>
+              <a:ext cx="1463039" cy="653143"/>
+            </a:xfrm>
+            <a:prstGeom prst="rect">
+              <a:avLst/>
+            </a:prstGeom>
+          </p:spPr>
+          <p:style>
+            <a:lnRef idx="2">
+              <a:schemeClr val="accent1">
+                <a:shade val="50000"/>
+              </a:schemeClr>
+            </a:lnRef>
+            <a:fillRef idx="1">
+              <a:schemeClr val="accent1"/>
+            </a:fillRef>
+            <a:effectRef idx="0">
+              <a:schemeClr val="accent1"/>
+            </a:effectRef>
+            <a:fontRef idx="minor">
+              <a:schemeClr val="lt1"/>
+            </a:fontRef>
+          </p:style>
+          <p:txBody>
+            <a:bodyPr rtlCol="0" anchor="ctr"/>
+            <a:lstStyle/>
+            <a:p>
+              <a:pPr algn="ctr"/>
+              <a:r>
+                <a:rPr lang="en-US" b="1" dirty="0">
+                  <a:solidFill>
+                    <a:schemeClr val="bg1"/>
+                  </a:solidFill>
+                  <a:latin typeface="Consolas" panose="020B0609020204030204" pitchFamily="49" charset="0"/>
+                </a:rPr>
+                <a:t>''</a:t>
+              </a:r>
+              <a:endParaRPr lang="en-US" b="1" dirty="0">
+                <a:solidFill>
+                  <a:schemeClr val="bg1"/>
+                </a:solidFill>
+              </a:endParaRPr>
+            </a:p>
+          </p:txBody>
+        </p:sp>
+        <p:sp>
+          <p:nvSpPr>
+            <p:cNvPr id="32" name="Rectangle 31"/>
+            <p:cNvSpPr/>
+            <p:nvPr/>
+          </p:nvSpPr>
+          <p:spPr>
+            <a:xfrm>
+              <a:off x="6918956" y="3134975"/>
+              <a:ext cx="1841865" cy="653143"/>
+            </a:xfrm>
+            <a:prstGeom prst="rect">
+              <a:avLst/>
+            </a:prstGeom>
+          </p:spPr>
+          <p:style>
+            <a:lnRef idx="2">
+              <a:schemeClr val="accent1">
+                <a:shade val="50000"/>
+              </a:schemeClr>
+            </a:lnRef>
+            <a:fillRef idx="1">
+              <a:schemeClr val="accent1"/>
+            </a:fillRef>
+            <a:effectRef idx="0">
+              <a:schemeClr val="accent1"/>
+            </a:effectRef>
+            <a:fontRef idx="minor">
+              <a:schemeClr val="lt1"/>
+            </a:fontRef>
+          </p:style>
+          <p:txBody>
+            <a:bodyPr rtlCol="0" anchor="ctr"/>
+            <a:lstStyle/>
+            <a:p>
+              <a:pPr algn="ctr"/>
+              <a:r>
+                <a:rPr lang="en-US" b="1" dirty="0">
+                  <a:solidFill>
+                    <a:schemeClr val="bg1"/>
+                  </a:solidFill>
+                  <a:latin typeface="Consolas" panose="020B0609020204030204" pitchFamily="49" charset="0"/>
+                </a:rPr>
+                <a:t>''</a:t>
+              </a:r>
+              <a:endParaRPr lang="en-US" b="1" dirty="0">
+                <a:solidFill>
+                  <a:schemeClr val="bg1"/>
+                </a:solidFill>
+              </a:endParaRPr>
+            </a:p>
+          </p:txBody>
+        </p:sp>
+        <p:sp>
+          <p:nvSpPr>
+            <p:cNvPr id="33" name="Rectangle 32"/>
+            <p:cNvSpPr/>
+            <p:nvPr/>
+          </p:nvSpPr>
+          <p:spPr>
+            <a:xfrm>
+              <a:off x="2525098" y="3786904"/>
+              <a:ext cx="1463039" cy="653143"/>
+            </a:xfrm>
+            <a:prstGeom prst="rect">
+              <a:avLst/>
+            </a:prstGeom>
+          </p:spPr>
+          <p:style>
+            <a:lnRef idx="2">
+              <a:schemeClr val="accent2">
+                <a:shade val="50000"/>
+              </a:schemeClr>
+            </a:lnRef>
+            <a:fillRef idx="1">
+              <a:schemeClr val="accent2"/>
+            </a:fillRef>
+            <a:effectRef idx="0">
+              <a:schemeClr val="accent2"/>
+            </a:effectRef>
+            <a:fontRef idx="minor">
+              <a:schemeClr val="lt1"/>
+            </a:fontRef>
+          </p:style>
+          <p:txBody>
+            <a:bodyPr rtlCol="0" anchor="ctr"/>
+            <a:lstStyle/>
+            <a:p>
+              <a:pPr algn="ctr"/>
+              <a:r>
+                <a:rPr lang="en-US" b="1" dirty="0">
+                  <a:solidFill>
+                    <a:schemeClr val="bg1"/>
+                  </a:solidFill>
+                  <a:latin typeface="Consolas" panose="020B0609020204030204" pitchFamily="49" charset="0"/>
+                </a:rPr>
+                <a:t>''</a:t>
+              </a:r>
+            </a:p>
+          </p:txBody>
+        </p:sp>
+        <p:sp>
+          <p:nvSpPr>
+            <p:cNvPr id="35" name="Rectangle 34"/>
+            <p:cNvSpPr/>
+            <p:nvPr/>
+          </p:nvSpPr>
+          <p:spPr>
+            <a:xfrm>
+              <a:off x="3992877" y="3786904"/>
+              <a:ext cx="1463039" cy="653143"/>
+            </a:xfrm>
+            <a:prstGeom prst="rect">
+              <a:avLst/>
+            </a:prstGeom>
+          </p:spPr>
+          <p:style>
+            <a:lnRef idx="2">
+              <a:schemeClr val="accent2">
+                <a:shade val="50000"/>
+              </a:schemeClr>
+            </a:lnRef>
+            <a:fillRef idx="1">
+              <a:schemeClr val="accent2"/>
+            </a:fillRef>
+            <a:effectRef idx="0">
+              <a:schemeClr val="accent2"/>
+            </a:effectRef>
+            <a:fontRef idx="minor">
+              <a:schemeClr val="lt1"/>
+            </a:fontRef>
+          </p:style>
+          <p:txBody>
+            <a:bodyPr rtlCol="0" anchor="ctr"/>
+            <a:lstStyle/>
+            <a:p>
+              <a:pPr algn="ctr"/>
+              <a:r>
+                <a:rPr lang="en-US" b="1" dirty="0">
+                  <a:solidFill>
+                    <a:schemeClr val="bg1"/>
+                  </a:solidFill>
+                  <a:latin typeface="Consolas" panose="020B0609020204030204" pitchFamily="49" charset="0"/>
+                </a:rPr>
+                <a:t>''</a:t>
+              </a:r>
+              <a:endParaRPr lang="en-US" b="1" dirty="0">
+                <a:solidFill>
+                  <a:schemeClr val="bg1"/>
+                </a:solidFill>
+              </a:endParaRPr>
+            </a:p>
+            <a:p>
+              <a:pPr algn="ctr"/>
+              <a:endParaRPr lang="en-US" b="1" dirty="0">
+                <a:solidFill>
+                  <a:schemeClr val="bg1"/>
+                </a:solidFill>
+              </a:endParaRPr>
+            </a:p>
+          </p:txBody>
+        </p:sp>
+        <p:sp>
+          <p:nvSpPr>
+            <p:cNvPr id="36" name="Rectangle 35"/>
+            <p:cNvSpPr/>
+            <p:nvPr/>
+          </p:nvSpPr>
+          <p:spPr>
+            <a:xfrm>
+              <a:off x="5455917" y="3786904"/>
+              <a:ext cx="1463039" cy="653143"/>
+            </a:xfrm>
+            <a:prstGeom prst="rect">
+              <a:avLst/>
+            </a:prstGeom>
+          </p:spPr>
+          <p:style>
+            <a:lnRef idx="2">
+              <a:schemeClr val="accent2">
+                <a:shade val="50000"/>
+              </a:schemeClr>
+            </a:lnRef>
+            <a:fillRef idx="1">
+              <a:schemeClr val="accent2"/>
+            </a:fillRef>
+            <a:effectRef idx="0">
+              <a:schemeClr val="accent2"/>
+            </a:effectRef>
+            <a:fontRef idx="minor">
+              <a:schemeClr val="lt1"/>
+            </a:fontRef>
+          </p:style>
+          <p:txBody>
+            <a:bodyPr rtlCol="0" anchor="ctr"/>
+            <a:lstStyle/>
+            <a:p>
+              <a:pPr algn="ctr"/>
+              <a:r>
+                <a:rPr lang="en-US" b="1" dirty="0">
+                  <a:solidFill>
+                    <a:schemeClr val="bg1"/>
+                  </a:solidFill>
+                  <a:latin typeface="Consolas" panose="020B0609020204030204" pitchFamily="49" charset="0"/>
+                </a:rPr>
+                <a:t>''</a:t>
+              </a:r>
+              <a:endParaRPr lang="en-US" b="1" dirty="0">
+                <a:solidFill>
+                  <a:schemeClr val="bg1"/>
+                </a:solidFill>
+              </a:endParaRPr>
+            </a:p>
+            <a:p>
+              <a:pPr algn="ctr"/>
+              <a:endParaRPr lang="en-US" b="1" dirty="0">
+                <a:solidFill>
+                  <a:schemeClr val="bg1"/>
+                </a:solidFill>
+              </a:endParaRPr>
+            </a:p>
+          </p:txBody>
+        </p:sp>
+        <p:sp>
+          <p:nvSpPr>
+            <p:cNvPr id="37" name="Rectangle 36"/>
+            <p:cNvSpPr/>
+            <p:nvPr/>
+          </p:nvSpPr>
+          <p:spPr>
+            <a:xfrm>
+              <a:off x="6918956" y="3786904"/>
+              <a:ext cx="1841865" cy="653143"/>
+            </a:xfrm>
+            <a:prstGeom prst="rect">
+              <a:avLst/>
+            </a:prstGeom>
+          </p:spPr>
+          <p:style>
+            <a:lnRef idx="2">
+              <a:schemeClr val="accent2">
+                <a:shade val="50000"/>
+              </a:schemeClr>
+            </a:lnRef>
+            <a:fillRef idx="1">
+              <a:schemeClr val="accent2"/>
+            </a:fillRef>
+            <a:effectRef idx="0">
+              <a:schemeClr val="accent2"/>
+            </a:effectRef>
+            <a:fontRef idx="minor">
+              <a:schemeClr val="lt1"/>
+            </a:fontRef>
+          </p:style>
+          <p:txBody>
+            <a:bodyPr rtlCol="0" anchor="ctr"/>
+            <a:lstStyle/>
+            <a:p>
+              <a:pPr algn="ctr"/>
+              <a:r>
+                <a:rPr lang="en-US" b="1" dirty="0">
+                  <a:solidFill>
+                    <a:schemeClr val="bg1"/>
+                  </a:solidFill>
+                  <a:latin typeface="Consolas" panose="020B0609020204030204" pitchFamily="49" charset="0"/>
+                </a:rPr>
+                <a:t>''</a:t>
+              </a:r>
+              <a:endParaRPr lang="en-US" b="1" dirty="0">
+                <a:solidFill>
+                  <a:schemeClr val="bg1"/>
+                </a:solidFill>
+              </a:endParaRPr>
+            </a:p>
+          </p:txBody>
+        </p:sp>
+      </p:grpSp>
+      <p:sp>
+        <p:nvSpPr>
+          <p:cNvPr id="38" name="Rectangle 37"/>
+          <p:cNvSpPr/>
+          <p:nvPr/>
+        </p:nvSpPr>
+        <p:spPr>
+          <a:xfrm>
+            <a:off x="609608" y="2149121"/>
+            <a:ext cx="4232510" cy="369332"/>
+          </a:xfrm>
+          <a:prstGeom prst="rect">
+            <a:avLst/>
+          </a:prstGeom>
+        </p:spPr>
+        <p:txBody>
+          <a:bodyPr wrap="square">
+            <a:spAutoFit/>
+          </a:bodyPr>
+          <a:lstStyle/>
+          <a:p>
+            <a:r>
+              <a:rPr lang="en-US" b="1" dirty="0" smtClean="0">
+                <a:effectLst/>
+                <a:latin typeface="Consolas" panose="020B0609020204030204" pitchFamily="49" charset="0"/>
+              </a:rPr>
+              <a:t>  0      1        2        3</a:t>
+            </a:r>
+            <a:endParaRPr lang="en-US" b="1" dirty="0">
+              <a:effectLst/>
+              <a:latin typeface="Consolas" panose="020B0609020204030204" pitchFamily="49" charset="0"/>
+            </a:endParaRPr>
+          </a:p>
+        </p:txBody>
+      </p:sp>
+      <p:sp>
+        <p:nvSpPr>
+          <p:cNvPr id="39" name="Rectangle 38"/>
+          <p:cNvSpPr/>
+          <p:nvPr/>
+        </p:nvSpPr>
+        <p:spPr>
+          <a:xfrm>
+            <a:off x="-48790" y="2256054"/>
+            <a:ext cx="745717" cy="338554"/>
+          </a:xfrm>
+          <a:prstGeom prst="rect">
+            <a:avLst/>
+          </a:prstGeom>
+        </p:spPr>
+        <p:txBody>
+          <a:bodyPr wrap="none">
+            <a:spAutoFit/>
+          </a:bodyPr>
+          <a:lstStyle/>
+          <a:p>
+            <a:r>
+              <a:rPr lang="en-US" sz="1600" b="1" dirty="0" smtClean="0">
+                <a:effectLst/>
+                <a:latin typeface="Consolas" panose="020B0609020204030204" pitchFamily="49" charset="0"/>
+              </a:rPr>
+              <a:t>INDEX</a:t>
+            </a:r>
+            <a:endParaRPr lang="en-US" b="1" dirty="0">
+              <a:effectLst/>
+              <a:latin typeface="Consolas" panose="020B0609020204030204" pitchFamily="49" charset="0"/>
+            </a:endParaRPr>
+          </a:p>
+        </p:txBody>
+      </p:sp>
+      <p:sp>
+        <p:nvSpPr>
+          <p:cNvPr id="41" name="Rectangle 40"/>
+          <p:cNvSpPr/>
+          <p:nvPr/>
+        </p:nvSpPr>
+        <p:spPr>
+          <a:xfrm>
+            <a:off x="6655381" y="201960"/>
+            <a:ext cx="4237057" cy="369332"/>
+          </a:xfrm>
+          <a:prstGeom prst="rect">
+            <a:avLst/>
+          </a:prstGeom>
+        </p:spPr>
+        <p:txBody>
+          <a:bodyPr wrap="none">
+            <a:spAutoFit/>
+          </a:bodyPr>
+          <a:lstStyle/>
+          <a:p>
+            <a:r>
+              <a:rPr lang="en-US" b="1" dirty="0">
+                <a:solidFill>
+                  <a:srgbClr val="386BC4"/>
+                </a:solidFill>
+                <a:latin typeface="Consolas" panose="020B0609020204030204" pitchFamily="49" charset="0"/>
+              </a:rPr>
+              <a:t>Map&lt;String, bool&gt; </a:t>
+            </a:r>
+            <a:r>
+              <a:rPr lang="en-US" b="1" dirty="0" err="1">
+                <a:solidFill>
+                  <a:srgbClr val="386BC4"/>
+                </a:solidFill>
+                <a:latin typeface="Consolas" panose="020B0609020204030204" pitchFamily="49" charset="0"/>
+              </a:rPr>
+              <a:t>mappedFlavours</a:t>
+            </a:r>
+            <a:endParaRPr lang="en-US" b="1" dirty="0">
+              <a:solidFill>
+                <a:srgbClr val="386BC4"/>
+              </a:solidFill>
+              <a:latin typeface="Consolas" panose="020B0609020204030204" pitchFamily="49" charset="0"/>
+            </a:endParaRPr>
+          </a:p>
+        </p:txBody>
+      </p:sp>
+      <p:grpSp>
+        <p:nvGrpSpPr>
+          <p:cNvPr id="42" name="Group 41"/>
+          <p:cNvGrpSpPr/>
+          <p:nvPr/>
+        </p:nvGrpSpPr>
+        <p:grpSpPr>
+          <a:xfrm>
+            <a:off x="5658706" y="792123"/>
+            <a:ext cx="6250958" cy="1305072"/>
+            <a:chOff x="2525098" y="3134975"/>
+            <a:chExt cx="6235723" cy="1305072"/>
+          </a:xfrm>
+        </p:grpSpPr>
+        <p:sp>
+          <p:nvSpPr>
+            <p:cNvPr id="43" name="Rectangle 42"/>
+            <p:cNvSpPr/>
+            <p:nvPr/>
+          </p:nvSpPr>
+          <p:spPr>
+            <a:xfrm>
+              <a:off x="2525099" y="3134975"/>
+              <a:ext cx="1467780" cy="653143"/>
+            </a:xfrm>
+            <a:prstGeom prst="rect">
+              <a:avLst/>
+            </a:prstGeom>
+          </p:spPr>
+          <p:style>
+            <a:lnRef idx="2">
+              <a:schemeClr val="accent1">
+                <a:shade val="50000"/>
+              </a:schemeClr>
+            </a:lnRef>
+            <a:fillRef idx="1">
+              <a:schemeClr val="accent1"/>
+            </a:fillRef>
+            <a:effectRef idx="0">
+              <a:schemeClr val="accent1"/>
+            </a:effectRef>
+            <a:fontRef idx="minor">
+              <a:schemeClr val="lt1"/>
+            </a:fontRef>
+          </p:style>
+          <p:txBody>
+            <a:bodyPr rtlCol="0" anchor="ctr"/>
+            <a:lstStyle/>
+            <a:p>
+              <a:pPr algn="ctr"/>
+              <a:r>
+                <a:rPr lang="en-US" b="1" dirty="0" smtClean="0">
+                  <a:solidFill>
+                    <a:schemeClr val="bg1"/>
+                  </a:solidFill>
+                  <a:effectLst/>
+                  <a:latin typeface="Consolas" panose="020B0609020204030204" pitchFamily="49" charset="0"/>
+                </a:rPr>
+                <a:t>Chocolate</a:t>
+              </a:r>
+              <a:endParaRPr lang="en-US" b="1" dirty="0">
+                <a:solidFill>
+                  <a:schemeClr val="bg1"/>
+                </a:solidFill>
+              </a:endParaRPr>
+            </a:p>
+          </p:txBody>
+        </p:sp>
+        <p:sp>
+          <p:nvSpPr>
+            <p:cNvPr id="44" name="Rectangle 43"/>
+            <p:cNvSpPr/>
+            <p:nvPr/>
+          </p:nvSpPr>
+          <p:spPr>
+            <a:xfrm>
+              <a:off x="3992878" y="3134975"/>
+              <a:ext cx="1463039" cy="653143"/>
+            </a:xfrm>
+            <a:prstGeom prst="rect">
+              <a:avLst/>
+            </a:prstGeom>
+          </p:spPr>
+          <p:style>
+            <a:lnRef idx="2">
+              <a:schemeClr val="accent1">
+                <a:shade val="50000"/>
+              </a:schemeClr>
+            </a:lnRef>
+            <a:fillRef idx="1">
+              <a:schemeClr val="accent1"/>
+            </a:fillRef>
+            <a:effectRef idx="0">
+              <a:schemeClr val="accent1"/>
+            </a:effectRef>
+            <a:fontRef idx="minor">
+              <a:schemeClr val="lt1"/>
+            </a:fontRef>
+          </p:style>
+          <p:txBody>
+            <a:bodyPr rtlCol="0" anchor="ctr"/>
+            <a:lstStyle/>
+            <a:p>
+              <a:pPr algn="ctr"/>
+              <a:r>
+                <a:rPr lang="en-US" b="1" dirty="0" smtClean="0">
+                  <a:solidFill>
+                    <a:schemeClr val="bg1"/>
+                  </a:solidFill>
+                  <a:effectLst/>
+                  <a:latin typeface="Consolas" panose="020B0609020204030204" pitchFamily="49" charset="0"/>
+                </a:rPr>
+                <a:t>Caramel</a:t>
+              </a:r>
+              <a:endParaRPr lang="en-US" b="1" dirty="0">
+                <a:solidFill>
+                  <a:schemeClr val="bg1"/>
+                </a:solidFill>
+              </a:endParaRPr>
+            </a:p>
+          </p:txBody>
+        </p:sp>
+        <p:sp>
+          <p:nvSpPr>
+            <p:cNvPr id="45" name="Rectangle 44"/>
+            <p:cNvSpPr/>
+            <p:nvPr/>
+          </p:nvSpPr>
+          <p:spPr>
+            <a:xfrm>
+              <a:off x="5455917" y="3134975"/>
+              <a:ext cx="1463039" cy="653143"/>
+            </a:xfrm>
+            <a:prstGeom prst="rect">
+              <a:avLst/>
+            </a:prstGeom>
+          </p:spPr>
+          <p:style>
+            <a:lnRef idx="2">
+              <a:schemeClr val="accent1">
+                <a:shade val="50000"/>
+              </a:schemeClr>
+            </a:lnRef>
+            <a:fillRef idx="1">
+              <a:schemeClr val="accent1"/>
+            </a:fillRef>
+            <a:effectRef idx="0">
+              <a:schemeClr val="accent1"/>
+            </a:effectRef>
+            <a:fontRef idx="minor">
+              <a:schemeClr val="lt1"/>
+            </a:fontRef>
+          </p:style>
+          <p:txBody>
+            <a:bodyPr rtlCol="0" anchor="ctr"/>
+            <a:lstStyle/>
+            <a:p>
+              <a:pPr algn="ctr"/>
+              <a:r>
+                <a:rPr lang="en-US" b="1" dirty="0" smtClean="0">
+                  <a:solidFill>
+                    <a:schemeClr val="bg1"/>
+                  </a:solidFill>
+                  <a:effectLst/>
+                  <a:latin typeface="Consolas" panose="020B0609020204030204" pitchFamily="49" charset="0"/>
+                </a:rPr>
+                <a:t>Vanilla</a:t>
+              </a:r>
+              <a:endParaRPr lang="en-US" b="1" dirty="0">
+                <a:solidFill>
+                  <a:schemeClr val="bg1"/>
+                </a:solidFill>
+              </a:endParaRPr>
+            </a:p>
+          </p:txBody>
+        </p:sp>
+        <p:sp>
+          <p:nvSpPr>
+            <p:cNvPr id="46" name="Rectangle 45"/>
+            <p:cNvSpPr/>
+            <p:nvPr/>
+          </p:nvSpPr>
+          <p:spPr>
+            <a:xfrm>
+              <a:off x="6918956" y="3134975"/>
+              <a:ext cx="1841865" cy="653143"/>
+            </a:xfrm>
+            <a:prstGeom prst="rect">
+              <a:avLst/>
+            </a:prstGeom>
+          </p:spPr>
+          <p:style>
+            <a:lnRef idx="2">
+              <a:schemeClr val="accent1">
+                <a:shade val="50000"/>
+              </a:schemeClr>
+            </a:lnRef>
+            <a:fillRef idx="1">
+              <a:schemeClr val="accent1"/>
+            </a:fillRef>
+            <a:effectRef idx="0">
+              <a:schemeClr val="accent1"/>
+            </a:effectRef>
+            <a:fontRef idx="minor">
+              <a:schemeClr val="lt1"/>
+            </a:fontRef>
+          </p:style>
+          <p:txBody>
+            <a:bodyPr rtlCol="0" anchor="ctr"/>
+            <a:lstStyle/>
+            <a:p>
+              <a:pPr algn="ctr"/>
+              <a:r>
+                <a:rPr lang="en-US" b="1" dirty="0" smtClean="0">
+                  <a:solidFill>
+                    <a:schemeClr val="bg1"/>
+                  </a:solidFill>
+                  <a:effectLst/>
+                  <a:latin typeface="Consolas" panose="020B0609020204030204" pitchFamily="49" charset="0"/>
+                </a:rPr>
+                <a:t>Peanut Butter</a:t>
+              </a:r>
+              <a:endParaRPr lang="en-US" b="1" dirty="0">
+                <a:solidFill>
+                  <a:schemeClr val="bg1"/>
+                </a:solidFill>
+              </a:endParaRPr>
+            </a:p>
+          </p:txBody>
+        </p:sp>
+        <p:sp>
+          <p:nvSpPr>
+            <p:cNvPr id="47" name="Rectangle 46"/>
+            <p:cNvSpPr/>
+            <p:nvPr/>
+          </p:nvSpPr>
+          <p:spPr>
+            <a:xfrm>
+              <a:off x="2525098" y="3786904"/>
+              <a:ext cx="1463039" cy="653143"/>
+            </a:xfrm>
+            <a:prstGeom prst="rect">
+              <a:avLst/>
+            </a:prstGeom>
+          </p:spPr>
+          <p:style>
+            <a:lnRef idx="2">
+              <a:schemeClr val="accent2">
+                <a:shade val="50000"/>
+              </a:schemeClr>
+            </a:lnRef>
+            <a:fillRef idx="1">
+              <a:schemeClr val="accent2"/>
+            </a:fillRef>
+            <a:effectRef idx="0">
+              <a:schemeClr val="accent2"/>
+            </a:effectRef>
+            <a:fontRef idx="minor">
+              <a:schemeClr val="lt1"/>
+            </a:fontRef>
+          </p:style>
+          <p:txBody>
+            <a:bodyPr rtlCol="0" anchor="ctr"/>
+            <a:lstStyle/>
+            <a:p>
+              <a:pPr algn="ctr"/>
+              <a:r>
+                <a:rPr lang="en-US" b="1" dirty="0" smtClean="0">
+                  <a:solidFill>
+                    <a:schemeClr val="bg1"/>
+                  </a:solidFill>
+                  <a:effectLst/>
+                  <a:latin typeface="Consolas" panose="020B0609020204030204" pitchFamily="49" charset="0"/>
+                </a:rPr>
+                <a:t>false</a:t>
+              </a:r>
+              <a:endParaRPr lang="en-US" b="1" dirty="0">
+                <a:solidFill>
+                  <a:schemeClr val="bg1"/>
+                </a:solidFill>
+              </a:endParaRPr>
+            </a:p>
+          </p:txBody>
+        </p:sp>
+        <p:sp>
+          <p:nvSpPr>
+            <p:cNvPr id="48" name="Rectangle 47"/>
+            <p:cNvSpPr/>
+            <p:nvPr/>
+          </p:nvSpPr>
+          <p:spPr>
+            <a:xfrm>
+              <a:off x="3992877" y="3786904"/>
+              <a:ext cx="1463039" cy="653143"/>
+            </a:xfrm>
+            <a:prstGeom prst="rect">
+              <a:avLst/>
+            </a:prstGeom>
+          </p:spPr>
+          <p:style>
+            <a:lnRef idx="2">
+              <a:schemeClr val="accent2">
+                <a:shade val="50000"/>
+              </a:schemeClr>
+            </a:lnRef>
+            <a:fillRef idx="1">
+              <a:schemeClr val="accent2"/>
+            </a:fillRef>
+            <a:effectRef idx="0">
+              <a:schemeClr val="accent2"/>
+            </a:effectRef>
+            <a:fontRef idx="minor">
+              <a:schemeClr val="lt1"/>
+            </a:fontRef>
+          </p:style>
+          <p:txBody>
+            <a:bodyPr rtlCol="0" anchor="ctr"/>
+            <a:lstStyle/>
+            <a:p>
+              <a:pPr algn="ctr"/>
+              <a:r>
+                <a:rPr lang="en-US" b="1" dirty="0" smtClean="0">
+                  <a:solidFill>
+                    <a:schemeClr val="bg1"/>
+                  </a:solidFill>
+                  <a:effectLst/>
+                  <a:latin typeface="Consolas" panose="020B0609020204030204" pitchFamily="49" charset="0"/>
+                </a:rPr>
+                <a:t>false</a:t>
+              </a:r>
+              <a:endParaRPr lang="en-US" b="1" dirty="0">
+                <a:solidFill>
+                  <a:schemeClr val="bg1"/>
+                </a:solidFill>
+              </a:endParaRPr>
+            </a:p>
+          </p:txBody>
+        </p:sp>
+        <p:sp>
+          <p:nvSpPr>
+            <p:cNvPr id="49" name="Rectangle 48"/>
+            <p:cNvSpPr/>
+            <p:nvPr/>
+          </p:nvSpPr>
+          <p:spPr>
+            <a:xfrm>
+              <a:off x="5455917" y="3786904"/>
+              <a:ext cx="1463039" cy="653143"/>
+            </a:xfrm>
+            <a:prstGeom prst="rect">
+              <a:avLst/>
+            </a:prstGeom>
+          </p:spPr>
+          <p:style>
+            <a:lnRef idx="2">
+              <a:schemeClr val="accent2">
+                <a:shade val="50000"/>
+              </a:schemeClr>
+            </a:lnRef>
+            <a:fillRef idx="1">
+              <a:schemeClr val="accent2"/>
+            </a:fillRef>
+            <a:effectRef idx="0">
+              <a:schemeClr val="accent2"/>
+            </a:effectRef>
+            <a:fontRef idx="minor">
+              <a:schemeClr val="lt1"/>
+            </a:fontRef>
+          </p:style>
+          <p:txBody>
+            <a:bodyPr rtlCol="0" anchor="ctr"/>
+            <a:lstStyle/>
+            <a:p>
+              <a:pPr algn="ctr"/>
+              <a:r>
+                <a:rPr lang="en-US" b="1" dirty="0" smtClean="0">
+                  <a:solidFill>
+                    <a:schemeClr val="bg1"/>
+                  </a:solidFill>
+                  <a:effectLst/>
+                  <a:latin typeface="Consolas" panose="020B0609020204030204" pitchFamily="49" charset="0"/>
+                </a:rPr>
+                <a:t>false</a:t>
+              </a:r>
+              <a:endParaRPr lang="en-US" b="1" dirty="0">
+                <a:solidFill>
+                  <a:schemeClr val="bg1"/>
+                </a:solidFill>
+              </a:endParaRPr>
+            </a:p>
+          </p:txBody>
+        </p:sp>
+        <p:sp>
+          <p:nvSpPr>
+            <p:cNvPr id="50" name="Rectangle 49"/>
+            <p:cNvSpPr/>
+            <p:nvPr/>
+          </p:nvSpPr>
+          <p:spPr>
+            <a:xfrm>
+              <a:off x="6918956" y="3786904"/>
+              <a:ext cx="1841865" cy="653143"/>
+            </a:xfrm>
+            <a:prstGeom prst="rect">
+              <a:avLst/>
+            </a:prstGeom>
+          </p:spPr>
+          <p:style>
+            <a:lnRef idx="2">
+              <a:schemeClr val="accent2">
+                <a:shade val="50000"/>
+              </a:schemeClr>
+            </a:lnRef>
+            <a:fillRef idx="1">
+              <a:schemeClr val="accent2"/>
+            </a:fillRef>
+            <a:effectRef idx="0">
+              <a:schemeClr val="accent2"/>
+            </a:effectRef>
+            <a:fontRef idx="minor">
+              <a:schemeClr val="lt1"/>
+            </a:fontRef>
+          </p:style>
+          <p:txBody>
+            <a:bodyPr rtlCol="0" anchor="ctr"/>
+            <a:lstStyle/>
+            <a:p>
+              <a:pPr algn="ctr"/>
+              <a:r>
+                <a:rPr lang="en-US" b="1" dirty="0" smtClean="0">
+                  <a:solidFill>
+                    <a:schemeClr val="bg1"/>
+                  </a:solidFill>
+                  <a:effectLst/>
+                  <a:latin typeface="Consolas" panose="020B0609020204030204" pitchFamily="49" charset="0"/>
+                </a:rPr>
+                <a:t>false</a:t>
+              </a:r>
+              <a:endParaRPr lang="en-US" b="1" dirty="0">
+                <a:solidFill>
+                  <a:schemeClr val="bg1"/>
+                </a:solidFill>
+              </a:endParaRPr>
+            </a:p>
+          </p:txBody>
+        </p:sp>
+      </p:grpSp>
+      <p:sp>
+        <p:nvSpPr>
+          <p:cNvPr id="51" name="Rectangle 50"/>
+          <p:cNvSpPr/>
+          <p:nvPr/>
+        </p:nvSpPr>
+        <p:spPr>
+          <a:xfrm>
+            <a:off x="6128211" y="2097195"/>
+            <a:ext cx="6196250" cy="369332"/>
+          </a:xfrm>
+          <a:prstGeom prst="rect">
+            <a:avLst/>
+          </a:prstGeom>
+        </p:spPr>
+        <p:txBody>
+          <a:bodyPr wrap="square">
+            <a:spAutoFit/>
+          </a:bodyPr>
+          <a:lstStyle/>
+          <a:p>
+            <a:r>
+              <a:rPr lang="en-US" b="1" dirty="0" smtClean="0">
+                <a:effectLst/>
+                <a:latin typeface="Consolas" panose="020B0609020204030204" pitchFamily="49" charset="0"/>
+              </a:rPr>
+              <a:t>  0           1          2            3</a:t>
+            </a:r>
+            <a:endParaRPr lang="en-US" b="1" dirty="0">
+              <a:effectLst/>
+              <a:latin typeface="Consolas" panose="020B0609020204030204" pitchFamily="49" charset="0"/>
+            </a:endParaRPr>
+          </a:p>
+        </p:txBody>
+      </p:sp>
+      <p:sp>
+        <p:nvSpPr>
+          <p:cNvPr id="52" name="Rectangle 51"/>
+          <p:cNvSpPr/>
+          <p:nvPr/>
+        </p:nvSpPr>
+        <p:spPr>
+          <a:xfrm>
+            <a:off x="5147741" y="2149121"/>
+            <a:ext cx="745717" cy="338554"/>
+          </a:xfrm>
+          <a:prstGeom prst="rect">
+            <a:avLst/>
+          </a:prstGeom>
+        </p:spPr>
+        <p:txBody>
+          <a:bodyPr wrap="none">
+            <a:spAutoFit/>
+          </a:bodyPr>
+          <a:lstStyle/>
+          <a:p>
+            <a:r>
+              <a:rPr lang="en-US" sz="1600" b="1" dirty="0" smtClean="0">
+                <a:effectLst/>
+                <a:latin typeface="Consolas" panose="020B0609020204030204" pitchFamily="49" charset="0"/>
+              </a:rPr>
+              <a:t>INDEX</a:t>
+            </a:r>
+            <a:endParaRPr lang="en-US" b="1" dirty="0">
+              <a:effectLst/>
+              <a:latin typeface="Consolas" panose="020B0609020204030204" pitchFamily="49" charset="0"/>
+            </a:endParaRPr>
+          </a:p>
+        </p:txBody>
+      </p:sp>
+      <p:sp>
+        <p:nvSpPr>
+          <p:cNvPr id="29" name="Rectangle 28"/>
+          <p:cNvSpPr/>
+          <p:nvPr/>
+        </p:nvSpPr>
+        <p:spPr>
+          <a:xfrm>
+            <a:off x="8234774" y="2303197"/>
+            <a:ext cx="744583" cy="1015663"/>
+          </a:xfrm>
+          <a:prstGeom prst="rect">
+            <a:avLst/>
+          </a:prstGeom>
+        </p:spPr>
+        <p:txBody>
+          <a:bodyPr wrap="square">
+            <a:spAutoFit/>
+          </a:bodyPr>
+          <a:lstStyle/>
+          <a:p>
+            <a:pPr algn="ctr"/>
+            <a:r>
+              <a:rPr lang="en-US" sz="6000" b="1" dirty="0" smtClean="0">
+                <a:solidFill>
+                  <a:srgbClr val="C00000"/>
+                </a:solidFill>
+                <a:latin typeface="Consolas" panose="020B0609020204030204" pitchFamily="49" charset="0"/>
+                <a:sym typeface="Wingdings 2" panose="05020102010507070707" pitchFamily="18" charset="2"/>
+              </a:rPr>
+              <a:t></a:t>
+            </a:r>
+            <a:endParaRPr lang="en-US" sz="6000" b="1" dirty="0">
+              <a:solidFill>
+                <a:srgbClr val="C00000"/>
+              </a:solidFill>
+              <a:latin typeface="Consolas" panose="020B0609020204030204" pitchFamily="49" charset="0"/>
+            </a:endParaRPr>
+          </a:p>
+        </p:txBody>
+      </p:sp>
+      <p:sp>
+        <p:nvSpPr>
+          <p:cNvPr id="31" name="Rectangle 30"/>
+          <p:cNvSpPr/>
+          <p:nvPr/>
+        </p:nvSpPr>
+        <p:spPr>
+          <a:xfrm>
+            <a:off x="2165143" y="2234285"/>
+            <a:ext cx="744583" cy="1015663"/>
+          </a:xfrm>
+          <a:prstGeom prst="rect">
+            <a:avLst/>
+          </a:prstGeom>
+        </p:spPr>
+        <p:txBody>
+          <a:bodyPr wrap="square">
+            <a:spAutoFit/>
+          </a:bodyPr>
+          <a:lstStyle/>
+          <a:p>
+            <a:pPr algn="ctr"/>
+            <a:r>
+              <a:rPr lang="en-US" sz="6000" b="1" dirty="0">
+                <a:solidFill>
+                  <a:srgbClr val="C00000"/>
+                </a:solidFill>
+                <a:latin typeface="Consolas" panose="020B0609020204030204" pitchFamily="49" charset="0"/>
+              </a:rPr>
+              <a:t>X</a:t>
+            </a:r>
+          </a:p>
+        </p:txBody>
+      </p:sp>
+    </p:spTree>
+    <p:extLst>
+      <p:ext uri="{BB962C8B-B14F-4D97-AF65-F5344CB8AC3E}">
+        <p14:creationId xmlns:p14="http://schemas.microsoft.com/office/powerpoint/2010/main" val="840610143"/>
       </p:ext>
     </p:extLst>
   </p:cSld>

</xml_diff>